<commit_message>
Add 2D-AntiCollision Monitoring System rev. A02 document.
</commit_message>
<xml_diff>
--- a/2D-AntiCollision Monitoring System.pptx
+++ b/2D-AntiCollision Monitoring System.pptx
@@ -11,11 +11,10 @@
     <p:sldId id="259" r:id="rId5"/>
     <p:sldId id="260" r:id="rId6"/>
     <p:sldId id="261" r:id="rId7"/>
-    <p:sldId id="262" r:id="rId8"/>
-    <p:sldId id="263" r:id="rId9"/>
-    <p:sldId id="264" r:id="rId10"/>
-    <p:sldId id="265" r:id="rId11"/>
-    <p:sldId id="266" r:id="rId12"/>
+    <p:sldId id="263" r:id="rId8"/>
+    <p:sldId id="264" r:id="rId9"/>
+    <p:sldId id="265" r:id="rId10"/>
+    <p:sldId id="266" r:id="rId11"/>
   </p:sldIdLst>
   <p:sldSz cx="9144000" cy="6858000" type="screen4x3"/>
   <p:notesSz cx="6858000" cy="9144000"/>
@@ -114,6 +113,22 @@
       </a:defRPr>
     </a:lvl9pPr>
   </p:defaultTextStyle>
+  <p:extLst>
+    <p:ext uri="{EFAFB233-063F-42B5-8137-9DF3F51BA10A}">
+      <p15:sldGuideLst xmlns:p15="http://schemas.microsoft.com/office/powerpoint/2012/main">
+        <p15:guide id="1" orient="horz" pos="2160">
+          <p15:clr>
+            <a:srgbClr val="A4A3A4"/>
+          </p15:clr>
+        </p15:guide>
+        <p15:guide id="2" pos="2880">
+          <p15:clr>
+            <a:srgbClr val="A4A3A4"/>
+          </p15:clr>
+        </p15:guide>
+      </p15:sldGuideLst>
+    </p:ext>
+  </p:extLst>
 </p:presentation>
 </file>
 
@@ -3101,40 +3116,386 @@
           </a:ln>
         </p:spPr>
       </p:pic>
+      <p:sp>
+        <p:nvSpPr>
+          <p:cNvPr id="2" name="TextBox 1"/>
+          <p:cNvSpPr txBox="1"/>
+          <p:nvPr/>
+        </p:nvSpPr>
+        <p:spPr>
+          <a:xfrm>
+            <a:off x="1547664" y="548680"/>
+            <a:ext cx="3888432" cy="369332"/>
+          </a:xfrm>
+          <a:prstGeom prst="rect">
+            <a:avLst/>
+          </a:prstGeom>
+          <a:noFill/>
+        </p:spPr>
+        <p:txBody>
+          <a:bodyPr wrap="square" rtlCol="0">
+            <a:spAutoFit/>
+          </a:bodyPr>
+          <a:lstStyle/>
+          <a:p>
+            <a:r>
+              <a:rPr lang="ko-KR" altLang="en-US" smtClean="0"/>
+              <a:t>기본 </a:t>
+            </a:r>
+            <a:r>
+              <a:rPr lang="ko-KR" altLang="en-US" dirty="0" smtClean="0"/>
+              <a:t>화면</a:t>
+            </a:r>
+            <a:endParaRPr lang="ko-KR" altLang="en-US" dirty="0"/>
+          </a:p>
+        </p:txBody>
+      </p:sp>
+      <p:sp>
+        <p:nvSpPr>
+          <p:cNvPr id="3" name="사각형 설명선 2"/>
+          <p:cNvSpPr/>
+          <p:nvPr/>
+        </p:nvSpPr>
+        <p:spPr>
+          <a:xfrm>
+            <a:off x="2987824" y="5085184"/>
+            <a:ext cx="1368152" cy="504056"/>
+          </a:xfrm>
+          <a:prstGeom prst="wedgeRectCallout">
+            <a:avLst>
+              <a:gd name="adj1" fmla="val 45318"/>
+              <a:gd name="adj2" fmla="val -88234"/>
+            </a:avLst>
+          </a:prstGeom>
+          <a:noFill/>
+          <a:ln>
+            <a:solidFill>
+              <a:schemeClr val="bg1">
+                <a:lumMod val="75000"/>
+              </a:schemeClr>
+            </a:solidFill>
+          </a:ln>
+        </p:spPr>
+        <p:style>
+          <a:lnRef idx="2">
+            <a:schemeClr val="accent1">
+              <a:shade val="50000"/>
+            </a:schemeClr>
+          </a:lnRef>
+          <a:fillRef idx="1">
+            <a:schemeClr val="accent1"/>
+          </a:fillRef>
+          <a:effectRef idx="0">
+            <a:schemeClr val="accent1"/>
+          </a:effectRef>
+          <a:fontRef idx="minor">
+            <a:schemeClr val="lt1"/>
+          </a:fontRef>
+        </p:style>
+        <p:txBody>
+          <a:bodyPr rtlCol="0" anchor="ctr"/>
+          <a:lstStyle/>
+          <a:p>
+            <a:pPr algn="ctr"/>
+            <a:r>
+              <a:rPr lang="en-US" altLang="ko-KR" sz="1200" dirty="0" smtClean="0">
+                <a:solidFill>
+                  <a:schemeClr val="tx1"/>
+                </a:solidFill>
+              </a:rPr>
+              <a:t>2D Laser Scanner </a:t>
+            </a:r>
+            <a:r>
+              <a:rPr lang="ko-KR" altLang="en-US" sz="1200" dirty="0" smtClean="0">
+                <a:solidFill>
+                  <a:schemeClr val="tx1"/>
+                </a:solidFill>
+              </a:rPr>
+              <a:t>이미지</a:t>
+            </a:r>
+            <a:endParaRPr lang="en-US" altLang="ko-KR" sz="1200" dirty="0" smtClean="0">
+              <a:solidFill>
+                <a:schemeClr val="tx1"/>
+              </a:solidFill>
+            </a:endParaRPr>
+          </a:p>
+        </p:txBody>
+      </p:sp>
+      <p:sp>
+        <p:nvSpPr>
+          <p:cNvPr id="6" name="사각형 설명선 5"/>
+          <p:cNvSpPr/>
+          <p:nvPr/>
+        </p:nvSpPr>
+        <p:spPr>
+          <a:xfrm>
+            <a:off x="2555776" y="1268761"/>
+            <a:ext cx="1116124" cy="504056"/>
+          </a:xfrm>
+          <a:prstGeom prst="wedgeRectCallout">
+            <a:avLst>
+              <a:gd name="adj1" fmla="val 44710"/>
+              <a:gd name="adj2" fmla="val 169037"/>
+            </a:avLst>
+          </a:prstGeom>
+          <a:noFill/>
+          <a:ln>
+            <a:solidFill>
+              <a:schemeClr val="bg1">
+                <a:lumMod val="75000"/>
+              </a:schemeClr>
+            </a:solidFill>
+          </a:ln>
+        </p:spPr>
+        <p:style>
+          <a:lnRef idx="2">
+            <a:schemeClr val="accent1">
+              <a:shade val="50000"/>
+            </a:schemeClr>
+          </a:lnRef>
+          <a:fillRef idx="1">
+            <a:schemeClr val="accent1"/>
+          </a:fillRef>
+          <a:effectRef idx="0">
+            <a:schemeClr val="accent1"/>
+          </a:effectRef>
+          <a:fontRef idx="minor">
+            <a:schemeClr val="lt1"/>
+          </a:fontRef>
+        </p:style>
+        <p:txBody>
+          <a:bodyPr rtlCol="0" anchor="ctr"/>
+          <a:lstStyle/>
+          <a:p>
+            <a:pPr algn="ctr"/>
+            <a:r>
+              <a:rPr lang="en-US" altLang="ko-KR" sz="1200" dirty="0" smtClean="0">
+                <a:solidFill>
+                  <a:schemeClr val="tx1"/>
+                </a:solidFill>
+              </a:rPr>
+              <a:t>Alert </a:t>
+            </a:r>
+            <a:r>
+              <a:rPr lang="ko-KR" altLang="en-US" sz="1200" dirty="0" smtClean="0">
+                <a:solidFill>
+                  <a:schemeClr val="tx1"/>
+                </a:solidFill>
+              </a:rPr>
+              <a:t>영역</a:t>
+            </a:r>
+            <a:endParaRPr lang="en-US" altLang="ko-KR" sz="1200" dirty="0" smtClean="0">
+              <a:solidFill>
+                <a:schemeClr val="tx1"/>
+              </a:solidFill>
+            </a:endParaRPr>
+          </a:p>
+          <a:p>
+            <a:pPr algn="ctr"/>
+            <a:r>
+              <a:rPr lang="en-US" altLang="ko-KR" sz="1200" dirty="0" smtClean="0">
+                <a:solidFill>
+                  <a:schemeClr val="tx1"/>
+                </a:solidFill>
+              </a:rPr>
+              <a:t>(</a:t>
+            </a:r>
+            <a:r>
+              <a:rPr lang="ko-KR" altLang="en-US" sz="1200" dirty="0" smtClean="0">
+                <a:solidFill>
+                  <a:schemeClr val="tx1"/>
+                </a:solidFill>
+              </a:rPr>
+              <a:t>노랑색 상자</a:t>
+            </a:r>
+            <a:r>
+              <a:rPr lang="en-US" altLang="ko-KR" sz="1200" dirty="0" smtClean="0">
+                <a:solidFill>
+                  <a:schemeClr val="tx1"/>
+                </a:solidFill>
+              </a:rPr>
+              <a:t>)</a:t>
+            </a:r>
+          </a:p>
+        </p:txBody>
+      </p:sp>
+      <p:sp>
+        <p:nvSpPr>
+          <p:cNvPr id="7" name="사각형 설명선 6"/>
+          <p:cNvSpPr/>
+          <p:nvPr/>
+        </p:nvSpPr>
+        <p:spPr>
+          <a:xfrm>
+            <a:off x="4067944" y="1268761"/>
+            <a:ext cx="1080120" cy="504056"/>
+          </a:xfrm>
+          <a:prstGeom prst="wedgeRectCallout">
+            <a:avLst>
+              <a:gd name="adj1" fmla="val -35922"/>
+              <a:gd name="adj2" fmla="val 170686"/>
+            </a:avLst>
+          </a:prstGeom>
+          <a:noFill/>
+          <a:ln>
+            <a:solidFill>
+              <a:schemeClr val="bg1">
+                <a:lumMod val="75000"/>
+              </a:schemeClr>
+            </a:solidFill>
+          </a:ln>
+        </p:spPr>
+        <p:style>
+          <a:lnRef idx="2">
+            <a:schemeClr val="accent1">
+              <a:shade val="50000"/>
+            </a:schemeClr>
+          </a:lnRef>
+          <a:fillRef idx="1">
+            <a:schemeClr val="accent1"/>
+          </a:fillRef>
+          <a:effectRef idx="0">
+            <a:schemeClr val="accent1"/>
+          </a:effectRef>
+          <a:fontRef idx="minor">
+            <a:schemeClr val="lt1"/>
+          </a:fontRef>
+        </p:style>
+        <p:txBody>
+          <a:bodyPr rtlCol="0" anchor="ctr"/>
+          <a:lstStyle/>
+          <a:p>
+            <a:pPr algn="ctr"/>
+            <a:r>
+              <a:rPr lang="en-US" altLang="ko-KR" sz="1200" dirty="0" smtClean="0">
+                <a:solidFill>
+                  <a:schemeClr val="tx1"/>
+                </a:solidFill>
+              </a:rPr>
+              <a:t>Fault </a:t>
+            </a:r>
+            <a:r>
+              <a:rPr lang="ko-KR" altLang="en-US" sz="1200" dirty="0" smtClean="0">
+                <a:solidFill>
+                  <a:schemeClr val="tx1"/>
+                </a:solidFill>
+              </a:rPr>
+              <a:t>영역</a:t>
+            </a:r>
+            <a:endParaRPr lang="en-US" altLang="ko-KR" sz="1200" dirty="0" smtClean="0">
+              <a:solidFill>
+                <a:schemeClr val="tx1"/>
+              </a:solidFill>
+            </a:endParaRPr>
+          </a:p>
+          <a:p>
+            <a:pPr algn="ctr"/>
+            <a:r>
+              <a:rPr lang="en-US" altLang="ko-KR" sz="1200" dirty="0" smtClean="0">
+                <a:solidFill>
+                  <a:schemeClr val="tx1"/>
+                </a:solidFill>
+              </a:rPr>
+              <a:t>(</a:t>
+            </a:r>
+            <a:r>
+              <a:rPr lang="ko-KR" altLang="en-US" sz="1200" dirty="0" smtClean="0">
+                <a:solidFill>
+                  <a:schemeClr val="tx1"/>
+                </a:solidFill>
+              </a:rPr>
+              <a:t>빨강색 상자</a:t>
+            </a:r>
+            <a:r>
+              <a:rPr lang="en-US" altLang="ko-KR" sz="1200" dirty="0" smtClean="0">
+                <a:solidFill>
+                  <a:schemeClr val="tx1"/>
+                </a:solidFill>
+              </a:rPr>
+              <a:t>)</a:t>
+            </a:r>
+          </a:p>
+        </p:txBody>
+      </p:sp>
+      <p:sp>
+        <p:nvSpPr>
+          <p:cNvPr id="8" name="사각형 설명선 7"/>
+          <p:cNvSpPr/>
+          <p:nvPr/>
+        </p:nvSpPr>
+        <p:spPr>
+          <a:xfrm>
+            <a:off x="611560" y="2276872"/>
+            <a:ext cx="1440160" cy="504056"/>
+          </a:xfrm>
+          <a:prstGeom prst="wedgeRectCallout">
+            <a:avLst>
+              <a:gd name="adj1" fmla="val 104676"/>
+              <a:gd name="adj2" fmla="val -42606"/>
+            </a:avLst>
+          </a:prstGeom>
+          <a:noFill/>
+          <a:ln>
+            <a:solidFill>
+              <a:schemeClr val="bg1">
+                <a:lumMod val="75000"/>
+              </a:schemeClr>
+            </a:solidFill>
+          </a:ln>
+        </p:spPr>
+        <p:style>
+          <a:lnRef idx="2">
+            <a:schemeClr val="accent1">
+              <a:shade val="50000"/>
+            </a:schemeClr>
+          </a:lnRef>
+          <a:fillRef idx="1">
+            <a:schemeClr val="accent1"/>
+          </a:fillRef>
+          <a:effectRef idx="0">
+            <a:schemeClr val="accent1"/>
+          </a:effectRef>
+          <a:fontRef idx="minor">
+            <a:schemeClr val="lt1"/>
+          </a:fontRef>
+        </p:style>
+        <p:txBody>
+          <a:bodyPr rtlCol="0" anchor="ctr"/>
+          <a:lstStyle/>
+          <a:p>
+            <a:pPr algn="ctr"/>
+            <a:r>
+              <a:rPr lang="ko-KR" altLang="en-US" sz="1200" dirty="0" smtClean="0">
+                <a:solidFill>
+                  <a:schemeClr val="tx1"/>
+                </a:solidFill>
+              </a:rPr>
+              <a:t>릴레이 출력 상태</a:t>
+            </a:r>
+            <a:endParaRPr lang="en-US" altLang="ko-KR" sz="1200" dirty="0" smtClean="0">
+              <a:solidFill>
+                <a:schemeClr val="tx1"/>
+              </a:solidFill>
+            </a:endParaRPr>
+          </a:p>
+        </p:txBody>
+      </p:sp>
     </p:spTree>
   </p:cSld>
   <p:clrMapOvr>
     <a:masterClrMapping/>
   </p:clrMapOvr>
+  <p:timing>
+    <p:tnLst>
+      <p:par>
+        <p:cTn id="1" dur="indefinite" restart="never" nodeType="tmRoot"/>
+      </p:par>
+    </p:tnLst>
+  </p:timing>
 </p:sld>
 </file>
 
 <file path=ppt/slides/slide10.xml><?xml version="1.0" encoding="utf-8"?>
-<p:sld xmlns:a="http://schemas.openxmlformats.org/drawingml/2006/main" xmlns:r="http://schemas.openxmlformats.org/officeDocument/2006/relationships" xmlns:p="http://schemas.openxmlformats.org/presentationml/2006/main">
-  <p:cSld>
-    <p:spTree>
-      <p:nvGrpSpPr>
-        <p:cNvPr id="1" name=""/>
-        <p:cNvGrpSpPr/>
-        <p:nvPr/>
-      </p:nvGrpSpPr>
-      <p:grpSpPr>
-        <a:xfrm>
-          <a:off x="0" y="0"/>
-          <a:ext cx="0" cy="0"/>
-          <a:chOff x="0" y="0"/>
-          <a:chExt cx="0" cy="0"/>
-        </a:xfrm>
-      </p:grpSpPr>
-    </p:spTree>
-  </p:cSld>
-  <p:clrMapOvr>
-    <a:masterClrMapping/>
-  </p:clrMapOvr>
-</p:sld>
-</file>
-
-<file path=ppt/slides/slide11.xml><?xml version="1.0" encoding="utf-8"?>
 <p:sld xmlns:a="http://schemas.openxmlformats.org/drawingml/2006/main" xmlns:r="http://schemas.openxmlformats.org/officeDocument/2006/relationships" xmlns:p="http://schemas.openxmlformats.org/presentationml/2006/main">
   <p:cSld>
     <p:spTree>
@@ -3193,7 +3554,7 @@
         </p:blipFill>
         <p:spPr bwMode="auto">
           <a:xfrm>
-            <a:off x="2128838" y="1852613"/>
+            <a:off x="2124904" y="1844824"/>
             <a:ext cx="4886325" cy="3152775"/>
           </a:xfrm>
           <a:prstGeom prst="rect">
@@ -3208,11 +3569,637 @@
           </a:ln>
         </p:spPr>
       </p:pic>
+      <p:sp>
+        <p:nvSpPr>
+          <p:cNvPr id="3" name="TextBox 2"/>
+          <p:cNvSpPr txBox="1"/>
+          <p:nvPr/>
+        </p:nvSpPr>
+        <p:spPr>
+          <a:xfrm>
+            <a:off x="1547664" y="548680"/>
+            <a:ext cx="3888432" cy="553998"/>
+          </a:xfrm>
+          <a:prstGeom prst="rect">
+            <a:avLst/>
+          </a:prstGeom>
+          <a:noFill/>
+        </p:spPr>
+        <p:txBody>
+          <a:bodyPr wrap="square" rtlCol="0">
+            <a:spAutoFit/>
+          </a:bodyPr>
+          <a:lstStyle/>
+          <a:p>
+            <a:r>
+              <a:rPr lang="en-US" altLang="ko-KR" dirty="0" smtClean="0"/>
+              <a:t>System </a:t>
+            </a:r>
+            <a:r>
+              <a:rPr lang="ko-KR" altLang="en-US" dirty="0" smtClean="0"/>
+              <a:t>설정</a:t>
+            </a:r>
+            <a:r>
+              <a:rPr lang="en-US" altLang="ko-KR" dirty="0" smtClean="0"/>
+              <a:t> </a:t>
+            </a:r>
+            <a:r>
+              <a:rPr lang="ko-KR" altLang="en-US" dirty="0" smtClean="0"/>
+              <a:t>화면</a:t>
+            </a:r>
+            <a:endParaRPr lang="en-US" altLang="ko-KR" dirty="0" smtClean="0"/>
+          </a:p>
+          <a:p>
+            <a:r>
+              <a:rPr lang="en-US" altLang="ko-KR" sz="1200" dirty="0"/>
+              <a:t> </a:t>
+            </a:r>
+            <a:r>
+              <a:rPr lang="en-US" altLang="ko-KR" sz="1200" dirty="0" smtClean="0">
+                <a:sym typeface="Wingdings" panose="05000000000000000000" pitchFamily="2" charset="2"/>
+              </a:rPr>
+              <a:t> </a:t>
+            </a:r>
+            <a:r>
+              <a:rPr lang="ko-KR" altLang="en-US" sz="1200" dirty="0" smtClean="0">
+                <a:sym typeface="Wingdings" panose="05000000000000000000" pitchFamily="2" charset="2"/>
+              </a:rPr>
+              <a:t>키보드 </a:t>
+            </a:r>
+            <a:r>
+              <a:rPr lang="en-US" altLang="ko-KR" sz="1200" dirty="0" smtClean="0">
+                <a:sym typeface="Wingdings" panose="05000000000000000000" pitchFamily="2" charset="2"/>
+              </a:rPr>
+              <a:t>F1 </a:t>
+            </a:r>
+            <a:r>
+              <a:rPr lang="ko-KR" altLang="en-US" sz="1200" dirty="0" smtClean="0">
+                <a:sym typeface="Wingdings" panose="05000000000000000000" pitchFamily="2" charset="2"/>
+              </a:rPr>
+              <a:t>키로 진입</a:t>
+            </a:r>
+            <a:endParaRPr lang="ko-KR" altLang="en-US" sz="1200" dirty="0"/>
+          </a:p>
+        </p:txBody>
+      </p:sp>
+      <p:sp>
+        <p:nvSpPr>
+          <p:cNvPr id="4" name="사각형 설명선 3"/>
+          <p:cNvSpPr/>
+          <p:nvPr/>
+        </p:nvSpPr>
+        <p:spPr>
+          <a:xfrm>
+            <a:off x="899592" y="1388225"/>
+            <a:ext cx="2448272" cy="387615"/>
+          </a:xfrm>
+          <a:prstGeom prst="wedgeRectCallout">
+            <a:avLst>
+              <a:gd name="adj1" fmla="val 12794"/>
+              <a:gd name="adj2" fmla="val 202855"/>
+            </a:avLst>
+          </a:prstGeom>
+          <a:noFill/>
+          <a:ln>
+            <a:solidFill>
+              <a:schemeClr val="bg1">
+                <a:lumMod val="75000"/>
+              </a:schemeClr>
+            </a:solidFill>
+          </a:ln>
+        </p:spPr>
+        <p:style>
+          <a:lnRef idx="2">
+            <a:schemeClr val="accent1">
+              <a:shade val="50000"/>
+            </a:schemeClr>
+          </a:lnRef>
+          <a:fillRef idx="1">
+            <a:schemeClr val="accent1"/>
+          </a:fillRef>
+          <a:effectRef idx="0">
+            <a:schemeClr val="accent1"/>
+          </a:effectRef>
+          <a:fontRef idx="minor">
+            <a:schemeClr val="lt1"/>
+          </a:fontRef>
+        </p:style>
+        <p:txBody>
+          <a:bodyPr rtlCol="0" anchor="ctr"/>
+          <a:lstStyle/>
+          <a:p>
+            <a:pPr algn="ctr"/>
+            <a:r>
+              <a:rPr lang="ko-KR" altLang="en-US" sz="1000" dirty="0" smtClean="0">
+                <a:solidFill>
+                  <a:schemeClr val="tx1"/>
+                </a:solidFill>
+              </a:rPr>
+              <a:t>각종 설정 화면 진입 시 입력해야 하는 </a:t>
+            </a:r>
+            <a:r>
+              <a:rPr lang="en-US" altLang="ko-KR" sz="1000" dirty="0" smtClean="0">
+                <a:solidFill>
+                  <a:schemeClr val="tx1"/>
+                </a:solidFill>
+              </a:rPr>
+              <a:t>System password</a:t>
+            </a:r>
+          </a:p>
+        </p:txBody>
+      </p:sp>
+      <p:sp>
+        <p:nvSpPr>
+          <p:cNvPr id="5" name="사각형 설명선 4"/>
+          <p:cNvSpPr/>
+          <p:nvPr/>
+        </p:nvSpPr>
+        <p:spPr>
+          <a:xfrm>
+            <a:off x="61610" y="2204864"/>
+            <a:ext cx="1656184" cy="268939"/>
+          </a:xfrm>
+          <a:prstGeom prst="wedgeRectCallout">
+            <a:avLst>
+              <a:gd name="adj1" fmla="val 79861"/>
+              <a:gd name="adj2" fmla="val 72832"/>
+            </a:avLst>
+          </a:prstGeom>
+          <a:noFill/>
+          <a:ln>
+            <a:solidFill>
+              <a:schemeClr val="bg1">
+                <a:lumMod val="75000"/>
+              </a:schemeClr>
+            </a:solidFill>
+          </a:ln>
+        </p:spPr>
+        <p:style>
+          <a:lnRef idx="2">
+            <a:schemeClr val="accent1">
+              <a:shade val="50000"/>
+            </a:schemeClr>
+          </a:lnRef>
+          <a:fillRef idx="1">
+            <a:schemeClr val="accent1"/>
+          </a:fillRef>
+          <a:effectRef idx="0">
+            <a:schemeClr val="accent1"/>
+          </a:effectRef>
+          <a:fontRef idx="minor">
+            <a:schemeClr val="lt1"/>
+          </a:fontRef>
+        </p:style>
+        <p:txBody>
+          <a:bodyPr rtlCol="0" anchor="ctr"/>
+          <a:lstStyle/>
+          <a:p>
+            <a:r>
+              <a:rPr lang="ko-KR" altLang="en-US" sz="1000" dirty="0" smtClean="0">
+                <a:solidFill>
+                  <a:schemeClr val="tx1"/>
+                </a:solidFill>
+              </a:rPr>
+              <a:t>초당 </a:t>
+            </a:r>
+            <a:r>
+              <a:rPr lang="en-US" altLang="ko-KR" sz="1000" dirty="0" smtClean="0">
+                <a:solidFill>
+                  <a:schemeClr val="tx1"/>
+                </a:solidFill>
+              </a:rPr>
+              <a:t>Scan </a:t>
+            </a:r>
+            <a:r>
+              <a:rPr lang="ko-KR" altLang="en-US" sz="1000" dirty="0" smtClean="0">
+                <a:solidFill>
+                  <a:schemeClr val="tx1"/>
+                </a:solidFill>
+              </a:rPr>
+              <a:t>동작 회수</a:t>
+            </a:r>
+            <a:endParaRPr lang="en-US" altLang="ko-KR" sz="1000" dirty="0" smtClean="0">
+              <a:solidFill>
+                <a:schemeClr val="tx1"/>
+              </a:solidFill>
+            </a:endParaRPr>
+          </a:p>
+        </p:txBody>
+      </p:sp>
+      <p:sp>
+        <p:nvSpPr>
+          <p:cNvPr id="6" name="사각형 설명선 5"/>
+          <p:cNvSpPr/>
+          <p:nvPr/>
+        </p:nvSpPr>
+        <p:spPr>
+          <a:xfrm>
+            <a:off x="61610" y="2564904"/>
+            <a:ext cx="1656184" cy="359033"/>
+          </a:xfrm>
+          <a:prstGeom prst="wedgeRectCallout">
+            <a:avLst>
+              <a:gd name="adj1" fmla="val 77324"/>
+              <a:gd name="adj2" fmla="val 21288"/>
+            </a:avLst>
+          </a:prstGeom>
+          <a:noFill/>
+          <a:ln>
+            <a:solidFill>
+              <a:schemeClr val="bg1">
+                <a:lumMod val="75000"/>
+              </a:schemeClr>
+            </a:solidFill>
+          </a:ln>
+        </p:spPr>
+        <p:style>
+          <a:lnRef idx="2">
+            <a:schemeClr val="accent1">
+              <a:shade val="50000"/>
+            </a:schemeClr>
+          </a:lnRef>
+          <a:fillRef idx="1">
+            <a:schemeClr val="accent1"/>
+          </a:fillRef>
+          <a:effectRef idx="0">
+            <a:schemeClr val="accent1"/>
+          </a:effectRef>
+          <a:fontRef idx="minor">
+            <a:schemeClr val="lt1"/>
+          </a:fontRef>
+        </p:style>
+        <p:txBody>
+          <a:bodyPr rtlCol="0" anchor="ctr"/>
+          <a:lstStyle/>
+          <a:p>
+            <a:r>
+              <a:rPr lang="en-US" altLang="ko-KR" sz="1000" dirty="0" smtClean="0">
+                <a:solidFill>
+                  <a:schemeClr val="tx1"/>
+                </a:solidFill>
+              </a:rPr>
+              <a:t>Scan data </a:t>
+            </a:r>
+            <a:r>
+              <a:rPr lang="ko-KR" altLang="en-US" sz="1000" dirty="0" smtClean="0">
+                <a:solidFill>
+                  <a:schemeClr val="tx1"/>
+                </a:solidFill>
+              </a:rPr>
+              <a:t>상시</a:t>
+            </a:r>
+            <a:r>
+              <a:rPr lang="en-US" altLang="ko-KR" sz="1000" dirty="0" smtClean="0">
+                <a:solidFill>
+                  <a:schemeClr val="tx1"/>
+                </a:solidFill>
+              </a:rPr>
+              <a:t>/</a:t>
+            </a:r>
+            <a:r>
+              <a:rPr lang="ko-KR" altLang="en-US" sz="1000" dirty="0" smtClean="0">
+                <a:solidFill>
+                  <a:schemeClr val="tx1"/>
+                </a:solidFill>
+              </a:rPr>
+              <a:t>이벤트</a:t>
+            </a:r>
+            <a:r>
+              <a:rPr lang="en-US" altLang="ko-KR" sz="1000" dirty="0" smtClean="0">
+                <a:solidFill>
+                  <a:schemeClr val="tx1"/>
+                </a:solidFill>
+              </a:rPr>
+              <a:t> </a:t>
+            </a:r>
+            <a:r>
+              <a:rPr lang="ko-KR" altLang="en-US" sz="1000" dirty="0" smtClean="0">
+                <a:solidFill>
+                  <a:schemeClr val="tx1"/>
+                </a:solidFill>
+              </a:rPr>
+              <a:t>저장 시간</a:t>
+            </a:r>
+            <a:endParaRPr lang="en-US" altLang="ko-KR" sz="1000" dirty="0" smtClean="0">
+              <a:solidFill>
+                <a:schemeClr val="tx1"/>
+              </a:solidFill>
+            </a:endParaRPr>
+          </a:p>
+        </p:txBody>
+      </p:sp>
+      <p:sp>
+        <p:nvSpPr>
+          <p:cNvPr id="7" name="왼쪽 중괄호 6"/>
+          <p:cNvSpPr/>
+          <p:nvPr/>
+        </p:nvSpPr>
+        <p:spPr>
+          <a:xfrm>
+            <a:off x="2175417" y="2643262"/>
+            <a:ext cx="45719" cy="353690"/>
+          </a:xfrm>
+          <a:prstGeom prst="leftBrace">
+            <a:avLst/>
+          </a:prstGeom>
+        </p:spPr>
+        <p:style>
+          <a:lnRef idx="1">
+            <a:schemeClr val="accent1"/>
+          </a:lnRef>
+          <a:fillRef idx="0">
+            <a:schemeClr val="accent1"/>
+          </a:fillRef>
+          <a:effectRef idx="0">
+            <a:schemeClr val="accent1"/>
+          </a:effectRef>
+          <a:fontRef idx="minor">
+            <a:schemeClr val="tx1"/>
+          </a:fontRef>
+        </p:style>
+        <p:txBody>
+          <a:bodyPr rtlCol="0" anchor="ctr"/>
+          <a:lstStyle/>
+          <a:p>
+            <a:pPr algn="ctr"/>
+            <a:endParaRPr lang="ko-KR" altLang="en-US"/>
+          </a:p>
+        </p:txBody>
+      </p:sp>
+      <p:sp>
+        <p:nvSpPr>
+          <p:cNvPr id="9" name="사각형 설명선 8"/>
+          <p:cNvSpPr/>
+          <p:nvPr/>
+        </p:nvSpPr>
+        <p:spPr>
+          <a:xfrm>
+            <a:off x="60896" y="3016045"/>
+            <a:ext cx="1656184" cy="268939"/>
+          </a:xfrm>
+          <a:prstGeom prst="wedgeRectCallout">
+            <a:avLst>
+              <a:gd name="adj1" fmla="val 80244"/>
+              <a:gd name="adj2" fmla="val -26336"/>
+            </a:avLst>
+          </a:prstGeom>
+          <a:noFill/>
+          <a:ln>
+            <a:solidFill>
+              <a:schemeClr val="bg1">
+                <a:lumMod val="75000"/>
+              </a:schemeClr>
+            </a:solidFill>
+          </a:ln>
+        </p:spPr>
+        <p:style>
+          <a:lnRef idx="2">
+            <a:schemeClr val="accent1">
+              <a:shade val="50000"/>
+            </a:schemeClr>
+          </a:lnRef>
+          <a:fillRef idx="1">
+            <a:schemeClr val="accent1"/>
+          </a:fillRef>
+          <a:effectRef idx="0">
+            <a:schemeClr val="accent1"/>
+          </a:effectRef>
+          <a:fontRef idx="minor">
+            <a:schemeClr val="lt1"/>
+          </a:fontRef>
+        </p:style>
+        <p:txBody>
+          <a:bodyPr rtlCol="0" anchor="ctr"/>
+          <a:lstStyle/>
+          <a:p>
+            <a:r>
+              <a:rPr lang="ko-KR" altLang="en-US" sz="1000" dirty="0" smtClean="0">
+                <a:solidFill>
+                  <a:schemeClr val="tx1"/>
+                </a:solidFill>
+              </a:rPr>
+              <a:t>릴레이 모듈 연결 포트</a:t>
+            </a:r>
+            <a:endParaRPr lang="en-US" altLang="ko-KR" sz="1000" dirty="0" smtClean="0">
+              <a:solidFill>
+                <a:schemeClr val="tx1"/>
+              </a:solidFill>
+            </a:endParaRPr>
+          </a:p>
+        </p:txBody>
+      </p:sp>
+      <p:sp>
+        <p:nvSpPr>
+          <p:cNvPr id="10" name="왼쪽 중괄호 9"/>
+          <p:cNvSpPr/>
+          <p:nvPr/>
+        </p:nvSpPr>
+        <p:spPr>
+          <a:xfrm>
+            <a:off x="2176593" y="3198833"/>
+            <a:ext cx="45719" cy="596558"/>
+          </a:xfrm>
+          <a:prstGeom prst="leftBrace">
+            <a:avLst/>
+          </a:prstGeom>
+        </p:spPr>
+        <p:style>
+          <a:lnRef idx="1">
+            <a:schemeClr val="accent1"/>
+          </a:lnRef>
+          <a:fillRef idx="0">
+            <a:schemeClr val="accent1"/>
+          </a:fillRef>
+          <a:effectRef idx="0">
+            <a:schemeClr val="accent1"/>
+          </a:effectRef>
+          <a:fontRef idx="minor">
+            <a:schemeClr val="tx1"/>
+          </a:fontRef>
+        </p:style>
+        <p:txBody>
+          <a:bodyPr rtlCol="0" anchor="ctr"/>
+          <a:lstStyle/>
+          <a:p>
+            <a:pPr algn="ctr"/>
+            <a:endParaRPr lang="ko-KR" altLang="en-US"/>
+          </a:p>
+        </p:txBody>
+      </p:sp>
+      <p:sp>
+        <p:nvSpPr>
+          <p:cNvPr id="11" name="사각형 설명선 10"/>
+          <p:cNvSpPr/>
+          <p:nvPr/>
+        </p:nvSpPr>
+        <p:spPr>
+          <a:xfrm>
+            <a:off x="60896" y="3430007"/>
+            <a:ext cx="1990824" cy="935097"/>
+          </a:xfrm>
+          <a:prstGeom prst="wedgeRectCallout">
+            <a:avLst>
+              <a:gd name="adj1" fmla="val 56656"/>
+              <a:gd name="adj2" fmla="val -45873"/>
+            </a:avLst>
+          </a:prstGeom>
+          <a:noFill/>
+          <a:ln>
+            <a:solidFill>
+              <a:schemeClr val="bg1">
+                <a:lumMod val="75000"/>
+              </a:schemeClr>
+            </a:solidFill>
+          </a:ln>
+        </p:spPr>
+        <p:style>
+          <a:lnRef idx="2">
+            <a:schemeClr val="accent1">
+              <a:shade val="50000"/>
+            </a:schemeClr>
+          </a:lnRef>
+          <a:fillRef idx="1">
+            <a:schemeClr val="accent1"/>
+          </a:fillRef>
+          <a:effectRef idx="0">
+            <a:schemeClr val="accent1"/>
+          </a:effectRef>
+          <a:fontRef idx="minor">
+            <a:schemeClr val="lt1"/>
+          </a:fontRef>
+        </p:style>
+        <p:txBody>
+          <a:bodyPr rtlCol="0" anchor="ctr"/>
+          <a:lstStyle/>
+          <a:p>
+            <a:r>
+              <a:rPr lang="ko-KR" altLang="en-US" sz="1000" dirty="0" smtClean="0">
+                <a:solidFill>
+                  <a:schemeClr val="tx1"/>
+                </a:solidFill>
+              </a:rPr>
+              <a:t>대상물체 감지를 위한 </a:t>
+            </a:r>
+            <a:r>
+              <a:rPr lang="ko-KR" altLang="en-US" sz="1000" dirty="0" err="1" smtClean="0">
+                <a:solidFill>
+                  <a:schemeClr val="tx1"/>
+                </a:solidFill>
+              </a:rPr>
+              <a:t>파라메터</a:t>
+            </a:r>
+            <a:endParaRPr lang="en-US" altLang="ko-KR" sz="1000" dirty="0" smtClean="0">
+              <a:solidFill>
+                <a:schemeClr val="tx1"/>
+              </a:solidFill>
+            </a:endParaRPr>
+          </a:p>
+          <a:p>
+            <a:r>
+              <a:rPr lang="en-US" altLang="ko-KR" sz="800" dirty="0" smtClean="0">
+                <a:solidFill>
+                  <a:schemeClr val="tx1"/>
+                </a:solidFill>
+              </a:rPr>
+              <a:t>POINT_DISTANCE_MAX: </a:t>
+            </a:r>
+            <a:r>
+              <a:rPr lang="ko-KR" altLang="en-US" sz="800" dirty="0" smtClean="0">
+                <a:solidFill>
+                  <a:schemeClr val="tx1"/>
+                </a:solidFill>
+              </a:rPr>
+              <a:t>대상물체를 구성하는 점들간의 거리</a:t>
+            </a:r>
+            <a:endParaRPr lang="en-US" altLang="ko-KR" sz="800" dirty="0" smtClean="0">
+              <a:solidFill>
+                <a:schemeClr val="tx1"/>
+              </a:solidFill>
+            </a:endParaRPr>
+          </a:p>
+          <a:p>
+            <a:r>
+              <a:rPr lang="en-US" altLang="ko-KR" sz="800" dirty="0" smtClean="0">
+                <a:solidFill>
+                  <a:schemeClr val="tx1"/>
+                </a:solidFill>
+              </a:rPr>
+              <a:t>DIAMETER: </a:t>
+            </a:r>
+            <a:r>
+              <a:rPr lang="ko-KR" altLang="en-US" sz="800" dirty="0" smtClean="0">
+                <a:solidFill>
+                  <a:schemeClr val="tx1"/>
+                </a:solidFill>
+              </a:rPr>
+              <a:t>대상물체의 지름 크기</a:t>
+            </a:r>
+            <a:endParaRPr lang="en-US" altLang="ko-KR" sz="800" dirty="0" smtClean="0">
+              <a:solidFill>
+                <a:schemeClr val="tx1"/>
+              </a:solidFill>
+            </a:endParaRPr>
+          </a:p>
+          <a:p>
+            <a:r>
+              <a:rPr lang="en-US" altLang="ko-KR" sz="800" dirty="0" smtClean="0">
+                <a:solidFill>
+                  <a:schemeClr val="tx1"/>
+                </a:solidFill>
+              </a:rPr>
+              <a:t>TIME_MIN: </a:t>
+            </a:r>
+            <a:r>
+              <a:rPr lang="ko-KR" altLang="en-US" sz="800" dirty="0" smtClean="0">
+                <a:solidFill>
+                  <a:schemeClr val="tx1"/>
+                </a:solidFill>
+              </a:rPr>
+              <a:t>대상물체 지속 감지 시간</a:t>
+            </a:r>
+            <a:endParaRPr lang="en-US" altLang="ko-KR" sz="800" dirty="0" smtClean="0">
+              <a:solidFill>
+                <a:schemeClr val="tx1"/>
+              </a:solidFill>
+            </a:endParaRPr>
+          </a:p>
+          <a:p>
+            <a:r>
+              <a:rPr lang="en-US" altLang="ko-KR" sz="800" dirty="0" smtClean="0">
+                <a:solidFill>
+                  <a:schemeClr val="tx1"/>
+                </a:solidFill>
+              </a:rPr>
+              <a:t>KEEP_TIME: </a:t>
+            </a:r>
+            <a:r>
+              <a:rPr lang="ko-KR" altLang="en-US" sz="800" dirty="0" smtClean="0">
+                <a:solidFill>
+                  <a:schemeClr val="tx1"/>
+                </a:solidFill>
+              </a:rPr>
+              <a:t>대상물체 감지 후 유지시간</a:t>
+            </a:r>
+            <a:endParaRPr lang="en-US" altLang="ko-KR" sz="800" dirty="0" smtClean="0">
+              <a:solidFill>
+                <a:schemeClr val="tx1"/>
+              </a:solidFill>
+            </a:endParaRPr>
+          </a:p>
+        </p:txBody>
+      </p:sp>
     </p:spTree>
   </p:cSld>
   <p:clrMapOvr>
     <a:masterClrMapping/>
   </p:clrMapOvr>
+  <p:timing>
+    <p:tnLst>
+      <p:par>
+        <p:cTn id="1" dur="indefinite" restart="never" nodeType="tmRoot"/>
+      </p:par>
+    </p:tnLst>
+  </p:timing>
 </p:sld>
 </file>
 
@@ -3265,11 +4252,517 @@
           </a:ln>
         </p:spPr>
       </p:pic>
+      <p:sp>
+        <p:nvSpPr>
+          <p:cNvPr id="3" name="TextBox 2"/>
+          <p:cNvSpPr txBox="1"/>
+          <p:nvPr/>
+        </p:nvSpPr>
+        <p:spPr>
+          <a:xfrm>
+            <a:off x="1547664" y="548680"/>
+            <a:ext cx="5040560" cy="923330"/>
+          </a:xfrm>
+          <a:prstGeom prst="rect">
+            <a:avLst/>
+          </a:prstGeom>
+          <a:noFill/>
+        </p:spPr>
+        <p:txBody>
+          <a:bodyPr wrap="square" rtlCol="0">
+            <a:spAutoFit/>
+          </a:bodyPr>
+          <a:lstStyle/>
+          <a:p>
+            <a:r>
+              <a:rPr lang="en-US" altLang="ko-KR" dirty="0" smtClean="0"/>
+              <a:t>Zoom/Rotate/Mirror/Angle/Location </a:t>
+            </a:r>
+            <a:r>
+              <a:rPr lang="ko-KR" altLang="en-US" dirty="0" smtClean="0"/>
+              <a:t>조정</a:t>
+            </a:r>
+            <a:r>
+              <a:rPr lang="en-US" altLang="ko-KR" dirty="0" smtClean="0"/>
+              <a:t> </a:t>
+            </a:r>
+            <a:r>
+              <a:rPr lang="ko-KR" altLang="en-US" dirty="0" smtClean="0"/>
+              <a:t>화면</a:t>
+            </a:r>
+            <a:endParaRPr lang="en-US" altLang="ko-KR" dirty="0" smtClean="0"/>
+          </a:p>
+          <a:p>
+            <a:r>
+              <a:rPr lang="en-US" altLang="ko-KR" sz="1200" dirty="0"/>
+              <a:t> </a:t>
+            </a:r>
+            <a:r>
+              <a:rPr lang="en-US" altLang="ko-KR" sz="1200" dirty="0" smtClean="0">
+                <a:sym typeface="Wingdings" panose="05000000000000000000" pitchFamily="2" charset="2"/>
+              </a:rPr>
+              <a:t> </a:t>
+            </a:r>
+            <a:r>
+              <a:rPr lang="ko-KR" altLang="en-US" sz="1200" dirty="0" smtClean="0">
+                <a:sym typeface="Wingdings" panose="05000000000000000000" pitchFamily="2" charset="2"/>
+              </a:rPr>
+              <a:t>키보드 </a:t>
+            </a:r>
+            <a:r>
+              <a:rPr lang="en-US" altLang="ko-KR" sz="1200" dirty="0" smtClean="0">
+                <a:sym typeface="Wingdings" panose="05000000000000000000" pitchFamily="2" charset="2"/>
+              </a:rPr>
+              <a:t>F2 </a:t>
+            </a:r>
+            <a:r>
+              <a:rPr lang="ko-KR" altLang="en-US" sz="1200" dirty="0" smtClean="0">
+                <a:sym typeface="Wingdings" panose="05000000000000000000" pitchFamily="2" charset="2"/>
+              </a:rPr>
+              <a:t>키로 진입</a:t>
+            </a:r>
+            <a:endParaRPr lang="en-US" altLang="ko-KR" sz="1200" dirty="0" smtClean="0">
+              <a:sym typeface="Wingdings" panose="05000000000000000000" pitchFamily="2" charset="2"/>
+            </a:endParaRPr>
+          </a:p>
+          <a:p>
+            <a:r>
+              <a:rPr lang="en-US" altLang="ko-KR" sz="1200" dirty="0">
+                <a:sym typeface="Wingdings" panose="05000000000000000000" pitchFamily="2" charset="2"/>
+              </a:rPr>
+              <a:t> </a:t>
+            </a:r>
+            <a:r>
+              <a:rPr lang="en-US" altLang="ko-KR" sz="1200" dirty="0" smtClean="0">
+                <a:sym typeface="Wingdings" panose="05000000000000000000" pitchFamily="2" charset="2"/>
+              </a:rPr>
+              <a:t> </a:t>
+            </a:r>
+            <a:r>
+              <a:rPr lang="ko-KR" altLang="en-US" sz="1200" dirty="0" smtClean="0">
+                <a:sym typeface="Wingdings" panose="05000000000000000000" pitchFamily="2" charset="2"/>
+              </a:rPr>
+              <a:t>마우스</a:t>
+            </a:r>
+            <a:r>
+              <a:rPr lang="en-US" altLang="ko-KR" sz="1200" dirty="0" smtClean="0">
+                <a:sym typeface="Wingdings" panose="05000000000000000000" pitchFamily="2" charset="2"/>
+              </a:rPr>
+              <a:t> </a:t>
+            </a:r>
+            <a:r>
+              <a:rPr lang="ko-KR" altLang="en-US" sz="1200" dirty="0" err="1" smtClean="0">
+                <a:sym typeface="Wingdings" panose="05000000000000000000" pitchFamily="2" charset="2"/>
+              </a:rPr>
+              <a:t>휠을</a:t>
+            </a:r>
+            <a:r>
+              <a:rPr lang="ko-KR" altLang="en-US" sz="1200" dirty="0" smtClean="0">
+                <a:sym typeface="Wingdings" panose="05000000000000000000" pitchFamily="2" charset="2"/>
+              </a:rPr>
+              <a:t> 이용하여 전체 화면 확대 축소 가능</a:t>
+            </a:r>
+            <a:endParaRPr lang="en-US" altLang="ko-KR" sz="1200" dirty="0" smtClean="0">
+              <a:sym typeface="Wingdings" panose="05000000000000000000" pitchFamily="2" charset="2"/>
+            </a:endParaRPr>
+          </a:p>
+          <a:p>
+            <a:r>
+              <a:rPr lang="en-US" altLang="ko-KR" sz="1200" dirty="0">
+                <a:sym typeface="Wingdings" panose="05000000000000000000" pitchFamily="2" charset="2"/>
+              </a:rPr>
+              <a:t> </a:t>
+            </a:r>
+            <a:r>
+              <a:rPr lang="en-US" altLang="ko-KR" sz="1200" dirty="0" smtClean="0">
+                <a:sym typeface="Wingdings" panose="05000000000000000000" pitchFamily="2" charset="2"/>
+              </a:rPr>
+              <a:t> </a:t>
+            </a:r>
+            <a:r>
+              <a:rPr lang="ko-KR" altLang="en-US" sz="1200" dirty="0" smtClean="0">
+                <a:sym typeface="Wingdings" panose="05000000000000000000" pitchFamily="2" charset="2"/>
+              </a:rPr>
+              <a:t>마우스 왼쪽 버튼 </a:t>
+            </a:r>
+            <a:r>
+              <a:rPr lang="ko-KR" altLang="en-US" sz="1200" dirty="0" err="1" smtClean="0">
+                <a:sym typeface="Wingdings" panose="05000000000000000000" pitchFamily="2" charset="2"/>
+              </a:rPr>
+              <a:t>드레그를</a:t>
+            </a:r>
+            <a:r>
+              <a:rPr lang="ko-KR" altLang="en-US" sz="1200" dirty="0" smtClean="0">
+                <a:sym typeface="Wingdings" panose="05000000000000000000" pitchFamily="2" charset="2"/>
+              </a:rPr>
+              <a:t> 이용하여 화면 위치 이동 가능</a:t>
+            </a:r>
+            <a:endParaRPr lang="en-US" altLang="ko-KR" sz="1200" dirty="0">
+              <a:sym typeface="Wingdings" panose="05000000000000000000" pitchFamily="2" charset="2"/>
+            </a:endParaRPr>
+          </a:p>
+        </p:txBody>
+      </p:sp>
+      <p:sp>
+        <p:nvSpPr>
+          <p:cNvPr id="4" name="사각형 설명선 3"/>
+          <p:cNvSpPr/>
+          <p:nvPr/>
+        </p:nvSpPr>
+        <p:spPr>
+          <a:xfrm>
+            <a:off x="107504" y="2420888"/>
+            <a:ext cx="1656184" cy="268939"/>
+          </a:xfrm>
+          <a:prstGeom prst="wedgeRectCallout">
+            <a:avLst>
+              <a:gd name="adj1" fmla="val 71809"/>
+              <a:gd name="adj2" fmla="val 42137"/>
+            </a:avLst>
+          </a:prstGeom>
+          <a:noFill/>
+          <a:ln>
+            <a:solidFill>
+              <a:schemeClr val="bg1">
+                <a:lumMod val="75000"/>
+              </a:schemeClr>
+            </a:solidFill>
+          </a:ln>
+        </p:spPr>
+        <p:style>
+          <a:lnRef idx="2">
+            <a:schemeClr val="accent1">
+              <a:shade val="50000"/>
+            </a:schemeClr>
+          </a:lnRef>
+          <a:fillRef idx="1">
+            <a:schemeClr val="accent1"/>
+          </a:fillRef>
+          <a:effectRef idx="0">
+            <a:schemeClr val="accent1"/>
+          </a:effectRef>
+          <a:fontRef idx="minor">
+            <a:schemeClr val="lt1"/>
+          </a:fontRef>
+        </p:style>
+        <p:txBody>
+          <a:bodyPr rtlCol="0" anchor="ctr"/>
+          <a:lstStyle/>
+          <a:p>
+            <a:r>
+              <a:rPr lang="ko-KR" altLang="en-US" sz="1000" dirty="0" smtClean="0">
+                <a:solidFill>
+                  <a:schemeClr val="tx1"/>
+                </a:solidFill>
+              </a:rPr>
+              <a:t>화면 확대 축소</a:t>
+            </a:r>
+            <a:endParaRPr lang="en-US" altLang="ko-KR" sz="1000" dirty="0" smtClean="0">
+              <a:solidFill>
+                <a:schemeClr val="tx1"/>
+              </a:solidFill>
+            </a:endParaRPr>
+          </a:p>
+        </p:txBody>
+      </p:sp>
+      <p:sp>
+        <p:nvSpPr>
+          <p:cNvPr id="5" name="사각형 설명선 4"/>
+          <p:cNvSpPr/>
+          <p:nvPr/>
+        </p:nvSpPr>
+        <p:spPr>
+          <a:xfrm>
+            <a:off x="107504" y="2924944"/>
+            <a:ext cx="1656184" cy="268939"/>
+          </a:xfrm>
+          <a:prstGeom prst="wedgeRectCallout">
+            <a:avLst>
+              <a:gd name="adj1" fmla="val 71809"/>
+              <a:gd name="adj2" fmla="val 42137"/>
+            </a:avLst>
+          </a:prstGeom>
+          <a:noFill/>
+          <a:ln>
+            <a:solidFill>
+              <a:schemeClr val="bg1">
+                <a:lumMod val="75000"/>
+              </a:schemeClr>
+            </a:solidFill>
+          </a:ln>
+        </p:spPr>
+        <p:style>
+          <a:lnRef idx="2">
+            <a:schemeClr val="accent1">
+              <a:shade val="50000"/>
+            </a:schemeClr>
+          </a:lnRef>
+          <a:fillRef idx="1">
+            <a:schemeClr val="accent1"/>
+          </a:fillRef>
+          <a:effectRef idx="0">
+            <a:schemeClr val="accent1"/>
+          </a:effectRef>
+          <a:fontRef idx="minor">
+            <a:schemeClr val="lt1"/>
+          </a:fontRef>
+        </p:style>
+        <p:txBody>
+          <a:bodyPr rtlCol="0" anchor="ctr"/>
+          <a:lstStyle/>
+          <a:p>
+            <a:r>
+              <a:rPr lang="ko-KR" altLang="en-US" sz="1000" dirty="0" smtClean="0">
+                <a:solidFill>
+                  <a:schemeClr val="tx1"/>
+                </a:solidFill>
+              </a:rPr>
+              <a:t>화면 회전</a:t>
+            </a:r>
+            <a:r>
+              <a:rPr lang="en-US" altLang="ko-KR" sz="1000" dirty="0" smtClean="0">
+                <a:solidFill>
+                  <a:schemeClr val="tx1"/>
+                </a:solidFill>
+              </a:rPr>
+              <a:t>(90°)</a:t>
+            </a:r>
+          </a:p>
+        </p:txBody>
+      </p:sp>
+      <p:sp>
+        <p:nvSpPr>
+          <p:cNvPr id="6" name="사각형 설명선 5"/>
+          <p:cNvSpPr/>
+          <p:nvPr/>
+        </p:nvSpPr>
+        <p:spPr>
+          <a:xfrm>
+            <a:off x="107504" y="3232069"/>
+            <a:ext cx="1656184" cy="268939"/>
+          </a:xfrm>
+          <a:prstGeom prst="wedgeRectCallout">
+            <a:avLst>
+              <a:gd name="adj1" fmla="val 71809"/>
+              <a:gd name="adj2" fmla="val 42137"/>
+            </a:avLst>
+          </a:prstGeom>
+          <a:noFill/>
+          <a:ln>
+            <a:solidFill>
+              <a:schemeClr val="bg1">
+                <a:lumMod val="75000"/>
+              </a:schemeClr>
+            </a:solidFill>
+          </a:ln>
+        </p:spPr>
+        <p:style>
+          <a:lnRef idx="2">
+            <a:schemeClr val="accent1">
+              <a:shade val="50000"/>
+            </a:schemeClr>
+          </a:lnRef>
+          <a:fillRef idx="1">
+            <a:schemeClr val="accent1"/>
+          </a:fillRef>
+          <a:effectRef idx="0">
+            <a:schemeClr val="accent1"/>
+          </a:effectRef>
+          <a:fontRef idx="minor">
+            <a:schemeClr val="lt1"/>
+          </a:fontRef>
+        </p:style>
+        <p:txBody>
+          <a:bodyPr rtlCol="0" anchor="ctr"/>
+          <a:lstStyle/>
+          <a:p>
+            <a:r>
+              <a:rPr lang="ko-KR" altLang="en-US" sz="1000" dirty="0" smtClean="0">
+                <a:solidFill>
+                  <a:schemeClr val="tx1"/>
+                </a:solidFill>
+              </a:rPr>
+              <a:t>화면 상하 반전</a:t>
+            </a:r>
+            <a:endParaRPr lang="en-US" altLang="ko-KR" sz="1000" dirty="0" smtClean="0">
+              <a:solidFill>
+                <a:schemeClr val="tx1"/>
+              </a:solidFill>
+            </a:endParaRPr>
+          </a:p>
+        </p:txBody>
+      </p:sp>
+      <p:sp>
+        <p:nvSpPr>
+          <p:cNvPr id="7" name="사각형 설명선 6"/>
+          <p:cNvSpPr/>
+          <p:nvPr/>
+        </p:nvSpPr>
+        <p:spPr>
+          <a:xfrm>
+            <a:off x="107504" y="3592109"/>
+            <a:ext cx="1656184" cy="268939"/>
+          </a:xfrm>
+          <a:prstGeom prst="wedgeRectCallout">
+            <a:avLst>
+              <a:gd name="adj1" fmla="val 71809"/>
+              <a:gd name="adj2" fmla="val 42137"/>
+            </a:avLst>
+          </a:prstGeom>
+          <a:noFill/>
+          <a:ln>
+            <a:solidFill>
+              <a:schemeClr val="bg1">
+                <a:lumMod val="75000"/>
+              </a:schemeClr>
+            </a:solidFill>
+          </a:ln>
+        </p:spPr>
+        <p:style>
+          <a:lnRef idx="2">
+            <a:schemeClr val="accent1">
+              <a:shade val="50000"/>
+            </a:schemeClr>
+          </a:lnRef>
+          <a:fillRef idx="1">
+            <a:schemeClr val="accent1"/>
+          </a:fillRef>
+          <a:effectRef idx="0">
+            <a:schemeClr val="accent1"/>
+          </a:effectRef>
+          <a:fontRef idx="minor">
+            <a:schemeClr val="lt1"/>
+          </a:fontRef>
+        </p:style>
+        <p:txBody>
+          <a:bodyPr rtlCol="0" anchor="ctr"/>
+          <a:lstStyle/>
+          <a:p>
+            <a:r>
+              <a:rPr lang="ko-KR" altLang="en-US" sz="1000" dirty="0" smtClean="0">
+                <a:solidFill>
+                  <a:schemeClr val="tx1"/>
+                </a:solidFill>
+              </a:rPr>
+              <a:t>화면 미세 회전</a:t>
+            </a:r>
+            <a:r>
+              <a:rPr lang="en-US" altLang="ko-KR" sz="1000" dirty="0" smtClean="0">
+                <a:solidFill>
+                  <a:schemeClr val="tx1"/>
+                </a:solidFill>
+              </a:rPr>
+              <a:t>(10</a:t>
+            </a:r>
+            <a:r>
+              <a:rPr lang="en-US" altLang="ko-KR" sz="1000" dirty="0">
+                <a:solidFill>
+                  <a:schemeClr val="tx1"/>
+                </a:solidFill>
+              </a:rPr>
+              <a:t>°</a:t>
+            </a:r>
+            <a:r>
+              <a:rPr lang="en-US" altLang="ko-KR" sz="1000" dirty="0" smtClean="0">
+                <a:solidFill>
+                  <a:schemeClr val="tx1"/>
+                </a:solidFill>
+              </a:rPr>
+              <a:t>~-10</a:t>
+            </a:r>
+            <a:r>
+              <a:rPr lang="en-US" altLang="ko-KR" sz="1000" dirty="0">
+                <a:solidFill>
+                  <a:schemeClr val="tx1"/>
+                </a:solidFill>
+              </a:rPr>
+              <a:t>°</a:t>
+            </a:r>
+            <a:r>
+              <a:rPr lang="en-US" altLang="ko-KR" sz="1000" dirty="0" smtClean="0">
+                <a:solidFill>
+                  <a:schemeClr val="tx1"/>
+                </a:solidFill>
+              </a:rPr>
+              <a:t>)</a:t>
+            </a:r>
+          </a:p>
+        </p:txBody>
+      </p:sp>
+      <p:sp>
+        <p:nvSpPr>
+          <p:cNvPr id="8" name="사각형 설명선 7"/>
+          <p:cNvSpPr/>
+          <p:nvPr/>
+        </p:nvSpPr>
+        <p:spPr>
+          <a:xfrm>
+            <a:off x="107504" y="3952149"/>
+            <a:ext cx="1656184" cy="268939"/>
+          </a:xfrm>
+          <a:prstGeom prst="wedgeRectCallout">
+            <a:avLst>
+              <a:gd name="adj1" fmla="val 71809"/>
+              <a:gd name="adj2" fmla="val 42137"/>
+            </a:avLst>
+          </a:prstGeom>
+          <a:noFill/>
+          <a:ln>
+            <a:solidFill>
+              <a:schemeClr val="bg1">
+                <a:lumMod val="75000"/>
+              </a:schemeClr>
+            </a:solidFill>
+          </a:ln>
+        </p:spPr>
+        <p:style>
+          <a:lnRef idx="2">
+            <a:schemeClr val="accent1">
+              <a:shade val="50000"/>
+            </a:schemeClr>
+          </a:lnRef>
+          <a:fillRef idx="1">
+            <a:schemeClr val="accent1"/>
+          </a:fillRef>
+          <a:effectRef idx="0">
+            <a:schemeClr val="accent1"/>
+          </a:effectRef>
+          <a:fontRef idx="minor">
+            <a:schemeClr val="lt1"/>
+          </a:fontRef>
+        </p:style>
+        <p:txBody>
+          <a:bodyPr rtlCol="0" anchor="ctr"/>
+          <a:lstStyle/>
+          <a:p>
+            <a:r>
+              <a:rPr lang="ko-KR" altLang="en-US" sz="1000" dirty="0" smtClean="0">
+                <a:solidFill>
+                  <a:schemeClr val="tx1"/>
+                </a:solidFill>
+              </a:rPr>
+              <a:t>화면 위치 초기화</a:t>
+            </a:r>
+            <a:endParaRPr lang="en-US" altLang="ko-KR" sz="1000" dirty="0" smtClean="0">
+              <a:solidFill>
+                <a:schemeClr val="tx1"/>
+              </a:solidFill>
+            </a:endParaRPr>
+          </a:p>
+        </p:txBody>
+      </p:sp>
     </p:spTree>
   </p:cSld>
   <p:clrMapOvr>
     <a:masterClrMapping/>
   </p:clrMapOvr>
+  <p:timing>
+    <p:tnLst>
+      <p:par>
+        <p:cTn id="1" dur="indefinite" restart="never" nodeType="tmRoot"/>
+      </p:par>
+    </p:tnLst>
+  </p:timing>
 </p:sld>
 </file>
 
@@ -3322,11 +4815,154 @@
           </a:ln>
         </p:spPr>
       </p:pic>
+      <p:sp>
+        <p:nvSpPr>
+          <p:cNvPr id="3" name="TextBox 2"/>
+          <p:cNvSpPr txBox="1"/>
+          <p:nvPr/>
+        </p:nvSpPr>
+        <p:spPr>
+          <a:xfrm>
+            <a:off x="1547664" y="548680"/>
+            <a:ext cx="3888432" cy="1107996"/>
+          </a:xfrm>
+          <a:prstGeom prst="rect">
+            <a:avLst/>
+          </a:prstGeom>
+          <a:noFill/>
+        </p:spPr>
+        <p:txBody>
+          <a:bodyPr wrap="square" rtlCol="0">
+            <a:spAutoFit/>
+          </a:bodyPr>
+          <a:lstStyle/>
+          <a:p>
+            <a:r>
+              <a:rPr lang="en-US" altLang="ko-KR" dirty="0" smtClean="0"/>
+              <a:t>Regions </a:t>
+            </a:r>
+            <a:r>
+              <a:rPr lang="ko-KR" altLang="en-US" dirty="0" smtClean="0"/>
+              <a:t>설정</a:t>
+            </a:r>
+            <a:r>
+              <a:rPr lang="en-US" altLang="ko-KR" dirty="0" smtClean="0"/>
+              <a:t> </a:t>
+            </a:r>
+            <a:r>
+              <a:rPr lang="ko-KR" altLang="en-US" dirty="0" smtClean="0"/>
+              <a:t>화면</a:t>
+            </a:r>
+            <a:endParaRPr lang="en-US" altLang="ko-KR" dirty="0" smtClean="0"/>
+          </a:p>
+          <a:p>
+            <a:r>
+              <a:rPr lang="en-US" altLang="ko-KR" sz="1200" dirty="0"/>
+              <a:t> </a:t>
+            </a:r>
+            <a:r>
+              <a:rPr lang="en-US" altLang="ko-KR" sz="1200" dirty="0" smtClean="0">
+                <a:sym typeface="Wingdings" panose="05000000000000000000" pitchFamily="2" charset="2"/>
+              </a:rPr>
+              <a:t> </a:t>
+            </a:r>
+            <a:r>
+              <a:rPr lang="ko-KR" altLang="en-US" sz="1200" dirty="0" smtClean="0">
+                <a:sym typeface="Wingdings" panose="05000000000000000000" pitchFamily="2" charset="2"/>
+              </a:rPr>
+              <a:t>키보드 </a:t>
+            </a:r>
+            <a:r>
+              <a:rPr lang="en-US" altLang="ko-KR" sz="1200" dirty="0" smtClean="0">
+                <a:sym typeface="Wingdings" panose="05000000000000000000" pitchFamily="2" charset="2"/>
+              </a:rPr>
+              <a:t>F3 </a:t>
+            </a:r>
+            <a:r>
+              <a:rPr lang="ko-KR" altLang="en-US" sz="1200" dirty="0" smtClean="0">
+                <a:sym typeface="Wingdings" panose="05000000000000000000" pitchFamily="2" charset="2"/>
+              </a:rPr>
+              <a:t>키로 진입</a:t>
+            </a:r>
+            <a:endParaRPr lang="en-US" altLang="ko-KR" sz="1200" dirty="0" smtClean="0">
+              <a:sym typeface="Wingdings" panose="05000000000000000000" pitchFamily="2" charset="2"/>
+            </a:endParaRPr>
+          </a:p>
+          <a:p>
+            <a:r>
+              <a:rPr lang="en-US" altLang="ko-KR" sz="1200" dirty="0" smtClean="0">
+                <a:sym typeface="Wingdings" panose="05000000000000000000" pitchFamily="2" charset="2"/>
+              </a:rPr>
+              <a:t>  Fault/Alert </a:t>
+            </a:r>
+            <a:r>
+              <a:rPr lang="ko-KR" altLang="en-US" sz="1200" dirty="0" smtClean="0">
+                <a:sym typeface="Wingdings" panose="05000000000000000000" pitchFamily="2" charset="2"/>
+              </a:rPr>
+              <a:t>등의 영역들에 대한 위치 설정</a:t>
+            </a:r>
+            <a:endParaRPr lang="en-US" altLang="ko-KR" sz="1200" dirty="0" smtClean="0">
+              <a:sym typeface="Wingdings" panose="05000000000000000000" pitchFamily="2" charset="2"/>
+            </a:endParaRPr>
+          </a:p>
+          <a:p>
+            <a:r>
+              <a:rPr lang="en-US" altLang="ko-KR" sz="1200" dirty="0">
+                <a:sym typeface="Wingdings" panose="05000000000000000000" pitchFamily="2" charset="2"/>
+              </a:rPr>
+              <a:t> </a:t>
+            </a:r>
+            <a:r>
+              <a:rPr lang="en-US" altLang="ko-KR" sz="1200" dirty="0" smtClean="0">
+                <a:sym typeface="Wingdings" panose="05000000000000000000" pitchFamily="2" charset="2"/>
+              </a:rPr>
+              <a:t> </a:t>
+            </a:r>
+            <a:r>
+              <a:rPr lang="ko-KR" altLang="en-US" sz="1200" dirty="0" smtClean="0">
+                <a:sym typeface="Wingdings" panose="05000000000000000000" pitchFamily="2" charset="2"/>
+              </a:rPr>
+              <a:t>각 영역에 해당하는 릴레이의 인덱스 설정</a:t>
+            </a:r>
+            <a:endParaRPr lang="en-US" altLang="ko-KR" sz="1200" dirty="0" smtClean="0">
+              <a:sym typeface="Wingdings" panose="05000000000000000000" pitchFamily="2" charset="2"/>
+            </a:endParaRPr>
+          </a:p>
+          <a:p>
+            <a:r>
+              <a:rPr lang="en-US" altLang="ko-KR" sz="1200" dirty="0">
+                <a:sym typeface="Wingdings" panose="05000000000000000000" pitchFamily="2" charset="2"/>
+              </a:rPr>
+              <a:t> </a:t>
+            </a:r>
+            <a:r>
+              <a:rPr lang="en-US" altLang="ko-KR" sz="1200" dirty="0" smtClean="0">
+                <a:sym typeface="Wingdings" panose="05000000000000000000" pitchFamily="2" charset="2"/>
+              </a:rPr>
+              <a:t> </a:t>
+            </a:r>
+            <a:r>
+              <a:rPr lang="ko-KR" altLang="en-US" sz="1200" dirty="0" smtClean="0">
+                <a:sym typeface="Wingdings" panose="05000000000000000000" pitchFamily="2" charset="2"/>
+              </a:rPr>
+              <a:t>각 릴레이의 이름 설정</a:t>
+            </a:r>
+            <a:endParaRPr lang="ko-KR" altLang="en-US" sz="1200" dirty="0"/>
+          </a:p>
+        </p:txBody>
+      </p:sp>
     </p:spTree>
   </p:cSld>
   <p:clrMapOvr>
     <a:masterClrMapping/>
   </p:clrMapOvr>
+  <p:timing>
+    <p:tnLst>
+      <p:par>
+        <p:cTn id="1" dur="indefinite" restart="never" nodeType="tmRoot"/>
+      </p:par>
+    </p:tnLst>
+  </p:timing>
 </p:sld>
 </file>
 
@@ -3379,11 +5015,177 @@
           </a:ln>
         </p:spPr>
       </p:pic>
+      <p:sp>
+        <p:nvSpPr>
+          <p:cNvPr id="3" name="TextBox 2"/>
+          <p:cNvSpPr txBox="1"/>
+          <p:nvPr/>
+        </p:nvSpPr>
+        <p:spPr>
+          <a:xfrm>
+            <a:off x="1547664" y="548680"/>
+            <a:ext cx="3888432" cy="553998"/>
+          </a:xfrm>
+          <a:prstGeom prst="rect">
+            <a:avLst/>
+          </a:prstGeom>
+          <a:noFill/>
+        </p:spPr>
+        <p:txBody>
+          <a:bodyPr wrap="square" rtlCol="0">
+            <a:spAutoFit/>
+          </a:bodyPr>
+          <a:lstStyle/>
+          <a:p>
+            <a:r>
+              <a:rPr lang="en-US" altLang="ko-KR" dirty="0" smtClean="0"/>
+              <a:t>2D Laser Scanner </a:t>
+            </a:r>
+            <a:r>
+              <a:rPr lang="ko-KR" altLang="en-US" dirty="0" smtClean="0"/>
+              <a:t>연결 설정</a:t>
+            </a:r>
+            <a:r>
+              <a:rPr lang="en-US" altLang="ko-KR" dirty="0" smtClean="0"/>
+              <a:t> </a:t>
+            </a:r>
+            <a:r>
+              <a:rPr lang="ko-KR" altLang="en-US" dirty="0" smtClean="0"/>
+              <a:t>화면</a:t>
+            </a:r>
+            <a:endParaRPr lang="en-US" altLang="ko-KR" dirty="0" smtClean="0"/>
+          </a:p>
+          <a:p>
+            <a:r>
+              <a:rPr lang="en-US" altLang="ko-KR" sz="1200" dirty="0"/>
+              <a:t> </a:t>
+            </a:r>
+            <a:r>
+              <a:rPr lang="en-US" altLang="ko-KR" sz="1200" dirty="0" smtClean="0">
+                <a:sym typeface="Wingdings" panose="05000000000000000000" pitchFamily="2" charset="2"/>
+              </a:rPr>
+              <a:t> </a:t>
+            </a:r>
+            <a:r>
+              <a:rPr lang="ko-KR" altLang="en-US" sz="1200" dirty="0" smtClean="0">
+                <a:sym typeface="Wingdings" panose="05000000000000000000" pitchFamily="2" charset="2"/>
+              </a:rPr>
+              <a:t>키보드 </a:t>
+            </a:r>
+            <a:r>
+              <a:rPr lang="en-US" altLang="ko-KR" sz="1200" dirty="0" smtClean="0">
+                <a:sym typeface="Wingdings" panose="05000000000000000000" pitchFamily="2" charset="2"/>
+              </a:rPr>
+              <a:t>F6 </a:t>
+            </a:r>
+            <a:r>
+              <a:rPr lang="ko-KR" altLang="en-US" sz="1200" dirty="0" smtClean="0">
+                <a:sym typeface="Wingdings" panose="05000000000000000000" pitchFamily="2" charset="2"/>
+              </a:rPr>
+              <a:t>키로 진입</a:t>
+            </a:r>
+            <a:endParaRPr lang="ko-KR" altLang="en-US" sz="1200" dirty="0"/>
+          </a:p>
+        </p:txBody>
+      </p:sp>
+      <p:sp>
+        <p:nvSpPr>
+          <p:cNvPr id="4" name="사각형 설명선 3"/>
+          <p:cNvSpPr/>
+          <p:nvPr/>
+        </p:nvSpPr>
+        <p:spPr>
+          <a:xfrm>
+            <a:off x="107504" y="4365104"/>
+            <a:ext cx="1656184" cy="360040"/>
+          </a:xfrm>
+          <a:prstGeom prst="wedgeRectCallout">
+            <a:avLst>
+              <a:gd name="adj1" fmla="val 71809"/>
+              <a:gd name="adj2" fmla="val 24500"/>
+            </a:avLst>
+          </a:prstGeom>
+          <a:noFill/>
+          <a:ln>
+            <a:solidFill>
+              <a:schemeClr val="bg1">
+                <a:lumMod val="75000"/>
+              </a:schemeClr>
+            </a:solidFill>
+          </a:ln>
+        </p:spPr>
+        <p:style>
+          <a:lnRef idx="2">
+            <a:schemeClr val="accent1">
+              <a:shade val="50000"/>
+            </a:schemeClr>
+          </a:lnRef>
+          <a:fillRef idx="1">
+            <a:schemeClr val="accent1"/>
+          </a:fillRef>
+          <a:effectRef idx="0">
+            <a:schemeClr val="accent1"/>
+          </a:effectRef>
+          <a:fontRef idx="minor">
+            <a:schemeClr val="lt1"/>
+          </a:fontRef>
+        </p:style>
+        <p:txBody>
+          <a:bodyPr rtlCol="0" anchor="ctr"/>
+          <a:lstStyle/>
+          <a:p>
+            <a:r>
+              <a:rPr lang="en-US" altLang="ko-KR" sz="1000" dirty="0" smtClean="0">
+                <a:solidFill>
+                  <a:schemeClr val="tx1"/>
+                </a:solidFill>
+              </a:rPr>
+              <a:t>2D Laser Scanner</a:t>
+            </a:r>
+            <a:r>
+              <a:rPr lang="ko-KR" altLang="en-US" sz="1000" dirty="0" smtClean="0">
+                <a:solidFill>
+                  <a:schemeClr val="tx1"/>
+                </a:solidFill>
+              </a:rPr>
+              <a:t>의 </a:t>
+            </a:r>
+            <a:r>
+              <a:rPr lang="en-US" altLang="ko-KR" sz="1000" dirty="0" smtClean="0">
+                <a:solidFill>
+                  <a:schemeClr val="tx1"/>
+                </a:solidFill>
+              </a:rPr>
+              <a:t>Serial Number </a:t>
+            </a:r>
+            <a:r>
+              <a:rPr lang="ko-KR" altLang="en-US" sz="1000" dirty="0" smtClean="0">
+                <a:solidFill>
+                  <a:schemeClr val="tx1"/>
+                </a:solidFill>
+              </a:rPr>
+              <a:t>입력</a:t>
+            </a:r>
+            <a:endParaRPr lang="en-US" altLang="ko-KR" sz="1000" dirty="0" smtClean="0">
+              <a:solidFill>
+                <a:schemeClr val="tx1"/>
+              </a:solidFill>
+            </a:endParaRPr>
+          </a:p>
+        </p:txBody>
+      </p:sp>
     </p:spTree>
   </p:cSld>
   <p:clrMapOvr>
     <a:masterClrMapping/>
   </p:clrMapOvr>
+  <p:timing>
+    <p:tnLst>
+      <p:par>
+        <p:cTn id="1" dur="indefinite" restart="never" nodeType="tmRoot"/>
+      </p:par>
+    </p:tnLst>
+  </p:timing>
 </p:sld>
 </file>
 
@@ -3421,7 +5223,108 @@
         </p:blipFill>
         <p:spPr bwMode="auto">
           <a:xfrm>
-            <a:off x="2128838" y="1852613"/>
+            <a:off x="3995936" y="2276872"/>
+            <a:ext cx="4886325" cy="3152775"/>
+          </a:xfrm>
+          <a:prstGeom prst="rect">
+            <a:avLst/>
+          </a:prstGeom>
+          <a:noFill/>
+          <a:ln w="9525">
+            <a:noFill/>
+            <a:miter lim="800000"/>
+            <a:headEnd/>
+            <a:tailEnd/>
+          </a:ln>
+        </p:spPr>
+      </p:pic>
+      <p:sp>
+        <p:nvSpPr>
+          <p:cNvPr id="3" name="TextBox 2"/>
+          <p:cNvSpPr txBox="1"/>
+          <p:nvPr/>
+        </p:nvSpPr>
+        <p:spPr>
+          <a:xfrm>
+            <a:off x="1547664" y="548680"/>
+            <a:ext cx="4536504" cy="553998"/>
+          </a:xfrm>
+          <a:prstGeom prst="rect">
+            <a:avLst/>
+          </a:prstGeom>
+          <a:noFill/>
+        </p:spPr>
+        <p:txBody>
+          <a:bodyPr wrap="square" rtlCol="0">
+            <a:spAutoFit/>
+          </a:bodyPr>
+          <a:lstStyle/>
+          <a:p>
+            <a:r>
+              <a:rPr lang="en-US" altLang="ko-KR" dirty="0" smtClean="0"/>
+              <a:t>2D Laser Scanner </a:t>
+            </a:r>
+            <a:r>
+              <a:rPr lang="ko-KR" altLang="en-US" dirty="0" smtClean="0"/>
+              <a:t>상태 보기</a:t>
+            </a:r>
+            <a:r>
+              <a:rPr lang="en-US" altLang="ko-KR" dirty="0" smtClean="0"/>
+              <a:t> </a:t>
+            </a:r>
+            <a:r>
+              <a:rPr lang="ko-KR" altLang="en-US" dirty="0" smtClean="0"/>
+              <a:t>화면</a:t>
+            </a:r>
+            <a:endParaRPr lang="en-US" altLang="ko-KR" dirty="0" smtClean="0"/>
+          </a:p>
+          <a:p>
+            <a:r>
+              <a:rPr lang="en-US" altLang="ko-KR" sz="1200" dirty="0"/>
+              <a:t> </a:t>
+            </a:r>
+            <a:r>
+              <a:rPr lang="en-US" altLang="ko-KR" sz="1200" dirty="0" smtClean="0">
+                <a:sym typeface="Wingdings" panose="05000000000000000000" pitchFamily="2" charset="2"/>
+              </a:rPr>
+              <a:t> </a:t>
+            </a:r>
+            <a:r>
+              <a:rPr lang="en-US" altLang="ko-KR" sz="1200" dirty="0"/>
+              <a:t>2D Laser Scanner </a:t>
+            </a:r>
+            <a:r>
+              <a:rPr lang="ko-KR" altLang="en-US" sz="1200" dirty="0" smtClean="0"/>
+              <a:t>이미지를 </a:t>
+            </a:r>
+            <a:r>
+              <a:rPr lang="ko-KR" altLang="en-US" sz="1200" dirty="0" smtClean="0">
+                <a:sym typeface="Wingdings" panose="05000000000000000000" pitchFamily="2" charset="2"/>
+              </a:rPr>
+              <a:t>마우스 왼쪽 버튼 클릭</a:t>
+            </a:r>
+            <a:endParaRPr lang="ko-KR" altLang="en-US" sz="1200" dirty="0"/>
+          </a:p>
+        </p:txBody>
+      </p:sp>
+      <p:pic>
+        <p:nvPicPr>
+          <p:cNvPr id="5" name="Picture 2"/>
+          <p:cNvPicPr>
+            <a:picLocks noChangeAspect="1" noChangeArrowheads="1"/>
+          </p:cNvPicPr>
+          <p:nvPr/>
+        </p:nvPicPr>
+        <p:blipFill>
+          <a:blip r:embed="rId3" cstate="print"/>
+          <a:srcRect/>
+          <a:stretch>
+            <a:fillRect/>
+          </a:stretch>
+        </p:blipFill>
+        <p:spPr bwMode="auto">
+          <a:xfrm>
+            <a:off x="539552" y="1196752"/>
             <a:ext cx="4886325" cy="3152775"/>
           </a:xfrm>
           <a:prstGeom prst="rect">
@@ -3441,67 +5344,17 @@
   <p:clrMapOvr>
     <a:masterClrMapping/>
   </p:clrMapOvr>
+  <p:timing>
+    <p:tnLst>
+      <p:par>
+        <p:cTn id="1" dur="indefinite" restart="never" nodeType="tmRoot"/>
+      </p:par>
+    </p:tnLst>
+  </p:timing>
 </p:sld>
 </file>
 
 <file path=ppt/slides/slide7.xml><?xml version="1.0" encoding="utf-8"?>
-<p:sld xmlns:a="http://schemas.openxmlformats.org/drawingml/2006/main" xmlns:r="http://schemas.openxmlformats.org/officeDocument/2006/relationships" xmlns:p="http://schemas.openxmlformats.org/presentationml/2006/main">
-  <p:cSld>
-    <p:spTree>
-      <p:nvGrpSpPr>
-        <p:cNvPr id="1" name=""/>
-        <p:cNvGrpSpPr/>
-        <p:nvPr/>
-      </p:nvGrpSpPr>
-      <p:grpSpPr>
-        <a:xfrm>
-          <a:off x="0" y="0"/>
-          <a:ext cx="0" cy="0"/>
-          <a:chOff x="0" y="0"/>
-          <a:chExt cx="0" cy="0"/>
-        </a:xfrm>
-      </p:grpSpPr>
-      <p:pic>
-        <p:nvPicPr>
-          <p:cNvPr id="2050" name="Picture 2"/>
-          <p:cNvPicPr>
-            <a:picLocks noChangeAspect="1" noChangeArrowheads="1"/>
-          </p:cNvPicPr>
-          <p:nvPr/>
-        </p:nvPicPr>
-        <p:blipFill>
-          <a:blip r:embed="rId2" cstate="print"/>
-          <a:srcRect/>
-          <a:stretch>
-            <a:fillRect/>
-          </a:stretch>
-        </p:blipFill>
-        <p:spPr bwMode="auto">
-          <a:xfrm>
-            <a:off x="2128838" y="1852613"/>
-            <a:ext cx="4886325" cy="3152775"/>
-          </a:xfrm>
-          <a:prstGeom prst="rect">
-            <a:avLst/>
-          </a:prstGeom>
-          <a:noFill/>
-          <a:ln w="9525">
-            <a:noFill/>
-            <a:miter lim="800000"/>
-            <a:headEnd/>
-            <a:tailEnd/>
-          </a:ln>
-        </p:spPr>
-      </p:pic>
-    </p:spTree>
-  </p:cSld>
-  <p:clrMapOvr>
-    <a:masterClrMapping/>
-  </p:clrMapOvr>
-</p:sld>
-</file>
-
-<file path=ppt/slides/slide8.xml><?xml version="1.0" encoding="utf-8"?>
 <p:sld xmlns:a="http://schemas.openxmlformats.org/drawingml/2006/main" xmlns:r="http://schemas.openxmlformats.org/officeDocument/2006/relationships" xmlns:p="http://schemas.openxmlformats.org/presentationml/2006/main">
   <p:cSld>
     <p:spTree>
@@ -3550,15 +5403,79 @@
           </a:ln>
         </p:spPr>
       </p:pic>
+      <p:sp>
+        <p:nvSpPr>
+          <p:cNvPr id="3" name="TextBox 2"/>
+          <p:cNvSpPr txBox="1"/>
+          <p:nvPr/>
+        </p:nvSpPr>
+        <p:spPr>
+          <a:xfrm>
+            <a:off x="1547664" y="548680"/>
+            <a:ext cx="4536504" cy="553998"/>
+          </a:xfrm>
+          <a:prstGeom prst="rect">
+            <a:avLst/>
+          </a:prstGeom>
+          <a:noFill/>
+        </p:spPr>
+        <p:txBody>
+          <a:bodyPr wrap="square" rtlCol="0">
+            <a:spAutoFit/>
+          </a:bodyPr>
+          <a:lstStyle/>
+          <a:p>
+            <a:r>
+              <a:rPr lang="ko-KR" altLang="en-US" dirty="0" smtClean="0"/>
+              <a:t>대상 물체 상태 보기</a:t>
+            </a:r>
+            <a:r>
+              <a:rPr lang="en-US" altLang="ko-KR" dirty="0" smtClean="0"/>
+              <a:t> </a:t>
+            </a:r>
+            <a:r>
+              <a:rPr lang="ko-KR" altLang="en-US" dirty="0" smtClean="0"/>
+              <a:t>화면</a:t>
+            </a:r>
+            <a:endParaRPr lang="en-US" altLang="ko-KR" dirty="0" smtClean="0"/>
+          </a:p>
+          <a:p>
+            <a:r>
+              <a:rPr lang="en-US" altLang="ko-KR" sz="1200" dirty="0"/>
+              <a:t> </a:t>
+            </a:r>
+            <a:r>
+              <a:rPr lang="en-US" altLang="ko-KR" sz="1200" dirty="0" smtClean="0">
+                <a:sym typeface="Wingdings" panose="05000000000000000000" pitchFamily="2" charset="2"/>
+              </a:rPr>
+              <a:t> </a:t>
+            </a:r>
+            <a:r>
+              <a:rPr lang="ko-KR" altLang="en-US" sz="1200" dirty="0" smtClean="0">
+                <a:sym typeface="Wingdings" panose="05000000000000000000" pitchFamily="2" charset="2"/>
+              </a:rPr>
+              <a:t>화면상 표시된 점들을 마우스 왼쪽 버튼 클릭</a:t>
+            </a:r>
+            <a:endParaRPr lang="ko-KR" altLang="en-US" sz="1200" dirty="0"/>
+          </a:p>
+        </p:txBody>
+      </p:sp>
     </p:spTree>
   </p:cSld>
   <p:clrMapOvr>
     <a:masterClrMapping/>
   </p:clrMapOvr>
+  <p:timing>
+    <p:tnLst>
+      <p:par>
+        <p:cTn id="1" dur="indefinite" restart="never" nodeType="tmRoot"/>
+      </p:par>
+    </p:tnLst>
+  </p:timing>
 </p:sld>
 </file>
 
-<file path=ppt/slides/slide9.xml><?xml version="1.0" encoding="utf-8"?>
+<file path=ppt/slides/slide8.xml><?xml version="1.0" encoding="utf-8"?>
 <p:sld xmlns:a="http://schemas.openxmlformats.org/drawingml/2006/main" xmlns:r="http://schemas.openxmlformats.org/officeDocument/2006/relationships" xmlns:p="http://schemas.openxmlformats.org/presentationml/2006/main">
   <p:cSld>
     <p:spTree>
@@ -3607,6 +5524,120 @@
           </a:ln>
         </p:spPr>
       </p:pic>
+      <p:sp>
+        <p:nvSpPr>
+          <p:cNvPr id="3" name="TextBox 2"/>
+          <p:cNvSpPr txBox="1"/>
+          <p:nvPr/>
+        </p:nvSpPr>
+        <p:spPr>
+          <a:xfrm>
+            <a:off x="1547664" y="548680"/>
+            <a:ext cx="4536504" cy="738664"/>
+          </a:xfrm>
+          <a:prstGeom prst="rect">
+            <a:avLst/>
+          </a:prstGeom>
+          <a:noFill/>
+        </p:spPr>
+        <p:txBody>
+          <a:bodyPr wrap="square" rtlCol="0">
+            <a:spAutoFit/>
+          </a:bodyPr>
+          <a:lstStyle/>
+          <a:p>
+            <a:r>
+              <a:rPr lang="ko-KR" altLang="en-US" dirty="0" smtClean="0"/>
+              <a:t>대상 물체 감지된 상태의</a:t>
+            </a:r>
+            <a:r>
+              <a:rPr lang="en-US" altLang="ko-KR" dirty="0" smtClean="0"/>
+              <a:t> </a:t>
+            </a:r>
+            <a:r>
+              <a:rPr lang="ko-KR" altLang="en-US" dirty="0" smtClean="0"/>
+              <a:t>화면</a:t>
+            </a:r>
+            <a:endParaRPr lang="en-US" altLang="ko-KR" dirty="0" smtClean="0"/>
+          </a:p>
+          <a:p>
+            <a:r>
+              <a:rPr lang="en-US" altLang="ko-KR" sz="1200" dirty="0"/>
+              <a:t> </a:t>
+            </a:r>
+            <a:r>
+              <a:rPr lang="en-US" altLang="ko-KR" sz="1200" dirty="0" smtClean="0">
+                <a:sym typeface="Wingdings" panose="05000000000000000000" pitchFamily="2" charset="2"/>
+              </a:rPr>
+              <a:t> </a:t>
+            </a:r>
+            <a:r>
+              <a:rPr lang="ko-KR" altLang="en-US" sz="1200" dirty="0" smtClean="0">
+                <a:sym typeface="Wingdings" panose="05000000000000000000" pitchFamily="2" charset="2"/>
+              </a:rPr>
+              <a:t>대상 물체가 감시되면 해당 점들의 주변에 원형 표시</a:t>
+            </a:r>
+            <a:endParaRPr lang="en-US" altLang="ko-KR" sz="1200" dirty="0" smtClean="0">
+              <a:sym typeface="Wingdings" panose="05000000000000000000" pitchFamily="2" charset="2"/>
+            </a:endParaRPr>
+          </a:p>
+          <a:p>
+            <a:r>
+              <a:rPr lang="en-US" altLang="ko-KR" sz="1200" dirty="0">
+                <a:sym typeface="Wingdings" panose="05000000000000000000" pitchFamily="2" charset="2"/>
+              </a:rPr>
+              <a:t> </a:t>
+            </a:r>
+            <a:r>
+              <a:rPr lang="en-US" altLang="ko-KR" sz="1200" dirty="0" smtClean="0">
+                <a:sym typeface="Wingdings" panose="05000000000000000000" pitchFamily="2" charset="2"/>
+              </a:rPr>
+              <a:t> </a:t>
+            </a:r>
+            <a:r>
+              <a:rPr lang="ko-KR" altLang="en-US" sz="1200" dirty="0" smtClean="0">
+                <a:sym typeface="Wingdings" panose="05000000000000000000" pitchFamily="2" charset="2"/>
+              </a:rPr>
+              <a:t>감지된 대상 물체가 위치한 영역에 해당하는 릴레이 출력</a:t>
+            </a:r>
+            <a:endParaRPr lang="en-US" altLang="ko-KR" sz="1200" dirty="0" smtClean="0">
+              <a:sym typeface="Wingdings" panose="05000000000000000000" pitchFamily="2" charset="2"/>
+            </a:endParaRPr>
+          </a:p>
+        </p:txBody>
+      </p:sp>
+    </p:spTree>
+  </p:cSld>
+  <p:clrMapOvr>
+    <a:masterClrMapping/>
+  </p:clrMapOvr>
+  <p:timing>
+    <p:tnLst>
+      <p:par>
+        <p:cTn id="1" dur="indefinite" restart="never" nodeType="tmRoot"/>
+      </p:par>
+    </p:tnLst>
+  </p:timing>
+</p:sld>
+</file>
+
+<file path=ppt/slides/slide9.xml><?xml version="1.0" encoding="utf-8"?>
+<p:sld xmlns:a="http://schemas.openxmlformats.org/drawingml/2006/main" xmlns:r="http://schemas.openxmlformats.org/officeDocument/2006/relationships" xmlns:p="http://schemas.openxmlformats.org/presentationml/2006/main">
+  <p:cSld>
+    <p:spTree>
+      <p:nvGrpSpPr>
+        <p:cNvPr id="1" name=""/>
+        <p:cNvGrpSpPr/>
+        <p:nvPr/>
+      </p:nvGrpSpPr>
+      <p:grpSpPr>
+        <a:xfrm>
+          <a:off x="0" y="0"/>
+          <a:ext cx="0" cy="0"/>
+          <a:chOff x="0" y="0"/>
+          <a:chExt cx="0" cy="0"/>
+        </a:xfrm>
+      </p:grpSpPr>
     </p:spTree>
   </p:cSld>
   <p:clrMapOvr>

</xml_diff>

<commit_message>
Add 2D-AntiCollision Monitoring System rev. A03 document.
</commit_message>
<xml_diff>
--- a/2D-AntiCollision Monitoring System.pptx
+++ b/2D-AntiCollision Monitoring System.pptx
@@ -6,13 +6,13 @@
   </p:sldMasterIdLst>
   <p:sldIdLst>
     <p:sldId id="256" r:id="rId2"/>
-    <p:sldId id="257" r:id="rId3"/>
-    <p:sldId id="258" r:id="rId4"/>
-    <p:sldId id="259" r:id="rId5"/>
-    <p:sldId id="260" r:id="rId6"/>
-    <p:sldId id="261" r:id="rId7"/>
-    <p:sldId id="263" r:id="rId8"/>
-    <p:sldId id="264" r:id="rId9"/>
+    <p:sldId id="267" r:id="rId3"/>
+    <p:sldId id="257" r:id="rId4"/>
+    <p:sldId id="258" r:id="rId5"/>
+    <p:sldId id="259" r:id="rId6"/>
+    <p:sldId id="260" r:id="rId7"/>
+    <p:sldId id="261" r:id="rId8"/>
+    <p:sldId id="263" r:id="rId9"/>
     <p:sldId id="265" r:id="rId10"/>
     <p:sldId id="266" r:id="rId11"/>
   </p:sldIdLst>
@@ -314,7 +314,7 @@
             <a:fld id="{F17B436D-341F-426B-A879-B4FA1B0657F1}" type="datetimeFigureOut">
               <a:rPr lang="ko-KR" altLang="en-US" smtClean="0"/>
               <a:pPr/>
-              <a:t>2018-08-03</a:t>
+              <a:t>2018-08-13</a:t>
             </a:fld>
             <a:endParaRPr lang="ko-KR" altLang="en-US"/>
           </a:p>
@@ -481,7 +481,7 @@
             <a:fld id="{F17B436D-341F-426B-A879-B4FA1B0657F1}" type="datetimeFigureOut">
               <a:rPr lang="ko-KR" altLang="en-US" smtClean="0"/>
               <a:pPr/>
-              <a:t>2018-08-03</a:t>
+              <a:t>2018-08-13</a:t>
             </a:fld>
             <a:endParaRPr lang="ko-KR" altLang="en-US"/>
           </a:p>
@@ -658,7 +658,7 @@
             <a:fld id="{F17B436D-341F-426B-A879-B4FA1B0657F1}" type="datetimeFigureOut">
               <a:rPr lang="ko-KR" altLang="en-US" smtClean="0"/>
               <a:pPr/>
-              <a:t>2018-08-03</a:t>
+              <a:t>2018-08-13</a:t>
             </a:fld>
             <a:endParaRPr lang="ko-KR" altLang="en-US"/>
           </a:p>
@@ -825,7 +825,7 @@
             <a:fld id="{F17B436D-341F-426B-A879-B4FA1B0657F1}" type="datetimeFigureOut">
               <a:rPr lang="ko-KR" altLang="en-US" smtClean="0"/>
               <a:pPr/>
-              <a:t>2018-08-03</a:t>
+              <a:t>2018-08-13</a:t>
             </a:fld>
             <a:endParaRPr lang="ko-KR" altLang="en-US"/>
           </a:p>
@@ -1068,7 +1068,7 @@
             <a:fld id="{F17B436D-341F-426B-A879-B4FA1B0657F1}" type="datetimeFigureOut">
               <a:rPr lang="ko-KR" altLang="en-US" smtClean="0"/>
               <a:pPr/>
-              <a:t>2018-08-03</a:t>
+              <a:t>2018-08-13</a:t>
             </a:fld>
             <a:endParaRPr lang="ko-KR" altLang="en-US"/>
           </a:p>
@@ -1353,7 +1353,7 @@
             <a:fld id="{F17B436D-341F-426B-A879-B4FA1B0657F1}" type="datetimeFigureOut">
               <a:rPr lang="ko-KR" altLang="en-US" smtClean="0"/>
               <a:pPr/>
-              <a:t>2018-08-03</a:t>
+              <a:t>2018-08-13</a:t>
             </a:fld>
             <a:endParaRPr lang="ko-KR" altLang="en-US"/>
           </a:p>
@@ -1772,7 +1772,7 @@
             <a:fld id="{F17B436D-341F-426B-A879-B4FA1B0657F1}" type="datetimeFigureOut">
               <a:rPr lang="ko-KR" altLang="en-US" smtClean="0"/>
               <a:pPr/>
-              <a:t>2018-08-03</a:t>
+              <a:t>2018-08-13</a:t>
             </a:fld>
             <a:endParaRPr lang="ko-KR" altLang="en-US"/>
           </a:p>
@@ -1887,7 +1887,7 @@
             <a:fld id="{F17B436D-341F-426B-A879-B4FA1B0657F1}" type="datetimeFigureOut">
               <a:rPr lang="ko-KR" altLang="en-US" smtClean="0"/>
               <a:pPr/>
-              <a:t>2018-08-03</a:t>
+              <a:t>2018-08-13</a:t>
             </a:fld>
             <a:endParaRPr lang="ko-KR" altLang="en-US"/>
           </a:p>
@@ -1979,7 +1979,7 @@
             <a:fld id="{F17B436D-341F-426B-A879-B4FA1B0657F1}" type="datetimeFigureOut">
               <a:rPr lang="ko-KR" altLang="en-US" smtClean="0"/>
               <a:pPr/>
-              <a:t>2018-08-03</a:t>
+              <a:t>2018-08-13</a:t>
             </a:fld>
             <a:endParaRPr lang="ko-KR" altLang="en-US"/>
           </a:p>
@@ -2253,7 +2253,7 @@
             <a:fld id="{F17B436D-341F-426B-A879-B4FA1B0657F1}" type="datetimeFigureOut">
               <a:rPr lang="ko-KR" altLang="en-US" smtClean="0"/>
               <a:pPr/>
-              <a:t>2018-08-03</a:t>
+              <a:t>2018-08-13</a:t>
             </a:fld>
             <a:endParaRPr lang="ko-KR" altLang="en-US"/>
           </a:p>
@@ -2503,7 +2503,7 @@
             <a:fld id="{F17B436D-341F-426B-A879-B4FA1B0657F1}" type="datetimeFigureOut">
               <a:rPr lang="ko-KR" altLang="en-US" smtClean="0"/>
               <a:pPr/>
-              <a:t>2018-08-03</a:t>
+              <a:t>2018-08-13</a:t>
             </a:fld>
             <a:endParaRPr lang="ko-KR" altLang="en-US"/>
           </a:p>
@@ -2713,7 +2713,7 @@
             <a:fld id="{F17B436D-341F-426B-A879-B4FA1B0657F1}" type="datetimeFigureOut">
               <a:rPr lang="ko-KR" altLang="en-US" smtClean="0"/>
               <a:pPr/>
-              <a:t>2018-08-03</a:t>
+              <a:t>2018-08-13</a:t>
             </a:fld>
             <a:endParaRPr lang="ko-KR" altLang="en-US"/>
           </a:p>
@@ -3539,7 +3539,7 @@
       </p:grpSpPr>
       <p:pic>
         <p:nvPicPr>
-          <p:cNvPr id="2050" name="Picture 2"/>
+          <p:cNvPr id="1027" name="Picture 3"/>
           <p:cNvPicPr>
             <a:picLocks noChangeAspect="1" noChangeArrowheads="1"/>
           </p:cNvPicPr>
@@ -3554,7 +3554,7 @@
         </p:blipFill>
         <p:spPr bwMode="auto">
           <a:xfrm>
-            <a:off x="2124904" y="1844824"/>
+            <a:off x="2128838" y="1852613"/>
             <a:ext cx="4886325" cy="3152775"/>
           </a:xfrm>
           <a:prstGeom prst="rect">
@@ -3578,7 +3578,7 @@
         <p:spPr>
           <a:xfrm>
             <a:off x="1547664" y="548680"/>
-            <a:ext cx="3888432" cy="553998"/>
+            <a:ext cx="4536504" cy="738664"/>
           </a:xfrm>
           <a:prstGeom prst="rect">
             <a:avLst/>
@@ -3592,12 +3592,8 @@
           <a:lstStyle/>
           <a:p>
             <a:r>
-              <a:rPr lang="en-US" altLang="ko-KR" dirty="0" smtClean="0"/>
-              <a:t>System </a:t>
-            </a:r>
-            <a:r>
               <a:rPr lang="ko-KR" altLang="en-US" dirty="0" smtClean="0"/>
-              <a:t>설정</a:t>
+              <a:t>대상 물체 감지된 상태의</a:t>
             </a:r>
             <a:r>
               <a:rPr lang="en-US" altLang="ko-KR" dirty="0" smtClean="0"/>
@@ -3624,571 +3620,43 @@
               <a:rPr lang="ko-KR" altLang="en-US" sz="1200" dirty="0" smtClean="0">
                 <a:sym typeface="Wingdings" panose="05000000000000000000" pitchFamily="2" charset="2"/>
               </a:rPr>
-              <a:t>키보드 </a:t>
+              <a:t>대상 물체가 감시되면 해당 점들의 주변에 원형 표시</a:t>
+            </a:r>
+            <a:endParaRPr lang="en-US" altLang="ko-KR" sz="1200" dirty="0" smtClean="0">
+              <a:sym typeface="Wingdings" panose="05000000000000000000" pitchFamily="2" charset="2"/>
+            </a:endParaRPr>
+          </a:p>
+          <a:p>
+            <a:r>
+              <a:rPr lang="en-US" altLang="ko-KR" sz="1200" dirty="0">
+                <a:sym typeface="Wingdings" panose="05000000000000000000" pitchFamily="2" charset="2"/>
+              </a:rPr>
+              <a:t> </a:t>
             </a:r>
             <a:r>
               <a:rPr lang="en-US" altLang="ko-KR" sz="1200" dirty="0" smtClean="0">
                 <a:sym typeface="Wingdings" panose="05000000000000000000" pitchFamily="2" charset="2"/>
               </a:rPr>
-              <a:t>F1 </a:t>
+              <a:t> </a:t>
             </a:r>
             <a:r>
               <a:rPr lang="ko-KR" altLang="en-US" sz="1200" dirty="0" smtClean="0">
                 <a:sym typeface="Wingdings" panose="05000000000000000000" pitchFamily="2" charset="2"/>
               </a:rPr>
-              <a:t>키로 진입</a:t>
-            </a:r>
-            <a:endParaRPr lang="ko-KR" altLang="en-US" sz="1200" dirty="0"/>
-          </a:p>
-        </p:txBody>
-      </p:sp>
-      <p:sp>
-        <p:nvSpPr>
-          <p:cNvPr id="4" name="사각형 설명선 3"/>
-          <p:cNvSpPr/>
-          <p:nvPr/>
-        </p:nvSpPr>
-        <p:spPr>
-          <a:xfrm>
-            <a:off x="899592" y="1388225"/>
-            <a:ext cx="2448272" cy="387615"/>
-          </a:xfrm>
-          <a:prstGeom prst="wedgeRectCallout">
-            <a:avLst>
-              <a:gd name="adj1" fmla="val 12794"/>
-              <a:gd name="adj2" fmla="val 202855"/>
-            </a:avLst>
-          </a:prstGeom>
-          <a:noFill/>
-          <a:ln>
-            <a:solidFill>
-              <a:schemeClr val="bg1">
-                <a:lumMod val="75000"/>
-              </a:schemeClr>
-            </a:solidFill>
-          </a:ln>
-        </p:spPr>
-        <p:style>
-          <a:lnRef idx="2">
-            <a:schemeClr val="accent1">
-              <a:shade val="50000"/>
-            </a:schemeClr>
-          </a:lnRef>
-          <a:fillRef idx="1">
-            <a:schemeClr val="accent1"/>
-          </a:fillRef>
-          <a:effectRef idx="0">
-            <a:schemeClr val="accent1"/>
-          </a:effectRef>
-          <a:fontRef idx="minor">
-            <a:schemeClr val="lt1"/>
-          </a:fontRef>
-        </p:style>
-        <p:txBody>
-          <a:bodyPr rtlCol="0" anchor="ctr"/>
-          <a:lstStyle/>
-          <a:p>
-            <a:pPr algn="ctr"/>
-            <a:r>
-              <a:rPr lang="ko-KR" altLang="en-US" sz="1000" dirty="0" smtClean="0">
-                <a:solidFill>
-                  <a:schemeClr val="tx1"/>
-                </a:solidFill>
-              </a:rPr>
-              <a:t>각종 설정 화면 진입 시 입력해야 하는 </a:t>
-            </a:r>
-            <a:r>
-              <a:rPr lang="en-US" altLang="ko-KR" sz="1000" dirty="0" smtClean="0">
-                <a:solidFill>
-                  <a:schemeClr val="tx1"/>
-                </a:solidFill>
-              </a:rPr>
-              <a:t>System password</a:t>
-            </a:r>
-          </a:p>
-        </p:txBody>
-      </p:sp>
-      <p:sp>
-        <p:nvSpPr>
-          <p:cNvPr id="5" name="사각형 설명선 4"/>
-          <p:cNvSpPr/>
-          <p:nvPr/>
-        </p:nvSpPr>
-        <p:spPr>
-          <a:xfrm>
-            <a:off x="61610" y="2204864"/>
-            <a:ext cx="1656184" cy="268939"/>
-          </a:xfrm>
-          <a:prstGeom prst="wedgeRectCallout">
-            <a:avLst>
-              <a:gd name="adj1" fmla="val 79861"/>
-              <a:gd name="adj2" fmla="val 72832"/>
-            </a:avLst>
-          </a:prstGeom>
-          <a:noFill/>
-          <a:ln>
-            <a:solidFill>
-              <a:schemeClr val="bg1">
-                <a:lumMod val="75000"/>
-              </a:schemeClr>
-            </a:solidFill>
-          </a:ln>
-        </p:spPr>
-        <p:style>
-          <a:lnRef idx="2">
-            <a:schemeClr val="accent1">
-              <a:shade val="50000"/>
-            </a:schemeClr>
-          </a:lnRef>
-          <a:fillRef idx="1">
-            <a:schemeClr val="accent1"/>
-          </a:fillRef>
-          <a:effectRef idx="0">
-            <a:schemeClr val="accent1"/>
-          </a:effectRef>
-          <a:fontRef idx="minor">
-            <a:schemeClr val="lt1"/>
-          </a:fontRef>
-        </p:style>
-        <p:txBody>
-          <a:bodyPr rtlCol="0" anchor="ctr"/>
-          <a:lstStyle/>
-          <a:p>
-            <a:r>
-              <a:rPr lang="ko-KR" altLang="en-US" sz="1000" dirty="0" smtClean="0">
-                <a:solidFill>
-                  <a:schemeClr val="tx1"/>
-                </a:solidFill>
-              </a:rPr>
-              <a:t>초당 </a:t>
-            </a:r>
-            <a:r>
-              <a:rPr lang="en-US" altLang="ko-KR" sz="1000" dirty="0" smtClean="0">
-                <a:solidFill>
-                  <a:schemeClr val="tx1"/>
-                </a:solidFill>
-              </a:rPr>
-              <a:t>Scan </a:t>
-            </a:r>
-            <a:r>
-              <a:rPr lang="ko-KR" altLang="en-US" sz="1000" dirty="0" smtClean="0">
-                <a:solidFill>
-                  <a:schemeClr val="tx1"/>
-                </a:solidFill>
-              </a:rPr>
-              <a:t>동작 회수</a:t>
-            </a:r>
-            <a:endParaRPr lang="en-US" altLang="ko-KR" sz="1000" dirty="0" smtClean="0">
-              <a:solidFill>
-                <a:schemeClr val="tx1"/>
-              </a:solidFill>
+              <a:t>감지된 대상 물체가 위치한 영역에 해당하는 릴레이 출력</a:t>
+            </a:r>
+            <a:endParaRPr lang="en-US" altLang="ko-KR" sz="1200" dirty="0" smtClean="0">
+              <a:sym typeface="Wingdings" panose="05000000000000000000" pitchFamily="2" charset="2"/>
             </a:endParaRPr>
           </a:p>
         </p:txBody>
       </p:sp>
-      <p:sp>
-        <p:nvSpPr>
-          <p:cNvPr id="6" name="사각형 설명선 5"/>
-          <p:cNvSpPr/>
-          <p:nvPr/>
-        </p:nvSpPr>
-        <p:spPr>
-          <a:xfrm>
-            <a:off x="61610" y="2564904"/>
-            <a:ext cx="1656184" cy="359033"/>
-          </a:xfrm>
-          <a:prstGeom prst="wedgeRectCallout">
-            <a:avLst>
-              <a:gd name="adj1" fmla="val 77324"/>
-              <a:gd name="adj2" fmla="val 21288"/>
-            </a:avLst>
-          </a:prstGeom>
-          <a:noFill/>
-          <a:ln>
-            <a:solidFill>
-              <a:schemeClr val="bg1">
-                <a:lumMod val="75000"/>
-              </a:schemeClr>
-            </a:solidFill>
-          </a:ln>
-        </p:spPr>
-        <p:style>
-          <a:lnRef idx="2">
-            <a:schemeClr val="accent1">
-              <a:shade val="50000"/>
-            </a:schemeClr>
-          </a:lnRef>
-          <a:fillRef idx="1">
-            <a:schemeClr val="accent1"/>
-          </a:fillRef>
-          <a:effectRef idx="0">
-            <a:schemeClr val="accent1"/>
-          </a:effectRef>
-          <a:fontRef idx="minor">
-            <a:schemeClr val="lt1"/>
-          </a:fontRef>
-        </p:style>
-        <p:txBody>
-          <a:bodyPr rtlCol="0" anchor="ctr"/>
-          <a:lstStyle/>
-          <a:p>
-            <a:r>
-              <a:rPr lang="en-US" altLang="ko-KR" sz="1000" dirty="0" smtClean="0">
-                <a:solidFill>
-                  <a:schemeClr val="tx1"/>
-                </a:solidFill>
-              </a:rPr>
-              <a:t>Scan data </a:t>
-            </a:r>
-            <a:r>
-              <a:rPr lang="ko-KR" altLang="en-US" sz="1000" dirty="0" smtClean="0">
-                <a:solidFill>
-                  <a:schemeClr val="tx1"/>
-                </a:solidFill>
-              </a:rPr>
-              <a:t>상시</a:t>
-            </a:r>
-            <a:r>
-              <a:rPr lang="en-US" altLang="ko-KR" sz="1000" dirty="0" smtClean="0">
-                <a:solidFill>
-                  <a:schemeClr val="tx1"/>
-                </a:solidFill>
-              </a:rPr>
-              <a:t>/</a:t>
-            </a:r>
-            <a:r>
-              <a:rPr lang="ko-KR" altLang="en-US" sz="1000" dirty="0" smtClean="0">
-                <a:solidFill>
-                  <a:schemeClr val="tx1"/>
-                </a:solidFill>
-              </a:rPr>
-              <a:t>이벤트</a:t>
-            </a:r>
-            <a:r>
-              <a:rPr lang="en-US" altLang="ko-KR" sz="1000" dirty="0" smtClean="0">
-                <a:solidFill>
-                  <a:schemeClr val="tx1"/>
-                </a:solidFill>
-              </a:rPr>
-              <a:t> </a:t>
-            </a:r>
-            <a:r>
-              <a:rPr lang="ko-KR" altLang="en-US" sz="1000" dirty="0" smtClean="0">
-                <a:solidFill>
-                  <a:schemeClr val="tx1"/>
-                </a:solidFill>
-              </a:rPr>
-              <a:t>저장 시간</a:t>
-            </a:r>
-            <a:endParaRPr lang="en-US" altLang="ko-KR" sz="1000" dirty="0" smtClean="0">
-              <a:solidFill>
-                <a:schemeClr val="tx1"/>
-              </a:solidFill>
-            </a:endParaRPr>
-          </a:p>
-        </p:txBody>
-      </p:sp>
-      <p:sp>
-        <p:nvSpPr>
-          <p:cNvPr id="7" name="왼쪽 중괄호 6"/>
-          <p:cNvSpPr/>
-          <p:nvPr/>
-        </p:nvSpPr>
-        <p:spPr>
-          <a:xfrm>
-            <a:off x="2175417" y="2643262"/>
-            <a:ext cx="45719" cy="353690"/>
-          </a:xfrm>
-          <a:prstGeom prst="leftBrace">
-            <a:avLst/>
-          </a:prstGeom>
-        </p:spPr>
-        <p:style>
-          <a:lnRef idx="1">
-            <a:schemeClr val="accent1"/>
-          </a:lnRef>
-          <a:fillRef idx="0">
-            <a:schemeClr val="accent1"/>
-          </a:fillRef>
-          <a:effectRef idx="0">
-            <a:schemeClr val="accent1"/>
-          </a:effectRef>
-          <a:fontRef idx="minor">
-            <a:schemeClr val="tx1"/>
-          </a:fontRef>
-        </p:style>
-        <p:txBody>
-          <a:bodyPr rtlCol="0" anchor="ctr"/>
-          <a:lstStyle/>
-          <a:p>
-            <a:pPr algn="ctr"/>
-            <a:endParaRPr lang="ko-KR" altLang="en-US"/>
-          </a:p>
-        </p:txBody>
-      </p:sp>
-      <p:sp>
-        <p:nvSpPr>
-          <p:cNvPr id="9" name="사각형 설명선 8"/>
-          <p:cNvSpPr/>
-          <p:nvPr/>
-        </p:nvSpPr>
-        <p:spPr>
-          <a:xfrm>
-            <a:off x="60896" y="3016045"/>
-            <a:ext cx="1656184" cy="268939"/>
-          </a:xfrm>
-          <a:prstGeom prst="wedgeRectCallout">
-            <a:avLst>
-              <a:gd name="adj1" fmla="val 80244"/>
-              <a:gd name="adj2" fmla="val -26336"/>
-            </a:avLst>
-          </a:prstGeom>
-          <a:noFill/>
-          <a:ln>
-            <a:solidFill>
-              <a:schemeClr val="bg1">
-                <a:lumMod val="75000"/>
-              </a:schemeClr>
-            </a:solidFill>
-          </a:ln>
-        </p:spPr>
-        <p:style>
-          <a:lnRef idx="2">
-            <a:schemeClr val="accent1">
-              <a:shade val="50000"/>
-            </a:schemeClr>
-          </a:lnRef>
-          <a:fillRef idx="1">
-            <a:schemeClr val="accent1"/>
-          </a:fillRef>
-          <a:effectRef idx="0">
-            <a:schemeClr val="accent1"/>
-          </a:effectRef>
-          <a:fontRef idx="minor">
-            <a:schemeClr val="lt1"/>
-          </a:fontRef>
-        </p:style>
-        <p:txBody>
-          <a:bodyPr rtlCol="0" anchor="ctr"/>
-          <a:lstStyle/>
-          <a:p>
-            <a:r>
-              <a:rPr lang="ko-KR" altLang="en-US" sz="1000" dirty="0" smtClean="0">
-                <a:solidFill>
-                  <a:schemeClr val="tx1"/>
-                </a:solidFill>
-              </a:rPr>
-              <a:t>릴레이 모듈 연결 포트</a:t>
-            </a:r>
-            <a:endParaRPr lang="en-US" altLang="ko-KR" sz="1000" dirty="0" smtClean="0">
-              <a:solidFill>
-                <a:schemeClr val="tx1"/>
-              </a:solidFill>
-            </a:endParaRPr>
-          </a:p>
-        </p:txBody>
-      </p:sp>
-      <p:sp>
-        <p:nvSpPr>
-          <p:cNvPr id="10" name="왼쪽 중괄호 9"/>
-          <p:cNvSpPr/>
-          <p:nvPr/>
-        </p:nvSpPr>
-        <p:spPr>
-          <a:xfrm>
-            <a:off x="2176593" y="3198833"/>
-            <a:ext cx="45719" cy="596558"/>
-          </a:xfrm>
-          <a:prstGeom prst="leftBrace">
-            <a:avLst/>
-          </a:prstGeom>
-        </p:spPr>
-        <p:style>
-          <a:lnRef idx="1">
-            <a:schemeClr val="accent1"/>
-          </a:lnRef>
-          <a:fillRef idx="0">
-            <a:schemeClr val="accent1"/>
-          </a:fillRef>
-          <a:effectRef idx="0">
-            <a:schemeClr val="accent1"/>
-          </a:effectRef>
-          <a:fontRef idx="minor">
-            <a:schemeClr val="tx1"/>
-          </a:fontRef>
-        </p:style>
-        <p:txBody>
-          <a:bodyPr rtlCol="0" anchor="ctr"/>
-          <a:lstStyle/>
-          <a:p>
-            <a:pPr algn="ctr"/>
-            <a:endParaRPr lang="ko-KR" altLang="en-US"/>
-          </a:p>
-        </p:txBody>
-      </p:sp>
-      <p:sp>
-        <p:nvSpPr>
-          <p:cNvPr id="11" name="사각형 설명선 10"/>
-          <p:cNvSpPr/>
-          <p:nvPr/>
-        </p:nvSpPr>
-        <p:spPr>
-          <a:xfrm>
-            <a:off x="60896" y="3430007"/>
-            <a:ext cx="1990824" cy="935097"/>
-          </a:xfrm>
-          <a:prstGeom prst="wedgeRectCallout">
-            <a:avLst>
-              <a:gd name="adj1" fmla="val 56656"/>
-              <a:gd name="adj2" fmla="val -45873"/>
-            </a:avLst>
-          </a:prstGeom>
-          <a:noFill/>
-          <a:ln>
-            <a:solidFill>
-              <a:schemeClr val="bg1">
-                <a:lumMod val="75000"/>
-              </a:schemeClr>
-            </a:solidFill>
-          </a:ln>
-        </p:spPr>
-        <p:style>
-          <a:lnRef idx="2">
-            <a:schemeClr val="accent1">
-              <a:shade val="50000"/>
-            </a:schemeClr>
-          </a:lnRef>
-          <a:fillRef idx="1">
-            <a:schemeClr val="accent1"/>
-          </a:fillRef>
-          <a:effectRef idx="0">
-            <a:schemeClr val="accent1"/>
-          </a:effectRef>
-          <a:fontRef idx="minor">
-            <a:schemeClr val="lt1"/>
-          </a:fontRef>
-        </p:style>
-        <p:txBody>
-          <a:bodyPr rtlCol="0" anchor="ctr"/>
-          <a:lstStyle/>
-          <a:p>
-            <a:r>
-              <a:rPr lang="ko-KR" altLang="en-US" sz="1000" dirty="0" smtClean="0">
-                <a:solidFill>
-                  <a:schemeClr val="tx1"/>
-                </a:solidFill>
-              </a:rPr>
-              <a:t>대상물체 감지를 위한 </a:t>
-            </a:r>
-            <a:r>
-              <a:rPr lang="ko-KR" altLang="en-US" sz="1000" dirty="0" err="1" smtClean="0">
-                <a:solidFill>
-                  <a:schemeClr val="tx1"/>
-                </a:solidFill>
-              </a:rPr>
-              <a:t>파라메터</a:t>
-            </a:r>
-            <a:endParaRPr lang="en-US" altLang="ko-KR" sz="1000" dirty="0" smtClean="0">
-              <a:solidFill>
-                <a:schemeClr val="tx1"/>
-              </a:solidFill>
-            </a:endParaRPr>
-          </a:p>
-          <a:p>
-            <a:r>
-              <a:rPr lang="en-US" altLang="ko-KR" sz="800" dirty="0" smtClean="0">
-                <a:solidFill>
-                  <a:schemeClr val="tx1"/>
-                </a:solidFill>
-              </a:rPr>
-              <a:t>POINT_DISTANCE_MAX: </a:t>
-            </a:r>
-            <a:r>
-              <a:rPr lang="ko-KR" altLang="en-US" sz="800" dirty="0" smtClean="0">
-                <a:solidFill>
-                  <a:schemeClr val="tx1"/>
-                </a:solidFill>
-              </a:rPr>
-              <a:t>대상물체를 구성하는 점들간의 거리</a:t>
-            </a:r>
-            <a:endParaRPr lang="en-US" altLang="ko-KR" sz="800" dirty="0" smtClean="0">
-              <a:solidFill>
-                <a:schemeClr val="tx1"/>
-              </a:solidFill>
-            </a:endParaRPr>
-          </a:p>
-          <a:p>
-            <a:r>
-              <a:rPr lang="en-US" altLang="ko-KR" sz="800" dirty="0" smtClean="0">
-                <a:solidFill>
-                  <a:schemeClr val="tx1"/>
-                </a:solidFill>
-              </a:rPr>
-              <a:t>DIAMETER: </a:t>
-            </a:r>
-            <a:r>
-              <a:rPr lang="ko-KR" altLang="en-US" sz="800" dirty="0" smtClean="0">
-                <a:solidFill>
-                  <a:schemeClr val="tx1"/>
-                </a:solidFill>
-              </a:rPr>
-              <a:t>대상물체의 지름 크기</a:t>
-            </a:r>
-            <a:endParaRPr lang="en-US" altLang="ko-KR" sz="800" dirty="0" smtClean="0">
-              <a:solidFill>
-                <a:schemeClr val="tx1"/>
-              </a:solidFill>
-            </a:endParaRPr>
-          </a:p>
-          <a:p>
-            <a:r>
-              <a:rPr lang="en-US" altLang="ko-KR" sz="800" dirty="0" smtClean="0">
-                <a:solidFill>
-                  <a:schemeClr val="tx1"/>
-                </a:solidFill>
-              </a:rPr>
-              <a:t>TIME_MIN: </a:t>
-            </a:r>
-            <a:r>
-              <a:rPr lang="ko-KR" altLang="en-US" sz="800" dirty="0" smtClean="0">
-                <a:solidFill>
-                  <a:schemeClr val="tx1"/>
-                </a:solidFill>
-              </a:rPr>
-              <a:t>대상물체 지속 감지 시간</a:t>
-            </a:r>
-            <a:endParaRPr lang="en-US" altLang="ko-KR" sz="800" dirty="0" smtClean="0">
-              <a:solidFill>
-                <a:schemeClr val="tx1"/>
-              </a:solidFill>
-            </a:endParaRPr>
-          </a:p>
-          <a:p>
-            <a:r>
-              <a:rPr lang="en-US" altLang="ko-KR" sz="800" dirty="0" smtClean="0">
-                <a:solidFill>
-                  <a:schemeClr val="tx1"/>
-                </a:solidFill>
-              </a:rPr>
-              <a:t>KEEP_TIME: </a:t>
-            </a:r>
-            <a:r>
-              <a:rPr lang="ko-KR" altLang="en-US" sz="800" dirty="0" smtClean="0">
-                <a:solidFill>
-                  <a:schemeClr val="tx1"/>
-                </a:solidFill>
-              </a:rPr>
-              <a:t>대상물체 감지 후 유지시간</a:t>
-            </a:r>
-            <a:endParaRPr lang="en-US" altLang="ko-KR" sz="800" dirty="0" smtClean="0">
-              <a:solidFill>
-                <a:schemeClr val="tx1"/>
-              </a:solidFill>
-            </a:endParaRPr>
-          </a:p>
-        </p:txBody>
-      </p:sp>
     </p:spTree>
+    <p:extLst>
+      <p:ext uri="{BB962C8B-B14F-4D97-AF65-F5344CB8AC3E}">
+        <p14:creationId xmlns:p14="http://schemas.microsoft.com/office/powerpoint/2010/main" val="1989560957"/>
+      </p:ext>
+    </p:extLst>
   </p:cSld>
   <p:clrMapOvr>
     <a:masterClrMapping/>
@@ -4237,7 +3705,7 @@
         </p:blipFill>
         <p:spPr bwMode="auto">
           <a:xfrm>
-            <a:off x="2128838" y="1852613"/>
+            <a:off x="2124904" y="1844824"/>
             <a:ext cx="4886325" cy="3152775"/>
           </a:xfrm>
           <a:prstGeom prst="rect">
@@ -4261,7 +3729,7 @@
         <p:spPr>
           <a:xfrm>
             <a:off x="1547664" y="548680"/>
-            <a:ext cx="5040560" cy="923330"/>
+            <a:ext cx="3888432" cy="553998"/>
           </a:xfrm>
           <a:prstGeom prst="rect">
             <a:avLst/>
@@ -4276,11 +3744,11 @@
           <a:p>
             <a:r>
               <a:rPr lang="en-US" altLang="ko-KR" dirty="0" smtClean="0"/>
-              <a:t>Zoom/Rotate/Mirror/Angle/Location </a:t>
+              <a:t>System </a:t>
             </a:r>
             <a:r>
               <a:rPr lang="ko-KR" altLang="en-US" dirty="0" smtClean="0"/>
-              <a:t>조정</a:t>
+              <a:t>설정</a:t>
             </a:r>
             <a:r>
               <a:rPr lang="en-US" altLang="ko-KR" dirty="0" smtClean="0"/>
@@ -4313,7 +3781,7 @@
               <a:rPr lang="en-US" altLang="ko-KR" sz="1200" dirty="0" smtClean="0">
                 <a:sym typeface="Wingdings" panose="05000000000000000000" pitchFamily="2" charset="2"/>
               </a:rPr>
-              <a:t>F2 </a:t>
+              <a:t>F1 </a:t>
             </a:r>
             <a:r>
               <a:rPr lang="ko-KR" altLang="en-US" sz="1200" dirty="0" smtClean="0">
@@ -4321,85 +3789,7 @@
               </a:rPr>
               <a:t>키로 진입</a:t>
             </a:r>
-            <a:endParaRPr lang="en-US" altLang="ko-KR" sz="1200" dirty="0" smtClean="0">
-              <a:sym typeface="Wingdings" panose="05000000000000000000" pitchFamily="2" charset="2"/>
-            </a:endParaRPr>
-          </a:p>
-          <a:p>
-            <a:r>
-              <a:rPr lang="en-US" altLang="ko-KR" sz="1200" dirty="0">
-                <a:sym typeface="Wingdings" panose="05000000000000000000" pitchFamily="2" charset="2"/>
-              </a:rPr>
-              <a:t> </a:t>
-            </a:r>
-            <a:r>
-              <a:rPr lang="en-US" altLang="ko-KR" sz="1200" dirty="0" smtClean="0">
-                <a:sym typeface="Wingdings" panose="05000000000000000000" pitchFamily="2" charset="2"/>
-              </a:rPr>
-              <a:t> </a:t>
-            </a:r>
-            <a:r>
-              <a:rPr lang="ko-KR" altLang="en-US" sz="1200" dirty="0" smtClean="0">
-                <a:sym typeface="Wingdings" panose="05000000000000000000" pitchFamily="2" charset="2"/>
-              </a:rPr>
-              <a:t>마우스</a:t>
-            </a:r>
-            <a:r>
-              <a:rPr lang="en-US" altLang="ko-KR" sz="1200" dirty="0" smtClean="0">
-                <a:sym typeface="Wingdings" panose="05000000000000000000" pitchFamily="2" charset="2"/>
-              </a:rPr>
-              <a:t> </a:t>
-            </a:r>
-            <a:r>
-              <a:rPr lang="ko-KR" altLang="en-US" sz="1200" dirty="0" err="1" smtClean="0">
-                <a:sym typeface="Wingdings" panose="05000000000000000000" pitchFamily="2" charset="2"/>
-              </a:rPr>
-              <a:t>휠을</a:t>
-            </a:r>
-            <a:r>
-              <a:rPr lang="ko-KR" altLang="en-US" sz="1200" dirty="0" smtClean="0">
-                <a:sym typeface="Wingdings" panose="05000000000000000000" pitchFamily="2" charset="2"/>
-              </a:rPr>
-              <a:t> 이용하여 전체 화면 확대 축소 가능</a:t>
-            </a:r>
-            <a:endParaRPr lang="en-US" altLang="ko-KR" sz="1200" dirty="0" smtClean="0">
-              <a:sym typeface="Wingdings" panose="05000000000000000000" pitchFamily="2" charset="2"/>
-            </a:endParaRPr>
-          </a:p>
-          <a:p>
-            <a:r>
-              <a:rPr lang="en-US" altLang="ko-KR" sz="1200" dirty="0">
-                <a:sym typeface="Wingdings" panose="05000000000000000000" pitchFamily="2" charset="2"/>
-              </a:rPr>
-              <a:t> </a:t>
-            </a:r>
-            <a:r>
-              <a:rPr lang="en-US" altLang="ko-KR" sz="1200" dirty="0" smtClean="0">
-                <a:sym typeface="Wingdings" panose="05000000000000000000" pitchFamily="2" charset="2"/>
-              </a:rPr>
-              <a:t> </a:t>
-            </a:r>
-            <a:r>
-              <a:rPr lang="ko-KR" altLang="en-US" sz="1200" dirty="0" smtClean="0">
-                <a:sym typeface="Wingdings" panose="05000000000000000000" pitchFamily="2" charset="2"/>
-              </a:rPr>
-              <a:t>마우스 왼쪽 버튼 </a:t>
-            </a:r>
-            <a:r>
-              <a:rPr lang="ko-KR" altLang="en-US" sz="1200" dirty="0" err="1" smtClean="0">
-                <a:sym typeface="Wingdings" panose="05000000000000000000" pitchFamily="2" charset="2"/>
-              </a:rPr>
-              <a:t>드레그를</a:t>
-            </a:r>
-            <a:r>
-              <a:rPr lang="ko-KR" altLang="en-US" sz="1200" dirty="0" smtClean="0">
-                <a:sym typeface="Wingdings" panose="05000000000000000000" pitchFamily="2" charset="2"/>
-              </a:rPr>
-              <a:t> 이용하여 화면 위치 이동 가능</a:t>
-            </a:r>
-            <a:endParaRPr lang="en-US" altLang="ko-KR" sz="1200" dirty="0">
-              <a:sym typeface="Wingdings" panose="05000000000000000000" pitchFamily="2" charset="2"/>
-            </a:endParaRPr>
+            <a:endParaRPr lang="ko-KR" altLang="en-US" sz="1200" dirty="0"/>
           </a:p>
         </p:txBody>
       </p:sp>
@@ -4411,13 +3801,13 @@
         </p:nvSpPr>
         <p:spPr>
           <a:xfrm>
-            <a:off x="107504" y="2420888"/>
-            <a:ext cx="1656184" cy="268939"/>
+            <a:off x="899592" y="1388225"/>
+            <a:ext cx="2448272" cy="387615"/>
           </a:xfrm>
           <a:prstGeom prst="wedgeRectCallout">
             <a:avLst>
-              <a:gd name="adj1" fmla="val 71809"/>
-              <a:gd name="adj2" fmla="val 42137"/>
+              <a:gd name="adj1" fmla="val 12794"/>
+              <a:gd name="adj2" fmla="val 202855"/>
             </a:avLst>
           </a:prstGeom>
           <a:noFill/>
@@ -4449,19 +3839,23 @@
           <a:bodyPr rtlCol="0" anchor="ctr"/>
           <a:lstStyle/>
           <a:p>
+            <a:pPr algn="ctr"/>
             <a:r>
               <a:rPr lang="ko-KR" altLang="en-US" sz="1000" dirty="0" smtClean="0">
                 <a:solidFill>
                   <a:schemeClr val="tx1"/>
                 </a:solidFill>
               </a:rPr>
-              <a:t>화면 확대 축소</a:t>
-            </a:r>
-            <a:endParaRPr lang="en-US" altLang="ko-KR" sz="1000" dirty="0" smtClean="0">
-              <a:solidFill>
-                <a:schemeClr val="tx1"/>
-              </a:solidFill>
-            </a:endParaRPr>
+              <a:t>각종 설정 화면 진입 시 입력해야 하는 </a:t>
+            </a:r>
+            <a:r>
+              <a:rPr lang="en-US" altLang="ko-KR" sz="1000" dirty="0" smtClean="0">
+                <a:solidFill>
+                  <a:schemeClr val="tx1"/>
+                </a:solidFill>
+              </a:rPr>
+              <a:t>System password</a:t>
+            </a:r>
           </a:p>
         </p:txBody>
       </p:sp>
@@ -4473,13 +3867,13 @@
         </p:nvSpPr>
         <p:spPr>
           <a:xfrm>
-            <a:off x="107504" y="2924944"/>
+            <a:off x="61610" y="2204864"/>
             <a:ext cx="1656184" cy="268939"/>
           </a:xfrm>
           <a:prstGeom prst="wedgeRectCallout">
             <a:avLst>
-              <a:gd name="adj1" fmla="val 71809"/>
-              <a:gd name="adj2" fmla="val 42137"/>
+              <a:gd name="adj1" fmla="val 79861"/>
+              <a:gd name="adj2" fmla="val 72832"/>
             </a:avLst>
           </a:prstGeom>
           <a:noFill/>
@@ -4517,7 +3911,7 @@
                   <a:schemeClr val="tx1"/>
                 </a:solidFill>
               </a:rPr>
-              <a:t>화면 회전</a:t>
+              <a:t>초당 </a:t>
             </a:r>
             <a:r>
               <a:rPr lang="en-US" altLang="ko-KR" sz="1000" dirty="0" smtClean="0">
@@ -4525,8 +3919,21 @@
                   <a:schemeClr val="tx1"/>
                 </a:solidFill>
               </a:rPr>
-              <a:t>(90°)</a:t>
-            </a:r>
+              <a:t>Scan </a:t>
+            </a:r>
+            <a:r>
+              <a:rPr lang="ko-KR" altLang="en-US" sz="1000" dirty="0" smtClean="0">
+                <a:solidFill>
+                  <a:schemeClr val="tx1"/>
+                </a:solidFill>
+              </a:rPr>
+              <a:t>동작 회수</a:t>
+            </a:r>
+            <a:endParaRPr lang="en-US" altLang="ko-KR" sz="1000" dirty="0" smtClean="0">
+              <a:solidFill>
+                <a:schemeClr val="tx1"/>
+              </a:solidFill>
+            </a:endParaRPr>
           </a:p>
         </p:txBody>
       </p:sp>
@@ -4538,13 +3945,13 @@
         </p:nvSpPr>
         <p:spPr>
           <a:xfrm>
-            <a:off x="107504" y="3232069"/>
-            <a:ext cx="1656184" cy="268939"/>
+            <a:off x="61610" y="2564904"/>
+            <a:ext cx="1656184" cy="359033"/>
           </a:xfrm>
           <a:prstGeom prst="wedgeRectCallout">
             <a:avLst>
-              <a:gd name="adj1" fmla="val 71809"/>
-              <a:gd name="adj2" fmla="val 42137"/>
+              <a:gd name="adj1" fmla="val 77324"/>
+              <a:gd name="adj2" fmla="val 21288"/>
             </a:avLst>
           </a:prstGeom>
           <a:noFill/>
@@ -4577,12 +3984,52 @@
           <a:lstStyle/>
           <a:p>
             <a:r>
+              <a:rPr lang="en-US" altLang="ko-KR" sz="1000" dirty="0" smtClean="0">
+                <a:solidFill>
+                  <a:schemeClr val="tx1"/>
+                </a:solidFill>
+              </a:rPr>
+              <a:t>Scan data </a:t>
+            </a:r>
+            <a:r>
               <a:rPr lang="ko-KR" altLang="en-US" sz="1000" dirty="0" smtClean="0">
                 <a:solidFill>
                   <a:schemeClr val="tx1"/>
                 </a:solidFill>
               </a:rPr>
-              <a:t>화면 상하 반전</a:t>
+              <a:t>상시</a:t>
+            </a:r>
+            <a:r>
+              <a:rPr lang="en-US" altLang="ko-KR" sz="1000" dirty="0" smtClean="0">
+                <a:solidFill>
+                  <a:schemeClr val="tx1"/>
+                </a:solidFill>
+              </a:rPr>
+              <a:t>/</a:t>
+            </a:r>
+            <a:r>
+              <a:rPr lang="ko-KR" altLang="en-US" sz="1000" dirty="0" smtClean="0">
+                <a:solidFill>
+                  <a:schemeClr val="tx1"/>
+                </a:solidFill>
+              </a:rPr>
+              <a:t>이벤트</a:t>
+            </a:r>
+            <a:r>
+              <a:rPr lang="en-US" altLang="ko-KR" sz="1000" dirty="0" smtClean="0">
+                <a:solidFill>
+                  <a:schemeClr val="tx1"/>
+                </a:solidFill>
+              </a:rPr>
+              <a:t> </a:t>
+            </a:r>
+            <a:r>
+              <a:rPr lang="ko-KR" altLang="en-US" sz="1000" dirty="0" smtClean="0">
+                <a:solidFill>
+                  <a:schemeClr val="tx1"/>
+                </a:solidFill>
+              </a:rPr>
+              <a:t>저장 시간</a:t>
             </a:r>
             <a:endParaRPr lang="en-US" altLang="ko-KR" sz="1000" dirty="0" smtClean="0">
               <a:solidFill>
@@ -4594,19 +4041,57 @@
       </p:sp>
       <p:sp>
         <p:nvSpPr>
-          <p:cNvPr id="7" name="사각형 설명선 6"/>
+          <p:cNvPr id="7" name="왼쪽 중괄호 6"/>
           <p:cNvSpPr/>
           <p:nvPr/>
         </p:nvSpPr>
         <p:spPr>
           <a:xfrm>
-            <a:off x="107504" y="3592109"/>
+            <a:off x="2175417" y="2643262"/>
+            <a:ext cx="45719" cy="353690"/>
+          </a:xfrm>
+          <a:prstGeom prst="leftBrace">
+            <a:avLst/>
+          </a:prstGeom>
+        </p:spPr>
+        <p:style>
+          <a:lnRef idx="1">
+            <a:schemeClr val="accent1"/>
+          </a:lnRef>
+          <a:fillRef idx="0">
+            <a:schemeClr val="accent1"/>
+          </a:fillRef>
+          <a:effectRef idx="0">
+            <a:schemeClr val="accent1"/>
+          </a:effectRef>
+          <a:fontRef idx="minor">
+            <a:schemeClr val="tx1"/>
+          </a:fontRef>
+        </p:style>
+        <p:txBody>
+          <a:bodyPr rtlCol="0" anchor="ctr"/>
+          <a:lstStyle/>
+          <a:p>
+            <a:pPr algn="ctr"/>
+            <a:endParaRPr lang="ko-KR" altLang="en-US"/>
+          </a:p>
+        </p:txBody>
+      </p:sp>
+      <p:sp>
+        <p:nvSpPr>
+          <p:cNvPr id="9" name="사각형 설명선 8"/>
+          <p:cNvSpPr/>
+          <p:nvPr/>
+        </p:nvSpPr>
+        <p:spPr>
+          <a:xfrm>
+            <a:off x="60896" y="3016045"/>
             <a:ext cx="1656184" cy="268939"/>
           </a:xfrm>
           <a:prstGeom prst="wedgeRectCallout">
             <a:avLst>
-              <a:gd name="adj1" fmla="val 71809"/>
-              <a:gd name="adj2" fmla="val 42137"/>
+              <a:gd name="adj1" fmla="val 80244"/>
+              <a:gd name="adj2" fmla="val -26336"/>
             </a:avLst>
           </a:prstGeom>
           <a:noFill/>
@@ -4644,66 +4129,69 @@
                   <a:schemeClr val="tx1"/>
                 </a:solidFill>
               </a:rPr>
-              <a:t>화면 미세 회전</a:t>
-            </a:r>
-            <a:r>
-              <a:rPr lang="en-US" altLang="ko-KR" sz="1000" dirty="0" smtClean="0">
-                <a:solidFill>
-                  <a:schemeClr val="tx1"/>
-                </a:solidFill>
-              </a:rPr>
-              <a:t>(10</a:t>
-            </a:r>
-            <a:r>
-              <a:rPr lang="en-US" altLang="ko-KR" sz="1000" dirty="0">
-                <a:solidFill>
-                  <a:schemeClr val="tx1"/>
-                </a:solidFill>
-              </a:rPr>
-              <a:t>°</a:t>
-            </a:r>
-            <a:r>
-              <a:rPr lang="en-US" altLang="ko-KR" sz="1000" dirty="0" smtClean="0">
-                <a:solidFill>
-                  <a:schemeClr val="tx1"/>
-                </a:solidFill>
-              </a:rPr>
-              <a:t>~-10</a:t>
-            </a:r>
-            <a:r>
-              <a:rPr lang="en-US" altLang="ko-KR" sz="1000" dirty="0">
-                <a:solidFill>
-                  <a:schemeClr val="tx1"/>
-                </a:solidFill>
-              </a:rPr>
-              <a:t>°</a:t>
-            </a:r>
-            <a:r>
-              <a:rPr lang="en-US" altLang="ko-KR" sz="1000" dirty="0" smtClean="0">
-                <a:solidFill>
-                  <a:schemeClr val="tx1"/>
-                </a:solidFill>
-              </a:rPr>
-              <a:t>)</a:t>
-            </a:r>
-          </a:p>
-        </p:txBody>
-      </p:sp>
-      <p:sp>
-        <p:nvSpPr>
-          <p:cNvPr id="8" name="사각형 설명선 7"/>
+              <a:t>릴레이 모듈 연결 포트</a:t>
+            </a:r>
+            <a:endParaRPr lang="en-US" altLang="ko-KR" sz="1000" dirty="0" smtClean="0">
+              <a:solidFill>
+                <a:schemeClr val="tx1"/>
+              </a:solidFill>
+            </a:endParaRPr>
+          </a:p>
+        </p:txBody>
+      </p:sp>
+      <p:sp>
+        <p:nvSpPr>
+          <p:cNvPr id="10" name="왼쪽 중괄호 9"/>
           <p:cNvSpPr/>
           <p:nvPr/>
         </p:nvSpPr>
         <p:spPr>
           <a:xfrm>
-            <a:off x="107504" y="3952149"/>
-            <a:ext cx="1656184" cy="268939"/>
+            <a:off x="2176593" y="3198833"/>
+            <a:ext cx="45719" cy="596558"/>
+          </a:xfrm>
+          <a:prstGeom prst="leftBrace">
+            <a:avLst/>
+          </a:prstGeom>
+        </p:spPr>
+        <p:style>
+          <a:lnRef idx="1">
+            <a:schemeClr val="accent1"/>
+          </a:lnRef>
+          <a:fillRef idx="0">
+            <a:schemeClr val="accent1"/>
+          </a:fillRef>
+          <a:effectRef idx="0">
+            <a:schemeClr val="accent1"/>
+          </a:effectRef>
+          <a:fontRef idx="minor">
+            <a:schemeClr val="tx1"/>
+          </a:fontRef>
+        </p:style>
+        <p:txBody>
+          <a:bodyPr rtlCol="0" anchor="ctr"/>
+          <a:lstStyle/>
+          <a:p>
+            <a:pPr algn="ctr"/>
+            <a:endParaRPr lang="ko-KR" altLang="en-US"/>
+          </a:p>
+        </p:txBody>
+      </p:sp>
+      <p:sp>
+        <p:nvSpPr>
+          <p:cNvPr id="11" name="사각형 설명선 10"/>
+          <p:cNvSpPr/>
+          <p:nvPr/>
+        </p:nvSpPr>
+        <p:spPr>
+          <a:xfrm>
+            <a:off x="60896" y="3430007"/>
+            <a:ext cx="1990824" cy="935097"/>
           </a:xfrm>
           <a:prstGeom prst="wedgeRectCallout">
             <a:avLst>
-              <a:gd name="adj1" fmla="val 71809"/>
-              <a:gd name="adj2" fmla="val 42137"/>
+              <a:gd name="adj1" fmla="val 56656"/>
+              <a:gd name="adj2" fmla="val -45873"/>
             </a:avLst>
           </a:prstGeom>
           <a:noFill/>
@@ -4741,9 +4229,187 @@
                   <a:schemeClr val="tx1"/>
                 </a:solidFill>
               </a:rPr>
-              <a:t>화면 위치 초기화</a:t>
+              <a:t>대상물체 감지를 위한 </a:t>
+            </a:r>
+            <a:r>
+              <a:rPr lang="ko-KR" altLang="en-US" sz="1000" dirty="0" err="1" smtClean="0">
+                <a:solidFill>
+                  <a:schemeClr val="tx1"/>
+                </a:solidFill>
+              </a:rPr>
+              <a:t>파라메터</a:t>
             </a:r>
             <a:endParaRPr lang="en-US" altLang="ko-KR" sz="1000" dirty="0" smtClean="0">
+              <a:solidFill>
+                <a:schemeClr val="tx1"/>
+              </a:solidFill>
+            </a:endParaRPr>
+          </a:p>
+          <a:p>
+            <a:r>
+              <a:rPr lang="en-US" altLang="ko-KR" sz="800" dirty="0" smtClean="0">
+                <a:solidFill>
+                  <a:schemeClr val="tx1"/>
+                </a:solidFill>
+              </a:rPr>
+              <a:t>POINT_DISTANCE_MAX: </a:t>
+            </a:r>
+            <a:r>
+              <a:rPr lang="ko-KR" altLang="en-US" sz="800" dirty="0" smtClean="0">
+                <a:solidFill>
+                  <a:schemeClr val="tx1"/>
+                </a:solidFill>
+              </a:rPr>
+              <a:t>대상물체를 구성하는 점들간의 거리</a:t>
+            </a:r>
+            <a:endParaRPr lang="en-US" altLang="ko-KR" sz="800" dirty="0" smtClean="0">
+              <a:solidFill>
+                <a:schemeClr val="tx1"/>
+              </a:solidFill>
+            </a:endParaRPr>
+          </a:p>
+          <a:p>
+            <a:r>
+              <a:rPr lang="en-US" altLang="ko-KR" sz="800" dirty="0" smtClean="0">
+                <a:solidFill>
+                  <a:schemeClr val="tx1"/>
+                </a:solidFill>
+              </a:rPr>
+              <a:t>DIAMETER: </a:t>
+            </a:r>
+            <a:r>
+              <a:rPr lang="ko-KR" altLang="en-US" sz="800" dirty="0" smtClean="0">
+                <a:solidFill>
+                  <a:schemeClr val="tx1"/>
+                </a:solidFill>
+              </a:rPr>
+              <a:t>대상물체의 지름 크기</a:t>
+            </a:r>
+            <a:endParaRPr lang="en-US" altLang="ko-KR" sz="800" dirty="0" smtClean="0">
+              <a:solidFill>
+                <a:schemeClr val="tx1"/>
+              </a:solidFill>
+            </a:endParaRPr>
+          </a:p>
+          <a:p>
+            <a:r>
+              <a:rPr lang="en-US" altLang="ko-KR" sz="800" dirty="0" smtClean="0">
+                <a:solidFill>
+                  <a:schemeClr val="tx1"/>
+                </a:solidFill>
+              </a:rPr>
+              <a:t>TIME_MIN: </a:t>
+            </a:r>
+            <a:r>
+              <a:rPr lang="ko-KR" altLang="en-US" sz="800" dirty="0" smtClean="0">
+                <a:solidFill>
+                  <a:schemeClr val="tx1"/>
+                </a:solidFill>
+              </a:rPr>
+              <a:t>대상물체 지속 감지 시간</a:t>
+            </a:r>
+            <a:endParaRPr lang="en-US" altLang="ko-KR" sz="800" dirty="0" smtClean="0">
+              <a:solidFill>
+                <a:schemeClr val="tx1"/>
+              </a:solidFill>
+            </a:endParaRPr>
+          </a:p>
+          <a:p>
+            <a:r>
+              <a:rPr lang="en-US" altLang="ko-KR" sz="800" dirty="0" smtClean="0">
+                <a:solidFill>
+                  <a:schemeClr val="tx1"/>
+                </a:solidFill>
+              </a:rPr>
+              <a:t>KEEP_TIME: </a:t>
+            </a:r>
+            <a:r>
+              <a:rPr lang="ko-KR" altLang="en-US" sz="800" dirty="0" smtClean="0">
+                <a:solidFill>
+                  <a:schemeClr val="tx1"/>
+                </a:solidFill>
+              </a:rPr>
+              <a:t>대상물체 감지 후 유지시간</a:t>
+            </a:r>
+            <a:endParaRPr lang="en-US" altLang="ko-KR" sz="800" dirty="0" smtClean="0">
+              <a:solidFill>
+                <a:schemeClr val="tx1"/>
+              </a:solidFill>
+            </a:endParaRPr>
+          </a:p>
+        </p:txBody>
+      </p:sp>
+      <p:sp>
+        <p:nvSpPr>
+          <p:cNvPr id="12" name="사각형 설명선 11"/>
+          <p:cNvSpPr/>
+          <p:nvPr/>
+        </p:nvSpPr>
+        <p:spPr>
+          <a:xfrm>
+            <a:off x="1717080" y="5062826"/>
+            <a:ext cx="1990824" cy="440844"/>
+          </a:xfrm>
+          <a:prstGeom prst="wedgeRectCallout">
+            <a:avLst>
+              <a:gd name="adj1" fmla="val -22629"/>
+              <a:gd name="adj2" fmla="val -305594"/>
+            </a:avLst>
+          </a:prstGeom>
+          <a:noFill/>
+          <a:ln>
+            <a:solidFill>
+              <a:schemeClr val="bg1">
+                <a:lumMod val="75000"/>
+              </a:schemeClr>
+            </a:solidFill>
+          </a:ln>
+        </p:spPr>
+        <p:style>
+          <a:lnRef idx="2">
+            <a:schemeClr val="accent1">
+              <a:shade val="50000"/>
+            </a:schemeClr>
+          </a:lnRef>
+          <a:fillRef idx="1">
+            <a:schemeClr val="accent1"/>
+          </a:fillRef>
+          <a:effectRef idx="0">
+            <a:schemeClr val="accent1"/>
+          </a:effectRef>
+          <a:fontRef idx="minor">
+            <a:schemeClr val="lt1"/>
+          </a:fontRef>
+        </p:style>
+        <p:txBody>
+          <a:bodyPr rtlCol="0" anchor="ctr"/>
+          <a:lstStyle/>
+          <a:p>
+            <a:r>
+              <a:rPr lang="en-US" altLang="ko-KR" sz="1000" dirty="0" smtClean="0">
+                <a:solidFill>
+                  <a:schemeClr val="tx1"/>
+                </a:solidFill>
+              </a:rPr>
+              <a:t>“No Marking” </a:t>
+            </a:r>
+            <a:r>
+              <a:rPr lang="ko-KR" altLang="en-US" sz="1000" dirty="0" smtClean="0">
+                <a:solidFill>
+                  <a:schemeClr val="tx1"/>
+                </a:solidFill>
+              </a:rPr>
+              <a:t>영역 동작을 위한 대상물체</a:t>
+            </a:r>
+            <a:r>
+              <a:rPr lang="ko-KR" altLang="en-US" sz="1000" dirty="0" smtClean="0">
+                <a:solidFill>
+                  <a:schemeClr val="tx1"/>
+                </a:solidFill>
+              </a:rPr>
+              <a:t>의 크기</a:t>
+            </a:r>
+            <a:endParaRPr lang="en-US" altLang="ko-KR" sz="800" dirty="0" smtClean="0">
               <a:solidFill>
                 <a:schemeClr val="tx1"/>
               </a:solidFill>
@@ -4785,7 +4451,7 @@
       </p:grpSpPr>
       <p:pic>
         <p:nvPicPr>
-          <p:cNvPr id="4098" name="Picture 2"/>
+          <p:cNvPr id="2050" name="Picture 2"/>
           <p:cNvPicPr>
             <a:picLocks noChangeAspect="1" noChangeArrowheads="1"/>
           </p:cNvPicPr>
@@ -4800,7 +4466,7 @@
         </p:blipFill>
         <p:spPr bwMode="auto">
           <a:xfrm>
-            <a:off x="2128838" y="1852613"/>
+            <a:off x="2128838" y="2148433"/>
             <a:ext cx="4886325" cy="3152775"/>
           </a:xfrm>
           <a:prstGeom prst="rect">
@@ -4824,7 +4490,7 @@
         <p:spPr>
           <a:xfrm>
             <a:off x="1547664" y="548680"/>
-            <a:ext cx="3888432" cy="1107996"/>
+            <a:ext cx="7128792" cy="1292662"/>
           </a:xfrm>
           <a:prstGeom prst="rect">
             <a:avLst/>
@@ -4839,11 +4505,11 @@
           <a:p>
             <a:r>
               <a:rPr lang="en-US" altLang="ko-KR" dirty="0" smtClean="0"/>
-              <a:t>Regions </a:t>
+              <a:t>Zoom/Rotate/Mirror/Angle/Location </a:t>
             </a:r>
             <a:r>
               <a:rPr lang="ko-KR" altLang="en-US" dirty="0" smtClean="0"/>
-              <a:t>설정</a:t>
+              <a:t>조정</a:t>
             </a:r>
             <a:r>
               <a:rPr lang="en-US" altLang="ko-KR" dirty="0" smtClean="0"/>
@@ -4876,7 +4542,7 @@
               <a:rPr lang="en-US" altLang="ko-KR" sz="1200" dirty="0" smtClean="0">
                 <a:sym typeface="Wingdings" panose="05000000000000000000" pitchFamily="2" charset="2"/>
               </a:rPr>
-              <a:t>F3 </a:t>
+              <a:t>F2 </a:t>
             </a:r>
             <a:r>
               <a:rPr lang="ko-KR" altLang="en-US" sz="1200" dirty="0" smtClean="0">
@@ -4890,16 +4556,40 @@
           </a:p>
           <a:p>
             <a:r>
+              <a:rPr lang="en-US" altLang="ko-KR" sz="1200" dirty="0">
+                <a:sym typeface="Wingdings" panose="05000000000000000000" pitchFamily="2" charset="2"/>
+              </a:rPr>
+              <a:t> </a:t>
+            </a:r>
+            <a:r>
               <a:rPr lang="en-US" altLang="ko-KR" sz="1200" dirty="0" smtClean="0">
                 <a:sym typeface="Wingdings" panose="05000000000000000000" pitchFamily="2" charset="2"/>
               </a:rPr>
-              <a:t>  Fault/Alert </a:t>
+              <a:t> </a:t>
             </a:r>
             <a:r>
               <a:rPr lang="ko-KR" altLang="en-US" sz="1200" dirty="0" smtClean="0">
                 <a:sym typeface="Wingdings" panose="05000000000000000000" pitchFamily="2" charset="2"/>
               </a:rPr>
-              <a:t>등의 영역들에 대한 위치 설정</a:t>
+              <a:t>마우스</a:t>
+            </a:r>
+            <a:r>
+              <a:rPr lang="en-US" altLang="ko-KR" sz="1200" dirty="0" smtClean="0">
+                <a:sym typeface="Wingdings" panose="05000000000000000000" pitchFamily="2" charset="2"/>
+              </a:rPr>
+              <a:t> </a:t>
+            </a:r>
+            <a:r>
+              <a:rPr lang="ko-KR" altLang="en-US" sz="1200" dirty="0" err="1" smtClean="0">
+                <a:sym typeface="Wingdings" panose="05000000000000000000" pitchFamily="2" charset="2"/>
+              </a:rPr>
+              <a:t>휠을</a:t>
+            </a:r>
+            <a:r>
+              <a:rPr lang="ko-KR" altLang="en-US" sz="1200" dirty="0" smtClean="0">
+                <a:sym typeface="Wingdings" panose="05000000000000000000" pitchFamily="2" charset="2"/>
+              </a:rPr>
+              <a:t> 이용하여 전체 화면 확대 축소 가능</a:t>
             </a:r>
             <a:endParaRPr lang="en-US" altLang="ko-KR" sz="1200" dirty="0" smtClean="0">
               <a:sym typeface="Wingdings" panose="05000000000000000000" pitchFamily="2" charset="2"/>
@@ -4922,7 +4612,25 @@
               <a:rPr lang="ko-KR" altLang="en-US" sz="1200" dirty="0" smtClean="0">
                 <a:sym typeface="Wingdings" panose="05000000000000000000" pitchFamily="2" charset="2"/>
               </a:rPr>
-              <a:t>각 영역에 해당하는 릴레이의 인덱스 설정</a:t>
+              <a:t>마우스 왼쪽 버튼 </a:t>
+            </a:r>
+            <a:r>
+              <a:rPr lang="ko-KR" altLang="en-US" sz="1200" dirty="0" smtClean="0">
+                <a:sym typeface="Wingdings" panose="05000000000000000000" pitchFamily="2" charset="2"/>
+              </a:rPr>
+              <a:t>드래그를 </a:t>
+            </a:r>
+            <a:r>
+              <a:rPr lang="ko-KR" altLang="en-US" sz="1200" dirty="0" smtClean="0">
+                <a:sym typeface="Wingdings" panose="05000000000000000000" pitchFamily="2" charset="2"/>
+              </a:rPr>
+              <a:t>이용하여 화면 위치 이동 </a:t>
+            </a:r>
+            <a:r>
+              <a:rPr lang="ko-KR" altLang="en-US" sz="1200" dirty="0" smtClean="0">
+                <a:sym typeface="Wingdings" panose="05000000000000000000" pitchFamily="2" charset="2"/>
+              </a:rPr>
+              <a:t>가능</a:t>
             </a:r>
             <a:endParaRPr lang="en-US" altLang="ko-KR" sz="1200" dirty="0" smtClean="0">
               <a:sym typeface="Wingdings" panose="05000000000000000000" pitchFamily="2" charset="2"/>
@@ -4945,9 +4653,467 @@
               <a:rPr lang="ko-KR" altLang="en-US" sz="1200" dirty="0" smtClean="0">
                 <a:sym typeface="Wingdings" panose="05000000000000000000" pitchFamily="2" charset="2"/>
               </a:rPr>
-              <a:t>각 릴레이의 이름 설정</a:t>
-            </a:r>
-            <a:endParaRPr lang="ko-KR" altLang="en-US" sz="1200" dirty="0"/>
+              <a:t>화면 미세회전 기능은 화면에 표시되는 점들을 회전하는 기능이므로 </a:t>
+            </a:r>
+            <a:r>
+              <a:rPr lang="en-US" altLang="ko-KR" sz="1200" dirty="0" smtClean="0">
+                <a:sym typeface="Wingdings" panose="05000000000000000000" pitchFamily="2" charset="2"/>
+              </a:rPr>
+              <a:t>2D Laser Scanner</a:t>
+            </a:r>
+            <a:r>
+              <a:rPr lang="ko-KR" altLang="en-US" sz="1200" dirty="0" smtClean="0">
+                <a:sym typeface="Wingdings" panose="05000000000000000000" pitchFamily="2" charset="2"/>
+              </a:rPr>
+              <a:t>의 물리적인 각도 조정을 우선적으로 하여야 함</a:t>
+            </a:r>
+            <a:endParaRPr lang="en-US" altLang="ko-KR" sz="1200" dirty="0">
+              <a:sym typeface="Wingdings" panose="05000000000000000000" pitchFamily="2" charset="2"/>
+            </a:endParaRPr>
+          </a:p>
+        </p:txBody>
+      </p:sp>
+      <p:sp>
+        <p:nvSpPr>
+          <p:cNvPr id="4" name="사각형 설명선 3"/>
+          <p:cNvSpPr/>
+          <p:nvPr/>
+        </p:nvSpPr>
+        <p:spPr>
+          <a:xfrm>
+            <a:off x="103651" y="2719335"/>
+            <a:ext cx="1656184" cy="268939"/>
+          </a:xfrm>
+          <a:prstGeom prst="wedgeRectCallout">
+            <a:avLst>
+              <a:gd name="adj1" fmla="val 74237"/>
+              <a:gd name="adj2" fmla="val 53156"/>
+            </a:avLst>
+          </a:prstGeom>
+          <a:noFill/>
+          <a:ln>
+            <a:solidFill>
+              <a:schemeClr val="bg1">
+                <a:lumMod val="75000"/>
+              </a:schemeClr>
+            </a:solidFill>
+          </a:ln>
+        </p:spPr>
+        <p:style>
+          <a:lnRef idx="2">
+            <a:schemeClr val="accent1">
+              <a:shade val="50000"/>
+            </a:schemeClr>
+          </a:lnRef>
+          <a:fillRef idx="1">
+            <a:schemeClr val="accent1"/>
+          </a:fillRef>
+          <a:effectRef idx="0">
+            <a:schemeClr val="accent1"/>
+          </a:effectRef>
+          <a:fontRef idx="minor">
+            <a:schemeClr val="lt1"/>
+          </a:fontRef>
+        </p:style>
+        <p:txBody>
+          <a:bodyPr rtlCol="0" anchor="ctr"/>
+          <a:lstStyle/>
+          <a:p>
+            <a:r>
+              <a:rPr lang="ko-KR" altLang="en-US" sz="1000" dirty="0" smtClean="0">
+                <a:solidFill>
+                  <a:schemeClr val="tx1"/>
+                </a:solidFill>
+              </a:rPr>
+              <a:t>화면 </a:t>
+            </a:r>
+            <a:r>
+              <a:rPr lang="ko-KR" altLang="en-US" sz="1000" dirty="0" smtClean="0">
+                <a:solidFill>
+                  <a:schemeClr val="tx1"/>
+                </a:solidFill>
+              </a:rPr>
+              <a:t>확대</a:t>
+            </a:r>
+            <a:r>
+              <a:rPr lang="en-US" altLang="ko-KR" sz="1000" dirty="0" smtClean="0">
+                <a:solidFill>
+                  <a:schemeClr val="tx1"/>
+                </a:solidFill>
+              </a:rPr>
+              <a:t>/</a:t>
+            </a:r>
+            <a:r>
+              <a:rPr lang="ko-KR" altLang="en-US" sz="1000" dirty="0" smtClean="0">
+                <a:solidFill>
+                  <a:schemeClr val="tx1"/>
+                </a:solidFill>
+              </a:rPr>
+              <a:t>축소</a:t>
+            </a:r>
+            <a:endParaRPr lang="en-US" altLang="ko-KR" sz="1000" dirty="0" smtClean="0">
+              <a:solidFill>
+                <a:schemeClr val="tx1"/>
+              </a:solidFill>
+            </a:endParaRPr>
+          </a:p>
+        </p:txBody>
+      </p:sp>
+      <p:sp>
+        <p:nvSpPr>
+          <p:cNvPr id="5" name="사각형 설명선 4"/>
+          <p:cNvSpPr/>
+          <p:nvPr/>
+        </p:nvSpPr>
+        <p:spPr>
+          <a:xfrm>
+            <a:off x="107504" y="3220764"/>
+            <a:ext cx="1656184" cy="268939"/>
+          </a:xfrm>
+          <a:prstGeom prst="wedgeRectCallout">
+            <a:avLst>
+              <a:gd name="adj1" fmla="val 73982"/>
+              <a:gd name="adj2" fmla="val 35841"/>
+            </a:avLst>
+          </a:prstGeom>
+          <a:noFill/>
+          <a:ln>
+            <a:solidFill>
+              <a:schemeClr val="bg1">
+                <a:lumMod val="75000"/>
+              </a:schemeClr>
+            </a:solidFill>
+          </a:ln>
+        </p:spPr>
+        <p:style>
+          <a:lnRef idx="2">
+            <a:schemeClr val="accent1">
+              <a:shade val="50000"/>
+            </a:schemeClr>
+          </a:lnRef>
+          <a:fillRef idx="1">
+            <a:schemeClr val="accent1"/>
+          </a:fillRef>
+          <a:effectRef idx="0">
+            <a:schemeClr val="accent1"/>
+          </a:effectRef>
+          <a:fontRef idx="minor">
+            <a:schemeClr val="lt1"/>
+          </a:fontRef>
+        </p:style>
+        <p:txBody>
+          <a:bodyPr rtlCol="0" anchor="ctr"/>
+          <a:lstStyle/>
+          <a:p>
+            <a:r>
+              <a:rPr lang="ko-KR" altLang="en-US" sz="1000" dirty="0" smtClean="0">
+                <a:solidFill>
+                  <a:schemeClr val="tx1"/>
+                </a:solidFill>
+              </a:rPr>
+              <a:t>화면 회전</a:t>
+            </a:r>
+            <a:r>
+              <a:rPr lang="en-US" altLang="ko-KR" sz="1000" dirty="0" smtClean="0">
+                <a:solidFill>
+                  <a:schemeClr val="tx1"/>
+                </a:solidFill>
+              </a:rPr>
+              <a:t>(90°)</a:t>
+            </a:r>
+          </a:p>
+        </p:txBody>
+      </p:sp>
+      <p:sp>
+        <p:nvSpPr>
+          <p:cNvPr id="6" name="사각형 설명선 5"/>
+          <p:cNvSpPr/>
+          <p:nvPr/>
+        </p:nvSpPr>
+        <p:spPr>
+          <a:xfrm>
+            <a:off x="107504" y="3527889"/>
+            <a:ext cx="1656184" cy="268939"/>
+          </a:xfrm>
+          <a:prstGeom prst="wedgeRectCallout">
+            <a:avLst>
+              <a:gd name="adj1" fmla="val 73982"/>
+              <a:gd name="adj2" fmla="val 31118"/>
+            </a:avLst>
+          </a:prstGeom>
+          <a:noFill/>
+          <a:ln>
+            <a:solidFill>
+              <a:schemeClr val="bg1">
+                <a:lumMod val="75000"/>
+              </a:schemeClr>
+            </a:solidFill>
+          </a:ln>
+        </p:spPr>
+        <p:style>
+          <a:lnRef idx="2">
+            <a:schemeClr val="accent1">
+              <a:shade val="50000"/>
+            </a:schemeClr>
+          </a:lnRef>
+          <a:fillRef idx="1">
+            <a:schemeClr val="accent1"/>
+          </a:fillRef>
+          <a:effectRef idx="0">
+            <a:schemeClr val="accent1"/>
+          </a:effectRef>
+          <a:fontRef idx="minor">
+            <a:schemeClr val="lt1"/>
+          </a:fontRef>
+        </p:style>
+        <p:txBody>
+          <a:bodyPr rtlCol="0" anchor="ctr"/>
+          <a:lstStyle/>
+          <a:p>
+            <a:r>
+              <a:rPr lang="ko-KR" altLang="en-US" sz="1000" dirty="0" smtClean="0">
+                <a:solidFill>
+                  <a:schemeClr val="tx1"/>
+                </a:solidFill>
+              </a:rPr>
+              <a:t>화면 상하 반전</a:t>
+            </a:r>
+            <a:endParaRPr lang="en-US" altLang="ko-KR" sz="1000" dirty="0" smtClean="0">
+              <a:solidFill>
+                <a:schemeClr val="tx1"/>
+              </a:solidFill>
+            </a:endParaRPr>
+          </a:p>
+        </p:txBody>
+      </p:sp>
+      <p:sp>
+        <p:nvSpPr>
+          <p:cNvPr id="7" name="사각형 설명선 6"/>
+          <p:cNvSpPr/>
+          <p:nvPr/>
+        </p:nvSpPr>
+        <p:spPr>
+          <a:xfrm>
+            <a:off x="107504" y="3887929"/>
+            <a:ext cx="1656184" cy="412955"/>
+          </a:xfrm>
+          <a:prstGeom prst="wedgeRectCallout">
+            <a:avLst>
+              <a:gd name="adj1" fmla="val 74237"/>
+              <a:gd name="adj2" fmla="val -8827"/>
+            </a:avLst>
+          </a:prstGeom>
+          <a:noFill/>
+          <a:ln>
+            <a:solidFill>
+              <a:schemeClr val="bg1">
+                <a:lumMod val="75000"/>
+              </a:schemeClr>
+            </a:solidFill>
+          </a:ln>
+        </p:spPr>
+        <p:style>
+          <a:lnRef idx="2">
+            <a:schemeClr val="accent1">
+              <a:shade val="50000"/>
+            </a:schemeClr>
+          </a:lnRef>
+          <a:fillRef idx="1">
+            <a:schemeClr val="accent1"/>
+          </a:fillRef>
+          <a:effectRef idx="0">
+            <a:schemeClr val="accent1"/>
+          </a:effectRef>
+          <a:fontRef idx="minor">
+            <a:schemeClr val="lt1"/>
+          </a:fontRef>
+        </p:style>
+        <p:txBody>
+          <a:bodyPr rtlCol="0" anchor="ctr"/>
+          <a:lstStyle/>
+          <a:p>
+            <a:r>
+              <a:rPr lang="ko-KR" altLang="en-US" sz="1000" dirty="0" smtClean="0">
+                <a:solidFill>
+                  <a:schemeClr val="tx1"/>
+                </a:solidFill>
+              </a:rPr>
+              <a:t>화면 </a:t>
+            </a:r>
+            <a:r>
+              <a:rPr lang="ko-KR" altLang="en-US" sz="1000" dirty="0" smtClean="0">
+                <a:solidFill>
+                  <a:schemeClr val="tx1"/>
+                </a:solidFill>
+              </a:rPr>
+              <a:t>미세회전</a:t>
+            </a:r>
+            <a:r>
+              <a:rPr lang="en-US" altLang="ko-KR" sz="1000" dirty="0" smtClean="0">
+                <a:solidFill>
+                  <a:schemeClr val="tx1"/>
+                </a:solidFill>
+              </a:rPr>
+              <a:t>:</a:t>
+            </a:r>
+            <a:r>
+              <a:rPr lang="ko-KR" altLang="en-US" sz="1000" dirty="0" smtClean="0">
+                <a:solidFill>
+                  <a:schemeClr val="tx1"/>
+                </a:solidFill>
+              </a:rPr>
+              <a:t> </a:t>
+            </a:r>
+            <a:r>
+              <a:rPr lang="en-US" altLang="ko-KR" sz="1000" dirty="0">
+                <a:solidFill>
+                  <a:schemeClr val="tx1"/>
+                </a:solidFill>
+              </a:rPr>
+              <a:t>0.1°</a:t>
+            </a:r>
+            <a:r>
+              <a:rPr lang="ko-KR" altLang="en-US" sz="1000" dirty="0" smtClean="0">
+                <a:solidFill>
+                  <a:schemeClr val="tx1"/>
+                </a:solidFill>
+              </a:rPr>
+              <a:t>단위</a:t>
+            </a:r>
+            <a:r>
+              <a:rPr lang="en-US" altLang="ko-KR" sz="1000" dirty="0" smtClean="0">
+                <a:solidFill>
+                  <a:schemeClr val="tx1"/>
+                </a:solidFill>
+              </a:rPr>
+              <a:t>(</a:t>
+            </a:r>
+            <a:r>
+              <a:rPr lang="ko-KR" altLang="en-US" sz="1000" dirty="0" smtClean="0">
+                <a:solidFill>
+                  <a:schemeClr val="tx1"/>
+                </a:solidFill>
+              </a:rPr>
+              <a:t>최대 </a:t>
+            </a:r>
+            <a:r>
+              <a:rPr lang="en-US" altLang="ko-KR" sz="1000" dirty="0" smtClean="0">
+                <a:solidFill>
+                  <a:schemeClr val="tx1"/>
+                </a:solidFill>
+              </a:rPr>
+              <a:t>10°~ </a:t>
+            </a:r>
+            <a:r>
+              <a:rPr lang="ko-KR" altLang="en-US" sz="1000" dirty="0" smtClean="0">
+                <a:solidFill>
+                  <a:schemeClr val="tx1"/>
+                </a:solidFill>
+              </a:rPr>
+              <a:t>최소 </a:t>
+            </a:r>
+            <a:r>
+              <a:rPr lang="en-US" altLang="ko-KR" sz="1000" dirty="0" smtClean="0">
+                <a:solidFill>
+                  <a:schemeClr val="tx1"/>
+                </a:solidFill>
+              </a:rPr>
+              <a:t>-</a:t>
+            </a:r>
+            <a:r>
+              <a:rPr lang="en-US" altLang="ko-KR" sz="1000" dirty="0" smtClean="0">
+                <a:solidFill>
+                  <a:schemeClr val="tx1"/>
+                </a:solidFill>
+              </a:rPr>
+              <a:t>10</a:t>
+            </a:r>
+            <a:r>
+              <a:rPr lang="en-US" altLang="ko-KR" sz="1000" dirty="0">
+                <a:solidFill>
+                  <a:schemeClr val="tx1"/>
+                </a:solidFill>
+              </a:rPr>
+              <a:t>°</a:t>
+            </a:r>
+            <a:r>
+              <a:rPr lang="en-US" altLang="ko-KR" sz="1000" dirty="0" smtClean="0">
+                <a:solidFill>
+                  <a:schemeClr val="tx1"/>
+                </a:solidFill>
+              </a:rPr>
+              <a:t>)</a:t>
+            </a:r>
+          </a:p>
+        </p:txBody>
+      </p:sp>
+      <p:sp>
+        <p:nvSpPr>
+          <p:cNvPr id="8" name="사각형 설명선 7"/>
+          <p:cNvSpPr/>
+          <p:nvPr/>
+        </p:nvSpPr>
+        <p:spPr>
+          <a:xfrm>
+            <a:off x="107504" y="4372892"/>
+            <a:ext cx="1656184" cy="412955"/>
+          </a:xfrm>
+          <a:prstGeom prst="wedgeRectCallout">
+            <a:avLst>
+              <a:gd name="adj1" fmla="val 73945"/>
+              <a:gd name="adj2" fmla="val -15856"/>
+            </a:avLst>
+          </a:prstGeom>
+          <a:noFill/>
+          <a:ln>
+            <a:solidFill>
+              <a:schemeClr val="bg1">
+                <a:lumMod val="75000"/>
+              </a:schemeClr>
+            </a:solidFill>
+          </a:ln>
+        </p:spPr>
+        <p:style>
+          <a:lnRef idx="2">
+            <a:schemeClr val="accent1">
+              <a:shade val="50000"/>
+            </a:schemeClr>
+          </a:lnRef>
+          <a:fillRef idx="1">
+            <a:schemeClr val="accent1"/>
+          </a:fillRef>
+          <a:effectRef idx="0">
+            <a:schemeClr val="accent1"/>
+          </a:effectRef>
+          <a:fontRef idx="minor">
+            <a:schemeClr val="lt1"/>
+          </a:fontRef>
+        </p:style>
+        <p:txBody>
+          <a:bodyPr rtlCol="0" anchor="ctr"/>
+          <a:lstStyle/>
+          <a:p>
+            <a:r>
+              <a:rPr lang="ko-KR" altLang="en-US" sz="1000" dirty="0" smtClean="0">
+                <a:solidFill>
+                  <a:schemeClr val="tx1"/>
+                </a:solidFill>
+              </a:rPr>
+              <a:t>화면 위치 </a:t>
+            </a:r>
+            <a:r>
+              <a:rPr lang="ko-KR" altLang="en-US" sz="1000" dirty="0" smtClean="0">
+                <a:solidFill>
+                  <a:schemeClr val="tx1"/>
+                </a:solidFill>
+              </a:rPr>
+              <a:t>및 미세회전 초기화</a:t>
+            </a:r>
+            <a:endParaRPr lang="en-US" altLang="ko-KR" sz="1000" dirty="0" smtClean="0">
+              <a:solidFill>
+                <a:schemeClr val="tx1"/>
+              </a:solidFill>
+            </a:endParaRPr>
           </a:p>
         </p:txBody>
       </p:sp>
@@ -4967,6 +5133,372 @@
 </file>
 
 <file path=ppt/slides/slide5.xml><?xml version="1.0" encoding="utf-8"?>
+<p:sld xmlns:a="http://schemas.openxmlformats.org/drawingml/2006/main" xmlns:r="http://schemas.openxmlformats.org/officeDocument/2006/relationships" xmlns:p="http://schemas.openxmlformats.org/presentationml/2006/main">
+  <p:cSld>
+    <p:spTree>
+      <p:nvGrpSpPr>
+        <p:cNvPr id="1" name=""/>
+        <p:cNvGrpSpPr/>
+        <p:nvPr/>
+      </p:nvGrpSpPr>
+      <p:grpSpPr>
+        <a:xfrm>
+          <a:off x="0" y="0"/>
+          <a:ext cx="0" cy="0"/>
+          <a:chOff x="0" y="0"/>
+          <a:chExt cx="0" cy="0"/>
+        </a:xfrm>
+      </p:grpSpPr>
+      <p:pic>
+        <p:nvPicPr>
+          <p:cNvPr id="4098" name="Picture 2"/>
+          <p:cNvPicPr>
+            <a:picLocks noChangeAspect="1" noChangeArrowheads="1"/>
+          </p:cNvPicPr>
+          <p:nvPr/>
+        </p:nvPicPr>
+        <p:blipFill>
+          <a:blip r:embed="rId2" cstate="print"/>
+          <a:srcRect/>
+          <a:stretch>
+            <a:fillRect/>
+          </a:stretch>
+        </p:blipFill>
+        <p:spPr bwMode="auto">
+          <a:xfrm>
+            <a:off x="2123728" y="2508473"/>
+            <a:ext cx="4886325" cy="3152775"/>
+          </a:xfrm>
+          <a:prstGeom prst="rect">
+            <a:avLst/>
+          </a:prstGeom>
+          <a:noFill/>
+          <a:ln w="9525">
+            <a:noFill/>
+            <a:miter lim="800000"/>
+            <a:headEnd/>
+            <a:tailEnd/>
+          </a:ln>
+        </p:spPr>
+      </p:pic>
+      <p:sp>
+        <p:nvSpPr>
+          <p:cNvPr id="3" name="TextBox 2"/>
+          <p:cNvSpPr txBox="1"/>
+          <p:nvPr/>
+        </p:nvSpPr>
+        <p:spPr>
+          <a:xfrm>
+            <a:off x="1547664" y="548680"/>
+            <a:ext cx="7056784" cy="1846659"/>
+          </a:xfrm>
+          <a:prstGeom prst="rect">
+            <a:avLst/>
+          </a:prstGeom>
+          <a:noFill/>
+        </p:spPr>
+        <p:txBody>
+          <a:bodyPr wrap="square" rtlCol="0">
+            <a:spAutoFit/>
+          </a:bodyPr>
+          <a:lstStyle/>
+          <a:p>
+            <a:r>
+              <a:rPr lang="en-US" altLang="ko-KR" dirty="0" smtClean="0"/>
+              <a:t>Regions </a:t>
+            </a:r>
+            <a:r>
+              <a:rPr lang="ko-KR" altLang="en-US" dirty="0" smtClean="0"/>
+              <a:t>설정</a:t>
+            </a:r>
+            <a:r>
+              <a:rPr lang="en-US" altLang="ko-KR" dirty="0" smtClean="0"/>
+              <a:t> </a:t>
+            </a:r>
+            <a:r>
+              <a:rPr lang="ko-KR" altLang="en-US" dirty="0" smtClean="0"/>
+              <a:t>화면</a:t>
+            </a:r>
+            <a:endParaRPr lang="en-US" altLang="ko-KR" dirty="0" smtClean="0"/>
+          </a:p>
+          <a:p>
+            <a:r>
+              <a:rPr lang="en-US" altLang="ko-KR" sz="1200" dirty="0"/>
+              <a:t> </a:t>
+            </a:r>
+            <a:r>
+              <a:rPr lang="en-US" altLang="ko-KR" sz="1200" dirty="0" smtClean="0">
+                <a:sym typeface="Wingdings" panose="05000000000000000000" pitchFamily="2" charset="2"/>
+              </a:rPr>
+              <a:t> </a:t>
+            </a:r>
+            <a:r>
+              <a:rPr lang="ko-KR" altLang="en-US" sz="1200" dirty="0" smtClean="0">
+                <a:sym typeface="Wingdings" panose="05000000000000000000" pitchFamily="2" charset="2"/>
+              </a:rPr>
+              <a:t>키보드 </a:t>
+            </a:r>
+            <a:r>
+              <a:rPr lang="en-US" altLang="ko-KR" sz="1200" dirty="0" smtClean="0">
+                <a:sym typeface="Wingdings" panose="05000000000000000000" pitchFamily="2" charset="2"/>
+              </a:rPr>
+              <a:t>F3 </a:t>
+            </a:r>
+            <a:r>
+              <a:rPr lang="ko-KR" altLang="en-US" sz="1200" dirty="0" smtClean="0">
+                <a:sym typeface="Wingdings" panose="05000000000000000000" pitchFamily="2" charset="2"/>
+              </a:rPr>
+              <a:t>키로 진입</a:t>
+            </a:r>
+            <a:endParaRPr lang="en-US" altLang="ko-KR" sz="1200" dirty="0" smtClean="0">
+              <a:sym typeface="Wingdings" panose="05000000000000000000" pitchFamily="2" charset="2"/>
+            </a:endParaRPr>
+          </a:p>
+          <a:p>
+            <a:r>
+              <a:rPr lang="en-US" altLang="ko-KR" sz="1200" dirty="0" smtClean="0">
+                <a:sym typeface="Wingdings" panose="05000000000000000000" pitchFamily="2" charset="2"/>
+              </a:rPr>
+              <a:t>  Fault/Alert </a:t>
+            </a:r>
+            <a:r>
+              <a:rPr lang="ko-KR" altLang="en-US" sz="1200" dirty="0" smtClean="0">
+                <a:sym typeface="Wingdings" panose="05000000000000000000" pitchFamily="2" charset="2"/>
+              </a:rPr>
+              <a:t>등의 영역들에 대한 위치 설정</a:t>
+            </a:r>
+            <a:endParaRPr lang="en-US" altLang="ko-KR" sz="1200" dirty="0" smtClean="0">
+              <a:sym typeface="Wingdings" panose="05000000000000000000" pitchFamily="2" charset="2"/>
+            </a:endParaRPr>
+          </a:p>
+          <a:p>
+            <a:r>
+              <a:rPr lang="en-US" altLang="ko-KR" sz="1200" dirty="0">
+                <a:sym typeface="Wingdings" panose="05000000000000000000" pitchFamily="2" charset="2"/>
+              </a:rPr>
+              <a:t> </a:t>
+            </a:r>
+            <a:r>
+              <a:rPr lang="en-US" altLang="ko-KR" sz="1200" dirty="0" smtClean="0">
+                <a:sym typeface="Wingdings" panose="05000000000000000000" pitchFamily="2" charset="2"/>
+              </a:rPr>
+              <a:t> </a:t>
+            </a:r>
+            <a:r>
+              <a:rPr lang="ko-KR" altLang="en-US" sz="1200" dirty="0" smtClean="0">
+                <a:sym typeface="Wingdings" panose="05000000000000000000" pitchFamily="2" charset="2"/>
+              </a:rPr>
+              <a:t>각 영역에 해당하는 릴레이의 인덱스 설정</a:t>
+            </a:r>
+            <a:endParaRPr lang="en-US" altLang="ko-KR" sz="1200" dirty="0" smtClean="0">
+              <a:sym typeface="Wingdings" panose="05000000000000000000" pitchFamily="2" charset="2"/>
+            </a:endParaRPr>
+          </a:p>
+          <a:p>
+            <a:r>
+              <a:rPr lang="en-US" altLang="ko-KR" sz="1200" dirty="0">
+                <a:sym typeface="Wingdings" panose="05000000000000000000" pitchFamily="2" charset="2"/>
+              </a:rPr>
+              <a:t> </a:t>
+            </a:r>
+            <a:r>
+              <a:rPr lang="en-US" altLang="ko-KR" sz="1200" dirty="0" smtClean="0">
+                <a:sym typeface="Wingdings" panose="05000000000000000000" pitchFamily="2" charset="2"/>
+              </a:rPr>
+              <a:t> </a:t>
+            </a:r>
+            <a:r>
+              <a:rPr lang="ko-KR" altLang="en-US" sz="1200" dirty="0" smtClean="0">
+                <a:sym typeface="Wingdings" panose="05000000000000000000" pitchFamily="2" charset="2"/>
+              </a:rPr>
+              <a:t>각 릴레이의 이름 </a:t>
+            </a:r>
+            <a:r>
+              <a:rPr lang="ko-KR" altLang="en-US" sz="1200" dirty="0" smtClean="0">
+                <a:sym typeface="Wingdings" panose="05000000000000000000" pitchFamily="2" charset="2"/>
+              </a:rPr>
+              <a:t>설정</a:t>
+            </a:r>
+            <a:endParaRPr lang="en-US" altLang="ko-KR" sz="1200" dirty="0" smtClean="0">
+              <a:sym typeface="Wingdings" panose="05000000000000000000" pitchFamily="2" charset="2"/>
+            </a:endParaRPr>
+          </a:p>
+          <a:p>
+            <a:r>
+              <a:rPr lang="en-US" altLang="ko-KR" sz="1200" dirty="0">
+                <a:sym typeface="Wingdings" panose="05000000000000000000" pitchFamily="2" charset="2"/>
+              </a:rPr>
+              <a:t> </a:t>
+            </a:r>
+            <a:r>
+              <a:rPr lang="en-US" altLang="ko-KR" sz="1200" dirty="0" smtClean="0">
+                <a:sym typeface="Wingdings" panose="05000000000000000000" pitchFamily="2" charset="2"/>
+              </a:rPr>
+              <a:t> </a:t>
+            </a:r>
+            <a:r>
+              <a:rPr lang="ko-KR" altLang="en-US" sz="1200" dirty="0" smtClean="0">
+                <a:sym typeface="Wingdings" panose="05000000000000000000" pitchFamily="2" charset="2"/>
+              </a:rPr>
+              <a:t>영역 이름 중 </a:t>
+            </a:r>
+            <a:r>
+              <a:rPr lang="en-US" altLang="ko-KR" sz="1200" dirty="0" smtClean="0">
+                <a:sym typeface="Wingdings" panose="05000000000000000000" pitchFamily="2" charset="2"/>
+              </a:rPr>
+              <a:t>“No Marking”</a:t>
+            </a:r>
+            <a:r>
+              <a:rPr lang="ko-KR" altLang="en-US" sz="1200" dirty="0" smtClean="0">
+                <a:sym typeface="Wingdings" panose="05000000000000000000" pitchFamily="2" charset="2"/>
+              </a:rPr>
+              <a:t>은 </a:t>
+            </a:r>
+            <a:r>
+              <a:rPr lang="en-US" altLang="ko-KR" sz="1200" dirty="0" smtClean="0">
+                <a:sym typeface="Wingdings" panose="05000000000000000000" pitchFamily="2" charset="2"/>
+              </a:rPr>
+              <a:t>“No mark big”</a:t>
+            </a:r>
+            <a:r>
+              <a:rPr lang="ko-KR" altLang="en-US" sz="1200" dirty="0" smtClean="0">
+                <a:sym typeface="Wingdings" panose="05000000000000000000" pitchFamily="2" charset="2"/>
+              </a:rPr>
+              <a:t>이 </a:t>
+            </a:r>
+            <a:r>
+              <a:rPr lang="en-US" altLang="ko-KR" sz="1200" dirty="0" smtClean="0">
+                <a:sym typeface="Wingdings" panose="05000000000000000000" pitchFamily="2" charset="2"/>
+              </a:rPr>
+              <a:t>“true”</a:t>
+            </a:r>
+            <a:r>
+              <a:rPr lang="ko-KR" altLang="en-US" sz="1200" dirty="0" smtClean="0">
+                <a:sym typeface="Wingdings" panose="05000000000000000000" pitchFamily="2" charset="2"/>
+              </a:rPr>
+              <a:t>로</a:t>
+            </a:r>
+            <a:r>
+              <a:rPr lang="en-US" altLang="ko-KR" sz="1200" dirty="0" smtClean="0">
+                <a:sym typeface="Wingdings" panose="05000000000000000000" pitchFamily="2" charset="2"/>
+              </a:rPr>
+              <a:t> </a:t>
+            </a:r>
+            <a:r>
+              <a:rPr lang="ko-KR" altLang="en-US" sz="1200" dirty="0" smtClean="0">
+                <a:sym typeface="Wingdings" panose="05000000000000000000" pitchFamily="2" charset="2"/>
+              </a:rPr>
+              <a:t>되어 있는 상태에서 이용되며 해당 영역에 </a:t>
+            </a:r>
+            <a:r>
+              <a:rPr lang="ko-KR" altLang="en-US" sz="1200" dirty="0">
+                <a:sym typeface="Wingdings" panose="05000000000000000000" pitchFamily="2" charset="2"/>
+              </a:rPr>
+              <a:t>일정 크기 </a:t>
+            </a:r>
+            <a:r>
+              <a:rPr lang="ko-KR" altLang="en-US" sz="1200" dirty="0" smtClean="0">
+                <a:sym typeface="Wingdings" panose="05000000000000000000" pitchFamily="2" charset="2"/>
+              </a:rPr>
+              <a:t>이상의 대상물체가 감지되면 화면의 감지된 대상물체에 원형 표</a:t>
+            </a:r>
+            <a:r>
+              <a:rPr lang="ko-KR" altLang="en-US" sz="1200" dirty="0" smtClean="0">
+                <a:sym typeface="Wingdings" panose="05000000000000000000" pitchFamily="2" charset="2"/>
+              </a:rPr>
+              <a:t>시</a:t>
+            </a:r>
+            <a:r>
+              <a:rPr lang="ko-KR" altLang="en-US" sz="1200" dirty="0" smtClean="0">
+                <a:sym typeface="Wingdings" panose="05000000000000000000" pitchFamily="2" charset="2"/>
+              </a:rPr>
+              <a:t>를 하지 않음</a:t>
+            </a:r>
+            <a:endParaRPr lang="en-US" altLang="ko-KR" sz="1200" dirty="0" smtClean="0">
+              <a:sym typeface="Wingdings" panose="05000000000000000000" pitchFamily="2" charset="2"/>
+            </a:endParaRPr>
+          </a:p>
+          <a:p>
+            <a:r>
+              <a:rPr lang="en-US" altLang="ko-KR" sz="1200" dirty="0">
+                <a:sym typeface="Wingdings" panose="05000000000000000000" pitchFamily="2" charset="2"/>
+              </a:rPr>
+              <a:t> </a:t>
+            </a:r>
+            <a:r>
+              <a:rPr lang="en-US" altLang="ko-KR" sz="1200" dirty="0" smtClean="0">
+                <a:sym typeface="Wingdings" panose="05000000000000000000" pitchFamily="2" charset="2"/>
+              </a:rPr>
+              <a:t> </a:t>
+            </a:r>
+            <a:r>
+              <a:rPr lang="ko-KR" altLang="en-US" sz="1200" dirty="0" smtClean="0">
+                <a:sym typeface="Wingdings" panose="05000000000000000000" pitchFamily="2" charset="2"/>
+              </a:rPr>
+              <a:t>이 대상물체의 크기는 </a:t>
+            </a:r>
+            <a:r>
+              <a:rPr lang="en-US" altLang="ko-KR" sz="1200" dirty="0" smtClean="0">
+                <a:sym typeface="Wingdings" panose="05000000000000000000" pitchFamily="2" charset="2"/>
+              </a:rPr>
+              <a:t>System </a:t>
+            </a:r>
+            <a:r>
+              <a:rPr lang="ko-KR" altLang="en-US" sz="1200" dirty="0" smtClean="0">
+                <a:sym typeface="Wingdings" panose="05000000000000000000" pitchFamily="2" charset="2"/>
+              </a:rPr>
+              <a:t>설정 화면의 </a:t>
+            </a:r>
+            <a:r>
+              <a:rPr lang="en-US" altLang="ko-KR" sz="1200" dirty="0" smtClean="0">
+                <a:sym typeface="Wingdings" panose="05000000000000000000" pitchFamily="2" charset="2"/>
+              </a:rPr>
+              <a:t>ROI_OBJECT_NO_MARK_BIG_DIAMETER_MIN </a:t>
+            </a:r>
+            <a:r>
+              <a:rPr lang="ko-KR" altLang="en-US" sz="1200" dirty="0" smtClean="0">
+                <a:sym typeface="Wingdings" panose="05000000000000000000" pitchFamily="2" charset="2"/>
+              </a:rPr>
+              <a:t>값을 이용함</a:t>
+            </a:r>
+            <a:r>
+              <a:rPr lang="en-US" altLang="ko-KR" sz="1200" dirty="0" smtClean="0">
+                <a:sym typeface="Wingdings" panose="05000000000000000000" pitchFamily="2" charset="2"/>
+              </a:rPr>
+              <a:t>(</a:t>
+            </a:r>
+            <a:r>
+              <a:rPr lang="ko-KR" altLang="en-US" sz="1200" dirty="0" smtClean="0">
+                <a:sym typeface="Wingdings" panose="05000000000000000000" pitchFamily="2" charset="2"/>
+              </a:rPr>
+              <a:t>기본값 </a:t>
+            </a:r>
+            <a:r>
+              <a:rPr lang="en-US" altLang="ko-KR" sz="1200" dirty="0" smtClean="0">
+                <a:sym typeface="Wingdings" panose="05000000000000000000" pitchFamily="2" charset="2"/>
+              </a:rPr>
+              <a:t>2meter)</a:t>
+            </a:r>
+            <a:endParaRPr lang="ko-KR" altLang="en-US" sz="1200" dirty="0"/>
+          </a:p>
+        </p:txBody>
+      </p:sp>
+    </p:spTree>
+  </p:cSld>
+  <p:clrMapOvr>
+    <a:masterClrMapping/>
+  </p:clrMapOvr>
+  <p:timing>
+    <p:tnLst>
+      <p:par>
+        <p:cTn id="1" dur="indefinite" restart="never" nodeType="tmRoot"/>
+      </p:par>
+    </p:tnLst>
+  </p:timing>
+</p:sld>
+</file>
+
+<file path=ppt/slides/slide6.xml><?xml version="1.0" encoding="utf-8"?>
 <p:sld xmlns:a="http://schemas.openxmlformats.org/drawingml/2006/main" xmlns:r="http://schemas.openxmlformats.org/officeDocument/2006/relationships" xmlns:p="http://schemas.openxmlformats.org/presentationml/2006/main">
   <p:cSld>
     <p:spTree>
@@ -5189,7 +5721,7 @@
 </p:sld>
 </file>
 
-<file path=ppt/slides/slide6.xml><?xml version="1.0" encoding="utf-8"?>
+<file path=ppt/slides/slide7.xml><?xml version="1.0" encoding="utf-8"?>
 <p:sld xmlns:a="http://schemas.openxmlformats.org/drawingml/2006/main" xmlns:r="http://schemas.openxmlformats.org/officeDocument/2006/relationships" xmlns:p="http://schemas.openxmlformats.org/presentationml/2006/main">
   <p:cSld>
     <p:spTree>
@@ -5354,7 +5886,7 @@
 </p:sld>
 </file>
 
-<file path=ppt/slides/slide7.xml><?xml version="1.0" encoding="utf-8"?>
+<file path=ppt/slides/slide8.xml><?xml version="1.0" encoding="utf-8"?>
 <p:sld xmlns:a="http://schemas.openxmlformats.org/drawingml/2006/main" xmlns:r="http://schemas.openxmlformats.org/officeDocument/2006/relationships" xmlns:p="http://schemas.openxmlformats.org/presentationml/2006/main">
   <p:cSld>
     <p:spTree>
@@ -5457,152 +5989,6 @@
               <a:t>화면상 표시된 점들을 마우스 왼쪽 버튼 클릭</a:t>
             </a:r>
             <a:endParaRPr lang="ko-KR" altLang="en-US" sz="1200" dirty="0"/>
-          </a:p>
-        </p:txBody>
-      </p:sp>
-    </p:spTree>
-  </p:cSld>
-  <p:clrMapOvr>
-    <a:masterClrMapping/>
-  </p:clrMapOvr>
-  <p:timing>
-    <p:tnLst>
-      <p:par>
-        <p:cTn id="1" dur="indefinite" restart="never" nodeType="tmRoot"/>
-      </p:par>
-    </p:tnLst>
-  </p:timing>
-</p:sld>
-</file>
-
-<file path=ppt/slides/slide8.xml><?xml version="1.0" encoding="utf-8"?>
-<p:sld xmlns:a="http://schemas.openxmlformats.org/drawingml/2006/main" xmlns:r="http://schemas.openxmlformats.org/officeDocument/2006/relationships" xmlns:p="http://schemas.openxmlformats.org/presentationml/2006/main">
-  <p:cSld>
-    <p:spTree>
-      <p:nvGrpSpPr>
-        <p:cNvPr id="1" name=""/>
-        <p:cNvGrpSpPr/>
-        <p:nvPr/>
-      </p:nvGrpSpPr>
-      <p:grpSpPr>
-        <a:xfrm>
-          <a:off x="0" y="0"/>
-          <a:ext cx="0" cy="0"/>
-          <a:chOff x="0" y="0"/>
-          <a:chExt cx="0" cy="0"/>
-        </a:xfrm>
-      </p:grpSpPr>
-      <p:pic>
-        <p:nvPicPr>
-          <p:cNvPr id="1027" name="Picture 3"/>
-          <p:cNvPicPr>
-            <a:picLocks noChangeAspect="1" noChangeArrowheads="1"/>
-          </p:cNvPicPr>
-          <p:nvPr/>
-        </p:nvPicPr>
-        <p:blipFill>
-          <a:blip r:embed="rId2" cstate="print"/>
-          <a:srcRect/>
-          <a:stretch>
-            <a:fillRect/>
-          </a:stretch>
-        </p:blipFill>
-        <p:spPr bwMode="auto">
-          <a:xfrm>
-            <a:off x="2128838" y="1852613"/>
-            <a:ext cx="4886325" cy="3152775"/>
-          </a:xfrm>
-          <a:prstGeom prst="rect">
-            <a:avLst/>
-          </a:prstGeom>
-          <a:noFill/>
-          <a:ln w="9525">
-            <a:noFill/>
-            <a:miter lim="800000"/>
-            <a:headEnd/>
-            <a:tailEnd/>
-          </a:ln>
-        </p:spPr>
-      </p:pic>
-      <p:sp>
-        <p:nvSpPr>
-          <p:cNvPr id="3" name="TextBox 2"/>
-          <p:cNvSpPr txBox="1"/>
-          <p:nvPr/>
-        </p:nvSpPr>
-        <p:spPr>
-          <a:xfrm>
-            <a:off x="1547664" y="548680"/>
-            <a:ext cx="4536504" cy="738664"/>
-          </a:xfrm>
-          <a:prstGeom prst="rect">
-            <a:avLst/>
-          </a:prstGeom>
-          <a:noFill/>
-        </p:spPr>
-        <p:txBody>
-          <a:bodyPr wrap="square" rtlCol="0">
-            <a:spAutoFit/>
-          </a:bodyPr>
-          <a:lstStyle/>
-          <a:p>
-            <a:r>
-              <a:rPr lang="ko-KR" altLang="en-US" dirty="0" smtClean="0"/>
-              <a:t>대상 물체 감지된 상태의</a:t>
-            </a:r>
-            <a:r>
-              <a:rPr lang="en-US" altLang="ko-KR" dirty="0" smtClean="0"/>
-              <a:t> </a:t>
-            </a:r>
-            <a:r>
-              <a:rPr lang="ko-KR" altLang="en-US" dirty="0" smtClean="0"/>
-              <a:t>화면</a:t>
-            </a:r>
-            <a:endParaRPr lang="en-US" altLang="ko-KR" dirty="0" smtClean="0"/>
-          </a:p>
-          <a:p>
-            <a:r>
-              <a:rPr lang="en-US" altLang="ko-KR" sz="1200" dirty="0"/>
-              <a:t> </a:t>
-            </a:r>
-            <a:r>
-              <a:rPr lang="en-US" altLang="ko-KR" sz="1200" dirty="0" smtClean="0">
-                <a:sym typeface="Wingdings" panose="05000000000000000000" pitchFamily="2" charset="2"/>
-              </a:rPr>
-              <a:t> </a:t>
-            </a:r>
-            <a:r>
-              <a:rPr lang="ko-KR" altLang="en-US" sz="1200" dirty="0" smtClean="0">
-                <a:sym typeface="Wingdings" panose="05000000000000000000" pitchFamily="2" charset="2"/>
-              </a:rPr>
-              <a:t>대상 물체가 감시되면 해당 점들의 주변에 원형 표시</a:t>
-            </a:r>
-            <a:endParaRPr lang="en-US" altLang="ko-KR" sz="1200" dirty="0" smtClean="0">
-              <a:sym typeface="Wingdings" panose="05000000000000000000" pitchFamily="2" charset="2"/>
-            </a:endParaRPr>
-          </a:p>
-          <a:p>
-            <a:r>
-              <a:rPr lang="en-US" altLang="ko-KR" sz="1200" dirty="0">
-                <a:sym typeface="Wingdings" panose="05000000000000000000" pitchFamily="2" charset="2"/>
-              </a:rPr>
-              <a:t> </a:t>
-            </a:r>
-            <a:r>
-              <a:rPr lang="en-US" altLang="ko-KR" sz="1200" dirty="0" smtClean="0">
-                <a:sym typeface="Wingdings" panose="05000000000000000000" pitchFamily="2" charset="2"/>
-              </a:rPr>
-              <a:t> </a:t>
-            </a:r>
-            <a:r>
-              <a:rPr lang="ko-KR" altLang="en-US" sz="1200" dirty="0" smtClean="0">
-                <a:sym typeface="Wingdings" panose="05000000000000000000" pitchFamily="2" charset="2"/>
-              </a:rPr>
-              <a:t>감지된 대상 물체가 위치한 영역에 해당하는 릴레이 출력</a:t>
-            </a:r>
-            <a:endParaRPr lang="en-US" altLang="ko-KR" sz="1200" dirty="0" smtClean="0">
-              <a:sym typeface="Wingdings" panose="05000000000000000000" pitchFamily="2" charset="2"/>
-            </a:endParaRPr>
           </a:p>
         </p:txBody>
       </p:sp>

</xml_diff>

<commit_message>
Add 2D-AntiCollision Monitoring System rev. A04 document.
</commit_message>
<xml_diff>
--- a/2D-AntiCollision Monitoring System.pptx
+++ b/2D-AntiCollision Monitoring System.pptx
@@ -7,14 +7,14 @@
   <p:sldIdLst>
     <p:sldId id="256" r:id="rId2"/>
     <p:sldId id="267" r:id="rId3"/>
-    <p:sldId id="257" r:id="rId4"/>
-    <p:sldId id="258" r:id="rId5"/>
-    <p:sldId id="259" r:id="rId6"/>
-    <p:sldId id="260" r:id="rId7"/>
-    <p:sldId id="261" r:id="rId8"/>
-    <p:sldId id="263" r:id="rId9"/>
-    <p:sldId id="265" r:id="rId10"/>
-    <p:sldId id="266" r:id="rId11"/>
+    <p:sldId id="269" r:id="rId4"/>
+    <p:sldId id="270" r:id="rId5"/>
+    <p:sldId id="257" r:id="rId6"/>
+    <p:sldId id="271" r:id="rId7"/>
+    <p:sldId id="258" r:id="rId8"/>
+    <p:sldId id="259" r:id="rId9"/>
+    <p:sldId id="268" r:id="rId10"/>
+    <p:sldId id="260" r:id="rId11"/>
   </p:sldIdLst>
   <p:sldSz cx="9144000" cy="6858000" type="screen4x3"/>
   <p:notesSz cx="6858000" cy="9144000"/>
@@ -314,7 +314,7 @@
             <a:fld id="{F17B436D-341F-426B-A879-B4FA1B0657F1}" type="datetimeFigureOut">
               <a:rPr lang="ko-KR" altLang="en-US" smtClean="0"/>
               <a:pPr/>
-              <a:t>2018-08-13</a:t>
+              <a:t>2018-08-17</a:t>
             </a:fld>
             <a:endParaRPr lang="ko-KR" altLang="en-US"/>
           </a:p>
@@ -481,7 +481,7 @@
             <a:fld id="{F17B436D-341F-426B-A879-B4FA1B0657F1}" type="datetimeFigureOut">
               <a:rPr lang="ko-KR" altLang="en-US" smtClean="0"/>
               <a:pPr/>
-              <a:t>2018-08-13</a:t>
+              <a:t>2018-08-17</a:t>
             </a:fld>
             <a:endParaRPr lang="ko-KR" altLang="en-US"/>
           </a:p>
@@ -658,7 +658,7 @@
             <a:fld id="{F17B436D-341F-426B-A879-B4FA1B0657F1}" type="datetimeFigureOut">
               <a:rPr lang="ko-KR" altLang="en-US" smtClean="0"/>
               <a:pPr/>
-              <a:t>2018-08-13</a:t>
+              <a:t>2018-08-17</a:t>
             </a:fld>
             <a:endParaRPr lang="ko-KR" altLang="en-US"/>
           </a:p>
@@ -825,7 +825,7 @@
             <a:fld id="{F17B436D-341F-426B-A879-B4FA1B0657F1}" type="datetimeFigureOut">
               <a:rPr lang="ko-KR" altLang="en-US" smtClean="0"/>
               <a:pPr/>
-              <a:t>2018-08-13</a:t>
+              <a:t>2018-08-17</a:t>
             </a:fld>
             <a:endParaRPr lang="ko-KR" altLang="en-US"/>
           </a:p>
@@ -1068,7 +1068,7 @@
             <a:fld id="{F17B436D-341F-426B-A879-B4FA1B0657F1}" type="datetimeFigureOut">
               <a:rPr lang="ko-KR" altLang="en-US" smtClean="0"/>
               <a:pPr/>
-              <a:t>2018-08-13</a:t>
+              <a:t>2018-08-17</a:t>
             </a:fld>
             <a:endParaRPr lang="ko-KR" altLang="en-US"/>
           </a:p>
@@ -1353,7 +1353,7 @@
             <a:fld id="{F17B436D-341F-426B-A879-B4FA1B0657F1}" type="datetimeFigureOut">
               <a:rPr lang="ko-KR" altLang="en-US" smtClean="0"/>
               <a:pPr/>
-              <a:t>2018-08-13</a:t>
+              <a:t>2018-08-17</a:t>
             </a:fld>
             <a:endParaRPr lang="ko-KR" altLang="en-US"/>
           </a:p>
@@ -1772,7 +1772,7 @@
             <a:fld id="{F17B436D-341F-426B-A879-B4FA1B0657F1}" type="datetimeFigureOut">
               <a:rPr lang="ko-KR" altLang="en-US" smtClean="0"/>
               <a:pPr/>
-              <a:t>2018-08-13</a:t>
+              <a:t>2018-08-17</a:t>
             </a:fld>
             <a:endParaRPr lang="ko-KR" altLang="en-US"/>
           </a:p>
@@ -1887,7 +1887,7 @@
             <a:fld id="{F17B436D-341F-426B-A879-B4FA1B0657F1}" type="datetimeFigureOut">
               <a:rPr lang="ko-KR" altLang="en-US" smtClean="0"/>
               <a:pPr/>
-              <a:t>2018-08-13</a:t>
+              <a:t>2018-08-17</a:t>
             </a:fld>
             <a:endParaRPr lang="ko-KR" altLang="en-US"/>
           </a:p>
@@ -1979,7 +1979,7 @@
             <a:fld id="{F17B436D-341F-426B-A879-B4FA1B0657F1}" type="datetimeFigureOut">
               <a:rPr lang="ko-KR" altLang="en-US" smtClean="0"/>
               <a:pPr/>
-              <a:t>2018-08-13</a:t>
+              <a:t>2018-08-17</a:t>
             </a:fld>
             <a:endParaRPr lang="ko-KR" altLang="en-US"/>
           </a:p>
@@ -2253,7 +2253,7 @@
             <a:fld id="{F17B436D-341F-426B-A879-B4FA1B0657F1}" type="datetimeFigureOut">
               <a:rPr lang="ko-KR" altLang="en-US" smtClean="0"/>
               <a:pPr/>
-              <a:t>2018-08-13</a:t>
+              <a:t>2018-08-17</a:t>
             </a:fld>
             <a:endParaRPr lang="ko-KR" altLang="en-US"/>
           </a:p>
@@ -2503,7 +2503,7 @@
             <a:fld id="{F17B436D-341F-426B-A879-B4FA1B0657F1}" type="datetimeFigureOut">
               <a:rPr lang="ko-KR" altLang="en-US" smtClean="0"/>
               <a:pPr/>
-              <a:t>2018-08-13</a:t>
+              <a:t>2018-08-17</a:t>
             </a:fld>
             <a:endParaRPr lang="ko-KR" altLang="en-US"/>
           </a:p>
@@ -2713,7 +2713,7 @@
             <a:fld id="{F17B436D-341F-426B-A879-B4FA1B0657F1}" type="datetimeFigureOut">
               <a:rPr lang="ko-KR" altLang="en-US" smtClean="0"/>
               <a:pPr/>
-              <a:t>2018-08-13</a:t>
+              <a:t>2018-08-17</a:t>
             </a:fld>
             <a:endParaRPr lang="ko-KR" altLang="en-US"/>
           </a:p>
@@ -3086,34 +3086,32 @@
       </p:grpSpPr>
       <p:pic>
         <p:nvPicPr>
-          <p:cNvPr id="1026" name="Picture 2"/>
+          <p:cNvPr id="4" name="그림 3"/>
           <p:cNvPicPr>
-            <a:picLocks noChangeAspect="1" noChangeArrowheads="1"/>
+            <a:picLocks noChangeAspect="1"/>
           </p:cNvPicPr>
           <p:nvPr/>
         </p:nvPicPr>
         <p:blipFill>
-          <a:blip r:embed="rId2" cstate="print"/>
-          <a:srcRect/>
+          <a:blip r:embed="rId2">
+            <a:extLst>
+              <a:ext uri="{28A0092B-C50C-407E-A947-70E740481C1C}">
+                <a14:useLocalDpi xmlns:a14="http://schemas.microsoft.com/office/drawing/2010/main" val="0"/>
+              </a:ext>
+            </a:extLst>
+          </a:blip>
           <a:stretch>
             <a:fillRect/>
           </a:stretch>
         </p:blipFill>
-        <p:spPr bwMode="auto">
+        <p:spPr>
           <a:xfrm>
-            <a:off x="2128838" y="1852613"/>
-            <a:ext cx="4886325" cy="3152775"/>
+            <a:off x="1860423" y="1750529"/>
+            <a:ext cx="5423154" cy="3356943"/>
           </a:xfrm>
           <a:prstGeom prst="rect">
             <a:avLst/>
           </a:prstGeom>
-          <a:noFill/>
-          <a:ln w="9525">
-            <a:noFill/>
-            <a:miter lim="800000"/>
-            <a:headEnd/>
-            <a:tailEnd/>
-          </a:ln>
         </p:spPr>
       </p:pic>
       <p:sp>
@@ -3158,13 +3156,13 @@
         </p:nvSpPr>
         <p:spPr>
           <a:xfrm>
-            <a:off x="2987824" y="5085184"/>
+            <a:off x="4283968" y="1142979"/>
             <a:ext cx="1368152" cy="504056"/>
           </a:xfrm>
           <a:prstGeom prst="wedgeRectCallout">
             <a:avLst>
-              <a:gd name="adj1" fmla="val 45318"/>
-              <a:gd name="adj2" fmla="val -88234"/>
+              <a:gd name="adj1" fmla="val -46997"/>
+              <a:gd name="adj2" fmla="val 130212"/>
             </a:avLst>
           </a:prstGeom>
           <a:noFill/>
@@ -3229,13 +3227,13 @@
         </p:nvSpPr>
         <p:spPr>
           <a:xfrm>
-            <a:off x="2555776" y="1268761"/>
+            <a:off x="611560" y="2780928"/>
             <a:ext cx="1116124" cy="504056"/>
           </a:xfrm>
           <a:prstGeom prst="wedgeRectCallout">
             <a:avLst>
-              <a:gd name="adj1" fmla="val 44710"/>
-              <a:gd name="adj2" fmla="val 169037"/>
+              <a:gd name="adj1" fmla="val 144172"/>
+              <a:gd name="adj2" fmla="val -47425"/>
             </a:avLst>
           </a:prstGeom>
           <a:noFill/>
@@ -3327,13 +3325,13 @@
         </p:nvSpPr>
         <p:spPr>
           <a:xfrm>
-            <a:off x="4067944" y="1268761"/>
-            <a:ext cx="1080120" cy="504056"/>
+            <a:off x="611560" y="2204864"/>
+            <a:ext cx="1116124" cy="504056"/>
           </a:xfrm>
           <a:prstGeom prst="wedgeRectCallout">
             <a:avLst>
-              <a:gd name="adj1" fmla="val -35922"/>
-              <a:gd name="adj2" fmla="val 170686"/>
+              <a:gd name="adj1" fmla="val 206889"/>
+              <a:gd name="adj2" fmla="val -22250"/>
             </a:avLst>
           </a:prstGeom>
           <a:noFill/>
@@ -3419,19 +3417,19 @@
       </p:sp>
       <p:sp>
         <p:nvSpPr>
-          <p:cNvPr id="8" name="사각형 설명선 7"/>
+          <p:cNvPr id="10" name="사각형 설명선 9"/>
           <p:cNvSpPr/>
           <p:nvPr/>
         </p:nvSpPr>
         <p:spPr>
           <a:xfrm>
-            <a:off x="611560" y="2276872"/>
+            <a:off x="2663788" y="1142979"/>
             <a:ext cx="1440160" cy="504056"/>
           </a:xfrm>
           <a:prstGeom prst="wedgeRectCallout">
             <a:avLst>
-              <a:gd name="adj1" fmla="val 104676"/>
-              <a:gd name="adj2" fmla="val -42606"/>
+              <a:gd name="adj1" fmla="val 29940"/>
+              <a:gd name="adj2" fmla="val 115496"/>
             </a:avLst>
           </a:prstGeom>
           <a:noFill/>
@@ -3464,19 +3462,172 @@
           <a:lstStyle/>
           <a:p>
             <a:pPr algn="ctr"/>
-            <a:r>
-              <a:rPr lang="ko-KR" altLang="en-US" sz="1200" dirty="0" smtClean="0">
-                <a:solidFill>
-                  <a:schemeClr val="tx1"/>
-                </a:solidFill>
-              </a:rPr>
-              <a:t>릴레이 출력 상태</a:t>
-            </a:r>
             <a:endParaRPr lang="en-US" altLang="ko-KR" sz="1200" dirty="0" smtClean="0">
               <a:solidFill>
                 <a:schemeClr val="tx1"/>
               </a:solidFill>
             </a:endParaRPr>
+          </a:p>
+        </p:txBody>
+      </p:sp>
+      <p:sp>
+        <p:nvSpPr>
+          <p:cNvPr id="8" name="사각형 설명선 7"/>
+          <p:cNvSpPr/>
+          <p:nvPr/>
+        </p:nvSpPr>
+        <p:spPr>
+          <a:xfrm>
+            <a:off x="2663788" y="1149091"/>
+            <a:ext cx="1440160" cy="504056"/>
+          </a:xfrm>
+          <a:prstGeom prst="wedgeRectCallout">
+            <a:avLst>
+              <a:gd name="adj1" fmla="val -29585"/>
+              <a:gd name="adj2" fmla="val 111969"/>
+            </a:avLst>
+          </a:prstGeom>
+          <a:noFill/>
+          <a:ln>
+            <a:solidFill>
+              <a:schemeClr val="bg1">
+                <a:lumMod val="75000"/>
+              </a:schemeClr>
+            </a:solidFill>
+          </a:ln>
+        </p:spPr>
+        <p:style>
+          <a:lnRef idx="2">
+            <a:schemeClr val="accent1">
+              <a:shade val="50000"/>
+            </a:schemeClr>
+          </a:lnRef>
+          <a:fillRef idx="1">
+            <a:schemeClr val="accent1"/>
+          </a:fillRef>
+          <a:effectRef idx="0">
+            <a:schemeClr val="accent1"/>
+          </a:effectRef>
+          <a:fontRef idx="minor">
+            <a:schemeClr val="lt1"/>
+          </a:fontRef>
+        </p:style>
+        <p:txBody>
+          <a:bodyPr rtlCol="0" anchor="ctr"/>
+          <a:lstStyle/>
+          <a:p>
+            <a:pPr algn="ctr"/>
+            <a:r>
+              <a:rPr lang="ko-KR" altLang="en-US" sz="1200" dirty="0" smtClean="0">
+                <a:solidFill>
+                  <a:schemeClr val="tx1"/>
+                </a:solidFill>
+              </a:rPr>
+              <a:t>릴레이 출력 상태</a:t>
+            </a:r>
+            <a:endParaRPr lang="en-US" altLang="ko-KR" sz="1200" dirty="0" smtClean="0">
+              <a:solidFill>
+                <a:schemeClr val="tx1"/>
+              </a:solidFill>
+            </a:endParaRPr>
+          </a:p>
+        </p:txBody>
+      </p:sp>
+      <p:sp>
+        <p:nvSpPr>
+          <p:cNvPr id="11" name="사각형 설명선 10"/>
+          <p:cNvSpPr/>
+          <p:nvPr/>
+        </p:nvSpPr>
+        <p:spPr>
+          <a:xfrm>
+            <a:off x="323528" y="3352428"/>
+            <a:ext cx="1404156" cy="504056"/>
+          </a:xfrm>
+          <a:prstGeom prst="wedgeRectCallout">
+            <a:avLst>
+              <a:gd name="adj1" fmla="val 180678"/>
+              <a:gd name="adj2" fmla="val -123347"/>
+            </a:avLst>
+          </a:prstGeom>
+          <a:noFill/>
+          <a:ln>
+            <a:solidFill>
+              <a:schemeClr val="bg1">
+                <a:lumMod val="75000"/>
+              </a:schemeClr>
+            </a:solidFill>
+          </a:ln>
+        </p:spPr>
+        <p:style>
+          <a:lnRef idx="2">
+            <a:schemeClr val="accent1">
+              <a:shade val="50000"/>
+            </a:schemeClr>
+          </a:lnRef>
+          <a:fillRef idx="1">
+            <a:schemeClr val="accent1"/>
+          </a:fillRef>
+          <a:effectRef idx="0">
+            <a:schemeClr val="accent1"/>
+          </a:effectRef>
+          <a:fontRef idx="minor">
+            <a:schemeClr val="lt1"/>
+          </a:fontRef>
+        </p:style>
+        <p:txBody>
+          <a:bodyPr rtlCol="0" anchor="ctr"/>
+          <a:lstStyle/>
+          <a:p>
+            <a:pPr algn="ctr"/>
+            <a:r>
+              <a:rPr lang="en-US" altLang="ko-KR" sz="1200" dirty="0" smtClean="0">
+                <a:solidFill>
+                  <a:schemeClr val="tx1"/>
+                </a:solidFill>
+              </a:rPr>
+              <a:t>No Mark </a:t>
+            </a:r>
+            <a:r>
+              <a:rPr lang="ko-KR" altLang="en-US" sz="1200" dirty="0" smtClean="0">
+                <a:solidFill>
+                  <a:schemeClr val="tx1"/>
+                </a:solidFill>
+              </a:rPr>
+              <a:t>영역</a:t>
+            </a:r>
+            <a:endParaRPr lang="en-US" altLang="ko-KR" sz="1200" dirty="0" smtClean="0">
+              <a:solidFill>
+                <a:schemeClr val="tx1"/>
+              </a:solidFill>
+            </a:endParaRPr>
+          </a:p>
+          <a:p>
+            <a:pPr algn="ctr"/>
+            <a:r>
+              <a:rPr lang="en-US" altLang="ko-KR" sz="1200" dirty="0" smtClean="0">
+                <a:solidFill>
+                  <a:schemeClr val="tx1"/>
+                </a:solidFill>
+              </a:rPr>
+              <a:t>(</a:t>
+            </a:r>
+            <a:r>
+              <a:rPr lang="ko-KR" altLang="en-US" sz="1200" dirty="0" smtClean="0">
+                <a:solidFill>
+                  <a:schemeClr val="tx1"/>
+                </a:solidFill>
+              </a:rPr>
+              <a:t>빨강색 점선 상자</a:t>
+            </a:r>
+            <a:r>
+              <a:rPr lang="en-US" altLang="ko-KR" sz="1200" dirty="0" smtClean="0">
+                <a:solidFill>
+                  <a:schemeClr val="tx1"/>
+                </a:solidFill>
+              </a:rPr>
+              <a:t>)</a:t>
+            </a:r>
           </a:p>
         </p:txBody>
       </p:sp>
@@ -3512,11 +3663,207 @@
           <a:chExt cx="0" cy="0"/>
         </a:xfrm>
       </p:grpSpPr>
+      <p:pic>
+        <p:nvPicPr>
+          <p:cNvPr id="2" name="그림 1"/>
+          <p:cNvPicPr>
+            <a:picLocks noChangeAspect="1"/>
+          </p:cNvPicPr>
+          <p:nvPr/>
+        </p:nvPicPr>
+        <p:blipFill>
+          <a:blip r:embed="rId2">
+            <a:extLst>
+              <a:ext uri="{28A0092B-C50C-407E-A947-70E740481C1C}">
+                <a14:useLocalDpi xmlns:a14="http://schemas.microsoft.com/office/drawing/2010/main" val="0"/>
+              </a:ext>
+            </a:extLst>
+          </a:blip>
+          <a:stretch>
+            <a:fillRect/>
+          </a:stretch>
+        </p:blipFill>
+        <p:spPr>
+          <a:xfrm>
+            <a:off x="1860423" y="1750529"/>
+            <a:ext cx="5423154" cy="3356943"/>
+          </a:xfrm>
+          <a:prstGeom prst="rect">
+            <a:avLst/>
+          </a:prstGeom>
+        </p:spPr>
+      </p:pic>
+      <p:sp>
+        <p:nvSpPr>
+          <p:cNvPr id="3" name="TextBox 2"/>
+          <p:cNvSpPr txBox="1"/>
+          <p:nvPr/>
+        </p:nvSpPr>
+        <p:spPr>
+          <a:xfrm>
+            <a:off x="1547664" y="548680"/>
+            <a:ext cx="3888432" cy="553998"/>
+          </a:xfrm>
+          <a:prstGeom prst="rect">
+            <a:avLst/>
+          </a:prstGeom>
+          <a:noFill/>
+        </p:spPr>
+        <p:txBody>
+          <a:bodyPr wrap="square" rtlCol="0">
+            <a:spAutoFit/>
+          </a:bodyPr>
+          <a:lstStyle/>
+          <a:p>
+            <a:r>
+              <a:rPr lang="en-US" altLang="ko-KR" dirty="0" smtClean="0"/>
+              <a:t>2D Laser Scanner </a:t>
+            </a:r>
+            <a:r>
+              <a:rPr lang="ko-KR" altLang="en-US" dirty="0" smtClean="0"/>
+              <a:t>연결 설정</a:t>
+            </a:r>
+            <a:r>
+              <a:rPr lang="en-US" altLang="ko-KR" dirty="0" smtClean="0"/>
+              <a:t> </a:t>
+            </a:r>
+            <a:r>
+              <a:rPr lang="ko-KR" altLang="en-US" dirty="0" smtClean="0"/>
+              <a:t>화면</a:t>
+            </a:r>
+            <a:endParaRPr lang="en-US" altLang="ko-KR" dirty="0" smtClean="0"/>
+          </a:p>
+          <a:p>
+            <a:r>
+              <a:rPr lang="en-US" altLang="ko-KR" sz="1200" dirty="0"/>
+              <a:t> </a:t>
+            </a:r>
+            <a:r>
+              <a:rPr lang="en-US" altLang="ko-KR" sz="1200" dirty="0" smtClean="0">
+                <a:sym typeface="Wingdings" panose="05000000000000000000" pitchFamily="2" charset="2"/>
+              </a:rPr>
+              <a:t> </a:t>
+            </a:r>
+            <a:r>
+              <a:rPr lang="ko-KR" altLang="en-US" sz="1200" dirty="0" smtClean="0">
+                <a:sym typeface="Wingdings" panose="05000000000000000000" pitchFamily="2" charset="2"/>
+              </a:rPr>
+              <a:t>키보드 </a:t>
+            </a:r>
+            <a:r>
+              <a:rPr lang="en-US" altLang="ko-KR" sz="1200" dirty="0" smtClean="0">
+                <a:sym typeface="Wingdings" panose="05000000000000000000" pitchFamily="2" charset="2"/>
+              </a:rPr>
+              <a:t>F6 </a:t>
+            </a:r>
+            <a:r>
+              <a:rPr lang="ko-KR" altLang="en-US" sz="1200" dirty="0" smtClean="0">
+                <a:sym typeface="Wingdings" panose="05000000000000000000" pitchFamily="2" charset="2"/>
+              </a:rPr>
+              <a:t>키로 진입</a:t>
+            </a:r>
+            <a:endParaRPr lang="ko-KR" altLang="en-US" sz="1200" dirty="0"/>
+          </a:p>
+        </p:txBody>
+      </p:sp>
+      <p:sp>
+        <p:nvSpPr>
+          <p:cNvPr id="4" name="사각형 설명선 3"/>
+          <p:cNvSpPr/>
+          <p:nvPr/>
+        </p:nvSpPr>
+        <p:spPr>
+          <a:xfrm>
+            <a:off x="251520" y="4365104"/>
+            <a:ext cx="1368152" cy="360040"/>
+          </a:xfrm>
+          <a:prstGeom prst="wedgeRectCallout">
+            <a:avLst>
+              <a:gd name="adj1" fmla="val 71809"/>
+              <a:gd name="adj2" fmla="val 24500"/>
+            </a:avLst>
+          </a:prstGeom>
+          <a:noFill/>
+          <a:ln>
+            <a:solidFill>
+              <a:schemeClr val="bg1">
+                <a:lumMod val="75000"/>
+              </a:schemeClr>
+            </a:solidFill>
+          </a:ln>
+        </p:spPr>
+        <p:style>
+          <a:lnRef idx="2">
+            <a:schemeClr val="accent1">
+              <a:shade val="50000"/>
+            </a:schemeClr>
+          </a:lnRef>
+          <a:fillRef idx="1">
+            <a:schemeClr val="accent1"/>
+          </a:fillRef>
+          <a:effectRef idx="0">
+            <a:schemeClr val="accent1"/>
+          </a:effectRef>
+          <a:fontRef idx="minor">
+            <a:schemeClr val="lt1"/>
+          </a:fontRef>
+        </p:style>
+        <p:txBody>
+          <a:bodyPr rtlCol="0" anchor="ctr"/>
+          <a:lstStyle/>
+          <a:p>
+            <a:r>
+              <a:rPr lang="en-US" altLang="ko-KR" sz="1000" dirty="0" smtClean="0">
+                <a:solidFill>
+                  <a:schemeClr val="tx1"/>
+                </a:solidFill>
+              </a:rPr>
+              <a:t>2D Laser Scanner</a:t>
+            </a:r>
+            <a:r>
+              <a:rPr lang="ko-KR" altLang="en-US" sz="1000" dirty="0" smtClean="0">
+                <a:solidFill>
+                  <a:schemeClr val="tx1"/>
+                </a:solidFill>
+              </a:rPr>
+              <a:t>의 </a:t>
+            </a:r>
+            <a:r>
+              <a:rPr lang="en-US" altLang="ko-KR" sz="1000" dirty="0" smtClean="0">
+                <a:solidFill>
+                  <a:schemeClr val="tx1"/>
+                </a:solidFill>
+              </a:rPr>
+              <a:t>Serial Number </a:t>
+            </a:r>
+            <a:r>
+              <a:rPr lang="ko-KR" altLang="en-US" sz="1000" dirty="0" smtClean="0">
+                <a:solidFill>
+                  <a:schemeClr val="tx1"/>
+                </a:solidFill>
+              </a:rPr>
+              <a:t>입력</a:t>
+            </a:r>
+            <a:endParaRPr lang="en-US" altLang="ko-KR" sz="1000" dirty="0" smtClean="0">
+              <a:solidFill>
+                <a:schemeClr val="tx1"/>
+              </a:solidFill>
+            </a:endParaRPr>
+          </a:p>
+        </p:txBody>
+      </p:sp>
     </p:spTree>
   </p:cSld>
   <p:clrMapOvr>
     <a:masterClrMapping/>
   </p:clrMapOvr>
+  <p:timing>
+    <p:tnLst>
+      <p:par>
+        <p:cTn id="1" dur="indefinite" restart="never" nodeType="tmRoot"/>
+      </p:par>
+    </p:tnLst>
+  </p:timing>
 </p:sld>
 </file>
 
@@ -3537,38 +3884,6 @@
           <a:chExt cx="0" cy="0"/>
         </a:xfrm>
       </p:grpSpPr>
-      <p:pic>
-        <p:nvPicPr>
-          <p:cNvPr id="1027" name="Picture 3"/>
-          <p:cNvPicPr>
-            <a:picLocks noChangeAspect="1" noChangeArrowheads="1"/>
-          </p:cNvPicPr>
-          <p:nvPr/>
-        </p:nvPicPr>
-        <p:blipFill>
-          <a:blip r:embed="rId2" cstate="print"/>
-          <a:srcRect/>
-          <a:stretch>
-            <a:fillRect/>
-          </a:stretch>
-        </p:blipFill>
-        <p:spPr bwMode="auto">
-          <a:xfrm>
-            <a:off x="2128838" y="1852613"/>
-            <a:ext cx="4886325" cy="3152775"/>
-          </a:xfrm>
-          <a:prstGeom prst="rect">
-            <a:avLst/>
-          </a:prstGeom>
-          <a:noFill/>
-          <a:ln w="9525">
-            <a:noFill/>
-            <a:miter lim="800000"/>
-            <a:headEnd/>
-            <a:tailEnd/>
-          </a:ln>
-        </p:spPr>
-      </p:pic>
       <p:sp>
         <p:nvSpPr>
           <p:cNvPr id="3" name="TextBox 2"/>
@@ -3578,7 +3893,7 @@
         <p:spPr>
           <a:xfrm>
             <a:off x="1547664" y="548680"/>
-            <a:ext cx="4536504" cy="738664"/>
+            <a:ext cx="4752528" cy="738664"/>
           </a:xfrm>
           <a:prstGeom prst="rect">
             <a:avLst/>
@@ -3643,7 +3958,19 @@
               <a:rPr lang="ko-KR" altLang="en-US" sz="1200" dirty="0" smtClean="0">
                 <a:sym typeface="Wingdings" panose="05000000000000000000" pitchFamily="2" charset="2"/>
               </a:rPr>
-              <a:t>감지된 대상 물체가 위치한 영역에 해당하는 릴레이 출력</a:t>
+              <a:t>감지된 대상 물체가 위치한 영역에 해당하는 릴레이 </a:t>
+            </a:r>
+            <a:r>
+              <a:rPr lang="en-US" altLang="ko-KR" sz="1200" dirty="0" smtClean="0">
+                <a:sym typeface="Wingdings" panose="05000000000000000000" pitchFamily="2" charset="2"/>
+              </a:rPr>
+              <a:t>ON</a:t>
+            </a:r>
+            <a:r>
+              <a:rPr lang="ko-KR" altLang="en-US" sz="1200" dirty="0" smtClean="0">
+                <a:sym typeface="Wingdings" panose="05000000000000000000" pitchFamily="2" charset="2"/>
+              </a:rPr>
+              <a:t> 출력</a:t>
             </a:r>
             <a:endParaRPr lang="en-US" altLang="ko-KR" sz="1200" dirty="0" smtClean="0">
               <a:sym typeface="Wingdings" panose="05000000000000000000" pitchFamily="2" charset="2"/>
@@ -3651,6 +3978,36 @@
           </a:p>
         </p:txBody>
       </p:sp>
+      <p:pic>
+        <p:nvPicPr>
+          <p:cNvPr id="2" name="그림 1"/>
+          <p:cNvPicPr>
+            <a:picLocks noChangeAspect="1"/>
+          </p:cNvPicPr>
+          <p:nvPr/>
+        </p:nvPicPr>
+        <p:blipFill>
+          <a:blip r:embed="rId2">
+            <a:extLst>
+              <a:ext uri="{28A0092B-C50C-407E-A947-70E740481C1C}">
+                <a14:useLocalDpi xmlns:a14="http://schemas.microsoft.com/office/drawing/2010/main" val="0"/>
+              </a:ext>
+            </a:extLst>
+          </a:blip>
+          <a:stretch>
+            <a:fillRect/>
+          </a:stretch>
+        </p:blipFill>
+        <p:spPr>
+          <a:xfrm>
+            <a:off x="1860423" y="1750529"/>
+            <a:ext cx="5423154" cy="3356943"/>
+          </a:xfrm>
+          <a:prstGeom prst="rect">
+            <a:avLst/>
+          </a:prstGeom>
+        </p:spPr>
+      </p:pic>
     </p:spTree>
     <p:extLst>
       <p:ext uri="{BB962C8B-B14F-4D97-AF65-F5344CB8AC3E}">
@@ -3688,38 +4045,6 @@
           <a:chExt cx="0" cy="0"/>
         </a:xfrm>
       </p:grpSpPr>
-      <p:pic>
-        <p:nvPicPr>
-          <p:cNvPr id="2050" name="Picture 2"/>
-          <p:cNvPicPr>
-            <a:picLocks noChangeAspect="1" noChangeArrowheads="1"/>
-          </p:cNvPicPr>
-          <p:nvPr/>
-        </p:nvPicPr>
-        <p:blipFill>
-          <a:blip r:embed="rId2" cstate="print"/>
-          <a:srcRect/>
-          <a:stretch>
-            <a:fillRect/>
-          </a:stretch>
-        </p:blipFill>
-        <p:spPr bwMode="auto">
-          <a:xfrm>
-            <a:off x="2124904" y="1844824"/>
-            <a:ext cx="4886325" cy="3152775"/>
-          </a:xfrm>
-          <a:prstGeom prst="rect">
-            <a:avLst/>
-          </a:prstGeom>
-          <a:noFill/>
-          <a:ln w="9525">
-            <a:noFill/>
-            <a:miter lim="800000"/>
-            <a:headEnd/>
-            <a:tailEnd/>
-          </a:ln>
-        </p:spPr>
-      </p:pic>
       <p:sp>
         <p:nvSpPr>
           <p:cNvPr id="3" name="TextBox 2"/>
@@ -3729,7 +4054,7 @@
         <p:spPr>
           <a:xfrm>
             <a:off x="1547664" y="548680"/>
-            <a:ext cx="3888432" cy="553998"/>
+            <a:ext cx="4536504" cy="553998"/>
           </a:xfrm>
           <a:prstGeom prst="rect">
             <a:avLst/>
@@ -3743,12 +4068,8 @@
           <a:lstStyle/>
           <a:p>
             <a:r>
-              <a:rPr lang="en-US" altLang="ko-KR" dirty="0" smtClean="0"/>
-              <a:t>System </a:t>
-            </a:r>
-            <a:r>
               <a:rPr lang="ko-KR" altLang="en-US" dirty="0" smtClean="0"/>
-              <a:t>설정</a:t>
+              <a:t>대상 물체 상태 보기</a:t>
             </a:r>
             <a:r>
               <a:rPr lang="en-US" altLang="ko-KR" dirty="0" smtClean="0"/>
@@ -3775,649 +4096,48 @@
               <a:rPr lang="ko-KR" altLang="en-US" sz="1200" dirty="0" smtClean="0">
                 <a:sym typeface="Wingdings" panose="05000000000000000000" pitchFamily="2" charset="2"/>
               </a:rPr>
-              <a:t>키보드 </a:t>
-            </a:r>
-            <a:r>
-              <a:rPr lang="en-US" altLang="ko-KR" sz="1200" dirty="0" smtClean="0">
-                <a:sym typeface="Wingdings" panose="05000000000000000000" pitchFamily="2" charset="2"/>
-              </a:rPr>
-              <a:t>F1 </a:t>
-            </a:r>
-            <a:r>
-              <a:rPr lang="ko-KR" altLang="en-US" sz="1200" dirty="0" smtClean="0">
-                <a:sym typeface="Wingdings" panose="05000000000000000000" pitchFamily="2" charset="2"/>
-              </a:rPr>
-              <a:t>키로 진입</a:t>
+              <a:t>화면상 표시된 점들을 마우스 왼쪽 버튼 클릭</a:t>
             </a:r>
             <a:endParaRPr lang="ko-KR" altLang="en-US" sz="1200" dirty="0"/>
           </a:p>
         </p:txBody>
       </p:sp>
-      <p:sp>
-        <p:nvSpPr>
-          <p:cNvPr id="4" name="사각형 설명선 3"/>
-          <p:cNvSpPr/>
+      <p:pic>
+        <p:nvPicPr>
+          <p:cNvPr id="4" name="그림 3"/>
+          <p:cNvPicPr>
+            <a:picLocks noChangeAspect="1"/>
+          </p:cNvPicPr>
           <p:nvPr/>
-        </p:nvSpPr>
+        </p:nvPicPr>
+        <p:blipFill>
+          <a:blip r:embed="rId2">
+            <a:extLst>
+              <a:ext uri="{28A0092B-C50C-407E-A947-70E740481C1C}">
+                <a14:useLocalDpi xmlns:a14="http://schemas.microsoft.com/office/drawing/2010/main" val="0"/>
+              </a:ext>
+            </a:extLst>
+          </a:blip>
+          <a:stretch>
+            <a:fillRect/>
+          </a:stretch>
+        </p:blipFill>
         <p:spPr>
           <a:xfrm>
-            <a:off x="899592" y="1388225"/>
-            <a:ext cx="2448272" cy="387615"/>
+            <a:off x="1860423" y="1750529"/>
+            <a:ext cx="5423154" cy="3356943"/>
           </a:xfrm>
-          <a:prstGeom prst="wedgeRectCallout">
-            <a:avLst>
-              <a:gd name="adj1" fmla="val 12794"/>
-              <a:gd name="adj2" fmla="val 202855"/>
-            </a:avLst>
-          </a:prstGeom>
-          <a:noFill/>
-          <a:ln>
-            <a:solidFill>
-              <a:schemeClr val="bg1">
-                <a:lumMod val="75000"/>
-              </a:schemeClr>
-            </a:solidFill>
-          </a:ln>
-        </p:spPr>
-        <p:style>
-          <a:lnRef idx="2">
-            <a:schemeClr val="accent1">
-              <a:shade val="50000"/>
-            </a:schemeClr>
-          </a:lnRef>
-          <a:fillRef idx="1">
-            <a:schemeClr val="accent1"/>
-          </a:fillRef>
-          <a:effectRef idx="0">
-            <a:schemeClr val="accent1"/>
-          </a:effectRef>
-          <a:fontRef idx="minor">
-            <a:schemeClr val="lt1"/>
-          </a:fontRef>
-        </p:style>
-        <p:txBody>
-          <a:bodyPr rtlCol="0" anchor="ctr"/>
-          <a:lstStyle/>
-          <a:p>
-            <a:pPr algn="ctr"/>
-            <a:r>
-              <a:rPr lang="ko-KR" altLang="en-US" sz="1000" dirty="0" smtClean="0">
-                <a:solidFill>
-                  <a:schemeClr val="tx1"/>
-                </a:solidFill>
-              </a:rPr>
-              <a:t>각종 설정 화면 진입 시 입력해야 하는 </a:t>
-            </a:r>
-            <a:r>
-              <a:rPr lang="en-US" altLang="ko-KR" sz="1000" dirty="0" smtClean="0">
-                <a:solidFill>
-                  <a:schemeClr val="tx1"/>
-                </a:solidFill>
-              </a:rPr>
-              <a:t>System password</a:t>
-            </a:r>
-          </a:p>
-        </p:txBody>
-      </p:sp>
-      <p:sp>
-        <p:nvSpPr>
-          <p:cNvPr id="5" name="사각형 설명선 4"/>
-          <p:cNvSpPr/>
-          <p:nvPr/>
-        </p:nvSpPr>
-        <p:spPr>
-          <a:xfrm>
-            <a:off x="61610" y="2204864"/>
-            <a:ext cx="1656184" cy="268939"/>
-          </a:xfrm>
-          <a:prstGeom prst="wedgeRectCallout">
-            <a:avLst>
-              <a:gd name="adj1" fmla="val 79861"/>
-              <a:gd name="adj2" fmla="val 72832"/>
-            </a:avLst>
-          </a:prstGeom>
-          <a:noFill/>
-          <a:ln>
-            <a:solidFill>
-              <a:schemeClr val="bg1">
-                <a:lumMod val="75000"/>
-              </a:schemeClr>
-            </a:solidFill>
-          </a:ln>
-        </p:spPr>
-        <p:style>
-          <a:lnRef idx="2">
-            <a:schemeClr val="accent1">
-              <a:shade val="50000"/>
-            </a:schemeClr>
-          </a:lnRef>
-          <a:fillRef idx="1">
-            <a:schemeClr val="accent1"/>
-          </a:fillRef>
-          <a:effectRef idx="0">
-            <a:schemeClr val="accent1"/>
-          </a:effectRef>
-          <a:fontRef idx="minor">
-            <a:schemeClr val="lt1"/>
-          </a:fontRef>
-        </p:style>
-        <p:txBody>
-          <a:bodyPr rtlCol="0" anchor="ctr"/>
-          <a:lstStyle/>
-          <a:p>
-            <a:r>
-              <a:rPr lang="ko-KR" altLang="en-US" sz="1000" dirty="0" smtClean="0">
-                <a:solidFill>
-                  <a:schemeClr val="tx1"/>
-                </a:solidFill>
-              </a:rPr>
-              <a:t>초당 </a:t>
-            </a:r>
-            <a:r>
-              <a:rPr lang="en-US" altLang="ko-KR" sz="1000" dirty="0" smtClean="0">
-                <a:solidFill>
-                  <a:schemeClr val="tx1"/>
-                </a:solidFill>
-              </a:rPr>
-              <a:t>Scan </a:t>
-            </a:r>
-            <a:r>
-              <a:rPr lang="ko-KR" altLang="en-US" sz="1000" dirty="0" smtClean="0">
-                <a:solidFill>
-                  <a:schemeClr val="tx1"/>
-                </a:solidFill>
-              </a:rPr>
-              <a:t>동작 회수</a:t>
-            </a:r>
-            <a:endParaRPr lang="en-US" altLang="ko-KR" sz="1000" dirty="0" smtClean="0">
-              <a:solidFill>
-                <a:schemeClr val="tx1"/>
-              </a:solidFill>
-            </a:endParaRPr>
-          </a:p>
-        </p:txBody>
-      </p:sp>
-      <p:sp>
-        <p:nvSpPr>
-          <p:cNvPr id="6" name="사각형 설명선 5"/>
-          <p:cNvSpPr/>
-          <p:nvPr/>
-        </p:nvSpPr>
-        <p:spPr>
-          <a:xfrm>
-            <a:off x="61610" y="2564904"/>
-            <a:ext cx="1656184" cy="359033"/>
-          </a:xfrm>
-          <a:prstGeom prst="wedgeRectCallout">
-            <a:avLst>
-              <a:gd name="adj1" fmla="val 77324"/>
-              <a:gd name="adj2" fmla="val 21288"/>
-            </a:avLst>
-          </a:prstGeom>
-          <a:noFill/>
-          <a:ln>
-            <a:solidFill>
-              <a:schemeClr val="bg1">
-                <a:lumMod val="75000"/>
-              </a:schemeClr>
-            </a:solidFill>
-          </a:ln>
-        </p:spPr>
-        <p:style>
-          <a:lnRef idx="2">
-            <a:schemeClr val="accent1">
-              <a:shade val="50000"/>
-            </a:schemeClr>
-          </a:lnRef>
-          <a:fillRef idx="1">
-            <a:schemeClr val="accent1"/>
-          </a:fillRef>
-          <a:effectRef idx="0">
-            <a:schemeClr val="accent1"/>
-          </a:effectRef>
-          <a:fontRef idx="minor">
-            <a:schemeClr val="lt1"/>
-          </a:fontRef>
-        </p:style>
-        <p:txBody>
-          <a:bodyPr rtlCol="0" anchor="ctr"/>
-          <a:lstStyle/>
-          <a:p>
-            <a:r>
-              <a:rPr lang="en-US" altLang="ko-KR" sz="1000" dirty="0" smtClean="0">
-                <a:solidFill>
-                  <a:schemeClr val="tx1"/>
-                </a:solidFill>
-              </a:rPr>
-              <a:t>Scan data </a:t>
-            </a:r>
-            <a:r>
-              <a:rPr lang="ko-KR" altLang="en-US" sz="1000" dirty="0" smtClean="0">
-                <a:solidFill>
-                  <a:schemeClr val="tx1"/>
-                </a:solidFill>
-              </a:rPr>
-              <a:t>상시</a:t>
-            </a:r>
-            <a:r>
-              <a:rPr lang="en-US" altLang="ko-KR" sz="1000" dirty="0" smtClean="0">
-                <a:solidFill>
-                  <a:schemeClr val="tx1"/>
-                </a:solidFill>
-              </a:rPr>
-              <a:t>/</a:t>
-            </a:r>
-            <a:r>
-              <a:rPr lang="ko-KR" altLang="en-US" sz="1000" dirty="0" smtClean="0">
-                <a:solidFill>
-                  <a:schemeClr val="tx1"/>
-                </a:solidFill>
-              </a:rPr>
-              <a:t>이벤트</a:t>
-            </a:r>
-            <a:r>
-              <a:rPr lang="en-US" altLang="ko-KR" sz="1000" dirty="0" smtClean="0">
-                <a:solidFill>
-                  <a:schemeClr val="tx1"/>
-                </a:solidFill>
-              </a:rPr>
-              <a:t> </a:t>
-            </a:r>
-            <a:r>
-              <a:rPr lang="ko-KR" altLang="en-US" sz="1000" dirty="0" smtClean="0">
-                <a:solidFill>
-                  <a:schemeClr val="tx1"/>
-                </a:solidFill>
-              </a:rPr>
-              <a:t>저장 시간</a:t>
-            </a:r>
-            <a:endParaRPr lang="en-US" altLang="ko-KR" sz="1000" dirty="0" smtClean="0">
-              <a:solidFill>
-                <a:schemeClr val="tx1"/>
-              </a:solidFill>
-            </a:endParaRPr>
-          </a:p>
-        </p:txBody>
-      </p:sp>
-      <p:sp>
-        <p:nvSpPr>
-          <p:cNvPr id="7" name="왼쪽 중괄호 6"/>
-          <p:cNvSpPr/>
-          <p:nvPr/>
-        </p:nvSpPr>
-        <p:spPr>
-          <a:xfrm>
-            <a:off x="2175417" y="2643262"/>
-            <a:ext cx="45719" cy="353690"/>
-          </a:xfrm>
-          <a:prstGeom prst="leftBrace">
+          <a:prstGeom prst="rect">
             <a:avLst/>
           </a:prstGeom>
         </p:spPr>
-        <p:style>
-          <a:lnRef idx="1">
-            <a:schemeClr val="accent1"/>
-          </a:lnRef>
-          <a:fillRef idx="0">
-            <a:schemeClr val="accent1"/>
-          </a:fillRef>
-          <a:effectRef idx="0">
-            <a:schemeClr val="accent1"/>
-          </a:effectRef>
-          <a:fontRef idx="minor">
-            <a:schemeClr val="tx1"/>
-          </a:fontRef>
-        </p:style>
-        <p:txBody>
-          <a:bodyPr rtlCol="0" anchor="ctr"/>
-          <a:lstStyle/>
-          <a:p>
-            <a:pPr algn="ctr"/>
-            <a:endParaRPr lang="ko-KR" altLang="en-US"/>
-          </a:p>
-        </p:txBody>
-      </p:sp>
-      <p:sp>
-        <p:nvSpPr>
-          <p:cNvPr id="9" name="사각형 설명선 8"/>
-          <p:cNvSpPr/>
-          <p:nvPr/>
-        </p:nvSpPr>
-        <p:spPr>
-          <a:xfrm>
-            <a:off x="60896" y="3016045"/>
-            <a:ext cx="1656184" cy="268939"/>
-          </a:xfrm>
-          <a:prstGeom prst="wedgeRectCallout">
-            <a:avLst>
-              <a:gd name="adj1" fmla="val 80244"/>
-              <a:gd name="adj2" fmla="val -26336"/>
-            </a:avLst>
-          </a:prstGeom>
-          <a:noFill/>
-          <a:ln>
-            <a:solidFill>
-              <a:schemeClr val="bg1">
-                <a:lumMod val="75000"/>
-              </a:schemeClr>
-            </a:solidFill>
-          </a:ln>
-        </p:spPr>
-        <p:style>
-          <a:lnRef idx="2">
-            <a:schemeClr val="accent1">
-              <a:shade val="50000"/>
-            </a:schemeClr>
-          </a:lnRef>
-          <a:fillRef idx="1">
-            <a:schemeClr val="accent1"/>
-          </a:fillRef>
-          <a:effectRef idx="0">
-            <a:schemeClr val="accent1"/>
-          </a:effectRef>
-          <a:fontRef idx="minor">
-            <a:schemeClr val="lt1"/>
-          </a:fontRef>
-        </p:style>
-        <p:txBody>
-          <a:bodyPr rtlCol="0" anchor="ctr"/>
-          <a:lstStyle/>
-          <a:p>
-            <a:r>
-              <a:rPr lang="ko-KR" altLang="en-US" sz="1000" dirty="0" smtClean="0">
-                <a:solidFill>
-                  <a:schemeClr val="tx1"/>
-                </a:solidFill>
-              </a:rPr>
-              <a:t>릴레이 모듈 연결 포트</a:t>
-            </a:r>
-            <a:endParaRPr lang="en-US" altLang="ko-KR" sz="1000" dirty="0" smtClean="0">
-              <a:solidFill>
-                <a:schemeClr val="tx1"/>
-              </a:solidFill>
-            </a:endParaRPr>
-          </a:p>
-        </p:txBody>
-      </p:sp>
-      <p:sp>
-        <p:nvSpPr>
-          <p:cNvPr id="10" name="왼쪽 중괄호 9"/>
-          <p:cNvSpPr/>
-          <p:nvPr/>
-        </p:nvSpPr>
-        <p:spPr>
-          <a:xfrm>
-            <a:off x="2176593" y="3198833"/>
-            <a:ext cx="45719" cy="596558"/>
-          </a:xfrm>
-          <a:prstGeom prst="leftBrace">
-            <a:avLst/>
-          </a:prstGeom>
-        </p:spPr>
-        <p:style>
-          <a:lnRef idx="1">
-            <a:schemeClr val="accent1"/>
-          </a:lnRef>
-          <a:fillRef idx="0">
-            <a:schemeClr val="accent1"/>
-          </a:fillRef>
-          <a:effectRef idx="0">
-            <a:schemeClr val="accent1"/>
-          </a:effectRef>
-          <a:fontRef idx="minor">
-            <a:schemeClr val="tx1"/>
-          </a:fontRef>
-        </p:style>
-        <p:txBody>
-          <a:bodyPr rtlCol="0" anchor="ctr"/>
-          <a:lstStyle/>
-          <a:p>
-            <a:pPr algn="ctr"/>
-            <a:endParaRPr lang="ko-KR" altLang="en-US"/>
-          </a:p>
-        </p:txBody>
-      </p:sp>
-      <p:sp>
-        <p:nvSpPr>
-          <p:cNvPr id="11" name="사각형 설명선 10"/>
-          <p:cNvSpPr/>
-          <p:nvPr/>
-        </p:nvSpPr>
-        <p:spPr>
-          <a:xfrm>
-            <a:off x="60896" y="3430007"/>
-            <a:ext cx="1990824" cy="935097"/>
-          </a:xfrm>
-          <a:prstGeom prst="wedgeRectCallout">
-            <a:avLst>
-              <a:gd name="adj1" fmla="val 56656"/>
-              <a:gd name="adj2" fmla="val -45873"/>
-            </a:avLst>
-          </a:prstGeom>
-          <a:noFill/>
-          <a:ln>
-            <a:solidFill>
-              <a:schemeClr val="bg1">
-                <a:lumMod val="75000"/>
-              </a:schemeClr>
-            </a:solidFill>
-          </a:ln>
-        </p:spPr>
-        <p:style>
-          <a:lnRef idx="2">
-            <a:schemeClr val="accent1">
-              <a:shade val="50000"/>
-            </a:schemeClr>
-          </a:lnRef>
-          <a:fillRef idx="1">
-            <a:schemeClr val="accent1"/>
-          </a:fillRef>
-          <a:effectRef idx="0">
-            <a:schemeClr val="accent1"/>
-          </a:effectRef>
-          <a:fontRef idx="minor">
-            <a:schemeClr val="lt1"/>
-          </a:fontRef>
-        </p:style>
-        <p:txBody>
-          <a:bodyPr rtlCol="0" anchor="ctr"/>
-          <a:lstStyle/>
-          <a:p>
-            <a:r>
-              <a:rPr lang="ko-KR" altLang="en-US" sz="1000" dirty="0" smtClean="0">
-                <a:solidFill>
-                  <a:schemeClr val="tx1"/>
-                </a:solidFill>
-              </a:rPr>
-              <a:t>대상물체 감지를 위한 </a:t>
-            </a:r>
-            <a:r>
-              <a:rPr lang="ko-KR" altLang="en-US" sz="1000" dirty="0" err="1" smtClean="0">
-                <a:solidFill>
-                  <a:schemeClr val="tx1"/>
-                </a:solidFill>
-              </a:rPr>
-              <a:t>파라메터</a:t>
-            </a:r>
-            <a:endParaRPr lang="en-US" altLang="ko-KR" sz="1000" dirty="0" smtClean="0">
-              <a:solidFill>
-                <a:schemeClr val="tx1"/>
-              </a:solidFill>
-            </a:endParaRPr>
-          </a:p>
-          <a:p>
-            <a:r>
-              <a:rPr lang="en-US" altLang="ko-KR" sz="800" dirty="0" smtClean="0">
-                <a:solidFill>
-                  <a:schemeClr val="tx1"/>
-                </a:solidFill>
-              </a:rPr>
-              <a:t>POINT_DISTANCE_MAX: </a:t>
-            </a:r>
-            <a:r>
-              <a:rPr lang="ko-KR" altLang="en-US" sz="800" dirty="0" smtClean="0">
-                <a:solidFill>
-                  <a:schemeClr val="tx1"/>
-                </a:solidFill>
-              </a:rPr>
-              <a:t>대상물체를 구성하는 점들간의 거리</a:t>
-            </a:r>
-            <a:endParaRPr lang="en-US" altLang="ko-KR" sz="800" dirty="0" smtClean="0">
-              <a:solidFill>
-                <a:schemeClr val="tx1"/>
-              </a:solidFill>
-            </a:endParaRPr>
-          </a:p>
-          <a:p>
-            <a:r>
-              <a:rPr lang="en-US" altLang="ko-KR" sz="800" dirty="0" smtClean="0">
-                <a:solidFill>
-                  <a:schemeClr val="tx1"/>
-                </a:solidFill>
-              </a:rPr>
-              <a:t>DIAMETER: </a:t>
-            </a:r>
-            <a:r>
-              <a:rPr lang="ko-KR" altLang="en-US" sz="800" dirty="0" smtClean="0">
-                <a:solidFill>
-                  <a:schemeClr val="tx1"/>
-                </a:solidFill>
-              </a:rPr>
-              <a:t>대상물체의 지름 크기</a:t>
-            </a:r>
-            <a:endParaRPr lang="en-US" altLang="ko-KR" sz="800" dirty="0" smtClean="0">
-              <a:solidFill>
-                <a:schemeClr val="tx1"/>
-              </a:solidFill>
-            </a:endParaRPr>
-          </a:p>
-          <a:p>
-            <a:r>
-              <a:rPr lang="en-US" altLang="ko-KR" sz="800" dirty="0" smtClean="0">
-                <a:solidFill>
-                  <a:schemeClr val="tx1"/>
-                </a:solidFill>
-              </a:rPr>
-              <a:t>TIME_MIN: </a:t>
-            </a:r>
-            <a:r>
-              <a:rPr lang="ko-KR" altLang="en-US" sz="800" dirty="0" smtClean="0">
-                <a:solidFill>
-                  <a:schemeClr val="tx1"/>
-                </a:solidFill>
-              </a:rPr>
-              <a:t>대상물체 지속 감지 시간</a:t>
-            </a:r>
-            <a:endParaRPr lang="en-US" altLang="ko-KR" sz="800" dirty="0" smtClean="0">
-              <a:solidFill>
-                <a:schemeClr val="tx1"/>
-              </a:solidFill>
-            </a:endParaRPr>
-          </a:p>
-          <a:p>
-            <a:r>
-              <a:rPr lang="en-US" altLang="ko-KR" sz="800" dirty="0" smtClean="0">
-                <a:solidFill>
-                  <a:schemeClr val="tx1"/>
-                </a:solidFill>
-              </a:rPr>
-              <a:t>KEEP_TIME: </a:t>
-            </a:r>
-            <a:r>
-              <a:rPr lang="ko-KR" altLang="en-US" sz="800" dirty="0" smtClean="0">
-                <a:solidFill>
-                  <a:schemeClr val="tx1"/>
-                </a:solidFill>
-              </a:rPr>
-              <a:t>대상물체 감지 후 유지시간</a:t>
-            </a:r>
-            <a:endParaRPr lang="en-US" altLang="ko-KR" sz="800" dirty="0" smtClean="0">
-              <a:solidFill>
-                <a:schemeClr val="tx1"/>
-              </a:solidFill>
-            </a:endParaRPr>
-          </a:p>
-        </p:txBody>
-      </p:sp>
-      <p:sp>
-        <p:nvSpPr>
-          <p:cNvPr id="12" name="사각형 설명선 11"/>
-          <p:cNvSpPr/>
-          <p:nvPr/>
-        </p:nvSpPr>
-        <p:spPr>
-          <a:xfrm>
-            <a:off x="1717080" y="5062826"/>
-            <a:ext cx="1990824" cy="440844"/>
-          </a:xfrm>
-          <a:prstGeom prst="wedgeRectCallout">
-            <a:avLst>
-              <a:gd name="adj1" fmla="val -22629"/>
-              <a:gd name="adj2" fmla="val -305594"/>
-            </a:avLst>
-          </a:prstGeom>
-          <a:noFill/>
-          <a:ln>
-            <a:solidFill>
-              <a:schemeClr val="bg1">
-                <a:lumMod val="75000"/>
-              </a:schemeClr>
-            </a:solidFill>
-          </a:ln>
-        </p:spPr>
-        <p:style>
-          <a:lnRef idx="2">
-            <a:schemeClr val="accent1">
-              <a:shade val="50000"/>
-            </a:schemeClr>
-          </a:lnRef>
-          <a:fillRef idx="1">
-            <a:schemeClr val="accent1"/>
-          </a:fillRef>
-          <a:effectRef idx="0">
-            <a:schemeClr val="accent1"/>
-          </a:effectRef>
-          <a:fontRef idx="minor">
-            <a:schemeClr val="lt1"/>
-          </a:fontRef>
-        </p:style>
-        <p:txBody>
-          <a:bodyPr rtlCol="0" anchor="ctr"/>
-          <a:lstStyle/>
-          <a:p>
-            <a:r>
-              <a:rPr lang="en-US" altLang="ko-KR" sz="1000" dirty="0" smtClean="0">
-                <a:solidFill>
-                  <a:schemeClr val="tx1"/>
-                </a:solidFill>
-              </a:rPr>
-              <a:t>“No Marking” </a:t>
-            </a:r>
-            <a:r>
-              <a:rPr lang="ko-KR" altLang="en-US" sz="1000" dirty="0" smtClean="0">
-                <a:solidFill>
-                  <a:schemeClr val="tx1"/>
-                </a:solidFill>
-              </a:rPr>
-              <a:t>영역 동작을 위한 대상물체</a:t>
-            </a:r>
-            <a:r>
-              <a:rPr lang="ko-KR" altLang="en-US" sz="1000" dirty="0" smtClean="0">
-                <a:solidFill>
-                  <a:schemeClr val="tx1"/>
-                </a:solidFill>
-              </a:rPr>
-              <a:t>의 크기</a:t>
-            </a:r>
-            <a:endParaRPr lang="en-US" altLang="ko-KR" sz="800" dirty="0" smtClean="0">
-              <a:solidFill>
-                <a:schemeClr val="tx1"/>
-              </a:solidFill>
-            </a:endParaRPr>
-          </a:p>
-        </p:txBody>
-      </p:sp>
+      </p:pic>
     </p:spTree>
+    <p:extLst>
+      <p:ext uri="{BB962C8B-B14F-4D97-AF65-F5344CB8AC3E}">
+        <p14:creationId xmlns:p14="http://schemas.microsoft.com/office/powerpoint/2010/main" val="4051310703"/>
+      </p:ext>
+    </p:extLst>
   </p:cSld>
   <p:clrMapOvr>
     <a:masterClrMapping/>
@@ -4449,38 +4169,6 @@
           <a:chExt cx="0" cy="0"/>
         </a:xfrm>
       </p:grpSpPr>
-      <p:pic>
-        <p:nvPicPr>
-          <p:cNvPr id="2050" name="Picture 2"/>
-          <p:cNvPicPr>
-            <a:picLocks noChangeAspect="1" noChangeArrowheads="1"/>
-          </p:cNvPicPr>
-          <p:nvPr/>
-        </p:nvPicPr>
-        <p:blipFill>
-          <a:blip r:embed="rId2" cstate="print"/>
-          <a:srcRect/>
-          <a:stretch>
-            <a:fillRect/>
-          </a:stretch>
-        </p:blipFill>
-        <p:spPr bwMode="auto">
-          <a:xfrm>
-            <a:off x="2128838" y="2148433"/>
-            <a:ext cx="4886325" cy="3152775"/>
-          </a:xfrm>
-          <a:prstGeom prst="rect">
-            <a:avLst/>
-          </a:prstGeom>
-          <a:noFill/>
-          <a:ln w="9525">
-            <a:noFill/>
-            <a:miter lim="800000"/>
-            <a:headEnd/>
-            <a:tailEnd/>
-          </a:ln>
-        </p:spPr>
-      </p:pic>
       <p:sp>
         <p:nvSpPr>
           <p:cNvPr id="3" name="TextBox 2"/>
@@ -4490,7 +4178,7 @@
         <p:spPr>
           <a:xfrm>
             <a:off x="1547664" y="548680"/>
-            <a:ext cx="7128792" cy="1292662"/>
+            <a:ext cx="4536504" cy="553998"/>
           </a:xfrm>
           <a:prstGeom prst="rect">
             <a:avLst/>
@@ -4505,11 +4193,11 @@
           <a:p>
             <a:r>
               <a:rPr lang="en-US" altLang="ko-KR" dirty="0" smtClean="0"/>
-              <a:t>Zoom/Rotate/Mirror/Angle/Location </a:t>
+              <a:t>2D Laser Scanner </a:t>
             </a:r>
             <a:r>
               <a:rPr lang="ko-KR" altLang="en-US" dirty="0" smtClean="0"/>
-              <a:t>조정</a:t>
+              <a:t>상태 보기</a:t>
             </a:r>
             <a:r>
               <a:rPr lang="en-US" altLang="ko-KR" dirty="0" smtClean="0"/>
@@ -4533,591 +4221,89 @@
               <a:t> </a:t>
             </a:r>
             <a:r>
+              <a:rPr lang="en-US" altLang="ko-KR" sz="1200" dirty="0"/>
+              <a:t>2D Laser Scanner </a:t>
+            </a:r>
+            <a:r>
+              <a:rPr lang="ko-KR" altLang="en-US" sz="1200" dirty="0" smtClean="0"/>
+              <a:t>이미지를 </a:t>
+            </a:r>
+            <a:r>
               <a:rPr lang="ko-KR" altLang="en-US" sz="1200" dirty="0" smtClean="0">
                 <a:sym typeface="Wingdings" panose="05000000000000000000" pitchFamily="2" charset="2"/>
               </a:rPr>
-              <a:t>키보드 </a:t>
-            </a:r>
-            <a:r>
-              <a:rPr lang="en-US" altLang="ko-KR" sz="1200" dirty="0" smtClean="0">
-                <a:sym typeface="Wingdings" panose="05000000000000000000" pitchFamily="2" charset="2"/>
-              </a:rPr>
-              <a:t>F2 </a:t>
-            </a:r>
-            <a:r>
-              <a:rPr lang="ko-KR" altLang="en-US" sz="1200" dirty="0" smtClean="0">
-                <a:sym typeface="Wingdings" panose="05000000000000000000" pitchFamily="2" charset="2"/>
-              </a:rPr>
-              <a:t>키로 진입</a:t>
-            </a:r>
-            <a:endParaRPr lang="en-US" altLang="ko-KR" sz="1200" dirty="0" smtClean="0">
-              <a:sym typeface="Wingdings" panose="05000000000000000000" pitchFamily="2" charset="2"/>
-            </a:endParaRPr>
-          </a:p>
-          <a:p>
-            <a:r>
-              <a:rPr lang="en-US" altLang="ko-KR" sz="1200" dirty="0">
-                <a:sym typeface="Wingdings" panose="05000000000000000000" pitchFamily="2" charset="2"/>
-              </a:rPr>
-              <a:t> </a:t>
-            </a:r>
-            <a:r>
-              <a:rPr lang="en-US" altLang="ko-KR" sz="1200" dirty="0" smtClean="0">
-                <a:sym typeface="Wingdings" panose="05000000000000000000" pitchFamily="2" charset="2"/>
-              </a:rPr>
-              <a:t> </a:t>
-            </a:r>
-            <a:r>
-              <a:rPr lang="ko-KR" altLang="en-US" sz="1200" dirty="0" smtClean="0">
-                <a:sym typeface="Wingdings" panose="05000000000000000000" pitchFamily="2" charset="2"/>
-              </a:rPr>
-              <a:t>마우스</a:t>
-            </a:r>
-            <a:r>
-              <a:rPr lang="en-US" altLang="ko-KR" sz="1200" dirty="0" smtClean="0">
-                <a:sym typeface="Wingdings" panose="05000000000000000000" pitchFamily="2" charset="2"/>
-              </a:rPr>
-              <a:t> </a:t>
-            </a:r>
-            <a:r>
-              <a:rPr lang="ko-KR" altLang="en-US" sz="1200" dirty="0" err="1" smtClean="0">
-                <a:sym typeface="Wingdings" panose="05000000000000000000" pitchFamily="2" charset="2"/>
-              </a:rPr>
-              <a:t>휠을</a:t>
-            </a:r>
-            <a:r>
-              <a:rPr lang="ko-KR" altLang="en-US" sz="1200" dirty="0" smtClean="0">
-                <a:sym typeface="Wingdings" panose="05000000000000000000" pitchFamily="2" charset="2"/>
-              </a:rPr>
-              <a:t> 이용하여 전체 화면 확대 축소 가능</a:t>
-            </a:r>
-            <a:endParaRPr lang="en-US" altLang="ko-KR" sz="1200" dirty="0" smtClean="0">
-              <a:sym typeface="Wingdings" panose="05000000000000000000" pitchFamily="2" charset="2"/>
-            </a:endParaRPr>
-          </a:p>
-          <a:p>
-            <a:r>
-              <a:rPr lang="en-US" altLang="ko-KR" sz="1200" dirty="0">
-                <a:sym typeface="Wingdings" panose="05000000000000000000" pitchFamily="2" charset="2"/>
-              </a:rPr>
-              <a:t> </a:t>
-            </a:r>
-            <a:r>
-              <a:rPr lang="en-US" altLang="ko-KR" sz="1200" dirty="0" smtClean="0">
-                <a:sym typeface="Wingdings" panose="05000000000000000000" pitchFamily="2" charset="2"/>
-              </a:rPr>
-              <a:t> </a:t>
-            </a:r>
-            <a:r>
-              <a:rPr lang="ko-KR" altLang="en-US" sz="1200" dirty="0" smtClean="0">
-                <a:sym typeface="Wingdings" panose="05000000000000000000" pitchFamily="2" charset="2"/>
-              </a:rPr>
-              <a:t>마우스 왼쪽 버튼 </a:t>
-            </a:r>
-            <a:r>
-              <a:rPr lang="ko-KR" altLang="en-US" sz="1200" dirty="0" smtClean="0">
-                <a:sym typeface="Wingdings" panose="05000000000000000000" pitchFamily="2" charset="2"/>
-              </a:rPr>
-              <a:t>드래그를 </a:t>
-            </a:r>
-            <a:r>
-              <a:rPr lang="ko-KR" altLang="en-US" sz="1200" dirty="0" smtClean="0">
-                <a:sym typeface="Wingdings" panose="05000000000000000000" pitchFamily="2" charset="2"/>
-              </a:rPr>
-              <a:t>이용하여 화면 위치 이동 </a:t>
-            </a:r>
-            <a:r>
-              <a:rPr lang="ko-KR" altLang="en-US" sz="1200" dirty="0" smtClean="0">
-                <a:sym typeface="Wingdings" panose="05000000000000000000" pitchFamily="2" charset="2"/>
-              </a:rPr>
-              <a:t>가능</a:t>
-            </a:r>
-            <a:endParaRPr lang="en-US" altLang="ko-KR" sz="1200" dirty="0" smtClean="0">
-              <a:sym typeface="Wingdings" panose="05000000000000000000" pitchFamily="2" charset="2"/>
-            </a:endParaRPr>
-          </a:p>
-          <a:p>
-            <a:r>
-              <a:rPr lang="en-US" altLang="ko-KR" sz="1200" dirty="0">
-                <a:sym typeface="Wingdings" panose="05000000000000000000" pitchFamily="2" charset="2"/>
-              </a:rPr>
-              <a:t> </a:t>
-            </a:r>
-            <a:r>
-              <a:rPr lang="en-US" altLang="ko-KR" sz="1200" dirty="0" smtClean="0">
-                <a:sym typeface="Wingdings" panose="05000000000000000000" pitchFamily="2" charset="2"/>
-              </a:rPr>
-              <a:t> </a:t>
-            </a:r>
-            <a:r>
-              <a:rPr lang="ko-KR" altLang="en-US" sz="1200" dirty="0" smtClean="0">
-                <a:sym typeface="Wingdings" panose="05000000000000000000" pitchFamily="2" charset="2"/>
-              </a:rPr>
-              <a:t>화면 미세회전 기능은 화면에 표시되는 점들을 회전하는 기능이므로 </a:t>
-            </a:r>
-            <a:r>
-              <a:rPr lang="en-US" altLang="ko-KR" sz="1200" dirty="0" smtClean="0">
-                <a:sym typeface="Wingdings" panose="05000000000000000000" pitchFamily="2" charset="2"/>
-              </a:rPr>
-              <a:t>2D Laser Scanner</a:t>
-            </a:r>
-            <a:r>
-              <a:rPr lang="ko-KR" altLang="en-US" sz="1200" dirty="0" smtClean="0">
-                <a:sym typeface="Wingdings" panose="05000000000000000000" pitchFamily="2" charset="2"/>
-              </a:rPr>
-              <a:t>의 물리적인 각도 조정을 우선적으로 하여야 함</a:t>
-            </a:r>
-            <a:endParaRPr lang="en-US" altLang="ko-KR" sz="1200" dirty="0">
-              <a:sym typeface="Wingdings" panose="05000000000000000000" pitchFamily="2" charset="2"/>
-            </a:endParaRPr>
-          </a:p>
-        </p:txBody>
-      </p:sp>
-      <p:sp>
-        <p:nvSpPr>
-          <p:cNvPr id="4" name="사각형 설명선 3"/>
-          <p:cNvSpPr/>
+              <a:t>마우스 왼쪽 버튼 클릭</a:t>
+            </a:r>
+            <a:endParaRPr lang="ko-KR" altLang="en-US" sz="1200" dirty="0"/>
+          </a:p>
+        </p:txBody>
+      </p:sp>
+      <p:pic>
+        <p:nvPicPr>
+          <p:cNvPr id="5" name="그림 4"/>
+          <p:cNvPicPr>
+            <a:picLocks noChangeAspect="1"/>
+          </p:cNvPicPr>
           <p:nvPr/>
-        </p:nvSpPr>
+        </p:nvPicPr>
+        <p:blipFill>
+          <a:blip r:embed="rId2">
+            <a:extLst>
+              <a:ext uri="{28A0092B-C50C-407E-A947-70E740481C1C}">
+                <a14:useLocalDpi xmlns:a14="http://schemas.microsoft.com/office/drawing/2010/main" val="0"/>
+              </a:ext>
+            </a:extLst>
+          </a:blip>
+          <a:stretch>
+            <a:fillRect/>
+          </a:stretch>
+        </p:blipFill>
         <p:spPr>
           <a:xfrm>
-            <a:off x="103651" y="2719335"/>
-            <a:ext cx="1656184" cy="268939"/>
+            <a:off x="467544" y="1340768"/>
+            <a:ext cx="5423154" cy="3356943"/>
           </a:xfrm>
-          <a:prstGeom prst="wedgeRectCallout">
-            <a:avLst>
-              <a:gd name="adj1" fmla="val 74237"/>
-              <a:gd name="adj2" fmla="val 53156"/>
-            </a:avLst>
+          <a:prstGeom prst="rect">
+            <a:avLst/>
           </a:prstGeom>
-          <a:noFill/>
-          <a:ln>
-            <a:solidFill>
-              <a:schemeClr val="bg1">
-                <a:lumMod val="75000"/>
-              </a:schemeClr>
-            </a:solidFill>
-          </a:ln>
         </p:spPr>
-        <p:style>
-          <a:lnRef idx="2">
-            <a:schemeClr val="accent1">
-              <a:shade val="50000"/>
-            </a:schemeClr>
-          </a:lnRef>
-          <a:fillRef idx="1">
-            <a:schemeClr val="accent1"/>
-          </a:fillRef>
-          <a:effectRef idx="0">
-            <a:schemeClr val="accent1"/>
-          </a:effectRef>
-          <a:fontRef idx="minor">
-            <a:schemeClr val="lt1"/>
-          </a:fontRef>
-        </p:style>
-        <p:txBody>
-          <a:bodyPr rtlCol="0" anchor="ctr"/>
-          <a:lstStyle/>
-          <a:p>
-            <a:r>
-              <a:rPr lang="ko-KR" altLang="en-US" sz="1000" dirty="0" smtClean="0">
-                <a:solidFill>
-                  <a:schemeClr val="tx1"/>
-                </a:solidFill>
-              </a:rPr>
-              <a:t>화면 </a:t>
-            </a:r>
-            <a:r>
-              <a:rPr lang="ko-KR" altLang="en-US" sz="1000" dirty="0" smtClean="0">
-                <a:solidFill>
-                  <a:schemeClr val="tx1"/>
-                </a:solidFill>
-              </a:rPr>
-              <a:t>확대</a:t>
-            </a:r>
-            <a:r>
-              <a:rPr lang="en-US" altLang="ko-KR" sz="1000" dirty="0" smtClean="0">
-                <a:solidFill>
-                  <a:schemeClr val="tx1"/>
-                </a:solidFill>
-              </a:rPr>
-              <a:t>/</a:t>
-            </a:r>
-            <a:r>
-              <a:rPr lang="ko-KR" altLang="en-US" sz="1000" dirty="0" smtClean="0">
-                <a:solidFill>
-                  <a:schemeClr val="tx1"/>
-                </a:solidFill>
-              </a:rPr>
-              <a:t>축소</a:t>
-            </a:r>
-            <a:endParaRPr lang="en-US" altLang="ko-KR" sz="1000" dirty="0" smtClean="0">
-              <a:solidFill>
-                <a:schemeClr val="tx1"/>
-              </a:solidFill>
-            </a:endParaRPr>
-          </a:p>
-        </p:txBody>
-      </p:sp>
-      <p:sp>
-        <p:nvSpPr>
-          <p:cNvPr id="5" name="사각형 설명선 4"/>
-          <p:cNvSpPr/>
+      </p:pic>
+      <p:pic>
+        <p:nvPicPr>
+          <p:cNvPr id="6" name="그림 5"/>
+          <p:cNvPicPr>
+            <a:picLocks noChangeAspect="1"/>
+          </p:cNvPicPr>
           <p:nvPr/>
-        </p:nvSpPr>
+        </p:nvPicPr>
+        <p:blipFill>
+          <a:blip r:embed="rId3">
+            <a:extLst>
+              <a:ext uri="{28A0092B-C50C-407E-A947-70E740481C1C}">
+                <a14:useLocalDpi xmlns:a14="http://schemas.microsoft.com/office/drawing/2010/main" val="0"/>
+              </a:ext>
+            </a:extLst>
+          </a:blip>
+          <a:stretch>
+            <a:fillRect/>
+          </a:stretch>
+        </p:blipFill>
         <p:spPr>
           <a:xfrm>
-            <a:off x="107504" y="3220764"/>
-            <a:ext cx="1656184" cy="268939"/>
+            <a:off x="3253302" y="3096393"/>
+            <a:ext cx="5423154" cy="3356943"/>
           </a:xfrm>
-          <a:prstGeom prst="wedgeRectCallout">
-            <a:avLst>
-              <a:gd name="adj1" fmla="val 73982"/>
-              <a:gd name="adj2" fmla="val 35841"/>
-            </a:avLst>
+          <a:prstGeom prst="rect">
+            <a:avLst/>
           </a:prstGeom>
-          <a:noFill/>
-          <a:ln>
-            <a:solidFill>
-              <a:schemeClr val="bg1">
-                <a:lumMod val="75000"/>
-              </a:schemeClr>
-            </a:solidFill>
-          </a:ln>
         </p:spPr>
-        <p:style>
-          <a:lnRef idx="2">
-            <a:schemeClr val="accent1">
-              <a:shade val="50000"/>
-            </a:schemeClr>
-          </a:lnRef>
-          <a:fillRef idx="1">
-            <a:schemeClr val="accent1"/>
-          </a:fillRef>
-          <a:effectRef idx="0">
-            <a:schemeClr val="accent1"/>
-          </a:effectRef>
-          <a:fontRef idx="minor">
-            <a:schemeClr val="lt1"/>
-          </a:fontRef>
-        </p:style>
-        <p:txBody>
-          <a:bodyPr rtlCol="0" anchor="ctr"/>
-          <a:lstStyle/>
-          <a:p>
-            <a:r>
-              <a:rPr lang="ko-KR" altLang="en-US" sz="1000" dirty="0" smtClean="0">
-                <a:solidFill>
-                  <a:schemeClr val="tx1"/>
-                </a:solidFill>
-              </a:rPr>
-              <a:t>화면 회전</a:t>
-            </a:r>
-            <a:r>
-              <a:rPr lang="en-US" altLang="ko-KR" sz="1000" dirty="0" smtClean="0">
-                <a:solidFill>
-                  <a:schemeClr val="tx1"/>
-                </a:solidFill>
-              </a:rPr>
-              <a:t>(90°)</a:t>
-            </a:r>
-          </a:p>
-        </p:txBody>
-      </p:sp>
-      <p:sp>
-        <p:nvSpPr>
-          <p:cNvPr id="6" name="사각형 설명선 5"/>
-          <p:cNvSpPr/>
-          <p:nvPr/>
-        </p:nvSpPr>
-        <p:spPr>
-          <a:xfrm>
-            <a:off x="107504" y="3527889"/>
-            <a:ext cx="1656184" cy="268939"/>
-          </a:xfrm>
-          <a:prstGeom prst="wedgeRectCallout">
-            <a:avLst>
-              <a:gd name="adj1" fmla="val 73982"/>
-              <a:gd name="adj2" fmla="val 31118"/>
-            </a:avLst>
-          </a:prstGeom>
-          <a:noFill/>
-          <a:ln>
-            <a:solidFill>
-              <a:schemeClr val="bg1">
-                <a:lumMod val="75000"/>
-              </a:schemeClr>
-            </a:solidFill>
-          </a:ln>
-        </p:spPr>
-        <p:style>
-          <a:lnRef idx="2">
-            <a:schemeClr val="accent1">
-              <a:shade val="50000"/>
-            </a:schemeClr>
-          </a:lnRef>
-          <a:fillRef idx="1">
-            <a:schemeClr val="accent1"/>
-          </a:fillRef>
-          <a:effectRef idx="0">
-            <a:schemeClr val="accent1"/>
-          </a:effectRef>
-          <a:fontRef idx="minor">
-            <a:schemeClr val="lt1"/>
-          </a:fontRef>
-        </p:style>
-        <p:txBody>
-          <a:bodyPr rtlCol="0" anchor="ctr"/>
-          <a:lstStyle/>
-          <a:p>
-            <a:r>
-              <a:rPr lang="ko-KR" altLang="en-US" sz="1000" dirty="0" smtClean="0">
-                <a:solidFill>
-                  <a:schemeClr val="tx1"/>
-                </a:solidFill>
-              </a:rPr>
-              <a:t>화면 상하 반전</a:t>
-            </a:r>
-            <a:endParaRPr lang="en-US" altLang="ko-KR" sz="1000" dirty="0" smtClean="0">
-              <a:solidFill>
-                <a:schemeClr val="tx1"/>
-              </a:solidFill>
-            </a:endParaRPr>
-          </a:p>
-        </p:txBody>
-      </p:sp>
-      <p:sp>
-        <p:nvSpPr>
-          <p:cNvPr id="7" name="사각형 설명선 6"/>
-          <p:cNvSpPr/>
-          <p:nvPr/>
-        </p:nvSpPr>
-        <p:spPr>
-          <a:xfrm>
-            <a:off x="107504" y="3887929"/>
-            <a:ext cx="1656184" cy="412955"/>
-          </a:xfrm>
-          <a:prstGeom prst="wedgeRectCallout">
-            <a:avLst>
-              <a:gd name="adj1" fmla="val 74237"/>
-              <a:gd name="adj2" fmla="val -8827"/>
-            </a:avLst>
-          </a:prstGeom>
-          <a:noFill/>
-          <a:ln>
-            <a:solidFill>
-              <a:schemeClr val="bg1">
-                <a:lumMod val="75000"/>
-              </a:schemeClr>
-            </a:solidFill>
-          </a:ln>
-        </p:spPr>
-        <p:style>
-          <a:lnRef idx="2">
-            <a:schemeClr val="accent1">
-              <a:shade val="50000"/>
-            </a:schemeClr>
-          </a:lnRef>
-          <a:fillRef idx="1">
-            <a:schemeClr val="accent1"/>
-          </a:fillRef>
-          <a:effectRef idx="0">
-            <a:schemeClr val="accent1"/>
-          </a:effectRef>
-          <a:fontRef idx="minor">
-            <a:schemeClr val="lt1"/>
-          </a:fontRef>
-        </p:style>
-        <p:txBody>
-          <a:bodyPr rtlCol="0" anchor="ctr"/>
-          <a:lstStyle/>
-          <a:p>
-            <a:r>
-              <a:rPr lang="ko-KR" altLang="en-US" sz="1000" dirty="0" smtClean="0">
-                <a:solidFill>
-                  <a:schemeClr val="tx1"/>
-                </a:solidFill>
-              </a:rPr>
-              <a:t>화면 </a:t>
-            </a:r>
-            <a:r>
-              <a:rPr lang="ko-KR" altLang="en-US" sz="1000" dirty="0" smtClean="0">
-                <a:solidFill>
-                  <a:schemeClr val="tx1"/>
-                </a:solidFill>
-              </a:rPr>
-              <a:t>미세회전</a:t>
-            </a:r>
-            <a:r>
-              <a:rPr lang="en-US" altLang="ko-KR" sz="1000" dirty="0" smtClean="0">
-                <a:solidFill>
-                  <a:schemeClr val="tx1"/>
-                </a:solidFill>
-              </a:rPr>
-              <a:t>:</a:t>
-            </a:r>
-            <a:r>
-              <a:rPr lang="ko-KR" altLang="en-US" sz="1000" dirty="0" smtClean="0">
-                <a:solidFill>
-                  <a:schemeClr val="tx1"/>
-                </a:solidFill>
-              </a:rPr>
-              <a:t> </a:t>
-            </a:r>
-            <a:r>
-              <a:rPr lang="en-US" altLang="ko-KR" sz="1000" dirty="0">
-                <a:solidFill>
-                  <a:schemeClr val="tx1"/>
-                </a:solidFill>
-              </a:rPr>
-              <a:t>0.1°</a:t>
-            </a:r>
-            <a:r>
-              <a:rPr lang="ko-KR" altLang="en-US" sz="1000" dirty="0" smtClean="0">
-                <a:solidFill>
-                  <a:schemeClr val="tx1"/>
-                </a:solidFill>
-              </a:rPr>
-              <a:t>단위</a:t>
-            </a:r>
-            <a:r>
-              <a:rPr lang="en-US" altLang="ko-KR" sz="1000" dirty="0" smtClean="0">
-                <a:solidFill>
-                  <a:schemeClr val="tx1"/>
-                </a:solidFill>
-              </a:rPr>
-              <a:t>(</a:t>
-            </a:r>
-            <a:r>
-              <a:rPr lang="ko-KR" altLang="en-US" sz="1000" dirty="0" smtClean="0">
-                <a:solidFill>
-                  <a:schemeClr val="tx1"/>
-                </a:solidFill>
-              </a:rPr>
-              <a:t>최대 </a:t>
-            </a:r>
-            <a:r>
-              <a:rPr lang="en-US" altLang="ko-KR" sz="1000" dirty="0" smtClean="0">
-                <a:solidFill>
-                  <a:schemeClr val="tx1"/>
-                </a:solidFill>
-              </a:rPr>
-              <a:t>10°~ </a:t>
-            </a:r>
-            <a:r>
-              <a:rPr lang="ko-KR" altLang="en-US" sz="1000" dirty="0" smtClean="0">
-                <a:solidFill>
-                  <a:schemeClr val="tx1"/>
-                </a:solidFill>
-              </a:rPr>
-              <a:t>최소 </a:t>
-            </a:r>
-            <a:r>
-              <a:rPr lang="en-US" altLang="ko-KR" sz="1000" dirty="0" smtClean="0">
-                <a:solidFill>
-                  <a:schemeClr val="tx1"/>
-                </a:solidFill>
-              </a:rPr>
-              <a:t>-</a:t>
-            </a:r>
-            <a:r>
-              <a:rPr lang="en-US" altLang="ko-KR" sz="1000" dirty="0" smtClean="0">
-                <a:solidFill>
-                  <a:schemeClr val="tx1"/>
-                </a:solidFill>
-              </a:rPr>
-              <a:t>10</a:t>
-            </a:r>
-            <a:r>
-              <a:rPr lang="en-US" altLang="ko-KR" sz="1000" dirty="0">
-                <a:solidFill>
-                  <a:schemeClr val="tx1"/>
-                </a:solidFill>
-              </a:rPr>
-              <a:t>°</a:t>
-            </a:r>
-            <a:r>
-              <a:rPr lang="en-US" altLang="ko-KR" sz="1000" dirty="0" smtClean="0">
-                <a:solidFill>
-                  <a:schemeClr val="tx1"/>
-                </a:solidFill>
-              </a:rPr>
-              <a:t>)</a:t>
-            </a:r>
-          </a:p>
-        </p:txBody>
-      </p:sp>
-      <p:sp>
-        <p:nvSpPr>
-          <p:cNvPr id="8" name="사각형 설명선 7"/>
-          <p:cNvSpPr/>
-          <p:nvPr/>
-        </p:nvSpPr>
-        <p:spPr>
-          <a:xfrm>
-            <a:off x="107504" y="4372892"/>
-            <a:ext cx="1656184" cy="412955"/>
-          </a:xfrm>
-          <a:prstGeom prst="wedgeRectCallout">
-            <a:avLst>
-              <a:gd name="adj1" fmla="val 73945"/>
-              <a:gd name="adj2" fmla="val -15856"/>
-            </a:avLst>
-          </a:prstGeom>
-          <a:noFill/>
-          <a:ln>
-            <a:solidFill>
-              <a:schemeClr val="bg1">
-                <a:lumMod val="75000"/>
-              </a:schemeClr>
-            </a:solidFill>
-          </a:ln>
-        </p:spPr>
-        <p:style>
-          <a:lnRef idx="2">
-            <a:schemeClr val="accent1">
-              <a:shade val="50000"/>
-            </a:schemeClr>
-          </a:lnRef>
-          <a:fillRef idx="1">
-            <a:schemeClr val="accent1"/>
-          </a:fillRef>
-          <a:effectRef idx="0">
-            <a:schemeClr val="accent1"/>
-          </a:effectRef>
-          <a:fontRef idx="minor">
-            <a:schemeClr val="lt1"/>
-          </a:fontRef>
-        </p:style>
-        <p:txBody>
-          <a:bodyPr rtlCol="0" anchor="ctr"/>
-          <a:lstStyle/>
-          <a:p>
-            <a:r>
-              <a:rPr lang="ko-KR" altLang="en-US" sz="1000" dirty="0" smtClean="0">
-                <a:solidFill>
-                  <a:schemeClr val="tx1"/>
-                </a:solidFill>
-              </a:rPr>
-              <a:t>화면 위치 </a:t>
-            </a:r>
-            <a:r>
-              <a:rPr lang="ko-KR" altLang="en-US" sz="1000" dirty="0" smtClean="0">
-                <a:solidFill>
-                  <a:schemeClr val="tx1"/>
-                </a:solidFill>
-              </a:rPr>
-              <a:t>및 미세회전 초기화</a:t>
-            </a:r>
-            <a:endParaRPr lang="en-US" altLang="ko-KR" sz="1000" dirty="0" smtClean="0">
-              <a:solidFill>
-                <a:schemeClr val="tx1"/>
-              </a:solidFill>
-            </a:endParaRPr>
-          </a:p>
-        </p:txBody>
-      </p:sp>
+      </p:pic>
     </p:spTree>
+    <p:extLst>
+      <p:ext uri="{BB962C8B-B14F-4D97-AF65-F5344CB8AC3E}">
+        <p14:creationId xmlns:p14="http://schemas.microsoft.com/office/powerpoint/2010/main" val="2679844732"/>
+      </p:ext>
+    </p:extLst>
   </p:cSld>
   <p:clrMapOvr>
     <a:masterClrMapping/>
@@ -5149,38 +4335,6 @@
           <a:chExt cx="0" cy="0"/>
         </a:xfrm>
       </p:grpSpPr>
-      <p:pic>
-        <p:nvPicPr>
-          <p:cNvPr id="4098" name="Picture 2"/>
-          <p:cNvPicPr>
-            <a:picLocks noChangeAspect="1" noChangeArrowheads="1"/>
-          </p:cNvPicPr>
-          <p:nvPr/>
-        </p:nvPicPr>
-        <p:blipFill>
-          <a:blip r:embed="rId2" cstate="print"/>
-          <a:srcRect/>
-          <a:stretch>
-            <a:fillRect/>
-          </a:stretch>
-        </p:blipFill>
-        <p:spPr bwMode="auto">
-          <a:xfrm>
-            <a:off x="2123728" y="2508473"/>
-            <a:ext cx="4886325" cy="3152775"/>
-          </a:xfrm>
-          <a:prstGeom prst="rect">
-            <a:avLst/>
-          </a:prstGeom>
-          <a:noFill/>
-          <a:ln w="9525">
-            <a:noFill/>
-            <a:miter lim="800000"/>
-            <a:headEnd/>
-            <a:tailEnd/>
-          </a:ln>
-        </p:spPr>
-      </p:pic>
       <p:sp>
         <p:nvSpPr>
           <p:cNvPr id="3" name="TextBox 2"/>
@@ -5190,7 +4344,7 @@
         <p:spPr>
           <a:xfrm>
             <a:off x="1547664" y="548680"/>
-            <a:ext cx="7056784" cy="1846659"/>
+            <a:ext cx="6840760" cy="738664"/>
           </a:xfrm>
           <a:prstGeom prst="rect">
             <a:avLst/>
@@ -5205,19 +4359,11 @@
           <a:p>
             <a:r>
               <a:rPr lang="en-US" altLang="ko-KR" dirty="0" smtClean="0"/>
-              <a:t>Regions </a:t>
+              <a:t>System password </a:t>
             </a:r>
             <a:r>
               <a:rPr lang="ko-KR" altLang="en-US" dirty="0" smtClean="0"/>
-              <a:t>설정</a:t>
-            </a:r>
-            <a:r>
-              <a:rPr lang="en-US" altLang="ko-KR" dirty="0" smtClean="0"/>
-              <a:t> </a:t>
-            </a:r>
-            <a:r>
-              <a:rPr lang="ko-KR" altLang="en-US" dirty="0" smtClean="0"/>
-              <a:t>화면</a:t>
+              <a:t>입력 화면</a:t>
             </a:r>
             <a:endParaRPr lang="en-US" altLang="ko-KR" dirty="0" smtClean="0"/>
           </a:p>
@@ -5242,247 +4388,84 @@
               <a:rPr lang="en-US" altLang="ko-KR" sz="1200" dirty="0" smtClean="0">
                 <a:sym typeface="Wingdings" panose="05000000000000000000" pitchFamily="2" charset="2"/>
               </a:rPr>
-              <a:t>F3 </a:t>
+              <a:t>F1, F2. F3, F6</a:t>
             </a:r>
             <a:r>
               <a:rPr lang="ko-KR" altLang="en-US" sz="1200" dirty="0" smtClean="0">
                 <a:sym typeface="Wingdings" panose="05000000000000000000" pitchFamily="2" charset="2"/>
               </a:rPr>
-              <a:t>키로 진입</a:t>
-            </a:r>
-            <a:endParaRPr lang="en-US" altLang="ko-KR" sz="1200" dirty="0" smtClean="0">
-              <a:sym typeface="Wingdings" panose="05000000000000000000" pitchFamily="2" charset="2"/>
-            </a:endParaRPr>
-          </a:p>
-          <a:p>
+              <a:t>키 등등에 의한 </a:t>
+            </a:r>
+            <a:r>
+              <a:rPr lang="ko-KR" altLang="en-US" sz="1200" dirty="0" smtClean="0">
+                <a:sym typeface="Wingdings" panose="05000000000000000000" pitchFamily="2" charset="2"/>
+              </a:rPr>
+              <a:t>각종 </a:t>
+            </a:r>
+            <a:r>
+              <a:rPr lang="ko-KR" altLang="en-US" sz="1200" dirty="0" smtClean="0">
+                <a:sym typeface="Wingdings" panose="05000000000000000000" pitchFamily="2" charset="2"/>
+              </a:rPr>
+              <a:t>설정 화면 진입 시 표시되고 </a:t>
+            </a:r>
             <a:r>
               <a:rPr lang="en-US" altLang="ko-KR" sz="1200" dirty="0" smtClean="0">
                 <a:sym typeface="Wingdings" panose="05000000000000000000" pitchFamily="2" charset="2"/>
               </a:rPr>
-              <a:t>  Fault/Alert </a:t>
+              <a:t>System </a:t>
             </a:r>
             <a:r>
               <a:rPr lang="ko-KR" altLang="en-US" sz="1200" dirty="0" smtClean="0">
                 <a:sym typeface="Wingdings" panose="05000000000000000000" pitchFamily="2" charset="2"/>
               </a:rPr>
-              <a:t>등의 영역들에 대한 위치 설정</a:t>
-            </a:r>
-            <a:endParaRPr lang="en-US" altLang="ko-KR" sz="1200" dirty="0" smtClean="0">
-              <a:sym typeface="Wingdings" panose="05000000000000000000" pitchFamily="2" charset="2"/>
-            </a:endParaRPr>
-          </a:p>
-          <a:p>
-            <a:r>
-              <a:rPr lang="en-US" altLang="ko-KR" sz="1200" dirty="0">
-                <a:sym typeface="Wingdings" panose="05000000000000000000" pitchFamily="2" charset="2"/>
-              </a:rPr>
-              <a:t> </a:t>
+              <a:t>설정 화면의 </a:t>
             </a:r>
             <a:r>
               <a:rPr lang="en-US" altLang="ko-KR" sz="1200" dirty="0" smtClean="0">
                 <a:sym typeface="Wingdings" panose="05000000000000000000" pitchFamily="2" charset="2"/>
               </a:rPr>
-              <a:t> </a:t>
+              <a:t>SYSTEM_PASSWORD(4-digits)</a:t>
             </a:r>
             <a:r>
               <a:rPr lang="ko-KR" altLang="en-US" sz="1200" dirty="0" smtClean="0">
                 <a:sym typeface="Wingdings" panose="05000000000000000000" pitchFamily="2" charset="2"/>
               </a:rPr>
-              <a:t>각 영역에 해당하는 릴레이의 인덱스 설정</a:t>
-            </a:r>
-            <a:endParaRPr lang="en-US" altLang="ko-KR" sz="1200" dirty="0" smtClean="0">
-              <a:sym typeface="Wingdings" panose="05000000000000000000" pitchFamily="2" charset="2"/>
-            </a:endParaRPr>
-          </a:p>
-          <a:p>
-            <a:r>
-              <a:rPr lang="en-US" altLang="ko-KR" sz="1200" dirty="0">
-                <a:sym typeface="Wingdings" panose="05000000000000000000" pitchFamily="2" charset="2"/>
-              </a:rPr>
-              <a:t> </a:t>
-            </a:r>
-            <a:r>
-              <a:rPr lang="en-US" altLang="ko-KR" sz="1200" dirty="0" smtClean="0">
-                <a:sym typeface="Wingdings" panose="05000000000000000000" pitchFamily="2" charset="2"/>
-              </a:rPr>
-              <a:t> </a:t>
-            </a:r>
-            <a:r>
-              <a:rPr lang="ko-KR" altLang="en-US" sz="1200" dirty="0" smtClean="0">
-                <a:sym typeface="Wingdings" panose="05000000000000000000" pitchFamily="2" charset="2"/>
-              </a:rPr>
-              <a:t>각 릴레이의 이름 </a:t>
-            </a:r>
-            <a:r>
-              <a:rPr lang="ko-KR" altLang="en-US" sz="1200" dirty="0" smtClean="0">
-                <a:sym typeface="Wingdings" panose="05000000000000000000" pitchFamily="2" charset="2"/>
-              </a:rPr>
-              <a:t>설정</a:t>
-            </a:r>
-            <a:endParaRPr lang="en-US" altLang="ko-KR" sz="1200" dirty="0" smtClean="0">
-              <a:sym typeface="Wingdings" panose="05000000000000000000" pitchFamily="2" charset="2"/>
-            </a:endParaRPr>
-          </a:p>
-          <a:p>
-            <a:r>
-              <a:rPr lang="en-US" altLang="ko-KR" sz="1200" dirty="0">
-                <a:sym typeface="Wingdings" panose="05000000000000000000" pitchFamily="2" charset="2"/>
-              </a:rPr>
-              <a:t> </a:t>
-            </a:r>
-            <a:r>
-              <a:rPr lang="en-US" altLang="ko-KR" sz="1200" dirty="0" smtClean="0">
-                <a:sym typeface="Wingdings" panose="05000000000000000000" pitchFamily="2" charset="2"/>
-              </a:rPr>
-              <a:t> </a:t>
-            </a:r>
-            <a:r>
-              <a:rPr lang="ko-KR" altLang="en-US" sz="1200" dirty="0" smtClean="0">
-                <a:sym typeface="Wingdings" panose="05000000000000000000" pitchFamily="2" charset="2"/>
-              </a:rPr>
-              <a:t>영역 이름 중 </a:t>
-            </a:r>
-            <a:r>
-              <a:rPr lang="en-US" altLang="ko-KR" sz="1200" dirty="0" smtClean="0">
-                <a:sym typeface="Wingdings" panose="05000000000000000000" pitchFamily="2" charset="2"/>
-              </a:rPr>
-              <a:t>“No Marking”</a:t>
-            </a:r>
-            <a:r>
-              <a:rPr lang="ko-KR" altLang="en-US" sz="1200" dirty="0" smtClean="0">
-                <a:sym typeface="Wingdings" panose="05000000000000000000" pitchFamily="2" charset="2"/>
-              </a:rPr>
-              <a:t>은 </a:t>
-            </a:r>
-            <a:r>
-              <a:rPr lang="en-US" altLang="ko-KR" sz="1200" dirty="0" smtClean="0">
-                <a:sym typeface="Wingdings" panose="05000000000000000000" pitchFamily="2" charset="2"/>
-              </a:rPr>
-              <a:t>“No mark big”</a:t>
-            </a:r>
-            <a:r>
-              <a:rPr lang="ko-KR" altLang="en-US" sz="1200" dirty="0" smtClean="0">
-                <a:sym typeface="Wingdings" panose="05000000000000000000" pitchFamily="2" charset="2"/>
-              </a:rPr>
-              <a:t>이 </a:t>
-            </a:r>
-            <a:r>
-              <a:rPr lang="en-US" altLang="ko-KR" sz="1200" dirty="0" smtClean="0">
-                <a:sym typeface="Wingdings" panose="05000000000000000000" pitchFamily="2" charset="2"/>
-              </a:rPr>
-              <a:t>“true”</a:t>
-            </a:r>
-            <a:r>
-              <a:rPr lang="ko-KR" altLang="en-US" sz="1200" dirty="0" smtClean="0">
-                <a:sym typeface="Wingdings" panose="05000000000000000000" pitchFamily="2" charset="2"/>
-              </a:rPr>
-              <a:t>로</a:t>
-            </a:r>
-            <a:r>
-              <a:rPr lang="en-US" altLang="ko-KR" sz="1200" dirty="0" smtClean="0">
-                <a:sym typeface="Wingdings" panose="05000000000000000000" pitchFamily="2" charset="2"/>
-              </a:rPr>
-              <a:t> </a:t>
-            </a:r>
-            <a:r>
-              <a:rPr lang="ko-KR" altLang="en-US" sz="1200" dirty="0" smtClean="0">
-                <a:sym typeface="Wingdings" panose="05000000000000000000" pitchFamily="2" charset="2"/>
-              </a:rPr>
-              <a:t>되어 있는 상태에서 이용되며 해당 영역에 </a:t>
-            </a:r>
-            <a:r>
-              <a:rPr lang="ko-KR" altLang="en-US" sz="1200" dirty="0">
-                <a:sym typeface="Wingdings" panose="05000000000000000000" pitchFamily="2" charset="2"/>
-              </a:rPr>
-              <a:t>일정 크기 </a:t>
-            </a:r>
-            <a:r>
-              <a:rPr lang="ko-KR" altLang="en-US" sz="1200" dirty="0" smtClean="0">
-                <a:sym typeface="Wingdings" panose="05000000000000000000" pitchFamily="2" charset="2"/>
-              </a:rPr>
-              <a:t>이상의 대상물체가 감지되면 화면의 감지된 대상물체에 원형 표</a:t>
-            </a:r>
-            <a:r>
-              <a:rPr lang="ko-KR" altLang="en-US" sz="1200" dirty="0" smtClean="0">
-                <a:sym typeface="Wingdings" panose="05000000000000000000" pitchFamily="2" charset="2"/>
-              </a:rPr>
-              <a:t>시</a:t>
-            </a:r>
-            <a:r>
-              <a:rPr lang="ko-KR" altLang="en-US" sz="1200" dirty="0" smtClean="0">
-                <a:sym typeface="Wingdings" panose="05000000000000000000" pitchFamily="2" charset="2"/>
-              </a:rPr>
-              <a:t>를 하지 않음</a:t>
-            </a:r>
-            <a:endParaRPr lang="en-US" altLang="ko-KR" sz="1200" dirty="0" smtClean="0">
-              <a:sym typeface="Wingdings" panose="05000000000000000000" pitchFamily="2" charset="2"/>
-            </a:endParaRPr>
-          </a:p>
-          <a:p>
-            <a:r>
-              <a:rPr lang="en-US" altLang="ko-KR" sz="1200" dirty="0">
-                <a:sym typeface="Wingdings" panose="05000000000000000000" pitchFamily="2" charset="2"/>
-              </a:rPr>
-              <a:t> </a:t>
-            </a:r>
-            <a:r>
-              <a:rPr lang="en-US" altLang="ko-KR" sz="1200" dirty="0" smtClean="0">
-                <a:sym typeface="Wingdings" panose="05000000000000000000" pitchFamily="2" charset="2"/>
-              </a:rPr>
-              <a:t> </a:t>
-            </a:r>
-            <a:r>
-              <a:rPr lang="ko-KR" altLang="en-US" sz="1200" dirty="0" smtClean="0">
-                <a:sym typeface="Wingdings" panose="05000000000000000000" pitchFamily="2" charset="2"/>
-              </a:rPr>
-              <a:t>이 대상물체의 크기는 </a:t>
-            </a:r>
-            <a:r>
-              <a:rPr lang="en-US" altLang="ko-KR" sz="1200" dirty="0" smtClean="0">
-                <a:sym typeface="Wingdings" panose="05000000000000000000" pitchFamily="2" charset="2"/>
-              </a:rPr>
-              <a:t>System </a:t>
-            </a:r>
-            <a:r>
-              <a:rPr lang="ko-KR" altLang="en-US" sz="1200" dirty="0" smtClean="0">
-                <a:sym typeface="Wingdings" panose="05000000000000000000" pitchFamily="2" charset="2"/>
-              </a:rPr>
-              <a:t>설정 화면의 </a:t>
-            </a:r>
-            <a:r>
-              <a:rPr lang="en-US" altLang="ko-KR" sz="1200" dirty="0" smtClean="0">
-                <a:sym typeface="Wingdings" panose="05000000000000000000" pitchFamily="2" charset="2"/>
-              </a:rPr>
-              <a:t>ROI_OBJECT_NO_MARK_BIG_DIAMETER_MIN </a:t>
-            </a:r>
-            <a:r>
-              <a:rPr lang="ko-KR" altLang="en-US" sz="1200" dirty="0" smtClean="0">
-                <a:sym typeface="Wingdings" panose="05000000000000000000" pitchFamily="2" charset="2"/>
-              </a:rPr>
-              <a:t>값을 이용함</a:t>
-            </a:r>
-            <a:r>
-              <a:rPr lang="en-US" altLang="ko-KR" sz="1200" dirty="0" smtClean="0">
-                <a:sym typeface="Wingdings" panose="05000000000000000000" pitchFamily="2" charset="2"/>
-              </a:rPr>
-              <a:t>(</a:t>
-            </a:r>
-            <a:r>
-              <a:rPr lang="ko-KR" altLang="en-US" sz="1200" dirty="0" smtClean="0">
-                <a:sym typeface="Wingdings" panose="05000000000000000000" pitchFamily="2" charset="2"/>
-              </a:rPr>
-              <a:t>기본값 </a:t>
-            </a:r>
-            <a:r>
-              <a:rPr lang="en-US" altLang="ko-KR" sz="1200" dirty="0" smtClean="0">
-                <a:sym typeface="Wingdings" panose="05000000000000000000" pitchFamily="2" charset="2"/>
-              </a:rPr>
-              <a:t>2meter)</a:t>
+              <a:t>를 입력</a:t>
             </a:r>
             <a:endParaRPr lang="ko-KR" altLang="en-US" sz="1200" dirty="0"/>
           </a:p>
         </p:txBody>
       </p:sp>
+      <p:pic>
+        <p:nvPicPr>
+          <p:cNvPr id="2" name="그림 1"/>
+          <p:cNvPicPr>
+            <a:picLocks noChangeAspect="1"/>
+          </p:cNvPicPr>
+          <p:nvPr/>
+        </p:nvPicPr>
+        <p:blipFill>
+          <a:blip r:embed="rId2">
+            <a:extLst>
+              <a:ext uri="{28A0092B-C50C-407E-A947-70E740481C1C}">
+                <a14:useLocalDpi xmlns:a14="http://schemas.microsoft.com/office/drawing/2010/main" val="0"/>
+              </a:ext>
+            </a:extLst>
+          </a:blip>
+          <a:stretch>
+            <a:fillRect/>
+          </a:stretch>
+        </p:blipFill>
+        <p:spPr>
+          <a:xfrm>
+            <a:off x="1860423" y="1750529"/>
+            <a:ext cx="5423154" cy="3356943"/>
+          </a:xfrm>
+          <a:prstGeom prst="rect">
+            <a:avLst/>
+          </a:prstGeom>
+        </p:spPr>
+      </p:pic>
     </p:spTree>
   </p:cSld>
   <p:clrMapOvr>
@@ -5517,34 +4500,32 @@
       </p:grpSpPr>
       <p:pic>
         <p:nvPicPr>
-          <p:cNvPr id="5122" name="Picture 2"/>
+          <p:cNvPr id="14" name="그림 13"/>
           <p:cNvPicPr>
-            <a:picLocks noChangeAspect="1" noChangeArrowheads="1"/>
+            <a:picLocks noChangeAspect="1"/>
           </p:cNvPicPr>
           <p:nvPr/>
         </p:nvPicPr>
         <p:blipFill>
-          <a:blip r:embed="rId2" cstate="print"/>
-          <a:srcRect/>
+          <a:blip r:embed="rId2">
+            <a:extLst>
+              <a:ext uri="{28A0092B-C50C-407E-A947-70E740481C1C}">
+                <a14:useLocalDpi xmlns:a14="http://schemas.microsoft.com/office/drawing/2010/main" val="0"/>
+              </a:ext>
+            </a:extLst>
+          </a:blip>
           <a:stretch>
             <a:fillRect/>
           </a:stretch>
         </p:blipFill>
-        <p:spPr bwMode="auto">
+        <p:spPr>
           <a:xfrm>
-            <a:off x="2128838" y="1852613"/>
-            <a:ext cx="4886325" cy="3152775"/>
+            <a:off x="1861200" y="1749600"/>
+            <a:ext cx="5399227" cy="3342132"/>
           </a:xfrm>
           <a:prstGeom prst="rect">
             <a:avLst/>
           </a:prstGeom>
-          <a:noFill/>
-          <a:ln w="9525">
-            <a:noFill/>
-            <a:miter lim="800000"/>
-            <a:headEnd/>
-            <a:tailEnd/>
-          </a:ln>
         </p:spPr>
       </p:pic>
       <p:sp>
@@ -5571,11 +4552,11 @@
           <a:p>
             <a:r>
               <a:rPr lang="en-US" altLang="ko-KR" dirty="0" smtClean="0"/>
-              <a:t>2D Laser Scanner </a:t>
+              <a:t>System </a:t>
             </a:r>
             <a:r>
               <a:rPr lang="ko-KR" altLang="en-US" dirty="0" smtClean="0"/>
-              <a:t>연결 설정</a:t>
+              <a:t>설정</a:t>
             </a:r>
             <a:r>
               <a:rPr lang="en-US" altLang="ko-KR" dirty="0" smtClean="0"/>
@@ -5608,7 +4589,7 @@
               <a:rPr lang="en-US" altLang="ko-KR" sz="1200" dirty="0" smtClean="0">
                 <a:sym typeface="Wingdings" panose="05000000000000000000" pitchFamily="2" charset="2"/>
               </a:rPr>
-              <a:t>F6 </a:t>
+              <a:t>F1 </a:t>
             </a:r>
             <a:r>
               <a:rPr lang="ko-KR" altLang="en-US" sz="1200" dirty="0" smtClean="0">
@@ -5628,13 +4609,13 @@
         </p:nvSpPr>
         <p:spPr>
           <a:xfrm>
-            <a:off x="107504" y="4365104"/>
-            <a:ext cx="1656184" cy="360040"/>
+            <a:off x="60896" y="1252368"/>
+            <a:ext cx="1846808" cy="392552"/>
           </a:xfrm>
           <a:prstGeom prst="wedgeRectCallout">
             <a:avLst>
-              <a:gd name="adj1" fmla="val 71809"/>
-              <a:gd name="adj2" fmla="val 24500"/>
+              <a:gd name="adj1" fmla="val 54683"/>
+              <a:gd name="adj2" fmla="val 198064"/>
             </a:avLst>
           </a:prstGeom>
           <a:noFill/>
@@ -5666,21 +4647,79 @@
           <a:bodyPr rtlCol="0" anchor="ctr"/>
           <a:lstStyle/>
           <a:p>
+            <a:pPr algn="ctr"/>
+            <a:r>
+              <a:rPr lang="ko-KR" altLang="en-US" sz="1000" dirty="0" smtClean="0">
+                <a:solidFill>
+                  <a:schemeClr val="tx1"/>
+                </a:solidFill>
+              </a:rPr>
+              <a:t>각종 설정 화면 진입 시 입력해야 하는 </a:t>
+            </a:r>
             <a:r>
               <a:rPr lang="en-US" altLang="ko-KR" sz="1000" dirty="0" smtClean="0">
                 <a:solidFill>
                   <a:schemeClr val="tx1"/>
                 </a:solidFill>
               </a:rPr>
-              <a:t>2D Laser Scanner</a:t>
-            </a:r>
+              <a:t>System password</a:t>
+            </a:r>
+          </a:p>
+        </p:txBody>
+      </p:sp>
+      <p:sp>
+        <p:nvSpPr>
+          <p:cNvPr id="5" name="사각형 설명선 4"/>
+          <p:cNvSpPr/>
+          <p:nvPr/>
+        </p:nvSpPr>
+        <p:spPr>
+          <a:xfrm>
+            <a:off x="61610" y="2204864"/>
+            <a:ext cx="1486054" cy="268939"/>
+          </a:xfrm>
+          <a:prstGeom prst="wedgeRectCallout">
+            <a:avLst>
+              <a:gd name="adj1" fmla="val 80822"/>
+              <a:gd name="adj2" fmla="val 19707"/>
+            </a:avLst>
+          </a:prstGeom>
+          <a:noFill/>
+          <a:ln>
+            <a:solidFill>
+              <a:schemeClr val="bg1">
+                <a:lumMod val="75000"/>
+              </a:schemeClr>
+            </a:solidFill>
+          </a:ln>
+        </p:spPr>
+        <p:style>
+          <a:lnRef idx="2">
+            <a:schemeClr val="accent1">
+              <a:shade val="50000"/>
+            </a:schemeClr>
+          </a:lnRef>
+          <a:fillRef idx="1">
+            <a:schemeClr val="accent1"/>
+          </a:fillRef>
+          <a:effectRef idx="0">
+            <a:schemeClr val="accent1"/>
+          </a:effectRef>
+          <a:fontRef idx="minor">
+            <a:schemeClr val="lt1"/>
+          </a:fontRef>
+        </p:style>
+        <p:txBody>
+          <a:bodyPr rtlCol="0" anchor="ctr"/>
+          <a:lstStyle/>
+          <a:p>
             <a:r>
               <a:rPr lang="ko-KR" altLang="en-US" sz="1000" dirty="0" smtClean="0">
                 <a:solidFill>
                   <a:schemeClr val="tx1"/>
                 </a:solidFill>
               </a:rPr>
-              <a:t>의 </a:t>
+              <a:t>초당 </a:t>
             </a:r>
             <a:r>
               <a:rPr lang="en-US" altLang="ko-KR" sz="1000" dirty="0" smtClean="0">
@@ -5688,7 +4727,7 @@
                   <a:schemeClr val="tx1"/>
                 </a:solidFill>
               </a:rPr>
-              <a:t>Serial Number </a:t>
+              <a:t>Scan </a:t>
             </a:r>
             <a:r>
               <a:rPr lang="ko-KR" altLang="en-US" sz="1000" dirty="0" smtClean="0">
@@ -5696,7 +4735,7 @@
                   <a:schemeClr val="tx1"/>
                 </a:solidFill>
               </a:rPr>
-              <a:t>입력</a:t>
+              <a:t>동작 회수</a:t>
             </a:r>
             <a:endParaRPr lang="en-US" altLang="ko-KR" sz="1000" dirty="0" smtClean="0">
               <a:solidFill>
@@ -5706,7 +4745,491 @@
           </a:p>
         </p:txBody>
       </p:sp>
+      <p:sp>
+        <p:nvSpPr>
+          <p:cNvPr id="6" name="사각형 설명선 5"/>
+          <p:cNvSpPr/>
+          <p:nvPr/>
+        </p:nvSpPr>
+        <p:spPr>
+          <a:xfrm>
+            <a:off x="61610" y="2564904"/>
+            <a:ext cx="1486054" cy="359033"/>
+          </a:xfrm>
+          <a:prstGeom prst="wedgeRectCallout">
+            <a:avLst>
+              <a:gd name="adj1" fmla="val 78967"/>
+              <a:gd name="adj2" fmla="val -17180"/>
+            </a:avLst>
+          </a:prstGeom>
+          <a:noFill/>
+          <a:ln>
+            <a:solidFill>
+              <a:schemeClr val="bg1">
+                <a:lumMod val="75000"/>
+              </a:schemeClr>
+            </a:solidFill>
+          </a:ln>
+        </p:spPr>
+        <p:style>
+          <a:lnRef idx="2">
+            <a:schemeClr val="accent1">
+              <a:shade val="50000"/>
+            </a:schemeClr>
+          </a:lnRef>
+          <a:fillRef idx="1">
+            <a:schemeClr val="accent1"/>
+          </a:fillRef>
+          <a:effectRef idx="0">
+            <a:schemeClr val="accent1"/>
+          </a:effectRef>
+          <a:fontRef idx="minor">
+            <a:schemeClr val="lt1"/>
+          </a:fontRef>
+        </p:style>
+        <p:txBody>
+          <a:bodyPr rtlCol="0" anchor="ctr"/>
+          <a:lstStyle/>
+          <a:p>
+            <a:r>
+              <a:rPr lang="en-US" altLang="ko-KR" sz="1000" dirty="0" smtClean="0">
+                <a:solidFill>
+                  <a:schemeClr val="tx1"/>
+                </a:solidFill>
+              </a:rPr>
+              <a:t>Scan data </a:t>
+            </a:r>
+            <a:r>
+              <a:rPr lang="ko-KR" altLang="en-US" sz="1000" dirty="0" smtClean="0">
+                <a:solidFill>
+                  <a:schemeClr val="tx1"/>
+                </a:solidFill>
+              </a:rPr>
+              <a:t>상시</a:t>
+            </a:r>
+            <a:r>
+              <a:rPr lang="en-US" altLang="ko-KR" sz="1000" dirty="0" smtClean="0">
+                <a:solidFill>
+                  <a:schemeClr val="tx1"/>
+                </a:solidFill>
+              </a:rPr>
+              <a:t>/</a:t>
+            </a:r>
+            <a:r>
+              <a:rPr lang="ko-KR" altLang="en-US" sz="1000" dirty="0" smtClean="0">
+                <a:solidFill>
+                  <a:schemeClr val="tx1"/>
+                </a:solidFill>
+              </a:rPr>
+              <a:t>이벤트</a:t>
+            </a:r>
+            <a:r>
+              <a:rPr lang="en-US" altLang="ko-KR" sz="1000" dirty="0" smtClean="0">
+                <a:solidFill>
+                  <a:schemeClr val="tx1"/>
+                </a:solidFill>
+              </a:rPr>
+              <a:t> </a:t>
+            </a:r>
+            <a:r>
+              <a:rPr lang="ko-KR" altLang="en-US" sz="1000" dirty="0" smtClean="0">
+                <a:solidFill>
+                  <a:schemeClr val="tx1"/>
+                </a:solidFill>
+              </a:rPr>
+              <a:t>저장 시간</a:t>
+            </a:r>
+            <a:endParaRPr lang="en-US" altLang="ko-KR" sz="1000" dirty="0" smtClean="0">
+              <a:solidFill>
+                <a:schemeClr val="tx1"/>
+              </a:solidFill>
+            </a:endParaRPr>
+          </a:p>
+        </p:txBody>
+      </p:sp>
+      <p:sp>
+        <p:nvSpPr>
+          <p:cNvPr id="7" name="왼쪽 중괄호 6"/>
+          <p:cNvSpPr/>
+          <p:nvPr/>
+        </p:nvSpPr>
+        <p:spPr>
+          <a:xfrm>
+            <a:off x="1979712" y="2507185"/>
+            <a:ext cx="45719" cy="353690"/>
+          </a:xfrm>
+          <a:prstGeom prst="leftBrace">
+            <a:avLst/>
+          </a:prstGeom>
+        </p:spPr>
+        <p:style>
+          <a:lnRef idx="1">
+            <a:schemeClr val="accent1"/>
+          </a:lnRef>
+          <a:fillRef idx="0">
+            <a:schemeClr val="accent1"/>
+          </a:fillRef>
+          <a:effectRef idx="0">
+            <a:schemeClr val="accent1"/>
+          </a:effectRef>
+          <a:fontRef idx="minor">
+            <a:schemeClr val="tx1"/>
+          </a:fontRef>
+        </p:style>
+        <p:txBody>
+          <a:bodyPr rtlCol="0" anchor="ctr"/>
+          <a:lstStyle/>
+          <a:p>
+            <a:pPr algn="ctr"/>
+            <a:endParaRPr lang="ko-KR" altLang="en-US"/>
+          </a:p>
+        </p:txBody>
+      </p:sp>
+      <p:sp>
+        <p:nvSpPr>
+          <p:cNvPr id="9" name="사각형 설명선 8"/>
+          <p:cNvSpPr/>
+          <p:nvPr/>
+        </p:nvSpPr>
+        <p:spPr>
+          <a:xfrm>
+            <a:off x="60896" y="3016045"/>
+            <a:ext cx="1486768" cy="268939"/>
+          </a:xfrm>
+          <a:prstGeom prst="wedgeRectCallout">
+            <a:avLst>
+              <a:gd name="adj1" fmla="val 79381"/>
+              <a:gd name="adj2" fmla="val -65294"/>
+            </a:avLst>
+          </a:prstGeom>
+          <a:noFill/>
+          <a:ln>
+            <a:solidFill>
+              <a:schemeClr val="bg1">
+                <a:lumMod val="75000"/>
+              </a:schemeClr>
+            </a:solidFill>
+          </a:ln>
+        </p:spPr>
+        <p:style>
+          <a:lnRef idx="2">
+            <a:schemeClr val="accent1">
+              <a:shade val="50000"/>
+            </a:schemeClr>
+          </a:lnRef>
+          <a:fillRef idx="1">
+            <a:schemeClr val="accent1"/>
+          </a:fillRef>
+          <a:effectRef idx="0">
+            <a:schemeClr val="accent1"/>
+          </a:effectRef>
+          <a:fontRef idx="minor">
+            <a:schemeClr val="lt1"/>
+          </a:fontRef>
+        </p:style>
+        <p:txBody>
+          <a:bodyPr rtlCol="0" anchor="ctr"/>
+          <a:lstStyle/>
+          <a:p>
+            <a:r>
+              <a:rPr lang="ko-KR" altLang="en-US" sz="1000" dirty="0" smtClean="0">
+                <a:solidFill>
+                  <a:schemeClr val="tx1"/>
+                </a:solidFill>
+              </a:rPr>
+              <a:t>릴레이 모듈 연결 포트</a:t>
+            </a:r>
+            <a:endParaRPr lang="en-US" altLang="ko-KR" sz="1000" dirty="0" smtClean="0">
+              <a:solidFill>
+                <a:schemeClr val="tx1"/>
+              </a:solidFill>
+            </a:endParaRPr>
+          </a:p>
+        </p:txBody>
+      </p:sp>
+      <p:sp>
+        <p:nvSpPr>
+          <p:cNvPr id="12" name="사각형 설명선 11"/>
+          <p:cNvSpPr/>
+          <p:nvPr/>
+        </p:nvSpPr>
+        <p:spPr>
+          <a:xfrm>
+            <a:off x="60896" y="4718729"/>
+            <a:ext cx="1702792" cy="440844"/>
+          </a:xfrm>
+          <a:prstGeom prst="wedgeRectCallout">
+            <a:avLst>
+              <a:gd name="adj1" fmla="val 62814"/>
+              <a:gd name="adj2" fmla="val -244678"/>
+            </a:avLst>
+          </a:prstGeom>
+          <a:noFill/>
+          <a:ln>
+            <a:solidFill>
+              <a:schemeClr val="bg1">
+                <a:lumMod val="75000"/>
+              </a:schemeClr>
+            </a:solidFill>
+          </a:ln>
+        </p:spPr>
+        <p:style>
+          <a:lnRef idx="2">
+            <a:schemeClr val="accent1">
+              <a:shade val="50000"/>
+            </a:schemeClr>
+          </a:lnRef>
+          <a:fillRef idx="1">
+            <a:schemeClr val="accent1"/>
+          </a:fillRef>
+          <a:effectRef idx="0">
+            <a:schemeClr val="accent1"/>
+          </a:effectRef>
+          <a:fontRef idx="minor">
+            <a:schemeClr val="lt1"/>
+          </a:fontRef>
+        </p:style>
+        <p:txBody>
+          <a:bodyPr rtlCol="0" anchor="ctr"/>
+          <a:lstStyle/>
+          <a:p>
+            <a:r>
+              <a:rPr lang="en-US" altLang="ko-KR" sz="1000" dirty="0" smtClean="0">
+                <a:solidFill>
+                  <a:schemeClr val="tx1"/>
+                </a:solidFill>
+              </a:rPr>
+              <a:t>“No Marking” </a:t>
+            </a:r>
+            <a:r>
+              <a:rPr lang="ko-KR" altLang="en-US" sz="1000" dirty="0" smtClean="0">
+                <a:solidFill>
+                  <a:schemeClr val="tx1"/>
+                </a:solidFill>
+              </a:rPr>
+              <a:t>영역 동작을 위한 대상물체의 크기</a:t>
+            </a:r>
+            <a:endParaRPr lang="en-US" altLang="ko-KR" sz="800" dirty="0" smtClean="0">
+              <a:solidFill>
+                <a:schemeClr val="tx1"/>
+              </a:solidFill>
+            </a:endParaRPr>
+          </a:p>
+        </p:txBody>
+      </p:sp>
+      <p:sp>
+        <p:nvSpPr>
+          <p:cNvPr id="11" name="사각형 설명선 10"/>
+          <p:cNvSpPr/>
+          <p:nvPr/>
+        </p:nvSpPr>
+        <p:spPr>
+          <a:xfrm>
+            <a:off x="76002" y="3377092"/>
+            <a:ext cx="1687686" cy="1276044"/>
+          </a:xfrm>
+          <a:prstGeom prst="wedgeRectCallout">
+            <a:avLst>
+              <a:gd name="adj1" fmla="val 62889"/>
+              <a:gd name="adj2" fmla="val -41685"/>
+            </a:avLst>
+          </a:prstGeom>
+          <a:noFill/>
+          <a:ln>
+            <a:solidFill>
+              <a:schemeClr val="bg1">
+                <a:lumMod val="75000"/>
+              </a:schemeClr>
+            </a:solidFill>
+          </a:ln>
+        </p:spPr>
+        <p:style>
+          <a:lnRef idx="2">
+            <a:schemeClr val="accent1">
+              <a:shade val="50000"/>
+            </a:schemeClr>
+          </a:lnRef>
+          <a:fillRef idx="1">
+            <a:schemeClr val="accent1"/>
+          </a:fillRef>
+          <a:effectRef idx="0">
+            <a:schemeClr val="accent1"/>
+          </a:effectRef>
+          <a:fontRef idx="minor">
+            <a:schemeClr val="lt1"/>
+          </a:fontRef>
+        </p:style>
+        <p:txBody>
+          <a:bodyPr rtlCol="0" anchor="ctr"/>
+          <a:lstStyle/>
+          <a:p>
+            <a:r>
+              <a:rPr lang="ko-KR" altLang="en-US" sz="1000" dirty="0" smtClean="0">
+                <a:solidFill>
+                  <a:schemeClr val="tx1"/>
+                </a:solidFill>
+              </a:rPr>
+              <a:t>대상물체 감지를 위한</a:t>
+            </a:r>
+            <a:endParaRPr lang="en-US" altLang="ko-KR" sz="1000" dirty="0" smtClean="0">
+              <a:solidFill>
+                <a:schemeClr val="tx1"/>
+              </a:solidFill>
+            </a:endParaRPr>
+          </a:p>
+          <a:p>
+            <a:r>
+              <a:rPr lang="ko-KR" altLang="en-US" sz="1000" dirty="0" err="1" smtClean="0">
+                <a:solidFill>
+                  <a:schemeClr val="tx1"/>
+                </a:solidFill>
+              </a:rPr>
+              <a:t>파라메터</a:t>
+            </a:r>
+            <a:endParaRPr lang="en-US" altLang="ko-KR" sz="1000" dirty="0" smtClean="0">
+              <a:solidFill>
+                <a:schemeClr val="tx1"/>
+              </a:solidFill>
+            </a:endParaRPr>
+          </a:p>
+          <a:p>
+            <a:r>
+              <a:rPr lang="en-US" altLang="ko-KR" sz="800" dirty="0" smtClean="0">
+                <a:solidFill>
+                  <a:schemeClr val="tx1"/>
+                </a:solidFill>
+              </a:rPr>
+              <a:t>POINT_DISTANCE_MAX:</a:t>
+            </a:r>
+            <a:r>
+              <a:rPr lang="ko-KR" altLang="en-US" sz="800" dirty="0" smtClean="0">
+                <a:solidFill>
+                  <a:schemeClr val="tx1"/>
+                </a:solidFill>
+              </a:rPr>
+              <a:t>대상물체를 구성하는 점들간의 거리</a:t>
+            </a:r>
+            <a:endParaRPr lang="en-US" altLang="ko-KR" sz="800" dirty="0" smtClean="0">
+              <a:solidFill>
+                <a:schemeClr val="tx1"/>
+              </a:solidFill>
+            </a:endParaRPr>
+          </a:p>
+          <a:p>
+            <a:r>
+              <a:rPr lang="en-US" altLang="ko-KR" sz="800" dirty="0" smtClean="0">
+                <a:solidFill>
+                  <a:schemeClr val="tx1"/>
+                </a:solidFill>
+              </a:rPr>
+              <a:t>DIAMETER:</a:t>
+            </a:r>
+            <a:r>
+              <a:rPr lang="ko-KR" altLang="en-US" sz="800" dirty="0" smtClean="0">
+                <a:solidFill>
+                  <a:schemeClr val="tx1"/>
+                </a:solidFill>
+              </a:rPr>
+              <a:t>대상물체의 지름 크기</a:t>
+            </a:r>
+            <a:endParaRPr lang="en-US" altLang="ko-KR" sz="800" dirty="0" smtClean="0">
+              <a:solidFill>
+                <a:schemeClr val="tx1"/>
+              </a:solidFill>
+            </a:endParaRPr>
+          </a:p>
+          <a:p>
+            <a:r>
+              <a:rPr lang="en-US" altLang="ko-KR" sz="800" dirty="0" smtClean="0">
+                <a:solidFill>
+                  <a:schemeClr val="tx1"/>
+                </a:solidFill>
+              </a:rPr>
+              <a:t>TIME_MIN:</a:t>
+            </a:r>
+            <a:r>
+              <a:rPr lang="ko-KR" altLang="en-US" sz="800" dirty="0" smtClean="0">
+                <a:solidFill>
+                  <a:schemeClr val="tx1"/>
+                </a:solidFill>
+              </a:rPr>
+              <a:t>대상물체 지속 감지 시간</a:t>
+            </a:r>
+            <a:endParaRPr lang="en-US" altLang="ko-KR" sz="800" dirty="0" smtClean="0">
+              <a:solidFill>
+                <a:schemeClr val="tx1"/>
+              </a:solidFill>
+            </a:endParaRPr>
+          </a:p>
+          <a:p>
+            <a:r>
+              <a:rPr lang="en-US" altLang="ko-KR" sz="800" dirty="0" smtClean="0">
+                <a:solidFill>
+                  <a:schemeClr val="tx1"/>
+                </a:solidFill>
+              </a:rPr>
+              <a:t>KEEP_TIME:</a:t>
+            </a:r>
+            <a:r>
+              <a:rPr lang="ko-KR" altLang="en-US" sz="800" dirty="0" smtClean="0">
+                <a:solidFill>
+                  <a:schemeClr val="tx1"/>
+                </a:solidFill>
+              </a:rPr>
+              <a:t>대상물체 감지 후 유지시간</a:t>
+            </a:r>
+            <a:endParaRPr lang="en-US" altLang="ko-KR" sz="800" dirty="0" smtClean="0">
+              <a:solidFill>
+                <a:schemeClr val="tx1"/>
+              </a:solidFill>
+            </a:endParaRPr>
+          </a:p>
+        </p:txBody>
+      </p:sp>
+      <p:sp>
+        <p:nvSpPr>
+          <p:cNvPr id="10" name="왼쪽 중괄호 9"/>
+          <p:cNvSpPr/>
+          <p:nvPr/>
+        </p:nvSpPr>
+        <p:spPr>
+          <a:xfrm>
+            <a:off x="1979712" y="3233535"/>
+            <a:ext cx="45719" cy="493023"/>
+          </a:xfrm>
+          <a:prstGeom prst="leftBrace">
+            <a:avLst/>
+          </a:prstGeom>
+        </p:spPr>
+        <p:style>
+          <a:lnRef idx="1">
+            <a:schemeClr val="accent1"/>
+          </a:lnRef>
+          <a:fillRef idx="0">
+            <a:schemeClr val="accent1"/>
+          </a:fillRef>
+          <a:effectRef idx="0">
+            <a:schemeClr val="accent1"/>
+          </a:effectRef>
+          <a:fontRef idx="minor">
+            <a:schemeClr val="tx1"/>
+          </a:fontRef>
+        </p:style>
+        <p:txBody>
+          <a:bodyPr rtlCol="0" anchor="ctr"/>
+          <a:lstStyle/>
+          <a:p>
+            <a:pPr algn="ctr"/>
+            <a:endParaRPr lang="ko-KR" altLang="en-US"/>
+          </a:p>
+        </p:txBody>
+      </p:sp>
     </p:spTree>
+    <p:extLst>
+      <p:ext uri="{BB962C8B-B14F-4D97-AF65-F5344CB8AC3E}">
+        <p14:creationId xmlns:p14="http://schemas.microsoft.com/office/powerpoint/2010/main" val="2758314978"/>
+      </p:ext>
+    </p:extLst>
   </p:cSld>
   <p:clrMapOvr>
     <a:masterClrMapping/>
@@ -5740,34 +5263,32 @@
       </p:grpSpPr>
       <p:pic>
         <p:nvPicPr>
-          <p:cNvPr id="1026" name="Picture 2"/>
+          <p:cNvPr id="9" name="그림 8"/>
           <p:cNvPicPr>
-            <a:picLocks noChangeAspect="1" noChangeArrowheads="1"/>
+            <a:picLocks noChangeAspect="1"/>
           </p:cNvPicPr>
           <p:nvPr/>
         </p:nvPicPr>
         <p:blipFill>
-          <a:blip r:embed="rId2" cstate="print"/>
-          <a:srcRect/>
+          <a:blip r:embed="rId2">
+            <a:extLst>
+              <a:ext uri="{28A0092B-C50C-407E-A947-70E740481C1C}">
+                <a14:useLocalDpi xmlns:a14="http://schemas.microsoft.com/office/drawing/2010/main" val="0"/>
+              </a:ext>
+            </a:extLst>
+          </a:blip>
           <a:stretch>
             <a:fillRect/>
           </a:stretch>
         </p:blipFill>
-        <p:spPr bwMode="auto">
+        <p:spPr>
           <a:xfrm>
-            <a:off x="3995936" y="2276872"/>
-            <a:ext cx="4886325" cy="3152775"/>
+            <a:off x="1861200" y="2088281"/>
+            <a:ext cx="5423154" cy="3356943"/>
           </a:xfrm>
           <a:prstGeom prst="rect">
             <a:avLst/>
           </a:prstGeom>
-          <a:noFill/>
-          <a:ln w="9525">
-            <a:noFill/>
-            <a:miter lim="800000"/>
-            <a:headEnd/>
-            <a:tailEnd/>
-          </a:ln>
         </p:spPr>
       </p:pic>
       <p:sp>
@@ -5779,7 +5300,7 @@
         <p:spPr>
           <a:xfrm>
             <a:off x="1547664" y="548680"/>
-            <a:ext cx="4536504" cy="553998"/>
+            <a:ext cx="7128792" cy="1477328"/>
           </a:xfrm>
           <a:prstGeom prst="rect">
             <a:avLst/>
@@ -5794,11 +5315,11 @@
           <a:p>
             <a:r>
               <a:rPr lang="en-US" altLang="ko-KR" dirty="0" smtClean="0"/>
-              <a:t>2D Laser Scanner </a:t>
+              <a:t>Zoom/Rotate/Mirror/Angle/Location </a:t>
             </a:r>
             <a:r>
               <a:rPr lang="ko-KR" altLang="en-US" dirty="0" smtClean="0"/>
-              <a:t>상태 보기</a:t>
+              <a:t>조정</a:t>
             </a:r>
             <a:r>
               <a:rPr lang="en-US" altLang="ko-KR" dirty="0" smtClean="0"/>
@@ -5822,55 +5343,575 @@
               <a:t> </a:t>
             </a:r>
             <a:r>
+              <a:rPr lang="ko-KR" altLang="en-US" sz="1200" dirty="0" smtClean="0">
+                <a:sym typeface="Wingdings" panose="05000000000000000000" pitchFamily="2" charset="2"/>
+              </a:rPr>
+              <a:t>키보드 </a:t>
+            </a:r>
+            <a:r>
+              <a:rPr lang="en-US" altLang="ko-KR" sz="1200" dirty="0" smtClean="0">
+                <a:sym typeface="Wingdings" panose="05000000000000000000" pitchFamily="2" charset="2"/>
+              </a:rPr>
+              <a:t>F2 </a:t>
+            </a:r>
+            <a:r>
+              <a:rPr lang="ko-KR" altLang="en-US" sz="1200" dirty="0" smtClean="0">
+                <a:sym typeface="Wingdings" panose="05000000000000000000" pitchFamily="2" charset="2"/>
+              </a:rPr>
+              <a:t>키로 진입</a:t>
+            </a:r>
+            <a:endParaRPr lang="en-US" altLang="ko-KR" sz="1200" dirty="0" smtClean="0">
+              <a:sym typeface="Wingdings" panose="05000000000000000000" pitchFamily="2" charset="2"/>
+            </a:endParaRPr>
+          </a:p>
+          <a:p>
+            <a:r>
+              <a:rPr lang="en-US" altLang="ko-KR" sz="1200" dirty="0">
+                <a:sym typeface="Wingdings" panose="05000000000000000000" pitchFamily="2" charset="2"/>
+              </a:rPr>
+              <a:t> </a:t>
+            </a:r>
+            <a:r>
+              <a:rPr lang="en-US" altLang="ko-KR" sz="1200" dirty="0" smtClean="0">
+                <a:sym typeface="Wingdings" panose="05000000000000000000" pitchFamily="2" charset="2"/>
+              </a:rPr>
+              <a:t> </a:t>
+            </a:r>
+            <a:r>
+              <a:rPr lang="ko-KR" altLang="en-US" sz="1200" dirty="0" smtClean="0">
+                <a:sym typeface="Wingdings" panose="05000000000000000000" pitchFamily="2" charset="2"/>
+              </a:rPr>
+              <a:t>마우스</a:t>
+            </a:r>
+            <a:r>
+              <a:rPr lang="en-US" altLang="ko-KR" sz="1200" dirty="0" smtClean="0">
+                <a:sym typeface="Wingdings" panose="05000000000000000000" pitchFamily="2" charset="2"/>
+              </a:rPr>
+              <a:t> </a:t>
+            </a:r>
+            <a:r>
+              <a:rPr lang="ko-KR" altLang="en-US" sz="1200" dirty="0" err="1" smtClean="0">
+                <a:sym typeface="Wingdings" panose="05000000000000000000" pitchFamily="2" charset="2"/>
+              </a:rPr>
+              <a:t>휠을</a:t>
+            </a:r>
+            <a:r>
+              <a:rPr lang="ko-KR" altLang="en-US" sz="1200" dirty="0" smtClean="0">
+                <a:sym typeface="Wingdings" panose="05000000000000000000" pitchFamily="2" charset="2"/>
+              </a:rPr>
+              <a:t> 이용하여 전체 화면 확대 축소 가능</a:t>
+            </a:r>
+            <a:endParaRPr lang="en-US" altLang="ko-KR" sz="1200" dirty="0" smtClean="0">
+              <a:sym typeface="Wingdings" panose="05000000000000000000" pitchFamily="2" charset="2"/>
+            </a:endParaRPr>
+          </a:p>
+          <a:p>
+            <a:r>
+              <a:rPr lang="en-US" altLang="ko-KR" sz="1200" dirty="0">
+                <a:sym typeface="Wingdings" panose="05000000000000000000" pitchFamily="2" charset="2"/>
+              </a:rPr>
+              <a:t> </a:t>
+            </a:r>
+            <a:r>
+              <a:rPr lang="en-US" altLang="ko-KR" sz="1200" dirty="0" smtClean="0">
+                <a:sym typeface="Wingdings" panose="05000000000000000000" pitchFamily="2" charset="2"/>
+              </a:rPr>
+              <a:t> </a:t>
+            </a:r>
+            <a:r>
+              <a:rPr lang="ko-KR" altLang="en-US" sz="1200" dirty="0" smtClean="0">
+                <a:sym typeface="Wingdings" panose="05000000000000000000" pitchFamily="2" charset="2"/>
+              </a:rPr>
+              <a:t>마우스 왼쪽 버튼 드래그를 이용하여 화면 위치 이동 가능</a:t>
+            </a:r>
+            <a:endParaRPr lang="en-US" altLang="ko-KR" sz="1200" dirty="0" smtClean="0">
+              <a:sym typeface="Wingdings" panose="05000000000000000000" pitchFamily="2" charset="2"/>
+            </a:endParaRPr>
+          </a:p>
+          <a:p>
+            <a:r>
+              <a:rPr lang="en-US" altLang="ko-KR" sz="1200" dirty="0">
+                <a:sym typeface="Wingdings" panose="05000000000000000000" pitchFamily="2" charset="2"/>
+              </a:rPr>
+              <a:t> </a:t>
+            </a:r>
+            <a:r>
+              <a:rPr lang="en-US" altLang="ko-KR" sz="1200" dirty="0" smtClean="0">
+                <a:sym typeface="Wingdings" panose="05000000000000000000" pitchFamily="2" charset="2"/>
+              </a:rPr>
+              <a:t> </a:t>
+            </a:r>
+            <a:r>
+              <a:rPr lang="ko-KR" altLang="en-US" sz="1200" dirty="0" smtClean="0">
+                <a:sym typeface="Wingdings" panose="05000000000000000000" pitchFamily="2" charset="2"/>
+              </a:rPr>
+              <a:t>화면 미세회전 기능은 화면에 표시되는 점들을 회전하는 기능이므로 </a:t>
+            </a:r>
+            <a:r>
+              <a:rPr lang="en-US" altLang="ko-KR" sz="1200" dirty="0" smtClean="0">
+                <a:sym typeface="Wingdings" panose="05000000000000000000" pitchFamily="2" charset="2"/>
+              </a:rPr>
+              <a:t>2D Laser Scanner</a:t>
+            </a:r>
+            <a:r>
+              <a:rPr lang="ko-KR" altLang="en-US" sz="1200" dirty="0" smtClean="0">
+                <a:sym typeface="Wingdings" panose="05000000000000000000" pitchFamily="2" charset="2"/>
+              </a:rPr>
+              <a:t>의 물리적인 각도 조정을 우선적으로 하여야 함</a:t>
+            </a:r>
+            <a:endParaRPr lang="en-US" altLang="ko-KR" sz="1200" dirty="0" smtClean="0">
+              <a:sym typeface="Wingdings" panose="05000000000000000000" pitchFamily="2" charset="2"/>
+            </a:endParaRPr>
+          </a:p>
+          <a:p>
+            <a:r>
+              <a:rPr lang="en-US" altLang="ko-KR" sz="1200" dirty="0">
+                <a:sym typeface="Wingdings" panose="05000000000000000000" pitchFamily="2" charset="2"/>
+              </a:rPr>
+              <a:t> </a:t>
+            </a:r>
+            <a:r>
+              <a:rPr lang="en-US" altLang="ko-KR" sz="1200" dirty="0" smtClean="0">
+                <a:sym typeface="Wingdings" panose="05000000000000000000" pitchFamily="2" charset="2"/>
+              </a:rPr>
+              <a:t> </a:t>
+            </a:r>
+            <a:r>
+              <a:rPr lang="ko-KR" altLang="en-US" sz="1200" dirty="0" smtClean="0">
+                <a:sym typeface="Wingdings" panose="05000000000000000000" pitchFamily="2" charset="2"/>
+              </a:rPr>
+              <a:t>미세회전 상태는 </a:t>
+            </a:r>
+            <a:r>
               <a:rPr lang="en-US" altLang="ko-KR" sz="1200" dirty="0"/>
               <a:t>2D Laser Scanner </a:t>
             </a:r>
             <a:r>
+              <a:rPr lang="ko-KR" altLang="en-US" sz="1200" dirty="0"/>
+              <a:t>상태 </a:t>
+            </a:r>
+            <a:r>
               <a:rPr lang="ko-KR" altLang="en-US" sz="1200" dirty="0" smtClean="0"/>
-              <a:t>이미지를 </a:t>
-            </a:r>
-            <a:r>
-              <a:rPr lang="ko-KR" altLang="en-US" sz="1200" dirty="0" smtClean="0">
-                <a:sym typeface="Wingdings" panose="05000000000000000000" pitchFamily="2" charset="2"/>
-              </a:rPr>
-              <a:t>마우스 왼쪽 버튼 클릭</a:t>
-            </a:r>
-            <a:endParaRPr lang="ko-KR" altLang="en-US" sz="1200" dirty="0"/>
-          </a:p>
-        </p:txBody>
-      </p:sp>
-      <p:pic>
-        <p:nvPicPr>
-          <p:cNvPr id="5" name="Picture 2"/>
-          <p:cNvPicPr>
-            <a:picLocks noChangeAspect="1" noChangeArrowheads="1"/>
-          </p:cNvPicPr>
+              <a:t>화면에서 확인 가능</a:t>
+            </a:r>
+            <a:endParaRPr lang="en-US" altLang="ko-KR" sz="1200" dirty="0">
+              <a:sym typeface="Wingdings" panose="05000000000000000000" pitchFamily="2" charset="2"/>
+            </a:endParaRPr>
+          </a:p>
+        </p:txBody>
+      </p:sp>
+      <p:sp>
+        <p:nvSpPr>
+          <p:cNvPr id="4" name="사각형 설명선 3"/>
+          <p:cNvSpPr/>
           <p:nvPr/>
-        </p:nvPicPr>
-        <p:blipFill>
-          <a:blip r:embed="rId3" cstate="print"/>
-          <a:srcRect/>
-          <a:stretch>
-            <a:fillRect/>
-          </a:stretch>
-        </p:blipFill>
-        <p:spPr bwMode="auto">
+        </p:nvSpPr>
+        <p:spPr>
           <a:xfrm>
-            <a:off x="539552" y="1196752"/>
-            <a:ext cx="4886325" cy="3152775"/>
+            <a:off x="103651" y="2719335"/>
+            <a:ext cx="1656184" cy="268939"/>
           </a:xfrm>
-          <a:prstGeom prst="rect">
-            <a:avLst/>
+          <a:prstGeom prst="wedgeRectCallout">
+            <a:avLst>
+              <a:gd name="adj1" fmla="val 61009"/>
+              <a:gd name="adj2" fmla="val 7114"/>
+            </a:avLst>
           </a:prstGeom>
           <a:noFill/>
-          <a:ln w="9525">
-            <a:noFill/>
-            <a:miter lim="800000"/>
-            <a:headEnd/>
-            <a:tailEnd/>
+          <a:ln>
+            <a:solidFill>
+              <a:schemeClr val="bg1">
+                <a:lumMod val="75000"/>
+              </a:schemeClr>
+            </a:solidFill>
           </a:ln>
         </p:spPr>
-      </p:pic>
+        <p:style>
+          <a:lnRef idx="2">
+            <a:schemeClr val="accent1">
+              <a:shade val="50000"/>
+            </a:schemeClr>
+          </a:lnRef>
+          <a:fillRef idx="1">
+            <a:schemeClr val="accent1"/>
+          </a:fillRef>
+          <a:effectRef idx="0">
+            <a:schemeClr val="accent1"/>
+          </a:effectRef>
+          <a:fontRef idx="minor">
+            <a:schemeClr val="lt1"/>
+          </a:fontRef>
+        </p:style>
+        <p:txBody>
+          <a:bodyPr rtlCol="0" anchor="ctr"/>
+          <a:lstStyle/>
+          <a:p>
+            <a:r>
+              <a:rPr lang="ko-KR" altLang="en-US" sz="1000" dirty="0" smtClean="0">
+                <a:solidFill>
+                  <a:schemeClr val="tx1"/>
+                </a:solidFill>
+              </a:rPr>
+              <a:t>화면 확대</a:t>
+            </a:r>
+            <a:r>
+              <a:rPr lang="en-US" altLang="ko-KR" sz="1000" dirty="0" smtClean="0">
+                <a:solidFill>
+                  <a:schemeClr val="tx1"/>
+                </a:solidFill>
+              </a:rPr>
+              <a:t>/</a:t>
+            </a:r>
+            <a:r>
+              <a:rPr lang="ko-KR" altLang="en-US" sz="1000" dirty="0" smtClean="0">
+                <a:solidFill>
+                  <a:schemeClr val="tx1"/>
+                </a:solidFill>
+              </a:rPr>
+              <a:t>축소</a:t>
+            </a:r>
+            <a:endParaRPr lang="en-US" altLang="ko-KR" sz="1000" dirty="0" smtClean="0">
+              <a:solidFill>
+                <a:schemeClr val="tx1"/>
+              </a:solidFill>
+            </a:endParaRPr>
+          </a:p>
+        </p:txBody>
+      </p:sp>
+      <p:sp>
+        <p:nvSpPr>
+          <p:cNvPr id="5" name="사각형 설명선 4"/>
+          <p:cNvSpPr/>
+          <p:nvPr/>
+        </p:nvSpPr>
+        <p:spPr>
+          <a:xfrm>
+            <a:off x="107504" y="3220764"/>
+            <a:ext cx="1656184" cy="268939"/>
+          </a:xfrm>
+          <a:prstGeom prst="wedgeRectCallout">
+            <a:avLst>
+              <a:gd name="adj1" fmla="val 61138"/>
+              <a:gd name="adj2" fmla="val 6327"/>
+            </a:avLst>
+          </a:prstGeom>
+          <a:noFill/>
+          <a:ln>
+            <a:solidFill>
+              <a:schemeClr val="bg1">
+                <a:lumMod val="75000"/>
+              </a:schemeClr>
+            </a:solidFill>
+          </a:ln>
+        </p:spPr>
+        <p:style>
+          <a:lnRef idx="2">
+            <a:schemeClr val="accent1">
+              <a:shade val="50000"/>
+            </a:schemeClr>
+          </a:lnRef>
+          <a:fillRef idx="1">
+            <a:schemeClr val="accent1"/>
+          </a:fillRef>
+          <a:effectRef idx="0">
+            <a:schemeClr val="accent1"/>
+          </a:effectRef>
+          <a:fontRef idx="minor">
+            <a:schemeClr val="lt1"/>
+          </a:fontRef>
+        </p:style>
+        <p:txBody>
+          <a:bodyPr rtlCol="0" anchor="ctr"/>
+          <a:lstStyle/>
+          <a:p>
+            <a:r>
+              <a:rPr lang="ko-KR" altLang="en-US" sz="1000" dirty="0" smtClean="0">
+                <a:solidFill>
+                  <a:schemeClr val="tx1"/>
+                </a:solidFill>
+              </a:rPr>
+              <a:t>화면 회전</a:t>
+            </a:r>
+            <a:r>
+              <a:rPr lang="en-US" altLang="ko-KR" sz="1000" dirty="0" smtClean="0">
+                <a:solidFill>
+                  <a:schemeClr val="tx1"/>
+                </a:solidFill>
+              </a:rPr>
+              <a:t>(90°)</a:t>
+            </a:r>
+          </a:p>
+        </p:txBody>
+      </p:sp>
+      <p:sp>
+        <p:nvSpPr>
+          <p:cNvPr id="6" name="사각형 설명선 5"/>
+          <p:cNvSpPr/>
+          <p:nvPr/>
+        </p:nvSpPr>
+        <p:spPr>
+          <a:xfrm>
+            <a:off x="107504" y="3527889"/>
+            <a:ext cx="1656184" cy="268939"/>
+          </a:xfrm>
+          <a:prstGeom prst="wedgeRectCallout">
+            <a:avLst>
+              <a:gd name="adj1" fmla="val 60946"/>
+              <a:gd name="adj2" fmla="val 13410"/>
+            </a:avLst>
+          </a:prstGeom>
+          <a:noFill/>
+          <a:ln>
+            <a:solidFill>
+              <a:schemeClr val="bg1">
+                <a:lumMod val="75000"/>
+              </a:schemeClr>
+            </a:solidFill>
+          </a:ln>
+        </p:spPr>
+        <p:style>
+          <a:lnRef idx="2">
+            <a:schemeClr val="accent1">
+              <a:shade val="50000"/>
+            </a:schemeClr>
+          </a:lnRef>
+          <a:fillRef idx="1">
+            <a:schemeClr val="accent1"/>
+          </a:fillRef>
+          <a:effectRef idx="0">
+            <a:schemeClr val="accent1"/>
+          </a:effectRef>
+          <a:fontRef idx="minor">
+            <a:schemeClr val="lt1"/>
+          </a:fontRef>
+        </p:style>
+        <p:txBody>
+          <a:bodyPr rtlCol="0" anchor="ctr"/>
+          <a:lstStyle/>
+          <a:p>
+            <a:r>
+              <a:rPr lang="ko-KR" altLang="en-US" sz="1000" dirty="0" smtClean="0">
+                <a:solidFill>
+                  <a:schemeClr val="tx1"/>
+                </a:solidFill>
+              </a:rPr>
+              <a:t>화면 상하 반전</a:t>
+            </a:r>
+            <a:endParaRPr lang="en-US" altLang="ko-KR" sz="1000" dirty="0" smtClean="0">
+              <a:solidFill>
+                <a:schemeClr val="tx1"/>
+              </a:solidFill>
+            </a:endParaRPr>
+          </a:p>
+        </p:txBody>
+      </p:sp>
+      <p:sp>
+        <p:nvSpPr>
+          <p:cNvPr id="7" name="사각형 설명선 6"/>
+          <p:cNvSpPr/>
+          <p:nvPr/>
+        </p:nvSpPr>
+        <p:spPr>
+          <a:xfrm>
+            <a:off x="107504" y="3887929"/>
+            <a:ext cx="1656184" cy="412955"/>
+          </a:xfrm>
+          <a:prstGeom prst="wedgeRectCallout">
+            <a:avLst>
+              <a:gd name="adj1" fmla="val 61393"/>
+              <a:gd name="adj2" fmla="val -15747"/>
+            </a:avLst>
+          </a:prstGeom>
+          <a:noFill/>
+          <a:ln>
+            <a:solidFill>
+              <a:schemeClr val="bg1">
+                <a:lumMod val="75000"/>
+              </a:schemeClr>
+            </a:solidFill>
+          </a:ln>
+        </p:spPr>
+        <p:style>
+          <a:lnRef idx="2">
+            <a:schemeClr val="accent1">
+              <a:shade val="50000"/>
+            </a:schemeClr>
+          </a:lnRef>
+          <a:fillRef idx="1">
+            <a:schemeClr val="accent1"/>
+          </a:fillRef>
+          <a:effectRef idx="0">
+            <a:schemeClr val="accent1"/>
+          </a:effectRef>
+          <a:fontRef idx="minor">
+            <a:schemeClr val="lt1"/>
+          </a:fontRef>
+        </p:style>
+        <p:txBody>
+          <a:bodyPr rtlCol="0" anchor="ctr"/>
+          <a:lstStyle/>
+          <a:p>
+            <a:r>
+              <a:rPr lang="ko-KR" altLang="en-US" sz="1000" dirty="0" smtClean="0">
+                <a:solidFill>
+                  <a:schemeClr val="tx1"/>
+                </a:solidFill>
+              </a:rPr>
+              <a:t>화면 미세회전</a:t>
+            </a:r>
+            <a:r>
+              <a:rPr lang="en-US" altLang="ko-KR" sz="1000" dirty="0" smtClean="0">
+                <a:solidFill>
+                  <a:schemeClr val="tx1"/>
+                </a:solidFill>
+              </a:rPr>
+              <a:t>:</a:t>
+            </a:r>
+            <a:r>
+              <a:rPr lang="ko-KR" altLang="en-US" sz="1000" dirty="0" smtClean="0">
+                <a:solidFill>
+                  <a:schemeClr val="tx1"/>
+                </a:solidFill>
+              </a:rPr>
+              <a:t> </a:t>
+            </a:r>
+            <a:r>
+              <a:rPr lang="en-US" altLang="ko-KR" sz="1000" dirty="0">
+                <a:solidFill>
+                  <a:schemeClr val="tx1"/>
+                </a:solidFill>
+              </a:rPr>
+              <a:t>0.1°</a:t>
+            </a:r>
+            <a:r>
+              <a:rPr lang="ko-KR" altLang="en-US" sz="1000" dirty="0" smtClean="0">
+                <a:solidFill>
+                  <a:schemeClr val="tx1"/>
+                </a:solidFill>
+              </a:rPr>
+              <a:t>단위</a:t>
+            </a:r>
+            <a:r>
+              <a:rPr lang="en-US" altLang="ko-KR" sz="1000" dirty="0" smtClean="0">
+                <a:solidFill>
+                  <a:schemeClr val="tx1"/>
+                </a:solidFill>
+              </a:rPr>
+              <a:t>(</a:t>
+            </a:r>
+            <a:r>
+              <a:rPr lang="ko-KR" altLang="en-US" sz="1000" dirty="0" smtClean="0">
+                <a:solidFill>
+                  <a:schemeClr val="tx1"/>
+                </a:solidFill>
+              </a:rPr>
+              <a:t>최대 </a:t>
+            </a:r>
+            <a:r>
+              <a:rPr lang="en-US" altLang="ko-KR" sz="1000" dirty="0" smtClean="0">
+                <a:solidFill>
+                  <a:schemeClr val="tx1"/>
+                </a:solidFill>
+              </a:rPr>
+              <a:t>10°~ </a:t>
+            </a:r>
+            <a:r>
+              <a:rPr lang="ko-KR" altLang="en-US" sz="1000" dirty="0" smtClean="0">
+                <a:solidFill>
+                  <a:schemeClr val="tx1"/>
+                </a:solidFill>
+              </a:rPr>
+              <a:t>최소 </a:t>
+            </a:r>
+            <a:r>
+              <a:rPr lang="en-US" altLang="ko-KR" sz="1000" dirty="0" smtClean="0">
+                <a:solidFill>
+                  <a:schemeClr val="tx1"/>
+                </a:solidFill>
+              </a:rPr>
+              <a:t>-10</a:t>
+            </a:r>
+            <a:r>
+              <a:rPr lang="en-US" altLang="ko-KR" sz="1000" dirty="0">
+                <a:solidFill>
+                  <a:schemeClr val="tx1"/>
+                </a:solidFill>
+              </a:rPr>
+              <a:t>°</a:t>
+            </a:r>
+            <a:r>
+              <a:rPr lang="en-US" altLang="ko-KR" sz="1000" dirty="0" smtClean="0">
+                <a:solidFill>
+                  <a:schemeClr val="tx1"/>
+                </a:solidFill>
+              </a:rPr>
+              <a:t>)</a:t>
+            </a:r>
+          </a:p>
+        </p:txBody>
+      </p:sp>
+      <p:sp>
+        <p:nvSpPr>
+          <p:cNvPr id="8" name="사각형 설명선 7"/>
+          <p:cNvSpPr/>
+          <p:nvPr/>
+        </p:nvSpPr>
+        <p:spPr>
+          <a:xfrm>
+            <a:off x="107504" y="4372892"/>
+            <a:ext cx="1656184" cy="412955"/>
+          </a:xfrm>
+          <a:prstGeom prst="wedgeRectCallout">
+            <a:avLst>
+              <a:gd name="adj1" fmla="val 61101"/>
+              <a:gd name="adj2" fmla="val -9705"/>
+            </a:avLst>
+          </a:prstGeom>
+          <a:noFill/>
+          <a:ln>
+            <a:solidFill>
+              <a:schemeClr val="bg1">
+                <a:lumMod val="75000"/>
+              </a:schemeClr>
+            </a:solidFill>
+          </a:ln>
+        </p:spPr>
+        <p:style>
+          <a:lnRef idx="2">
+            <a:schemeClr val="accent1">
+              <a:shade val="50000"/>
+            </a:schemeClr>
+          </a:lnRef>
+          <a:fillRef idx="1">
+            <a:schemeClr val="accent1"/>
+          </a:fillRef>
+          <a:effectRef idx="0">
+            <a:schemeClr val="accent1"/>
+          </a:effectRef>
+          <a:fontRef idx="minor">
+            <a:schemeClr val="lt1"/>
+          </a:fontRef>
+        </p:style>
+        <p:txBody>
+          <a:bodyPr rtlCol="0" anchor="ctr"/>
+          <a:lstStyle/>
+          <a:p>
+            <a:r>
+              <a:rPr lang="ko-KR" altLang="en-US" sz="1000" dirty="0" smtClean="0">
+                <a:solidFill>
+                  <a:schemeClr val="tx1"/>
+                </a:solidFill>
+              </a:rPr>
+              <a:t>화면 위치 및 미세회전 초기화</a:t>
+            </a:r>
+            <a:endParaRPr lang="en-US" altLang="ko-KR" sz="1000" dirty="0" smtClean="0">
+              <a:solidFill>
+                <a:schemeClr val="tx1"/>
+              </a:solidFill>
+            </a:endParaRPr>
+          </a:p>
+        </p:txBody>
+      </p:sp>
     </p:spTree>
   </p:cSld>
   <p:clrMapOvr>
@@ -5903,38 +5944,6 @@
           <a:chExt cx="0" cy="0"/>
         </a:xfrm>
       </p:grpSpPr>
-      <p:pic>
-        <p:nvPicPr>
-          <p:cNvPr id="2" name="Picture 2"/>
-          <p:cNvPicPr>
-            <a:picLocks noChangeAspect="1" noChangeArrowheads="1"/>
-          </p:cNvPicPr>
-          <p:nvPr/>
-        </p:nvPicPr>
-        <p:blipFill>
-          <a:blip r:embed="rId2" cstate="print"/>
-          <a:srcRect/>
-          <a:stretch>
-            <a:fillRect/>
-          </a:stretch>
-        </p:blipFill>
-        <p:spPr bwMode="auto">
-          <a:xfrm>
-            <a:off x="2128838" y="1852613"/>
-            <a:ext cx="4886325" cy="3152775"/>
-          </a:xfrm>
-          <a:prstGeom prst="rect">
-            <a:avLst/>
-          </a:prstGeom>
-          <a:noFill/>
-          <a:ln w="9525">
-            <a:noFill/>
-            <a:miter lim="800000"/>
-            <a:headEnd/>
-            <a:tailEnd/>
-          </a:ln>
-        </p:spPr>
-      </p:pic>
       <p:sp>
         <p:nvSpPr>
           <p:cNvPr id="3" name="TextBox 2"/>
@@ -5944,7 +5953,7 @@
         <p:spPr>
           <a:xfrm>
             <a:off x="1547664" y="548680"/>
-            <a:ext cx="4536504" cy="553998"/>
+            <a:ext cx="7056784" cy="1846659"/>
           </a:xfrm>
           <a:prstGeom prst="rect">
             <a:avLst/>
@@ -5958,8 +5967,12 @@
           <a:lstStyle/>
           <a:p>
             <a:r>
+              <a:rPr lang="en-US" altLang="ko-KR" dirty="0" smtClean="0"/>
+              <a:t>Regions </a:t>
+            </a:r>
+            <a:r>
               <a:rPr lang="ko-KR" altLang="en-US" dirty="0" smtClean="0"/>
-              <a:t>대상 물체 상태 보기</a:t>
+              <a:t>설정</a:t>
             </a:r>
             <a:r>
               <a:rPr lang="en-US" altLang="ko-KR" dirty="0" smtClean="0"/>
@@ -5986,12 +5999,265 @@
               <a:rPr lang="ko-KR" altLang="en-US" sz="1200" dirty="0" smtClean="0">
                 <a:sym typeface="Wingdings" panose="05000000000000000000" pitchFamily="2" charset="2"/>
               </a:rPr>
-              <a:t>화면상 표시된 점들을 마우스 왼쪽 버튼 클릭</a:t>
+              <a:t>키보드 </a:t>
+            </a:r>
+            <a:r>
+              <a:rPr lang="en-US" altLang="ko-KR" sz="1200" dirty="0" smtClean="0">
+                <a:sym typeface="Wingdings" panose="05000000000000000000" pitchFamily="2" charset="2"/>
+              </a:rPr>
+              <a:t>F3 </a:t>
+            </a:r>
+            <a:r>
+              <a:rPr lang="ko-KR" altLang="en-US" sz="1200" dirty="0" smtClean="0">
+                <a:sym typeface="Wingdings" panose="05000000000000000000" pitchFamily="2" charset="2"/>
+              </a:rPr>
+              <a:t>키로 진입</a:t>
+            </a:r>
+            <a:endParaRPr lang="en-US" altLang="ko-KR" sz="1200" dirty="0" smtClean="0">
+              <a:sym typeface="Wingdings" panose="05000000000000000000" pitchFamily="2" charset="2"/>
+            </a:endParaRPr>
+          </a:p>
+          <a:p>
+            <a:r>
+              <a:rPr lang="en-US" altLang="ko-KR" sz="1200" dirty="0" smtClean="0">
+                <a:sym typeface="Wingdings" panose="05000000000000000000" pitchFamily="2" charset="2"/>
+              </a:rPr>
+              <a:t>  Fault/Alert </a:t>
+            </a:r>
+            <a:r>
+              <a:rPr lang="ko-KR" altLang="en-US" sz="1200" dirty="0" smtClean="0">
+                <a:sym typeface="Wingdings" panose="05000000000000000000" pitchFamily="2" charset="2"/>
+              </a:rPr>
+              <a:t>등의 영역들에 대한 위치 설정</a:t>
+            </a:r>
+            <a:endParaRPr lang="en-US" altLang="ko-KR" sz="1200" dirty="0" smtClean="0">
+              <a:sym typeface="Wingdings" panose="05000000000000000000" pitchFamily="2" charset="2"/>
+            </a:endParaRPr>
+          </a:p>
+          <a:p>
+            <a:r>
+              <a:rPr lang="en-US" altLang="ko-KR" sz="1200" dirty="0">
+                <a:sym typeface="Wingdings" panose="05000000000000000000" pitchFamily="2" charset="2"/>
+              </a:rPr>
+              <a:t> </a:t>
+            </a:r>
+            <a:r>
+              <a:rPr lang="en-US" altLang="ko-KR" sz="1200" dirty="0" smtClean="0">
+                <a:sym typeface="Wingdings" panose="05000000000000000000" pitchFamily="2" charset="2"/>
+              </a:rPr>
+              <a:t> </a:t>
+            </a:r>
+            <a:r>
+              <a:rPr lang="ko-KR" altLang="en-US" sz="1200" dirty="0" smtClean="0">
+                <a:sym typeface="Wingdings" panose="05000000000000000000" pitchFamily="2" charset="2"/>
+              </a:rPr>
+              <a:t>각 영역에 해당하는 릴레이의 인덱스 설정</a:t>
+            </a:r>
+            <a:endParaRPr lang="en-US" altLang="ko-KR" sz="1200" dirty="0" smtClean="0">
+              <a:sym typeface="Wingdings" panose="05000000000000000000" pitchFamily="2" charset="2"/>
+            </a:endParaRPr>
+          </a:p>
+          <a:p>
+            <a:r>
+              <a:rPr lang="en-US" altLang="ko-KR" sz="1200" dirty="0">
+                <a:sym typeface="Wingdings" panose="05000000000000000000" pitchFamily="2" charset="2"/>
+              </a:rPr>
+              <a:t> </a:t>
+            </a:r>
+            <a:r>
+              <a:rPr lang="en-US" altLang="ko-KR" sz="1200" dirty="0" smtClean="0">
+                <a:sym typeface="Wingdings" panose="05000000000000000000" pitchFamily="2" charset="2"/>
+              </a:rPr>
+              <a:t> </a:t>
+            </a:r>
+            <a:r>
+              <a:rPr lang="ko-KR" altLang="en-US" sz="1200" dirty="0" smtClean="0">
+                <a:sym typeface="Wingdings" panose="05000000000000000000" pitchFamily="2" charset="2"/>
+              </a:rPr>
+              <a:t>각 릴레이의 이름 설정</a:t>
+            </a:r>
+            <a:endParaRPr lang="en-US" altLang="ko-KR" sz="1200" dirty="0" smtClean="0">
+              <a:sym typeface="Wingdings" panose="05000000000000000000" pitchFamily="2" charset="2"/>
+            </a:endParaRPr>
+          </a:p>
+          <a:p>
+            <a:r>
+              <a:rPr lang="en-US" altLang="ko-KR" sz="1200" dirty="0">
+                <a:sym typeface="Wingdings" panose="05000000000000000000" pitchFamily="2" charset="2"/>
+              </a:rPr>
+              <a:t> </a:t>
+            </a:r>
+            <a:r>
+              <a:rPr lang="en-US" altLang="ko-KR" sz="1200" dirty="0" smtClean="0">
+                <a:sym typeface="Wingdings" panose="05000000000000000000" pitchFamily="2" charset="2"/>
+              </a:rPr>
+              <a:t> </a:t>
+            </a:r>
+            <a:r>
+              <a:rPr lang="ko-KR" altLang="en-US" sz="1200" dirty="0" smtClean="0">
+                <a:sym typeface="Wingdings" panose="05000000000000000000" pitchFamily="2" charset="2"/>
+              </a:rPr>
+              <a:t>영역 이름 중 </a:t>
+            </a:r>
+            <a:r>
+              <a:rPr lang="en-US" altLang="ko-KR" sz="1200" dirty="0" smtClean="0">
+                <a:sym typeface="Wingdings" panose="05000000000000000000" pitchFamily="2" charset="2"/>
+              </a:rPr>
+              <a:t>“No Marking”</a:t>
+            </a:r>
+            <a:r>
+              <a:rPr lang="ko-KR" altLang="en-US" sz="1200" dirty="0" smtClean="0">
+                <a:sym typeface="Wingdings" panose="05000000000000000000" pitchFamily="2" charset="2"/>
+              </a:rPr>
+              <a:t>은 </a:t>
+            </a:r>
+            <a:r>
+              <a:rPr lang="en-US" altLang="ko-KR" sz="1200" dirty="0" smtClean="0">
+                <a:sym typeface="Wingdings" panose="05000000000000000000" pitchFamily="2" charset="2"/>
+              </a:rPr>
+              <a:t>“No mark big”</a:t>
+            </a:r>
+            <a:r>
+              <a:rPr lang="ko-KR" altLang="en-US" sz="1200" dirty="0" smtClean="0">
+                <a:sym typeface="Wingdings" panose="05000000000000000000" pitchFamily="2" charset="2"/>
+              </a:rPr>
+              <a:t>이 </a:t>
+            </a:r>
+            <a:r>
+              <a:rPr lang="en-US" altLang="ko-KR" sz="1200" dirty="0" smtClean="0">
+                <a:sym typeface="Wingdings" panose="05000000000000000000" pitchFamily="2" charset="2"/>
+              </a:rPr>
+              <a:t>“true”</a:t>
+            </a:r>
+            <a:r>
+              <a:rPr lang="ko-KR" altLang="en-US" sz="1200" dirty="0" smtClean="0">
+                <a:sym typeface="Wingdings" panose="05000000000000000000" pitchFamily="2" charset="2"/>
+              </a:rPr>
+              <a:t>로</a:t>
+            </a:r>
+            <a:r>
+              <a:rPr lang="en-US" altLang="ko-KR" sz="1200" dirty="0" smtClean="0">
+                <a:sym typeface="Wingdings" panose="05000000000000000000" pitchFamily="2" charset="2"/>
+              </a:rPr>
+              <a:t> </a:t>
+            </a:r>
+            <a:r>
+              <a:rPr lang="ko-KR" altLang="en-US" sz="1200" dirty="0" smtClean="0">
+                <a:sym typeface="Wingdings" panose="05000000000000000000" pitchFamily="2" charset="2"/>
+              </a:rPr>
+              <a:t>되어 있는 상태에서 이용되며 해당 영역에 </a:t>
+            </a:r>
+            <a:r>
+              <a:rPr lang="ko-KR" altLang="en-US" sz="1200" dirty="0">
+                <a:sym typeface="Wingdings" panose="05000000000000000000" pitchFamily="2" charset="2"/>
+              </a:rPr>
+              <a:t>일정 크기 </a:t>
+            </a:r>
+            <a:r>
+              <a:rPr lang="ko-KR" altLang="en-US" sz="1200" dirty="0" smtClean="0">
+                <a:sym typeface="Wingdings" panose="05000000000000000000" pitchFamily="2" charset="2"/>
+              </a:rPr>
+              <a:t>이상의 대상물체가 감지되면 화면의 감지된 대상물체에 원형 표시를 하지 않음</a:t>
+            </a:r>
+            <a:endParaRPr lang="en-US" altLang="ko-KR" sz="1200" dirty="0" smtClean="0">
+              <a:sym typeface="Wingdings" panose="05000000000000000000" pitchFamily="2" charset="2"/>
+            </a:endParaRPr>
+          </a:p>
+          <a:p>
+            <a:r>
+              <a:rPr lang="en-US" altLang="ko-KR" sz="1200" dirty="0">
+                <a:sym typeface="Wingdings" panose="05000000000000000000" pitchFamily="2" charset="2"/>
+              </a:rPr>
+              <a:t> </a:t>
+            </a:r>
+            <a:r>
+              <a:rPr lang="en-US" altLang="ko-KR" sz="1200" dirty="0" smtClean="0">
+                <a:sym typeface="Wingdings" panose="05000000000000000000" pitchFamily="2" charset="2"/>
+              </a:rPr>
+              <a:t> </a:t>
+            </a:r>
+            <a:r>
+              <a:rPr lang="ko-KR" altLang="en-US" sz="1200" dirty="0" smtClean="0">
+                <a:sym typeface="Wingdings" panose="05000000000000000000" pitchFamily="2" charset="2"/>
+              </a:rPr>
+              <a:t>이 대상물체의 크기는 </a:t>
+            </a:r>
+            <a:r>
+              <a:rPr lang="en-US" altLang="ko-KR" sz="1200" dirty="0" smtClean="0">
+                <a:sym typeface="Wingdings" panose="05000000000000000000" pitchFamily="2" charset="2"/>
+              </a:rPr>
+              <a:t>System </a:t>
+            </a:r>
+            <a:r>
+              <a:rPr lang="ko-KR" altLang="en-US" sz="1200" dirty="0" smtClean="0">
+                <a:sym typeface="Wingdings" panose="05000000000000000000" pitchFamily="2" charset="2"/>
+              </a:rPr>
+              <a:t>설정 화면의 </a:t>
+            </a:r>
+            <a:r>
+              <a:rPr lang="en-US" altLang="ko-KR" sz="1200" dirty="0" smtClean="0">
+                <a:sym typeface="Wingdings" panose="05000000000000000000" pitchFamily="2" charset="2"/>
+              </a:rPr>
+              <a:t>ROI_OBJECT_NO_MARK_BIG_DIAMETER_MIN </a:t>
+            </a:r>
+            <a:r>
+              <a:rPr lang="ko-KR" altLang="en-US" sz="1200" dirty="0" smtClean="0">
+                <a:sym typeface="Wingdings" panose="05000000000000000000" pitchFamily="2" charset="2"/>
+              </a:rPr>
+              <a:t>값을 이용함</a:t>
+            </a:r>
+            <a:r>
+              <a:rPr lang="en-US" altLang="ko-KR" sz="1200" dirty="0" smtClean="0">
+                <a:sym typeface="Wingdings" panose="05000000000000000000" pitchFamily="2" charset="2"/>
+              </a:rPr>
+              <a:t>(</a:t>
+            </a:r>
+            <a:r>
+              <a:rPr lang="ko-KR" altLang="en-US" sz="1200" dirty="0" smtClean="0">
+                <a:sym typeface="Wingdings" panose="05000000000000000000" pitchFamily="2" charset="2"/>
+              </a:rPr>
+              <a:t>기본값 </a:t>
+            </a:r>
+            <a:r>
+              <a:rPr lang="en-US" altLang="ko-KR" sz="1200" dirty="0" smtClean="0">
+                <a:sym typeface="Wingdings" panose="05000000000000000000" pitchFamily="2" charset="2"/>
+              </a:rPr>
+              <a:t>2meter)</a:t>
             </a:r>
             <a:endParaRPr lang="ko-KR" altLang="en-US" sz="1200" dirty="0"/>
           </a:p>
         </p:txBody>
       </p:sp>
+      <p:pic>
+        <p:nvPicPr>
+          <p:cNvPr id="2" name="그림 1"/>
+          <p:cNvPicPr>
+            <a:picLocks noChangeAspect="1"/>
+          </p:cNvPicPr>
+          <p:nvPr/>
+        </p:nvPicPr>
+        <p:blipFill>
+          <a:blip r:embed="rId2">
+            <a:extLst>
+              <a:ext uri="{28A0092B-C50C-407E-A947-70E740481C1C}">
+                <a14:useLocalDpi xmlns:a14="http://schemas.microsoft.com/office/drawing/2010/main" val="0"/>
+              </a:ext>
+            </a:extLst>
+          </a:blip>
+          <a:stretch>
+            <a:fillRect/>
+          </a:stretch>
+        </p:blipFill>
+        <p:spPr>
+          <a:xfrm>
+            <a:off x="1861200" y="2636912"/>
+            <a:ext cx="5399227" cy="3342132"/>
+          </a:xfrm>
+          <a:prstGeom prst="rect">
+            <a:avLst/>
+          </a:prstGeom>
+        </p:spPr>
+      </p:pic>
     </p:spTree>
   </p:cSld>
   <p:clrMapOvr>
@@ -6024,11 +6290,180 @@
           <a:chExt cx="0" cy="0"/>
         </a:xfrm>
       </p:grpSpPr>
+      <p:sp>
+        <p:nvSpPr>
+          <p:cNvPr id="3" name="TextBox 2"/>
+          <p:cNvSpPr txBox="1"/>
+          <p:nvPr/>
+        </p:nvSpPr>
+        <p:spPr>
+          <a:xfrm>
+            <a:off x="1547664" y="548680"/>
+            <a:ext cx="7056784" cy="923330"/>
+          </a:xfrm>
+          <a:prstGeom prst="rect">
+            <a:avLst/>
+          </a:prstGeom>
+          <a:noFill/>
+        </p:spPr>
+        <p:txBody>
+          <a:bodyPr wrap="square" rtlCol="0">
+            <a:spAutoFit/>
+          </a:bodyPr>
+          <a:lstStyle/>
+          <a:p>
+            <a:r>
+              <a:rPr lang="ko-KR" altLang="en-US" dirty="0" smtClean="0"/>
+              <a:t>전체 대상물체 표시</a:t>
+            </a:r>
+            <a:r>
+              <a:rPr lang="en-US" altLang="ko-KR" dirty="0" smtClean="0"/>
+              <a:t> </a:t>
+            </a:r>
+            <a:r>
+              <a:rPr lang="ko-KR" altLang="en-US" dirty="0" smtClean="0"/>
+              <a:t>화면</a:t>
+            </a:r>
+            <a:endParaRPr lang="en-US" altLang="ko-KR" dirty="0" smtClean="0"/>
+          </a:p>
+          <a:p>
+            <a:r>
+              <a:rPr lang="en-US" altLang="ko-KR" sz="1200" dirty="0"/>
+              <a:t> </a:t>
+            </a:r>
+            <a:r>
+              <a:rPr lang="en-US" altLang="ko-KR" sz="1200" dirty="0" smtClean="0">
+                <a:sym typeface="Wingdings" panose="05000000000000000000" pitchFamily="2" charset="2"/>
+              </a:rPr>
+              <a:t> </a:t>
+            </a:r>
+            <a:r>
+              <a:rPr lang="ko-KR" altLang="en-US" sz="1200" dirty="0" smtClean="0">
+                <a:sym typeface="Wingdings" panose="05000000000000000000" pitchFamily="2" charset="2"/>
+              </a:rPr>
+              <a:t>키보드 </a:t>
+            </a:r>
+            <a:r>
+              <a:rPr lang="en-US" altLang="ko-KR" sz="1200" dirty="0" smtClean="0">
+                <a:sym typeface="Wingdings" panose="05000000000000000000" pitchFamily="2" charset="2"/>
+              </a:rPr>
+              <a:t>F4 </a:t>
+            </a:r>
+            <a:r>
+              <a:rPr lang="ko-KR" altLang="en-US" sz="1200" dirty="0" smtClean="0">
+                <a:sym typeface="Wingdings" panose="05000000000000000000" pitchFamily="2" charset="2"/>
+              </a:rPr>
+              <a:t>키로 진입</a:t>
+            </a:r>
+            <a:endParaRPr lang="en-US" altLang="ko-KR" sz="1200" dirty="0" smtClean="0">
+              <a:sym typeface="Wingdings" panose="05000000000000000000" pitchFamily="2" charset="2"/>
+            </a:endParaRPr>
+          </a:p>
+          <a:p>
+            <a:r>
+              <a:rPr lang="en-US" altLang="ko-KR" sz="1200" dirty="0" smtClean="0">
+                <a:sym typeface="Wingdings" panose="05000000000000000000" pitchFamily="2" charset="2"/>
+              </a:rPr>
+              <a:t>  </a:t>
+            </a:r>
+            <a:r>
+              <a:rPr lang="ko-KR" altLang="en-US" sz="1200" dirty="0" smtClean="0">
+                <a:sym typeface="Wingdings" panose="05000000000000000000" pitchFamily="2" charset="2"/>
+              </a:rPr>
+              <a:t>기본적으로 </a:t>
+            </a:r>
+            <a:r>
+              <a:rPr lang="en-US" altLang="ko-KR" sz="1200" dirty="0" smtClean="0">
+                <a:sym typeface="Wingdings" panose="05000000000000000000" pitchFamily="2" charset="2"/>
+              </a:rPr>
+              <a:t>Fault/Alert </a:t>
+            </a:r>
+            <a:r>
+              <a:rPr lang="ko-KR" altLang="en-US" sz="1200" dirty="0" smtClean="0">
+                <a:sym typeface="Wingdings" panose="05000000000000000000" pitchFamily="2" charset="2"/>
+              </a:rPr>
+              <a:t>등의 영역들에 위치한 대상물체만을 표시하고 있으나 이외의 영역에 위치한 대상물체도 표시</a:t>
+            </a:r>
+          </a:p>
+        </p:txBody>
+      </p:sp>
+      <p:pic>
+        <p:nvPicPr>
+          <p:cNvPr id="2" name="그림 1"/>
+          <p:cNvPicPr>
+            <a:picLocks noChangeAspect="1"/>
+          </p:cNvPicPr>
+          <p:nvPr/>
+        </p:nvPicPr>
+        <p:blipFill>
+          <a:blip r:embed="rId2" cstate="print">
+            <a:extLst>
+              <a:ext uri="{28A0092B-C50C-407E-A947-70E740481C1C}">
+                <a14:useLocalDpi xmlns:a14="http://schemas.microsoft.com/office/drawing/2010/main" val="0"/>
+              </a:ext>
+            </a:extLst>
+          </a:blip>
+          <a:stretch>
+            <a:fillRect/>
+          </a:stretch>
+        </p:blipFill>
+        <p:spPr>
+          <a:xfrm>
+            <a:off x="467544" y="1556792"/>
+            <a:ext cx="3687745" cy="2282722"/>
+          </a:xfrm>
+          <a:prstGeom prst="rect">
+            <a:avLst/>
+          </a:prstGeom>
+        </p:spPr>
+      </p:pic>
+      <p:pic>
+        <p:nvPicPr>
+          <p:cNvPr id="5" name="그림 4"/>
+          <p:cNvPicPr>
+            <a:picLocks noChangeAspect="1"/>
+          </p:cNvPicPr>
+          <p:nvPr/>
+        </p:nvPicPr>
+        <p:blipFill>
+          <a:blip r:embed="rId3">
+            <a:extLst>
+              <a:ext uri="{28A0092B-C50C-407E-A947-70E740481C1C}">
+                <a14:useLocalDpi xmlns:a14="http://schemas.microsoft.com/office/drawing/2010/main" val="0"/>
+              </a:ext>
+            </a:extLst>
+          </a:blip>
+          <a:stretch>
+            <a:fillRect/>
+          </a:stretch>
+        </p:blipFill>
+        <p:spPr>
+          <a:xfrm>
+            <a:off x="3275856" y="3140968"/>
+            <a:ext cx="5423154" cy="3356943"/>
+          </a:xfrm>
+          <a:prstGeom prst="rect">
+            <a:avLst/>
+          </a:prstGeom>
+        </p:spPr>
+      </p:pic>
     </p:spTree>
+    <p:extLst>
+      <p:ext uri="{BB962C8B-B14F-4D97-AF65-F5344CB8AC3E}">
+        <p14:creationId xmlns:p14="http://schemas.microsoft.com/office/powerpoint/2010/main" val="1566085540"/>
+      </p:ext>
+    </p:extLst>
   </p:cSld>
   <p:clrMapOvr>
     <a:masterClrMapping/>
   </p:clrMapOvr>
+  <p:timing>
+    <p:tnLst>
+      <p:par>
+        <p:cTn id="1" dur="indefinite" restart="never" nodeType="tmRoot"/>
+      </p:par>
+    </p:tnLst>
+  </p:timing>
 </p:sld>
 </file>
 

</xml_diff>

<commit_message>
Add 2D-AntiCollision Monitoring System rev. A05 document.
</commit_message>
<xml_diff>
--- a/2D-AntiCollision Monitoring System.pptx
+++ b/2D-AntiCollision Monitoring System.pptx
@@ -6,15 +6,16 @@
   </p:sldMasterIdLst>
   <p:sldIdLst>
     <p:sldId id="256" r:id="rId2"/>
-    <p:sldId id="267" r:id="rId3"/>
-    <p:sldId id="269" r:id="rId4"/>
-    <p:sldId id="270" r:id="rId5"/>
-    <p:sldId id="257" r:id="rId6"/>
-    <p:sldId id="271" r:id="rId7"/>
-    <p:sldId id="258" r:id="rId8"/>
-    <p:sldId id="259" r:id="rId9"/>
-    <p:sldId id="268" r:id="rId10"/>
-    <p:sldId id="260" r:id="rId11"/>
+    <p:sldId id="272" r:id="rId3"/>
+    <p:sldId id="267" r:id="rId4"/>
+    <p:sldId id="269" r:id="rId5"/>
+    <p:sldId id="270" r:id="rId6"/>
+    <p:sldId id="257" r:id="rId7"/>
+    <p:sldId id="271" r:id="rId8"/>
+    <p:sldId id="258" r:id="rId9"/>
+    <p:sldId id="259" r:id="rId10"/>
+    <p:sldId id="268" r:id="rId11"/>
+    <p:sldId id="260" r:id="rId12"/>
   </p:sldIdLst>
   <p:sldSz cx="9144000" cy="6858000" type="screen4x3"/>
   <p:notesSz cx="6858000" cy="9144000"/>
@@ -314,7 +315,7 @@
             <a:fld id="{F17B436D-341F-426B-A879-B4FA1B0657F1}" type="datetimeFigureOut">
               <a:rPr lang="ko-KR" altLang="en-US" smtClean="0"/>
               <a:pPr/>
-              <a:t>2018-08-17</a:t>
+              <a:t>2018-08-24</a:t>
             </a:fld>
             <a:endParaRPr lang="ko-KR" altLang="en-US"/>
           </a:p>
@@ -481,7 +482,7 @@
             <a:fld id="{F17B436D-341F-426B-A879-B4FA1B0657F1}" type="datetimeFigureOut">
               <a:rPr lang="ko-KR" altLang="en-US" smtClean="0"/>
               <a:pPr/>
-              <a:t>2018-08-17</a:t>
+              <a:t>2018-08-24</a:t>
             </a:fld>
             <a:endParaRPr lang="ko-KR" altLang="en-US"/>
           </a:p>
@@ -658,7 +659,7 @@
             <a:fld id="{F17B436D-341F-426B-A879-B4FA1B0657F1}" type="datetimeFigureOut">
               <a:rPr lang="ko-KR" altLang="en-US" smtClean="0"/>
               <a:pPr/>
-              <a:t>2018-08-17</a:t>
+              <a:t>2018-08-24</a:t>
             </a:fld>
             <a:endParaRPr lang="ko-KR" altLang="en-US"/>
           </a:p>
@@ -825,7 +826,7 @@
             <a:fld id="{F17B436D-341F-426B-A879-B4FA1B0657F1}" type="datetimeFigureOut">
               <a:rPr lang="ko-KR" altLang="en-US" smtClean="0"/>
               <a:pPr/>
-              <a:t>2018-08-17</a:t>
+              <a:t>2018-08-24</a:t>
             </a:fld>
             <a:endParaRPr lang="ko-KR" altLang="en-US"/>
           </a:p>
@@ -1068,7 +1069,7 @@
             <a:fld id="{F17B436D-341F-426B-A879-B4FA1B0657F1}" type="datetimeFigureOut">
               <a:rPr lang="ko-KR" altLang="en-US" smtClean="0"/>
               <a:pPr/>
-              <a:t>2018-08-17</a:t>
+              <a:t>2018-08-24</a:t>
             </a:fld>
             <a:endParaRPr lang="ko-KR" altLang="en-US"/>
           </a:p>
@@ -1353,7 +1354,7 @@
             <a:fld id="{F17B436D-341F-426B-A879-B4FA1B0657F1}" type="datetimeFigureOut">
               <a:rPr lang="ko-KR" altLang="en-US" smtClean="0"/>
               <a:pPr/>
-              <a:t>2018-08-17</a:t>
+              <a:t>2018-08-24</a:t>
             </a:fld>
             <a:endParaRPr lang="ko-KR" altLang="en-US"/>
           </a:p>
@@ -1772,7 +1773,7 @@
             <a:fld id="{F17B436D-341F-426B-A879-B4FA1B0657F1}" type="datetimeFigureOut">
               <a:rPr lang="ko-KR" altLang="en-US" smtClean="0"/>
               <a:pPr/>
-              <a:t>2018-08-17</a:t>
+              <a:t>2018-08-24</a:t>
             </a:fld>
             <a:endParaRPr lang="ko-KR" altLang="en-US"/>
           </a:p>
@@ -1887,7 +1888,7 @@
             <a:fld id="{F17B436D-341F-426B-A879-B4FA1B0657F1}" type="datetimeFigureOut">
               <a:rPr lang="ko-KR" altLang="en-US" smtClean="0"/>
               <a:pPr/>
-              <a:t>2018-08-17</a:t>
+              <a:t>2018-08-24</a:t>
             </a:fld>
             <a:endParaRPr lang="ko-KR" altLang="en-US"/>
           </a:p>
@@ -1979,7 +1980,7 @@
             <a:fld id="{F17B436D-341F-426B-A879-B4FA1B0657F1}" type="datetimeFigureOut">
               <a:rPr lang="ko-KR" altLang="en-US" smtClean="0"/>
               <a:pPr/>
-              <a:t>2018-08-17</a:t>
+              <a:t>2018-08-24</a:t>
             </a:fld>
             <a:endParaRPr lang="ko-KR" altLang="en-US"/>
           </a:p>
@@ -2253,7 +2254,7 @@
             <a:fld id="{F17B436D-341F-426B-A879-B4FA1B0657F1}" type="datetimeFigureOut">
               <a:rPr lang="ko-KR" altLang="en-US" smtClean="0"/>
               <a:pPr/>
-              <a:t>2018-08-17</a:t>
+              <a:t>2018-08-24</a:t>
             </a:fld>
             <a:endParaRPr lang="ko-KR" altLang="en-US"/>
           </a:p>
@@ -2503,7 +2504,7 @@
             <a:fld id="{F17B436D-341F-426B-A879-B4FA1B0657F1}" type="datetimeFigureOut">
               <a:rPr lang="ko-KR" altLang="en-US" smtClean="0"/>
               <a:pPr/>
-              <a:t>2018-08-17</a:t>
+              <a:t>2018-08-24</a:t>
             </a:fld>
             <a:endParaRPr lang="ko-KR" altLang="en-US"/>
           </a:p>
@@ -2713,7 +2714,7 @@
             <a:fld id="{F17B436D-341F-426B-A879-B4FA1B0657F1}" type="datetimeFigureOut">
               <a:rPr lang="ko-KR" altLang="en-US" smtClean="0"/>
               <a:pPr/>
-              <a:t>2018-08-17</a:t>
+              <a:t>2018-08-24</a:t>
             </a:fld>
             <a:endParaRPr lang="ko-KR" altLang="en-US"/>
           </a:p>
@@ -3084,36 +3085,6 @@
           <a:chExt cx="0" cy="0"/>
         </a:xfrm>
       </p:grpSpPr>
-      <p:pic>
-        <p:nvPicPr>
-          <p:cNvPr id="4" name="그림 3"/>
-          <p:cNvPicPr>
-            <a:picLocks noChangeAspect="1"/>
-          </p:cNvPicPr>
-          <p:nvPr/>
-        </p:nvPicPr>
-        <p:blipFill>
-          <a:blip r:embed="rId2">
-            <a:extLst>
-              <a:ext uri="{28A0092B-C50C-407E-A947-70E740481C1C}">
-                <a14:useLocalDpi xmlns:a14="http://schemas.microsoft.com/office/drawing/2010/main" val="0"/>
-              </a:ext>
-            </a:extLst>
-          </a:blip>
-          <a:stretch>
-            <a:fillRect/>
-          </a:stretch>
-        </p:blipFill>
-        <p:spPr>
-          <a:xfrm>
-            <a:off x="1860423" y="1750529"/>
-            <a:ext cx="5423154" cy="3356943"/>
-          </a:xfrm>
-          <a:prstGeom prst="rect">
-            <a:avLst/>
-          </a:prstGeom>
-        </p:spPr>
-      </p:pic>
       <p:sp>
         <p:nvSpPr>
           <p:cNvPr id="2" name="TextBox 1"/>
@@ -3137,12 +3108,8 @@
           <a:lstStyle/>
           <a:p>
             <a:r>
-              <a:rPr lang="ko-KR" altLang="en-US" smtClean="0"/>
-              <a:t>기본 </a:t>
-            </a:r>
-            <a:r>
               <a:rPr lang="ko-KR" altLang="en-US" dirty="0" smtClean="0"/>
-              <a:t>화면</a:t>
+              <a:t>문서 갱신 내용</a:t>
             </a:r>
             <a:endParaRPr lang="ko-KR" altLang="en-US" dirty="0"/>
           </a:p>
@@ -3150,484 +3117,87 @@
       </p:sp>
       <p:sp>
         <p:nvSpPr>
-          <p:cNvPr id="3" name="사각형 설명선 2"/>
-          <p:cNvSpPr/>
+          <p:cNvPr id="13" name="TextBox 12"/>
+          <p:cNvSpPr txBox="1"/>
           <p:nvPr/>
         </p:nvSpPr>
         <p:spPr>
           <a:xfrm>
-            <a:off x="4283968" y="1142979"/>
-            <a:ext cx="1368152" cy="504056"/>
+            <a:off x="755576" y="1052736"/>
+            <a:ext cx="7848872" cy="1015663"/>
           </a:xfrm>
-          <a:prstGeom prst="wedgeRectCallout">
-            <a:avLst>
-              <a:gd name="adj1" fmla="val -46997"/>
-              <a:gd name="adj2" fmla="val 130212"/>
-            </a:avLst>
+          <a:prstGeom prst="rect">
+            <a:avLst/>
           </a:prstGeom>
           <a:noFill/>
-          <a:ln>
-            <a:solidFill>
-              <a:schemeClr val="bg1">
-                <a:lumMod val="75000"/>
-              </a:schemeClr>
-            </a:solidFill>
-          </a:ln>
         </p:spPr>
-        <p:style>
-          <a:lnRef idx="2">
-            <a:schemeClr val="accent1">
-              <a:shade val="50000"/>
-            </a:schemeClr>
-          </a:lnRef>
-          <a:fillRef idx="1">
-            <a:schemeClr val="accent1"/>
-          </a:fillRef>
-          <a:effectRef idx="0">
-            <a:schemeClr val="accent1"/>
-          </a:effectRef>
-          <a:fontRef idx="minor">
-            <a:schemeClr val="lt1"/>
-          </a:fontRef>
-        </p:style>
-        <p:txBody>
-          <a:bodyPr rtlCol="0" anchor="ctr"/>
-          <a:lstStyle/>
-          <a:p>
-            <a:pPr algn="ctr"/>
-            <a:r>
-              <a:rPr lang="en-US" altLang="ko-KR" sz="1200" dirty="0" smtClean="0">
-                <a:solidFill>
-                  <a:schemeClr val="tx1"/>
-                </a:solidFill>
-              </a:rPr>
-              <a:t>2D Laser Scanner </a:t>
-            </a:r>
-            <a:r>
-              <a:rPr lang="ko-KR" altLang="en-US" sz="1200" dirty="0" smtClean="0">
-                <a:solidFill>
-                  <a:schemeClr val="tx1"/>
-                </a:solidFill>
-              </a:rPr>
-              <a:t>이미지</a:t>
-            </a:r>
-            <a:endParaRPr lang="en-US" altLang="ko-KR" sz="1200" dirty="0" smtClean="0">
-              <a:solidFill>
-                <a:schemeClr val="tx1"/>
-              </a:solidFill>
-            </a:endParaRPr>
-          </a:p>
-        </p:txBody>
-      </p:sp>
-      <p:sp>
-        <p:nvSpPr>
-          <p:cNvPr id="6" name="사각형 설명선 5"/>
-          <p:cNvSpPr/>
-          <p:nvPr/>
-        </p:nvSpPr>
-        <p:spPr>
-          <a:xfrm>
-            <a:off x="611560" y="2780928"/>
-            <a:ext cx="1116124" cy="504056"/>
-          </a:xfrm>
-          <a:prstGeom prst="wedgeRectCallout">
-            <a:avLst>
-              <a:gd name="adj1" fmla="val 144172"/>
-              <a:gd name="adj2" fmla="val -47425"/>
-            </a:avLst>
-          </a:prstGeom>
-          <a:noFill/>
-          <a:ln>
-            <a:solidFill>
-              <a:schemeClr val="bg1">
-                <a:lumMod val="75000"/>
-              </a:schemeClr>
-            </a:solidFill>
-          </a:ln>
-        </p:spPr>
-        <p:style>
-          <a:lnRef idx="2">
-            <a:schemeClr val="accent1">
-              <a:shade val="50000"/>
-            </a:schemeClr>
-          </a:lnRef>
-          <a:fillRef idx="1">
-            <a:schemeClr val="accent1"/>
-          </a:fillRef>
-          <a:effectRef idx="0">
-            <a:schemeClr val="accent1"/>
-          </a:effectRef>
-          <a:fontRef idx="minor">
-            <a:schemeClr val="lt1"/>
-          </a:fontRef>
-        </p:style>
-        <p:txBody>
-          <a:bodyPr rtlCol="0" anchor="ctr"/>
-          <a:lstStyle/>
-          <a:p>
-            <a:pPr algn="ctr"/>
-            <a:r>
-              <a:rPr lang="en-US" altLang="ko-KR" sz="1200" dirty="0" smtClean="0">
-                <a:solidFill>
-                  <a:schemeClr val="tx1"/>
-                </a:solidFill>
-              </a:rPr>
-              <a:t>Alert </a:t>
-            </a:r>
-            <a:r>
-              <a:rPr lang="ko-KR" altLang="en-US" sz="1200" dirty="0" smtClean="0">
-                <a:solidFill>
-                  <a:schemeClr val="tx1"/>
-                </a:solidFill>
-              </a:rPr>
-              <a:t>영역</a:t>
-            </a:r>
-            <a:endParaRPr lang="en-US" altLang="ko-KR" sz="1200" dirty="0" smtClean="0">
-              <a:solidFill>
-                <a:schemeClr val="tx1"/>
-              </a:solidFill>
-            </a:endParaRPr>
-          </a:p>
-          <a:p>
-            <a:pPr algn="ctr"/>
-            <a:r>
-              <a:rPr lang="en-US" altLang="ko-KR" sz="1200" dirty="0" smtClean="0">
-                <a:solidFill>
-                  <a:schemeClr val="tx1"/>
-                </a:solidFill>
-              </a:rPr>
-              <a:t>(</a:t>
-            </a:r>
-            <a:r>
-              <a:rPr lang="ko-KR" altLang="en-US" sz="1200" dirty="0" smtClean="0">
-                <a:solidFill>
-                  <a:schemeClr val="tx1"/>
-                </a:solidFill>
-              </a:rPr>
-              <a:t>노랑색 상자</a:t>
-            </a:r>
-            <a:r>
-              <a:rPr lang="en-US" altLang="ko-KR" sz="1200" dirty="0" smtClean="0">
-                <a:solidFill>
-                  <a:schemeClr val="tx1"/>
-                </a:solidFill>
-              </a:rPr>
-              <a:t>)</a:t>
-            </a:r>
-          </a:p>
-        </p:txBody>
-      </p:sp>
-      <p:sp>
-        <p:nvSpPr>
-          <p:cNvPr id="7" name="사각형 설명선 6"/>
-          <p:cNvSpPr/>
-          <p:nvPr/>
-        </p:nvSpPr>
-        <p:spPr>
-          <a:xfrm>
-            <a:off x="611560" y="2204864"/>
-            <a:ext cx="1116124" cy="504056"/>
-          </a:xfrm>
-          <a:prstGeom prst="wedgeRectCallout">
-            <a:avLst>
-              <a:gd name="adj1" fmla="val 206889"/>
-              <a:gd name="adj2" fmla="val -22250"/>
-            </a:avLst>
-          </a:prstGeom>
-          <a:noFill/>
-          <a:ln>
-            <a:solidFill>
-              <a:schemeClr val="bg1">
-                <a:lumMod val="75000"/>
-              </a:schemeClr>
-            </a:solidFill>
-          </a:ln>
-        </p:spPr>
-        <p:style>
-          <a:lnRef idx="2">
-            <a:schemeClr val="accent1">
-              <a:shade val="50000"/>
-            </a:schemeClr>
-          </a:lnRef>
-          <a:fillRef idx="1">
-            <a:schemeClr val="accent1"/>
-          </a:fillRef>
-          <a:effectRef idx="0">
-            <a:schemeClr val="accent1"/>
-          </a:effectRef>
-          <a:fontRef idx="minor">
-            <a:schemeClr val="lt1"/>
-          </a:fontRef>
-        </p:style>
-        <p:txBody>
-          <a:bodyPr rtlCol="0" anchor="ctr"/>
-          <a:lstStyle/>
-          <a:p>
-            <a:pPr algn="ctr"/>
-            <a:r>
-              <a:rPr lang="en-US" altLang="ko-KR" sz="1200" dirty="0" smtClean="0">
-                <a:solidFill>
-                  <a:schemeClr val="tx1"/>
-                </a:solidFill>
-              </a:rPr>
-              <a:t>Fault </a:t>
-            </a:r>
-            <a:r>
-              <a:rPr lang="ko-KR" altLang="en-US" sz="1200" dirty="0" smtClean="0">
-                <a:solidFill>
-                  <a:schemeClr val="tx1"/>
-                </a:solidFill>
-              </a:rPr>
-              <a:t>영역</a:t>
-            </a:r>
-            <a:endParaRPr lang="en-US" altLang="ko-KR" sz="1200" dirty="0" smtClean="0">
-              <a:solidFill>
-                <a:schemeClr val="tx1"/>
-              </a:solidFill>
-            </a:endParaRPr>
-          </a:p>
-          <a:p>
-            <a:pPr algn="ctr"/>
-            <a:r>
-              <a:rPr lang="en-US" altLang="ko-KR" sz="1200" dirty="0" smtClean="0">
-                <a:solidFill>
-                  <a:schemeClr val="tx1"/>
-                </a:solidFill>
-              </a:rPr>
-              <a:t>(</a:t>
-            </a:r>
-            <a:r>
-              <a:rPr lang="ko-KR" altLang="en-US" sz="1200" dirty="0" smtClean="0">
-                <a:solidFill>
-                  <a:schemeClr val="tx1"/>
-                </a:solidFill>
-              </a:rPr>
-              <a:t>빨강색 상자</a:t>
-            </a:r>
-            <a:r>
-              <a:rPr lang="en-US" altLang="ko-KR" sz="1200" dirty="0" smtClean="0">
-                <a:solidFill>
-                  <a:schemeClr val="tx1"/>
-                </a:solidFill>
-              </a:rPr>
-              <a:t>)</a:t>
-            </a:r>
-          </a:p>
-        </p:txBody>
-      </p:sp>
-      <p:sp>
-        <p:nvSpPr>
-          <p:cNvPr id="10" name="사각형 설명선 9"/>
-          <p:cNvSpPr/>
-          <p:nvPr/>
-        </p:nvSpPr>
-        <p:spPr>
-          <a:xfrm>
-            <a:off x="2663788" y="1142979"/>
-            <a:ext cx="1440160" cy="504056"/>
-          </a:xfrm>
-          <a:prstGeom prst="wedgeRectCallout">
-            <a:avLst>
-              <a:gd name="adj1" fmla="val 29940"/>
-              <a:gd name="adj2" fmla="val 115496"/>
-            </a:avLst>
-          </a:prstGeom>
-          <a:noFill/>
-          <a:ln>
-            <a:solidFill>
-              <a:schemeClr val="bg1">
-                <a:lumMod val="75000"/>
-              </a:schemeClr>
-            </a:solidFill>
-          </a:ln>
-        </p:spPr>
-        <p:style>
-          <a:lnRef idx="2">
-            <a:schemeClr val="accent1">
-              <a:shade val="50000"/>
-            </a:schemeClr>
-          </a:lnRef>
-          <a:fillRef idx="1">
-            <a:schemeClr val="accent1"/>
-          </a:fillRef>
-          <a:effectRef idx="0">
-            <a:schemeClr val="accent1"/>
-          </a:effectRef>
-          <a:fontRef idx="minor">
-            <a:schemeClr val="lt1"/>
-          </a:fontRef>
-        </p:style>
-        <p:txBody>
-          <a:bodyPr rtlCol="0" anchor="ctr"/>
-          <a:lstStyle/>
-          <a:p>
-            <a:pPr algn="ctr"/>
-            <a:endParaRPr lang="en-US" altLang="ko-KR" sz="1200" dirty="0" smtClean="0">
-              <a:solidFill>
-                <a:schemeClr val="tx1"/>
-              </a:solidFill>
-            </a:endParaRPr>
-          </a:p>
-        </p:txBody>
-      </p:sp>
-      <p:sp>
-        <p:nvSpPr>
-          <p:cNvPr id="8" name="사각형 설명선 7"/>
-          <p:cNvSpPr/>
-          <p:nvPr/>
-        </p:nvSpPr>
-        <p:spPr>
-          <a:xfrm>
-            <a:off x="2663788" y="1149091"/>
-            <a:ext cx="1440160" cy="504056"/>
-          </a:xfrm>
-          <a:prstGeom prst="wedgeRectCallout">
-            <a:avLst>
-              <a:gd name="adj1" fmla="val -29585"/>
-              <a:gd name="adj2" fmla="val 111969"/>
-            </a:avLst>
-          </a:prstGeom>
-          <a:noFill/>
-          <a:ln>
-            <a:solidFill>
-              <a:schemeClr val="bg1">
-                <a:lumMod val="75000"/>
-              </a:schemeClr>
-            </a:solidFill>
-          </a:ln>
-        </p:spPr>
-        <p:style>
-          <a:lnRef idx="2">
-            <a:schemeClr val="accent1">
-              <a:shade val="50000"/>
-            </a:schemeClr>
-          </a:lnRef>
-          <a:fillRef idx="1">
-            <a:schemeClr val="accent1"/>
-          </a:fillRef>
-          <a:effectRef idx="0">
-            <a:schemeClr val="accent1"/>
-          </a:effectRef>
-          <a:fontRef idx="minor">
-            <a:schemeClr val="lt1"/>
-          </a:fontRef>
-        </p:style>
-        <p:txBody>
-          <a:bodyPr rtlCol="0" anchor="ctr"/>
-          <a:lstStyle/>
-          <a:p>
-            <a:pPr algn="ctr"/>
-            <a:r>
-              <a:rPr lang="ko-KR" altLang="en-US" sz="1200" dirty="0" smtClean="0">
-                <a:solidFill>
-                  <a:schemeClr val="tx1"/>
-                </a:solidFill>
-              </a:rPr>
-              <a:t>릴레이 출력 상태</a:t>
-            </a:r>
-            <a:endParaRPr lang="en-US" altLang="ko-KR" sz="1200" dirty="0" smtClean="0">
-              <a:solidFill>
-                <a:schemeClr val="tx1"/>
-              </a:solidFill>
-            </a:endParaRPr>
-          </a:p>
-        </p:txBody>
-      </p:sp>
-      <p:sp>
-        <p:nvSpPr>
-          <p:cNvPr id="11" name="사각형 설명선 10"/>
-          <p:cNvSpPr/>
-          <p:nvPr/>
-        </p:nvSpPr>
-        <p:spPr>
-          <a:xfrm>
-            <a:off x="323528" y="3352428"/>
-            <a:ext cx="1404156" cy="504056"/>
-          </a:xfrm>
-          <a:prstGeom prst="wedgeRectCallout">
-            <a:avLst>
-              <a:gd name="adj1" fmla="val 180678"/>
-              <a:gd name="adj2" fmla="val -123347"/>
-            </a:avLst>
-          </a:prstGeom>
-          <a:noFill/>
-          <a:ln>
-            <a:solidFill>
-              <a:schemeClr val="bg1">
-                <a:lumMod val="75000"/>
-              </a:schemeClr>
-            </a:solidFill>
-          </a:ln>
-        </p:spPr>
-        <p:style>
-          <a:lnRef idx="2">
-            <a:schemeClr val="accent1">
-              <a:shade val="50000"/>
-            </a:schemeClr>
-          </a:lnRef>
-          <a:fillRef idx="1">
-            <a:schemeClr val="accent1"/>
-          </a:fillRef>
-          <a:effectRef idx="0">
-            <a:schemeClr val="accent1"/>
-          </a:effectRef>
-          <a:fontRef idx="minor">
-            <a:schemeClr val="lt1"/>
-          </a:fontRef>
-        </p:style>
-        <p:txBody>
-          <a:bodyPr rtlCol="0" anchor="ctr"/>
-          <a:lstStyle/>
-          <a:p>
-            <a:pPr algn="ctr"/>
-            <a:r>
-              <a:rPr lang="en-US" altLang="ko-KR" sz="1200" dirty="0" smtClean="0">
-                <a:solidFill>
-                  <a:schemeClr val="tx1"/>
-                </a:solidFill>
-              </a:rPr>
-              <a:t>No Mark </a:t>
-            </a:r>
-            <a:r>
-              <a:rPr lang="ko-KR" altLang="en-US" sz="1200" dirty="0" smtClean="0">
-                <a:solidFill>
-                  <a:schemeClr val="tx1"/>
-                </a:solidFill>
-              </a:rPr>
-              <a:t>영역</a:t>
-            </a:r>
-            <a:endParaRPr lang="en-US" altLang="ko-KR" sz="1200" dirty="0" smtClean="0">
-              <a:solidFill>
-                <a:schemeClr val="tx1"/>
-              </a:solidFill>
-            </a:endParaRPr>
-          </a:p>
-          <a:p>
-            <a:pPr algn="ctr"/>
-            <a:r>
-              <a:rPr lang="en-US" altLang="ko-KR" sz="1200" dirty="0" smtClean="0">
-                <a:solidFill>
-                  <a:schemeClr val="tx1"/>
-                </a:solidFill>
-              </a:rPr>
-              <a:t>(</a:t>
-            </a:r>
-            <a:r>
-              <a:rPr lang="ko-KR" altLang="en-US" sz="1200" dirty="0" smtClean="0">
-                <a:solidFill>
-                  <a:schemeClr val="tx1"/>
-                </a:solidFill>
-              </a:rPr>
-              <a:t>빨강색 점선 상자</a:t>
-            </a:r>
-            <a:r>
-              <a:rPr lang="en-US" altLang="ko-KR" sz="1200" dirty="0" smtClean="0">
-                <a:solidFill>
-                  <a:schemeClr val="tx1"/>
-                </a:solidFill>
-              </a:rPr>
-              <a:t>)</a:t>
-            </a:r>
+        <p:txBody>
+          <a:bodyPr wrap="square" rtlCol="0">
+            <a:spAutoFit/>
+          </a:bodyPr>
+          <a:lstStyle/>
+          <a:p>
+            <a:r>
+              <a:rPr lang="en-US" altLang="ko-KR" sz="1200" dirty="0" smtClean="0"/>
+              <a:t>A01 2018-08-03 </a:t>
+            </a:r>
+            <a:r>
+              <a:rPr lang="ko-KR" altLang="en-US" sz="1200" dirty="0" smtClean="0"/>
+              <a:t>초기문서</a:t>
+            </a:r>
+            <a:endParaRPr lang="en-US" altLang="ko-KR" sz="1200" dirty="0" smtClean="0"/>
+          </a:p>
+          <a:p>
+            <a:r>
+              <a:rPr lang="en-US" altLang="ko-KR" sz="1200" dirty="0" smtClean="0"/>
+              <a:t>A02 2018-08-04 </a:t>
+            </a:r>
+            <a:r>
+              <a:rPr lang="ko-KR" altLang="en-US" sz="1200" dirty="0" smtClean="0"/>
+              <a:t>화면 설명 추가</a:t>
+            </a:r>
+            <a:endParaRPr lang="en-US" altLang="ko-KR" sz="1200" dirty="0" smtClean="0"/>
+          </a:p>
+          <a:p>
+            <a:r>
+              <a:rPr lang="en-US" altLang="ko-KR" sz="1200" dirty="0" smtClean="0"/>
+              <a:t>A03 2018-08-13 </a:t>
+            </a:r>
+            <a:r>
+              <a:rPr lang="ko-KR" altLang="en-US" sz="1200" dirty="0"/>
+              <a:t>화면 </a:t>
+            </a:r>
+            <a:r>
+              <a:rPr lang="ko-KR" altLang="en-US" sz="1200" dirty="0" smtClean="0"/>
+              <a:t>상세 설명 추가</a:t>
+            </a:r>
+            <a:endParaRPr lang="en-US" altLang="ko-KR" sz="1200" dirty="0" smtClean="0"/>
+          </a:p>
+          <a:p>
+            <a:r>
+              <a:rPr lang="en-US" altLang="ko-KR" sz="1200" dirty="0" smtClean="0"/>
+              <a:t>A04 2018-08-17 </a:t>
+            </a:r>
+            <a:r>
+              <a:rPr lang="ko-KR" altLang="en-US" sz="1200" dirty="0" smtClean="0"/>
+              <a:t>현장 운영 화면 적용</a:t>
+            </a:r>
+            <a:endParaRPr lang="en-US" altLang="ko-KR" sz="1200" dirty="0"/>
+          </a:p>
+          <a:p>
+            <a:r>
+              <a:rPr lang="en-US" altLang="ko-KR" sz="1200" dirty="0" smtClean="0"/>
+              <a:t>A05 2018-08-24 Region </a:t>
+            </a:r>
+            <a:r>
+              <a:rPr lang="ko-KR" altLang="en-US" sz="1200" dirty="0" smtClean="0"/>
+              <a:t>설정 화면의 영역 설명 방식 변경사항 설명 </a:t>
+            </a:r>
+            <a:r>
+              <a:rPr lang="ko-KR" altLang="en-US" sz="1200" dirty="0" smtClean="0"/>
+              <a:t>및 화면 추가</a:t>
+            </a:r>
+            <a:endParaRPr lang="en-US" altLang="ko-KR" sz="1200" dirty="0"/>
           </a:p>
         </p:txBody>
       </p:sp>
@@ -3647,6 +3217,200 @@
 </file>
 
 <file path=ppt/slides/slide10.xml><?xml version="1.0" encoding="utf-8"?>
+<p:sld xmlns:a="http://schemas.openxmlformats.org/drawingml/2006/main" xmlns:r="http://schemas.openxmlformats.org/officeDocument/2006/relationships" xmlns:p="http://schemas.openxmlformats.org/presentationml/2006/main">
+  <p:cSld>
+    <p:spTree>
+      <p:nvGrpSpPr>
+        <p:cNvPr id="1" name=""/>
+        <p:cNvGrpSpPr/>
+        <p:nvPr/>
+      </p:nvGrpSpPr>
+      <p:grpSpPr>
+        <a:xfrm>
+          <a:off x="0" y="0"/>
+          <a:ext cx="0" cy="0"/>
+          <a:chOff x="0" y="0"/>
+          <a:chExt cx="0" cy="0"/>
+        </a:xfrm>
+      </p:grpSpPr>
+      <p:sp>
+        <p:nvSpPr>
+          <p:cNvPr id="3" name="TextBox 2"/>
+          <p:cNvSpPr txBox="1"/>
+          <p:nvPr/>
+        </p:nvSpPr>
+        <p:spPr>
+          <a:xfrm>
+            <a:off x="1547664" y="548680"/>
+            <a:ext cx="7056784" cy="923330"/>
+          </a:xfrm>
+          <a:prstGeom prst="rect">
+            <a:avLst/>
+          </a:prstGeom>
+          <a:noFill/>
+        </p:spPr>
+        <p:txBody>
+          <a:bodyPr wrap="square" rtlCol="0">
+            <a:spAutoFit/>
+          </a:bodyPr>
+          <a:lstStyle/>
+          <a:p>
+            <a:r>
+              <a:rPr lang="ko-KR" altLang="en-US" dirty="0" smtClean="0"/>
+              <a:t>전체 대상물체 표시</a:t>
+            </a:r>
+            <a:r>
+              <a:rPr lang="en-US" altLang="ko-KR" dirty="0" smtClean="0"/>
+              <a:t> </a:t>
+            </a:r>
+            <a:r>
+              <a:rPr lang="ko-KR" altLang="en-US" dirty="0" smtClean="0"/>
+              <a:t>화면</a:t>
+            </a:r>
+            <a:endParaRPr lang="en-US" altLang="ko-KR" dirty="0" smtClean="0"/>
+          </a:p>
+          <a:p>
+            <a:r>
+              <a:rPr lang="en-US" altLang="ko-KR" sz="1200" dirty="0"/>
+              <a:t> </a:t>
+            </a:r>
+            <a:r>
+              <a:rPr lang="en-US" altLang="ko-KR" sz="1200" dirty="0" smtClean="0">
+                <a:sym typeface="Wingdings" panose="05000000000000000000" pitchFamily="2" charset="2"/>
+              </a:rPr>
+              <a:t> </a:t>
+            </a:r>
+            <a:r>
+              <a:rPr lang="ko-KR" altLang="en-US" sz="1200" dirty="0" smtClean="0">
+                <a:sym typeface="Wingdings" panose="05000000000000000000" pitchFamily="2" charset="2"/>
+              </a:rPr>
+              <a:t>키보드 </a:t>
+            </a:r>
+            <a:r>
+              <a:rPr lang="en-US" altLang="ko-KR" sz="1200" dirty="0" smtClean="0">
+                <a:sym typeface="Wingdings" panose="05000000000000000000" pitchFamily="2" charset="2"/>
+              </a:rPr>
+              <a:t>F4 </a:t>
+            </a:r>
+            <a:r>
+              <a:rPr lang="ko-KR" altLang="en-US" sz="1200" dirty="0" smtClean="0">
+                <a:sym typeface="Wingdings" panose="05000000000000000000" pitchFamily="2" charset="2"/>
+              </a:rPr>
+              <a:t>키로 진입</a:t>
+            </a:r>
+            <a:endParaRPr lang="en-US" altLang="ko-KR" sz="1200" dirty="0" smtClean="0">
+              <a:sym typeface="Wingdings" panose="05000000000000000000" pitchFamily="2" charset="2"/>
+            </a:endParaRPr>
+          </a:p>
+          <a:p>
+            <a:r>
+              <a:rPr lang="en-US" altLang="ko-KR" sz="1200" dirty="0" smtClean="0">
+                <a:sym typeface="Wingdings" panose="05000000000000000000" pitchFamily="2" charset="2"/>
+              </a:rPr>
+              <a:t>  </a:t>
+            </a:r>
+            <a:r>
+              <a:rPr lang="ko-KR" altLang="en-US" sz="1200" dirty="0" smtClean="0">
+                <a:sym typeface="Wingdings" panose="05000000000000000000" pitchFamily="2" charset="2"/>
+              </a:rPr>
+              <a:t>기본적으로 </a:t>
+            </a:r>
+            <a:r>
+              <a:rPr lang="en-US" altLang="ko-KR" sz="1200" dirty="0" smtClean="0">
+                <a:sym typeface="Wingdings" panose="05000000000000000000" pitchFamily="2" charset="2"/>
+              </a:rPr>
+              <a:t>Fault/Alert </a:t>
+            </a:r>
+            <a:r>
+              <a:rPr lang="ko-KR" altLang="en-US" sz="1200" dirty="0" smtClean="0">
+                <a:sym typeface="Wingdings" panose="05000000000000000000" pitchFamily="2" charset="2"/>
+              </a:rPr>
+              <a:t>등의 영역들에 위치한 대상물체만을 표시하고 있으나 이외의 영역에 위치한 대상물체도 표시</a:t>
+            </a:r>
+          </a:p>
+        </p:txBody>
+      </p:sp>
+      <p:pic>
+        <p:nvPicPr>
+          <p:cNvPr id="2" name="그림 1"/>
+          <p:cNvPicPr>
+            <a:picLocks noChangeAspect="1"/>
+          </p:cNvPicPr>
+          <p:nvPr/>
+        </p:nvPicPr>
+        <p:blipFill>
+          <a:blip r:embed="rId2" cstate="print">
+            <a:extLst>
+              <a:ext uri="{28A0092B-C50C-407E-A947-70E740481C1C}">
+                <a14:useLocalDpi xmlns:a14="http://schemas.microsoft.com/office/drawing/2010/main" val="0"/>
+              </a:ext>
+            </a:extLst>
+          </a:blip>
+          <a:stretch>
+            <a:fillRect/>
+          </a:stretch>
+        </p:blipFill>
+        <p:spPr>
+          <a:xfrm>
+            <a:off x="467544" y="1556792"/>
+            <a:ext cx="3687745" cy="2282722"/>
+          </a:xfrm>
+          <a:prstGeom prst="rect">
+            <a:avLst/>
+          </a:prstGeom>
+        </p:spPr>
+      </p:pic>
+      <p:pic>
+        <p:nvPicPr>
+          <p:cNvPr id="5" name="그림 4"/>
+          <p:cNvPicPr>
+            <a:picLocks noChangeAspect="1"/>
+          </p:cNvPicPr>
+          <p:nvPr/>
+        </p:nvPicPr>
+        <p:blipFill>
+          <a:blip r:embed="rId3">
+            <a:extLst>
+              <a:ext uri="{28A0092B-C50C-407E-A947-70E740481C1C}">
+                <a14:useLocalDpi xmlns:a14="http://schemas.microsoft.com/office/drawing/2010/main" val="0"/>
+              </a:ext>
+            </a:extLst>
+          </a:blip>
+          <a:stretch>
+            <a:fillRect/>
+          </a:stretch>
+        </p:blipFill>
+        <p:spPr>
+          <a:xfrm>
+            <a:off x="3275856" y="3140968"/>
+            <a:ext cx="5423154" cy="3356943"/>
+          </a:xfrm>
+          <a:prstGeom prst="rect">
+            <a:avLst/>
+          </a:prstGeom>
+        </p:spPr>
+      </p:pic>
+    </p:spTree>
+    <p:extLst>
+      <p:ext uri="{BB962C8B-B14F-4D97-AF65-F5344CB8AC3E}">
+        <p14:creationId xmlns:p14="http://schemas.microsoft.com/office/powerpoint/2010/main" val="1566085540"/>
+      </p:ext>
+    </p:extLst>
+  </p:cSld>
+  <p:clrMapOvr>
+    <a:masterClrMapping/>
+  </p:clrMapOvr>
+  <p:timing>
+    <p:tnLst>
+      <p:par>
+        <p:cTn id="1" dur="indefinite" restart="never" nodeType="tmRoot"/>
+      </p:par>
+    </p:tnLst>
+  </p:timing>
+</p:sld>
+</file>
+
+<file path=ppt/slides/slide11.xml><?xml version="1.0" encoding="utf-8"?>
 <p:sld xmlns:a="http://schemas.openxmlformats.org/drawingml/2006/main" xmlns:r="http://schemas.openxmlformats.org/officeDocument/2006/relationships" xmlns:p="http://schemas.openxmlformats.org/presentationml/2006/main">
   <p:cSld>
     <p:spTree>
@@ -3868,6 +3632,590 @@
 </file>
 
 <file path=ppt/slides/slide2.xml><?xml version="1.0" encoding="utf-8"?>
+<p:sld xmlns:a="http://schemas.openxmlformats.org/drawingml/2006/main" xmlns:r="http://schemas.openxmlformats.org/officeDocument/2006/relationships" xmlns:p="http://schemas.openxmlformats.org/presentationml/2006/main">
+  <p:cSld>
+    <p:spTree>
+      <p:nvGrpSpPr>
+        <p:cNvPr id="1" name=""/>
+        <p:cNvGrpSpPr/>
+        <p:nvPr/>
+      </p:nvGrpSpPr>
+      <p:grpSpPr>
+        <a:xfrm>
+          <a:off x="0" y="0"/>
+          <a:ext cx="0" cy="0"/>
+          <a:chOff x="0" y="0"/>
+          <a:chExt cx="0" cy="0"/>
+        </a:xfrm>
+      </p:grpSpPr>
+      <p:pic>
+        <p:nvPicPr>
+          <p:cNvPr id="4" name="그림 3"/>
+          <p:cNvPicPr>
+            <a:picLocks noChangeAspect="1"/>
+          </p:cNvPicPr>
+          <p:nvPr/>
+        </p:nvPicPr>
+        <p:blipFill>
+          <a:blip r:embed="rId2">
+            <a:extLst>
+              <a:ext uri="{28A0092B-C50C-407E-A947-70E740481C1C}">
+                <a14:useLocalDpi xmlns:a14="http://schemas.microsoft.com/office/drawing/2010/main" val="0"/>
+              </a:ext>
+            </a:extLst>
+          </a:blip>
+          <a:stretch>
+            <a:fillRect/>
+          </a:stretch>
+        </p:blipFill>
+        <p:spPr>
+          <a:xfrm>
+            <a:off x="1860423" y="1750529"/>
+            <a:ext cx="5423154" cy="3356943"/>
+          </a:xfrm>
+          <a:prstGeom prst="rect">
+            <a:avLst/>
+          </a:prstGeom>
+        </p:spPr>
+      </p:pic>
+      <p:sp>
+        <p:nvSpPr>
+          <p:cNvPr id="2" name="TextBox 1"/>
+          <p:cNvSpPr txBox="1"/>
+          <p:nvPr/>
+        </p:nvSpPr>
+        <p:spPr>
+          <a:xfrm>
+            <a:off x="1547664" y="548680"/>
+            <a:ext cx="3888432" cy="369332"/>
+          </a:xfrm>
+          <a:prstGeom prst="rect">
+            <a:avLst/>
+          </a:prstGeom>
+          <a:noFill/>
+        </p:spPr>
+        <p:txBody>
+          <a:bodyPr wrap="square" rtlCol="0">
+            <a:spAutoFit/>
+          </a:bodyPr>
+          <a:lstStyle/>
+          <a:p>
+            <a:r>
+              <a:rPr lang="ko-KR" altLang="en-US" smtClean="0"/>
+              <a:t>기본 </a:t>
+            </a:r>
+            <a:r>
+              <a:rPr lang="ko-KR" altLang="en-US" dirty="0" smtClean="0"/>
+              <a:t>화면</a:t>
+            </a:r>
+            <a:endParaRPr lang="ko-KR" altLang="en-US" dirty="0"/>
+          </a:p>
+        </p:txBody>
+      </p:sp>
+      <p:sp>
+        <p:nvSpPr>
+          <p:cNvPr id="3" name="사각형 설명선 2"/>
+          <p:cNvSpPr/>
+          <p:nvPr/>
+        </p:nvSpPr>
+        <p:spPr>
+          <a:xfrm>
+            <a:off x="4283968" y="1142979"/>
+            <a:ext cx="1368152" cy="504056"/>
+          </a:xfrm>
+          <a:prstGeom prst="wedgeRectCallout">
+            <a:avLst>
+              <a:gd name="adj1" fmla="val -46997"/>
+              <a:gd name="adj2" fmla="val 130212"/>
+            </a:avLst>
+          </a:prstGeom>
+          <a:noFill/>
+          <a:ln>
+            <a:solidFill>
+              <a:schemeClr val="bg1">
+                <a:lumMod val="75000"/>
+              </a:schemeClr>
+            </a:solidFill>
+          </a:ln>
+        </p:spPr>
+        <p:style>
+          <a:lnRef idx="2">
+            <a:schemeClr val="accent1">
+              <a:shade val="50000"/>
+            </a:schemeClr>
+          </a:lnRef>
+          <a:fillRef idx="1">
+            <a:schemeClr val="accent1"/>
+          </a:fillRef>
+          <a:effectRef idx="0">
+            <a:schemeClr val="accent1"/>
+          </a:effectRef>
+          <a:fontRef idx="minor">
+            <a:schemeClr val="lt1"/>
+          </a:fontRef>
+        </p:style>
+        <p:txBody>
+          <a:bodyPr rtlCol="0" anchor="ctr"/>
+          <a:lstStyle/>
+          <a:p>
+            <a:pPr algn="ctr"/>
+            <a:r>
+              <a:rPr lang="en-US" altLang="ko-KR" sz="1200" dirty="0" smtClean="0">
+                <a:solidFill>
+                  <a:schemeClr val="tx1"/>
+                </a:solidFill>
+              </a:rPr>
+              <a:t>2D Laser Scanner </a:t>
+            </a:r>
+            <a:r>
+              <a:rPr lang="ko-KR" altLang="en-US" sz="1200" dirty="0" smtClean="0">
+                <a:solidFill>
+                  <a:schemeClr val="tx1"/>
+                </a:solidFill>
+              </a:rPr>
+              <a:t>이미지</a:t>
+            </a:r>
+            <a:endParaRPr lang="en-US" altLang="ko-KR" sz="1200" dirty="0" smtClean="0">
+              <a:solidFill>
+                <a:schemeClr val="tx1"/>
+              </a:solidFill>
+            </a:endParaRPr>
+          </a:p>
+        </p:txBody>
+      </p:sp>
+      <p:sp>
+        <p:nvSpPr>
+          <p:cNvPr id="6" name="사각형 설명선 5"/>
+          <p:cNvSpPr/>
+          <p:nvPr/>
+        </p:nvSpPr>
+        <p:spPr>
+          <a:xfrm>
+            <a:off x="611560" y="2780928"/>
+            <a:ext cx="1116124" cy="504056"/>
+          </a:xfrm>
+          <a:prstGeom prst="wedgeRectCallout">
+            <a:avLst>
+              <a:gd name="adj1" fmla="val 144172"/>
+              <a:gd name="adj2" fmla="val -47425"/>
+            </a:avLst>
+          </a:prstGeom>
+          <a:noFill/>
+          <a:ln>
+            <a:solidFill>
+              <a:schemeClr val="bg1">
+                <a:lumMod val="75000"/>
+              </a:schemeClr>
+            </a:solidFill>
+          </a:ln>
+        </p:spPr>
+        <p:style>
+          <a:lnRef idx="2">
+            <a:schemeClr val="accent1">
+              <a:shade val="50000"/>
+            </a:schemeClr>
+          </a:lnRef>
+          <a:fillRef idx="1">
+            <a:schemeClr val="accent1"/>
+          </a:fillRef>
+          <a:effectRef idx="0">
+            <a:schemeClr val="accent1"/>
+          </a:effectRef>
+          <a:fontRef idx="minor">
+            <a:schemeClr val="lt1"/>
+          </a:fontRef>
+        </p:style>
+        <p:txBody>
+          <a:bodyPr rtlCol="0" anchor="ctr"/>
+          <a:lstStyle/>
+          <a:p>
+            <a:pPr algn="ctr"/>
+            <a:r>
+              <a:rPr lang="en-US" altLang="ko-KR" sz="1200" dirty="0" smtClean="0">
+                <a:solidFill>
+                  <a:schemeClr val="tx1"/>
+                </a:solidFill>
+              </a:rPr>
+              <a:t>Alert </a:t>
+            </a:r>
+            <a:r>
+              <a:rPr lang="ko-KR" altLang="en-US" sz="1200" dirty="0" smtClean="0">
+                <a:solidFill>
+                  <a:schemeClr val="tx1"/>
+                </a:solidFill>
+              </a:rPr>
+              <a:t>영역</a:t>
+            </a:r>
+            <a:endParaRPr lang="en-US" altLang="ko-KR" sz="1200" dirty="0" smtClean="0">
+              <a:solidFill>
+                <a:schemeClr val="tx1"/>
+              </a:solidFill>
+            </a:endParaRPr>
+          </a:p>
+          <a:p>
+            <a:pPr algn="ctr"/>
+            <a:r>
+              <a:rPr lang="en-US" altLang="ko-KR" sz="1200" dirty="0" smtClean="0">
+                <a:solidFill>
+                  <a:schemeClr val="tx1"/>
+                </a:solidFill>
+              </a:rPr>
+              <a:t>(</a:t>
+            </a:r>
+            <a:r>
+              <a:rPr lang="ko-KR" altLang="en-US" sz="1200" dirty="0" smtClean="0">
+                <a:solidFill>
+                  <a:schemeClr val="tx1"/>
+                </a:solidFill>
+              </a:rPr>
+              <a:t>노랑색 상자</a:t>
+            </a:r>
+            <a:r>
+              <a:rPr lang="en-US" altLang="ko-KR" sz="1200" dirty="0" smtClean="0">
+                <a:solidFill>
+                  <a:schemeClr val="tx1"/>
+                </a:solidFill>
+              </a:rPr>
+              <a:t>)</a:t>
+            </a:r>
+          </a:p>
+        </p:txBody>
+      </p:sp>
+      <p:sp>
+        <p:nvSpPr>
+          <p:cNvPr id="7" name="사각형 설명선 6"/>
+          <p:cNvSpPr/>
+          <p:nvPr/>
+        </p:nvSpPr>
+        <p:spPr>
+          <a:xfrm>
+            <a:off x="611560" y="2204864"/>
+            <a:ext cx="1116124" cy="504056"/>
+          </a:xfrm>
+          <a:prstGeom prst="wedgeRectCallout">
+            <a:avLst>
+              <a:gd name="adj1" fmla="val 206889"/>
+              <a:gd name="adj2" fmla="val -22250"/>
+            </a:avLst>
+          </a:prstGeom>
+          <a:noFill/>
+          <a:ln>
+            <a:solidFill>
+              <a:schemeClr val="bg1">
+                <a:lumMod val="75000"/>
+              </a:schemeClr>
+            </a:solidFill>
+          </a:ln>
+        </p:spPr>
+        <p:style>
+          <a:lnRef idx="2">
+            <a:schemeClr val="accent1">
+              <a:shade val="50000"/>
+            </a:schemeClr>
+          </a:lnRef>
+          <a:fillRef idx="1">
+            <a:schemeClr val="accent1"/>
+          </a:fillRef>
+          <a:effectRef idx="0">
+            <a:schemeClr val="accent1"/>
+          </a:effectRef>
+          <a:fontRef idx="minor">
+            <a:schemeClr val="lt1"/>
+          </a:fontRef>
+        </p:style>
+        <p:txBody>
+          <a:bodyPr rtlCol="0" anchor="ctr"/>
+          <a:lstStyle/>
+          <a:p>
+            <a:pPr algn="ctr"/>
+            <a:r>
+              <a:rPr lang="en-US" altLang="ko-KR" sz="1200" dirty="0" smtClean="0">
+                <a:solidFill>
+                  <a:schemeClr val="tx1"/>
+                </a:solidFill>
+              </a:rPr>
+              <a:t>Fault </a:t>
+            </a:r>
+            <a:r>
+              <a:rPr lang="ko-KR" altLang="en-US" sz="1200" dirty="0" smtClean="0">
+                <a:solidFill>
+                  <a:schemeClr val="tx1"/>
+                </a:solidFill>
+              </a:rPr>
+              <a:t>영역</a:t>
+            </a:r>
+            <a:endParaRPr lang="en-US" altLang="ko-KR" sz="1200" dirty="0" smtClean="0">
+              <a:solidFill>
+                <a:schemeClr val="tx1"/>
+              </a:solidFill>
+            </a:endParaRPr>
+          </a:p>
+          <a:p>
+            <a:pPr algn="ctr"/>
+            <a:r>
+              <a:rPr lang="en-US" altLang="ko-KR" sz="1200" dirty="0" smtClean="0">
+                <a:solidFill>
+                  <a:schemeClr val="tx1"/>
+                </a:solidFill>
+              </a:rPr>
+              <a:t>(</a:t>
+            </a:r>
+            <a:r>
+              <a:rPr lang="ko-KR" altLang="en-US" sz="1200" dirty="0" smtClean="0">
+                <a:solidFill>
+                  <a:schemeClr val="tx1"/>
+                </a:solidFill>
+              </a:rPr>
+              <a:t>빨강색 상자</a:t>
+            </a:r>
+            <a:r>
+              <a:rPr lang="en-US" altLang="ko-KR" sz="1200" dirty="0" smtClean="0">
+                <a:solidFill>
+                  <a:schemeClr val="tx1"/>
+                </a:solidFill>
+              </a:rPr>
+              <a:t>)</a:t>
+            </a:r>
+          </a:p>
+        </p:txBody>
+      </p:sp>
+      <p:sp>
+        <p:nvSpPr>
+          <p:cNvPr id="10" name="사각형 설명선 9"/>
+          <p:cNvSpPr/>
+          <p:nvPr/>
+        </p:nvSpPr>
+        <p:spPr>
+          <a:xfrm>
+            <a:off x="2663788" y="1142979"/>
+            <a:ext cx="1440160" cy="504056"/>
+          </a:xfrm>
+          <a:prstGeom prst="wedgeRectCallout">
+            <a:avLst>
+              <a:gd name="adj1" fmla="val 29940"/>
+              <a:gd name="adj2" fmla="val 115496"/>
+            </a:avLst>
+          </a:prstGeom>
+          <a:noFill/>
+          <a:ln>
+            <a:solidFill>
+              <a:schemeClr val="bg1">
+                <a:lumMod val="75000"/>
+              </a:schemeClr>
+            </a:solidFill>
+          </a:ln>
+        </p:spPr>
+        <p:style>
+          <a:lnRef idx="2">
+            <a:schemeClr val="accent1">
+              <a:shade val="50000"/>
+            </a:schemeClr>
+          </a:lnRef>
+          <a:fillRef idx="1">
+            <a:schemeClr val="accent1"/>
+          </a:fillRef>
+          <a:effectRef idx="0">
+            <a:schemeClr val="accent1"/>
+          </a:effectRef>
+          <a:fontRef idx="minor">
+            <a:schemeClr val="lt1"/>
+          </a:fontRef>
+        </p:style>
+        <p:txBody>
+          <a:bodyPr rtlCol="0" anchor="ctr"/>
+          <a:lstStyle/>
+          <a:p>
+            <a:pPr algn="ctr"/>
+            <a:endParaRPr lang="en-US" altLang="ko-KR" sz="1200" dirty="0" smtClean="0">
+              <a:solidFill>
+                <a:schemeClr val="tx1"/>
+              </a:solidFill>
+            </a:endParaRPr>
+          </a:p>
+        </p:txBody>
+      </p:sp>
+      <p:sp>
+        <p:nvSpPr>
+          <p:cNvPr id="8" name="사각형 설명선 7"/>
+          <p:cNvSpPr/>
+          <p:nvPr/>
+        </p:nvSpPr>
+        <p:spPr>
+          <a:xfrm>
+            <a:off x="2663788" y="1149091"/>
+            <a:ext cx="1440160" cy="504056"/>
+          </a:xfrm>
+          <a:prstGeom prst="wedgeRectCallout">
+            <a:avLst>
+              <a:gd name="adj1" fmla="val -29585"/>
+              <a:gd name="adj2" fmla="val 111969"/>
+            </a:avLst>
+          </a:prstGeom>
+          <a:noFill/>
+          <a:ln>
+            <a:solidFill>
+              <a:schemeClr val="bg1">
+                <a:lumMod val="75000"/>
+              </a:schemeClr>
+            </a:solidFill>
+          </a:ln>
+        </p:spPr>
+        <p:style>
+          <a:lnRef idx="2">
+            <a:schemeClr val="accent1">
+              <a:shade val="50000"/>
+            </a:schemeClr>
+          </a:lnRef>
+          <a:fillRef idx="1">
+            <a:schemeClr val="accent1"/>
+          </a:fillRef>
+          <a:effectRef idx="0">
+            <a:schemeClr val="accent1"/>
+          </a:effectRef>
+          <a:fontRef idx="minor">
+            <a:schemeClr val="lt1"/>
+          </a:fontRef>
+        </p:style>
+        <p:txBody>
+          <a:bodyPr rtlCol="0" anchor="ctr"/>
+          <a:lstStyle/>
+          <a:p>
+            <a:pPr algn="ctr"/>
+            <a:r>
+              <a:rPr lang="ko-KR" altLang="en-US" sz="1200" dirty="0" smtClean="0">
+                <a:solidFill>
+                  <a:schemeClr val="tx1"/>
+                </a:solidFill>
+              </a:rPr>
+              <a:t>릴레이 출력 상태</a:t>
+            </a:r>
+            <a:endParaRPr lang="en-US" altLang="ko-KR" sz="1200" dirty="0" smtClean="0">
+              <a:solidFill>
+                <a:schemeClr val="tx1"/>
+              </a:solidFill>
+            </a:endParaRPr>
+          </a:p>
+        </p:txBody>
+      </p:sp>
+      <p:sp>
+        <p:nvSpPr>
+          <p:cNvPr id="11" name="사각형 설명선 10"/>
+          <p:cNvSpPr/>
+          <p:nvPr/>
+        </p:nvSpPr>
+        <p:spPr>
+          <a:xfrm>
+            <a:off x="323528" y="3352428"/>
+            <a:ext cx="1404156" cy="504056"/>
+          </a:xfrm>
+          <a:prstGeom prst="wedgeRectCallout">
+            <a:avLst>
+              <a:gd name="adj1" fmla="val 180678"/>
+              <a:gd name="adj2" fmla="val -123347"/>
+            </a:avLst>
+          </a:prstGeom>
+          <a:noFill/>
+          <a:ln>
+            <a:solidFill>
+              <a:schemeClr val="bg1">
+                <a:lumMod val="75000"/>
+              </a:schemeClr>
+            </a:solidFill>
+          </a:ln>
+        </p:spPr>
+        <p:style>
+          <a:lnRef idx="2">
+            <a:schemeClr val="accent1">
+              <a:shade val="50000"/>
+            </a:schemeClr>
+          </a:lnRef>
+          <a:fillRef idx="1">
+            <a:schemeClr val="accent1"/>
+          </a:fillRef>
+          <a:effectRef idx="0">
+            <a:schemeClr val="accent1"/>
+          </a:effectRef>
+          <a:fontRef idx="minor">
+            <a:schemeClr val="lt1"/>
+          </a:fontRef>
+        </p:style>
+        <p:txBody>
+          <a:bodyPr rtlCol="0" anchor="ctr"/>
+          <a:lstStyle/>
+          <a:p>
+            <a:pPr algn="ctr"/>
+            <a:r>
+              <a:rPr lang="en-US" altLang="ko-KR" sz="1200" dirty="0" smtClean="0">
+                <a:solidFill>
+                  <a:schemeClr val="tx1"/>
+                </a:solidFill>
+              </a:rPr>
+              <a:t>No Mark </a:t>
+            </a:r>
+            <a:r>
+              <a:rPr lang="ko-KR" altLang="en-US" sz="1200" dirty="0" smtClean="0">
+                <a:solidFill>
+                  <a:schemeClr val="tx1"/>
+                </a:solidFill>
+              </a:rPr>
+              <a:t>영역</a:t>
+            </a:r>
+            <a:endParaRPr lang="en-US" altLang="ko-KR" sz="1200" dirty="0" smtClean="0">
+              <a:solidFill>
+                <a:schemeClr val="tx1"/>
+              </a:solidFill>
+            </a:endParaRPr>
+          </a:p>
+          <a:p>
+            <a:pPr algn="ctr"/>
+            <a:r>
+              <a:rPr lang="en-US" altLang="ko-KR" sz="1200" dirty="0" smtClean="0">
+                <a:solidFill>
+                  <a:schemeClr val="tx1"/>
+                </a:solidFill>
+              </a:rPr>
+              <a:t>(</a:t>
+            </a:r>
+            <a:r>
+              <a:rPr lang="ko-KR" altLang="en-US" sz="1200" dirty="0" smtClean="0">
+                <a:solidFill>
+                  <a:schemeClr val="tx1"/>
+                </a:solidFill>
+              </a:rPr>
+              <a:t>빨강색 점선 상자</a:t>
+            </a:r>
+            <a:r>
+              <a:rPr lang="en-US" altLang="ko-KR" sz="1200" dirty="0" smtClean="0">
+                <a:solidFill>
+                  <a:schemeClr val="tx1"/>
+                </a:solidFill>
+              </a:rPr>
+              <a:t>)</a:t>
+            </a:r>
+          </a:p>
+        </p:txBody>
+      </p:sp>
+    </p:spTree>
+    <p:extLst>
+      <p:ext uri="{BB962C8B-B14F-4D97-AF65-F5344CB8AC3E}">
+        <p14:creationId xmlns:p14="http://schemas.microsoft.com/office/powerpoint/2010/main" val="3798725756"/>
+      </p:ext>
+    </p:extLst>
+  </p:cSld>
+  <p:clrMapOvr>
+    <a:masterClrMapping/>
+  </p:clrMapOvr>
+  <p:timing>
+    <p:tnLst>
+      <p:par>
+        <p:cTn id="1" dur="indefinite" restart="never" nodeType="tmRoot"/>
+      </p:par>
+    </p:tnLst>
+  </p:timing>
+</p:sld>
+</file>
+
+<file path=ppt/slides/slide3.xml><?xml version="1.0" encoding="utf-8"?>
 <p:sld xmlns:a="http://schemas.openxmlformats.org/drawingml/2006/main" xmlns:r="http://schemas.openxmlformats.org/officeDocument/2006/relationships" xmlns:p="http://schemas.openxmlformats.org/presentationml/2006/main">
   <p:cSld>
     <p:spTree>
@@ -4028,7 +4376,7 @@
 </p:sld>
 </file>
 
-<file path=ppt/slides/slide3.xml><?xml version="1.0" encoding="utf-8"?>
+<file path=ppt/slides/slide4.xml><?xml version="1.0" encoding="utf-8"?>
 <p:sld xmlns:a="http://schemas.openxmlformats.org/drawingml/2006/main" xmlns:r="http://schemas.openxmlformats.org/officeDocument/2006/relationships" xmlns:p="http://schemas.openxmlformats.org/presentationml/2006/main">
   <p:cSld>
     <p:spTree>
@@ -4152,7 +4500,7 @@
 </p:sld>
 </file>
 
-<file path=ppt/slides/slide4.xml><?xml version="1.0" encoding="utf-8"?>
+<file path=ppt/slides/slide5.xml><?xml version="1.0" encoding="utf-8"?>
 <p:sld xmlns:a="http://schemas.openxmlformats.org/drawingml/2006/main" xmlns:r="http://schemas.openxmlformats.org/officeDocument/2006/relationships" xmlns:p="http://schemas.openxmlformats.org/presentationml/2006/main">
   <p:cSld>
     <p:spTree>
@@ -4318,7 +4666,7 @@
 </p:sld>
 </file>
 
-<file path=ppt/slides/slide5.xml><?xml version="1.0" encoding="utf-8"?>
+<file path=ppt/slides/slide6.xml><?xml version="1.0" encoding="utf-8"?>
 <p:sld xmlns:a="http://schemas.openxmlformats.org/drawingml/2006/main" xmlns:r="http://schemas.openxmlformats.org/officeDocument/2006/relationships" xmlns:p="http://schemas.openxmlformats.org/presentationml/2006/main">
   <p:cSld>
     <p:spTree>
@@ -4394,19 +4742,7 @@
               <a:rPr lang="ko-KR" altLang="en-US" sz="1200" dirty="0" smtClean="0">
                 <a:sym typeface="Wingdings" panose="05000000000000000000" pitchFamily="2" charset="2"/>
               </a:rPr>
-              <a:t>키 등등에 의한 </a:t>
-            </a:r>
-            <a:r>
-              <a:rPr lang="ko-KR" altLang="en-US" sz="1200" dirty="0" smtClean="0">
-                <a:sym typeface="Wingdings" panose="05000000000000000000" pitchFamily="2" charset="2"/>
-              </a:rPr>
-              <a:t>각종 </a:t>
-            </a:r>
-            <a:r>
-              <a:rPr lang="ko-KR" altLang="en-US" sz="1200" dirty="0" smtClean="0">
-                <a:sym typeface="Wingdings" panose="05000000000000000000" pitchFamily="2" charset="2"/>
-              </a:rPr>
-              <a:t>설정 화면 진입 시 표시되고 </a:t>
+              <a:t>키 등등에 의한 각종 설정 화면 진입 시 표시되고 </a:t>
             </a:r>
             <a:r>
               <a:rPr lang="en-US" altLang="ko-KR" sz="1200" dirty="0" smtClean="0">
@@ -4481,7 +4817,7 @@
 </p:sld>
 </file>
 
-<file path=ppt/slides/slide6.xml><?xml version="1.0" encoding="utf-8"?>
+<file path=ppt/slides/slide7.xml><?xml version="1.0" encoding="utf-8"?>
 <p:sld xmlns:a="http://schemas.openxmlformats.org/drawingml/2006/main" xmlns:r="http://schemas.openxmlformats.org/officeDocument/2006/relationships" xmlns:p="http://schemas.openxmlformats.org/presentationml/2006/main">
   <p:cSld>
     <p:spTree>
@@ -5244,7 +5580,7 @@
 </p:sld>
 </file>
 
-<file path=ppt/slides/slide7.xml><?xml version="1.0" encoding="utf-8"?>
+<file path=ppt/slides/slide8.xml><?xml version="1.0" encoding="utf-8"?>
 <p:sld xmlns:a="http://schemas.openxmlformats.org/drawingml/2006/main" xmlns:r="http://schemas.openxmlformats.org/officeDocument/2006/relationships" xmlns:p="http://schemas.openxmlformats.org/presentationml/2006/main">
   <p:cSld>
     <p:spTree>
@@ -5927,352 +6263,6 @@
 </p:sld>
 </file>
 
-<file path=ppt/slides/slide8.xml><?xml version="1.0" encoding="utf-8"?>
-<p:sld xmlns:a="http://schemas.openxmlformats.org/drawingml/2006/main" xmlns:r="http://schemas.openxmlformats.org/officeDocument/2006/relationships" xmlns:p="http://schemas.openxmlformats.org/presentationml/2006/main">
-  <p:cSld>
-    <p:spTree>
-      <p:nvGrpSpPr>
-        <p:cNvPr id="1" name=""/>
-        <p:cNvGrpSpPr/>
-        <p:nvPr/>
-      </p:nvGrpSpPr>
-      <p:grpSpPr>
-        <a:xfrm>
-          <a:off x="0" y="0"/>
-          <a:ext cx="0" cy="0"/>
-          <a:chOff x="0" y="0"/>
-          <a:chExt cx="0" cy="0"/>
-        </a:xfrm>
-      </p:grpSpPr>
-      <p:sp>
-        <p:nvSpPr>
-          <p:cNvPr id="3" name="TextBox 2"/>
-          <p:cNvSpPr txBox="1"/>
-          <p:nvPr/>
-        </p:nvSpPr>
-        <p:spPr>
-          <a:xfrm>
-            <a:off x="1547664" y="548680"/>
-            <a:ext cx="7056784" cy="1846659"/>
-          </a:xfrm>
-          <a:prstGeom prst="rect">
-            <a:avLst/>
-          </a:prstGeom>
-          <a:noFill/>
-        </p:spPr>
-        <p:txBody>
-          <a:bodyPr wrap="square" rtlCol="0">
-            <a:spAutoFit/>
-          </a:bodyPr>
-          <a:lstStyle/>
-          <a:p>
-            <a:r>
-              <a:rPr lang="en-US" altLang="ko-KR" dirty="0" smtClean="0"/>
-              <a:t>Regions </a:t>
-            </a:r>
-            <a:r>
-              <a:rPr lang="ko-KR" altLang="en-US" dirty="0" smtClean="0"/>
-              <a:t>설정</a:t>
-            </a:r>
-            <a:r>
-              <a:rPr lang="en-US" altLang="ko-KR" dirty="0" smtClean="0"/>
-              <a:t> </a:t>
-            </a:r>
-            <a:r>
-              <a:rPr lang="ko-KR" altLang="en-US" dirty="0" smtClean="0"/>
-              <a:t>화면</a:t>
-            </a:r>
-            <a:endParaRPr lang="en-US" altLang="ko-KR" dirty="0" smtClean="0"/>
-          </a:p>
-          <a:p>
-            <a:r>
-              <a:rPr lang="en-US" altLang="ko-KR" sz="1200" dirty="0"/>
-              <a:t> </a:t>
-            </a:r>
-            <a:r>
-              <a:rPr lang="en-US" altLang="ko-KR" sz="1200" dirty="0" smtClean="0">
-                <a:sym typeface="Wingdings" panose="05000000000000000000" pitchFamily="2" charset="2"/>
-              </a:rPr>
-              <a:t> </a:t>
-            </a:r>
-            <a:r>
-              <a:rPr lang="ko-KR" altLang="en-US" sz="1200" dirty="0" smtClean="0">
-                <a:sym typeface="Wingdings" panose="05000000000000000000" pitchFamily="2" charset="2"/>
-              </a:rPr>
-              <a:t>키보드 </a:t>
-            </a:r>
-            <a:r>
-              <a:rPr lang="en-US" altLang="ko-KR" sz="1200" dirty="0" smtClean="0">
-                <a:sym typeface="Wingdings" panose="05000000000000000000" pitchFamily="2" charset="2"/>
-              </a:rPr>
-              <a:t>F3 </a:t>
-            </a:r>
-            <a:r>
-              <a:rPr lang="ko-KR" altLang="en-US" sz="1200" dirty="0" smtClean="0">
-                <a:sym typeface="Wingdings" panose="05000000000000000000" pitchFamily="2" charset="2"/>
-              </a:rPr>
-              <a:t>키로 진입</a:t>
-            </a:r>
-            <a:endParaRPr lang="en-US" altLang="ko-KR" sz="1200" dirty="0" smtClean="0">
-              <a:sym typeface="Wingdings" panose="05000000000000000000" pitchFamily="2" charset="2"/>
-            </a:endParaRPr>
-          </a:p>
-          <a:p>
-            <a:r>
-              <a:rPr lang="en-US" altLang="ko-KR" sz="1200" dirty="0" smtClean="0">
-                <a:sym typeface="Wingdings" panose="05000000000000000000" pitchFamily="2" charset="2"/>
-              </a:rPr>
-              <a:t>  Fault/Alert </a:t>
-            </a:r>
-            <a:r>
-              <a:rPr lang="ko-KR" altLang="en-US" sz="1200" dirty="0" smtClean="0">
-                <a:sym typeface="Wingdings" panose="05000000000000000000" pitchFamily="2" charset="2"/>
-              </a:rPr>
-              <a:t>등의 영역들에 대한 위치 설정</a:t>
-            </a:r>
-            <a:endParaRPr lang="en-US" altLang="ko-KR" sz="1200" dirty="0" smtClean="0">
-              <a:sym typeface="Wingdings" panose="05000000000000000000" pitchFamily="2" charset="2"/>
-            </a:endParaRPr>
-          </a:p>
-          <a:p>
-            <a:r>
-              <a:rPr lang="en-US" altLang="ko-KR" sz="1200" dirty="0">
-                <a:sym typeface="Wingdings" panose="05000000000000000000" pitchFamily="2" charset="2"/>
-              </a:rPr>
-              <a:t> </a:t>
-            </a:r>
-            <a:r>
-              <a:rPr lang="en-US" altLang="ko-KR" sz="1200" dirty="0" smtClean="0">
-                <a:sym typeface="Wingdings" panose="05000000000000000000" pitchFamily="2" charset="2"/>
-              </a:rPr>
-              <a:t> </a:t>
-            </a:r>
-            <a:r>
-              <a:rPr lang="ko-KR" altLang="en-US" sz="1200" dirty="0" smtClean="0">
-                <a:sym typeface="Wingdings" panose="05000000000000000000" pitchFamily="2" charset="2"/>
-              </a:rPr>
-              <a:t>각 영역에 해당하는 릴레이의 인덱스 설정</a:t>
-            </a:r>
-            <a:endParaRPr lang="en-US" altLang="ko-KR" sz="1200" dirty="0" smtClean="0">
-              <a:sym typeface="Wingdings" panose="05000000000000000000" pitchFamily="2" charset="2"/>
-            </a:endParaRPr>
-          </a:p>
-          <a:p>
-            <a:r>
-              <a:rPr lang="en-US" altLang="ko-KR" sz="1200" dirty="0">
-                <a:sym typeface="Wingdings" panose="05000000000000000000" pitchFamily="2" charset="2"/>
-              </a:rPr>
-              <a:t> </a:t>
-            </a:r>
-            <a:r>
-              <a:rPr lang="en-US" altLang="ko-KR" sz="1200" dirty="0" smtClean="0">
-                <a:sym typeface="Wingdings" panose="05000000000000000000" pitchFamily="2" charset="2"/>
-              </a:rPr>
-              <a:t> </a:t>
-            </a:r>
-            <a:r>
-              <a:rPr lang="ko-KR" altLang="en-US" sz="1200" dirty="0" smtClean="0">
-                <a:sym typeface="Wingdings" panose="05000000000000000000" pitchFamily="2" charset="2"/>
-              </a:rPr>
-              <a:t>각 릴레이의 이름 설정</a:t>
-            </a:r>
-            <a:endParaRPr lang="en-US" altLang="ko-KR" sz="1200" dirty="0" smtClean="0">
-              <a:sym typeface="Wingdings" panose="05000000000000000000" pitchFamily="2" charset="2"/>
-            </a:endParaRPr>
-          </a:p>
-          <a:p>
-            <a:r>
-              <a:rPr lang="en-US" altLang="ko-KR" sz="1200" dirty="0">
-                <a:sym typeface="Wingdings" panose="05000000000000000000" pitchFamily="2" charset="2"/>
-              </a:rPr>
-              <a:t> </a:t>
-            </a:r>
-            <a:r>
-              <a:rPr lang="en-US" altLang="ko-KR" sz="1200" dirty="0" smtClean="0">
-                <a:sym typeface="Wingdings" panose="05000000000000000000" pitchFamily="2" charset="2"/>
-              </a:rPr>
-              <a:t> </a:t>
-            </a:r>
-            <a:r>
-              <a:rPr lang="ko-KR" altLang="en-US" sz="1200" dirty="0" smtClean="0">
-                <a:sym typeface="Wingdings" panose="05000000000000000000" pitchFamily="2" charset="2"/>
-              </a:rPr>
-              <a:t>영역 이름 중 </a:t>
-            </a:r>
-            <a:r>
-              <a:rPr lang="en-US" altLang="ko-KR" sz="1200" dirty="0" smtClean="0">
-                <a:sym typeface="Wingdings" panose="05000000000000000000" pitchFamily="2" charset="2"/>
-              </a:rPr>
-              <a:t>“No Marking”</a:t>
-            </a:r>
-            <a:r>
-              <a:rPr lang="ko-KR" altLang="en-US" sz="1200" dirty="0" smtClean="0">
-                <a:sym typeface="Wingdings" panose="05000000000000000000" pitchFamily="2" charset="2"/>
-              </a:rPr>
-              <a:t>은 </a:t>
-            </a:r>
-            <a:r>
-              <a:rPr lang="en-US" altLang="ko-KR" sz="1200" dirty="0" smtClean="0">
-                <a:sym typeface="Wingdings" panose="05000000000000000000" pitchFamily="2" charset="2"/>
-              </a:rPr>
-              <a:t>“No mark big”</a:t>
-            </a:r>
-            <a:r>
-              <a:rPr lang="ko-KR" altLang="en-US" sz="1200" dirty="0" smtClean="0">
-                <a:sym typeface="Wingdings" panose="05000000000000000000" pitchFamily="2" charset="2"/>
-              </a:rPr>
-              <a:t>이 </a:t>
-            </a:r>
-            <a:r>
-              <a:rPr lang="en-US" altLang="ko-KR" sz="1200" dirty="0" smtClean="0">
-                <a:sym typeface="Wingdings" panose="05000000000000000000" pitchFamily="2" charset="2"/>
-              </a:rPr>
-              <a:t>“true”</a:t>
-            </a:r>
-            <a:r>
-              <a:rPr lang="ko-KR" altLang="en-US" sz="1200" dirty="0" smtClean="0">
-                <a:sym typeface="Wingdings" panose="05000000000000000000" pitchFamily="2" charset="2"/>
-              </a:rPr>
-              <a:t>로</a:t>
-            </a:r>
-            <a:r>
-              <a:rPr lang="en-US" altLang="ko-KR" sz="1200" dirty="0" smtClean="0">
-                <a:sym typeface="Wingdings" panose="05000000000000000000" pitchFamily="2" charset="2"/>
-              </a:rPr>
-              <a:t> </a:t>
-            </a:r>
-            <a:r>
-              <a:rPr lang="ko-KR" altLang="en-US" sz="1200" dirty="0" smtClean="0">
-                <a:sym typeface="Wingdings" panose="05000000000000000000" pitchFamily="2" charset="2"/>
-              </a:rPr>
-              <a:t>되어 있는 상태에서 이용되며 해당 영역에 </a:t>
-            </a:r>
-            <a:r>
-              <a:rPr lang="ko-KR" altLang="en-US" sz="1200" dirty="0">
-                <a:sym typeface="Wingdings" panose="05000000000000000000" pitchFamily="2" charset="2"/>
-              </a:rPr>
-              <a:t>일정 크기 </a:t>
-            </a:r>
-            <a:r>
-              <a:rPr lang="ko-KR" altLang="en-US" sz="1200" dirty="0" smtClean="0">
-                <a:sym typeface="Wingdings" panose="05000000000000000000" pitchFamily="2" charset="2"/>
-              </a:rPr>
-              <a:t>이상의 대상물체가 감지되면 화면의 감지된 대상물체에 원형 표시를 하지 않음</a:t>
-            </a:r>
-            <a:endParaRPr lang="en-US" altLang="ko-KR" sz="1200" dirty="0" smtClean="0">
-              <a:sym typeface="Wingdings" panose="05000000000000000000" pitchFamily="2" charset="2"/>
-            </a:endParaRPr>
-          </a:p>
-          <a:p>
-            <a:r>
-              <a:rPr lang="en-US" altLang="ko-KR" sz="1200" dirty="0">
-                <a:sym typeface="Wingdings" panose="05000000000000000000" pitchFamily="2" charset="2"/>
-              </a:rPr>
-              <a:t> </a:t>
-            </a:r>
-            <a:r>
-              <a:rPr lang="en-US" altLang="ko-KR" sz="1200" dirty="0" smtClean="0">
-                <a:sym typeface="Wingdings" panose="05000000000000000000" pitchFamily="2" charset="2"/>
-              </a:rPr>
-              <a:t> </a:t>
-            </a:r>
-            <a:r>
-              <a:rPr lang="ko-KR" altLang="en-US" sz="1200" dirty="0" smtClean="0">
-                <a:sym typeface="Wingdings" panose="05000000000000000000" pitchFamily="2" charset="2"/>
-              </a:rPr>
-              <a:t>이 대상물체의 크기는 </a:t>
-            </a:r>
-            <a:r>
-              <a:rPr lang="en-US" altLang="ko-KR" sz="1200" dirty="0" smtClean="0">
-                <a:sym typeface="Wingdings" panose="05000000000000000000" pitchFamily="2" charset="2"/>
-              </a:rPr>
-              <a:t>System </a:t>
-            </a:r>
-            <a:r>
-              <a:rPr lang="ko-KR" altLang="en-US" sz="1200" dirty="0" smtClean="0">
-                <a:sym typeface="Wingdings" panose="05000000000000000000" pitchFamily="2" charset="2"/>
-              </a:rPr>
-              <a:t>설정 화면의 </a:t>
-            </a:r>
-            <a:r>
-              <a:rPr lang="en-US" altLang="ko-KR" sz="1200" dirty="0" smtClean="0">
-                <a:sym typeface="Wingdings" panose="05000000000000000000" pitchFamily="2" charset="2"/>
-              </a:rPr>
-              <a:t>ROI_OBJECT_NO_MARK_BIG_DIAMETER_MIN </a:t>
-            </a:r>
-            <a:r>
-              <a:rPr lang="ko-KR" altLang="en-US" sz="1200" dirty="0" smtClean="0">
-                <a:sym typeface="Wingdings" panose="05000000000000000000" pitchFamily="2" charset="2"/>
-              </a:rPr>
-              <a:t>값을 이용함</a:t>
-            </a:r>
-            <a:r>
-              <a:rPr lang="en-US" altLang="ko-KR" sz="1200" dirty="0" smtClean="0">
-                <a:sym typeface="Wingdings" panose="05000000000000000000" pitchFamily="2" charset="2"/>
-              </a:rPr>
-              <a:t>(</a:t>
-            </a:r>
-            <a:r>
-              <a:rPr lang="ko-KR" altLang="en-US" sz="1200" dirty="0" smtClean="0">
-                <a:sym typeface="Wingdings" panose="05000000000000000000" pitchFamily="2" charset="2"/>
-              </a:rPr>
-              <a:t>기본값 </a:t>
-            </a:r>
-            <a:r>
-              <a:rPr lang="en-US" altLang="ko-KR" sz="1200" dirty="0" smtClean="0">
-                <a:sym typeface="Wingdings" panose="05000000000000000000" pitchFamily="2" charset="2"/>
-              </a:rPr>
-              <a:t>2meter)</a:t>
-            </a:r>
-            <a:endParaRPr lang="ko-KR" altLang="en-US" sz="1200" dirty="0"/>
-          </a:p>
-        </p:txBody>
-      </p:sp>
-      <p:pic>
-        <p:nvPicPr>
-          <p:cNvPr id="2" name="그림 1"/>
-          <p:cNvPicPr>
-            <a:picLocks noChangeAspect="1"/>
-          </p:cNvPicPr>
-          <p:nvPr/>
-        </p:nvPicPr>
-        <p:blipFill>
-          <a:blip r:embed="rId2">
-            <a:extLst>
-              <a:ext uri="{28A0092B-C50C-407E-A947-70E740481C1C}">
-                <a14:useLocalDpi xmlns:a14="http://schemas.microsoft.com/office/drawing/2010/main" val="0"/>
-              </a:ext>
-            </a:extLst>
-          </a:blip>
-          <a:stretch>
-            <a:fillRect/>
-          </a:stretch>
-        </p:blipFill>
-        <p:spPr>
-          <a:xfrm>
-            <a:off x="1861200" y="2636912"/>
-            <a:ext cx="5399227" cy="3342132"/>
-          </a:xfrm>
-          <a:prstGeom prst="rect">
-            <a:avLst/>
-          </a:prstGeom>
-        </p:spPr>
-      </p:pic>
-    </p:spTree>
-  </p:cSld>
-  <p:clrMapOvr>
-    <a:masterClrMapping/>
-  </p:clrMapOvr>
-  <p:timing>
-    <p:tnLst>
-      <p:par>
-        <p:cTn id="1" dur="indefinite" restart="never" nodeType="tmRoot"/>
-      </p:par>
-    </p:tnLst>
-  </p:timing>
-</p:sld>
-</file>
-
 <file path=ppt/slides/slide9.xml><?xml version="1.0" encoding="utf-8"?>
 <p:sld xmlns:a="http://schemas.openxmlformats.org/drawingml/2006/main" xmlns:r="http://schemas.openxmlformats.org/officeDocument/2006/relationships" xmlns:p="http://schemas.openxmlformats.org/presentationml/2006/main">
   <p:cSld>
@@ -6290,6 +6280,30 @@
           <a:chExt cx="0" cy="0"/>
         </a:xfrm>
       </p:grpSpPr>
+      <p:pic>
+        <p:nvPicPr>
+          <p:cNvPr id="6" name="그림 5"/>
+          <p:cNvPicPr>
+            <a:picLocks noChangeAspect="1"/>
+          </p:cNvPicPr>
+          <p:nvPr/>
+        </p:nvPicPr>
+        <p:blipFill>
+          <a:blip r:embed="rId2"/>
+          <a:stretch>
+            <a:fillRect/>
+          </a:stretch>
+        </p:blipFill>
+        <p:spPr>
+          <a:xfrm>
+            <a:off x="1900291" y="2674119"/>
+            <a:ext cx="5316955" cy="3275161"/>
+          </a:xfrm>
+          <a:prstGeom prst="rect">
+            <a:avLst/>
+          </a:prstGeom>
+        </p:spPr>
+      </p:pic>
       <p:sp>
         <p:nvSpPr>
           <p:cNvPr id="3" name="TextBox 2"/>
@@ -6299,7 +6313,7 @@
         <p:spPr>
           <a:xfrm>
             <a:off x="1547664" y="548680"/>
-            <a:ext cx="7056784" cy="923330"/>
+            <a:ext cx="7056784" cy="1846659"/>
           </a:xfrm>
           <a:prstGeom prst="rect">
             <a:avLst/>
@@ -6313,8 +6327,12 @@
           <a:lstStyle/>
           <a:p>
             <a:r>
+              <a:rPr lang="en-US" altLang="ko-KR" dirty="0" smtClean="0"/>
+              <a:t>Regions </a:t>
+            </a:r>
+            <a:r>
               <a:rPr lang="ko-KR" altLang="en-US" dirty="0" smtClean="0"/>
-              <a:t>전체 대상물체 표시</a:t>
+              <a:t>설정</a:t>
             </a:r>
             <a:r>
               <a:rPr lang="en-US" altLang="ko-KR" dirty="0" smtClean="0"/>
@@ -6347,7 +6365,7 @@
               <a:rPr lang="en-US" altLang="ko-KR" sz="1200" dirty="0" smtClean="0">
                 <a:sym typeface="Wingdings" panose="05000000000000000000" pitchFamily="2" charset="2"/>
               </a:rPr>
-              <a:t>F4 </a:t>
+              <a:t>F3 </a:t>
             </a:r>
             <a:r>
               <a:rPr lang="ko-KR" altLang="en-US" sz="1200" dirty="0" smtClean="0">
@@ -6364,95 +6382,225 @@
               <a:rPr lang="en-US" altLang="ko-KR" sz="1200" dirty="0" smtClean="0">
                 <a:sym typeface="Wingdings" panose="05000000000000000000" pitchFamily="2" charset="2"/>
               </a:rPr>
-              <a:t>  </a:t>
+              <a:t>  Fault/Alert </a:t>
             </a:r>
             <a:r>
               <a:rPr lang="ko-KR" altLang="en-US" sz="1200" dirty="0" smtClean="0">
                 <a:sym typeface="Wingdings" panose="05000000000000000000" pitchFamily="2" charset="2"/>
               </a:rPr>
-              <a:t>기본적으로 </a:t>
+              <a:t>등의 영역들에 대한 시작 및 끝 </a:t>
             </a:r>
             <a:r>
               <a:rPr lang="en-US" altLang="ko-KR" sz="1200" dirty="0" smtClean="0">
                 <a:sym typeface="Wingdings" panose="05000000000000000000" pitchFamily="2" charset="2"/>
               </a:rPr>
-              <a:t>Fault/Alert </a:t>
+              <a:t>X, Y </a:t>
             </a:r>
             <a:r>
               <a:rPr lang="ko-KR" altLang="en-US" sz="1200" dirty="0" smtClean="0">
                 <a:sym typeface="Wingdings" panose="05000000000000000000" pitchFamily="2" charset="2"/>
               </a:rPr>
-              <a:t>등의 영역들에 위치한 대상물체만을 표시하고 있으나 이외의 영역에 위치한 대상물체도 표시</a:t>
-            </a:r>
-          </a:p>
-        </p:txBody>
-      </p:sp>
-      <p:pic>
-        <p:nvPicPr>
-          <p:cNvPr id="2" name="그림 1"/>
-          <p:cNvPicPr>
-            <a:picLocks noChangeAspect="1"/>
-          </p:cNvPicPr>
-          <p:nvPr/>
-        </p:nvPicPr>
-        <p:blipFill>
-          <a:blip r:embed="rId2" cstate="print">
-            <a:extLst>
-              <a:ext uri="{28A0092B-C50C-407E-A947-70E740481C1C}">
-                <a14:useLocalDpi xmlns:a14="http://schemas.microsoft.com/office/drawing/2010/main" val="0"/>
-              </a:ext>
-            </a:extLst>
-          </a:blip>
-          <a:stretch>
-            <a:fillRect/>
-          </a:stretch>
-        </p:blipFill>
-        <p:spPr>
-          <a:xfrm>
-            <a:off x="467544" y="1556792"/>
-            <a:ext cx="3687745" cy="2282722"/>
-          </a:xfrm>
-          <a:prstGeom prst="rect">
-            <a:avLst/>
-          </a:prstGeom>
-        </p:spPr>
-      </p:pic>
-      <p:pic>
-        <p:nvPicPr>
-          <p:cNvPr id="5" name="그림 4"/>
-          <p:cNvPicPr>
-            <a:picLocks noChangeAspect="1"/>
-          </p:cNvPicPr>
-          <p:nvPr/>
-        </p:nvPicPr>
-        <p:blipFill>
-          <a:blip r:embed="rId3">
-            <a:extLst>
-              <a:ext uri="{28A0092B-C50C-407E-A947-70E740481C1C}">
-                <a14:useLocalDpi xmlns:a14="http://schemas.microsoft.com/office/drawing/2010/main" val="0"/>
-              </a:ext>
-            </a:extLst>
-          </a:blip>
-          <a:stretch>
-            <a:fillRect/>
-          </a:stretch>
-        </p:blipFill>
-        <p:spPr>
-          <a:xfrm>
-            <a:off x="3275856" y="3140968"/>
-            <a:ext cx="5423154" cy="3356943"/>
-          </a:xfrm>
-          <a:prstGeom prst="rect">
-            <a:avLst/>
-          </a:prstGeom>
-        </p:spPr>
-      </p:pic>
+              <a:t>위치 설정</a:t>
+            </a:r>
+            <a:endParaRPr lang="en-US" altLang="ko-KR" sz="1200" dirty="0" smtClean="0">
+              <a:sym typeface="Wingdings" panose="05000000000000000000" pitchFamily="2" charset="2"/>
+            </a:endParaRPr>
+          </a:p>
+          <a:p>
+            <a:r>
+              <a:rPr lang="en-US" altLang="ko-KR" sz="1200" dirty="0">
+                <a:sym typeface="Wingdings" panose="05000000000000000000" pitchFamily="2" charset="2"/>
+              </a:rPr>
+              <a:t> </a:t>
+            </a:r>
+            <a:r>
+              <a:rPr lang="en-US" altLang="ko-KR" sz="1200" dirty="0" smtClean="0">
+                <a:sym typeface="Wingdings" panose="05000000000000000000" pitchFamily="2" charset="2"/>
+              </a:rPr>
+              <a:t> </a:t>
+            </a:r>
+            <a:r>
+              <a:rPr lang="ko-KR" altLang="en-US" sz="1200" dirty="0" smtClean="0">
+                <a:sym typeface="Wingdings" panose="05000000000000000000" pitchFamily="2" charset="2"/>
+              </a:rPr>
+              <a:t>각 영역에 해당하는 릴레이의 인덱스 설정</a:t>
+            </a:r>
+            <a:endParaRPr lang="en-US" altLang="ko-KR" sz="1200" dirty="0" smtClean="0">
+              <a:sym typeface="Wingdings" panose="05000000000000000000" pitchFamily="2" charset="2"/>
+            </a:endParaRPr>
+          </a:p>
+          <a:p>
+            <a:r>
+              <a:rPr lang="en-US" altLang="ko-KR" sz="1200" dirty="0">
+                <a:sym typeface="Wingdings" panose="05000000000000000000" pitchFamily="2" charset="2"/>
+              </a:rPr>
+              <a:t> </a:t>
+            </a:r>
+            <a:r>
+              <a:rPr lang="en-US" altLang="ko-KR" sz="1200" dirty="0" smtClean="0">
+                <a:sym typeface="Wingdings" panose="05000000000000000000" pitchFamily="2" charset="2"/>
+              </a:rPr>
+              <a:t> </a:t>
+            </a:r>
+            <a:r>
+              <a:rPr lang="ko-KR" altLang="en-US" sz="1200" dirty="0" smtClean="0">
+                <a:sym typeface="Wingdings" panose="05000000000000000000" pitchFamily="2" charset="2"/>
+              </a:rPr>
+              <a:t>각 릴레이의 이름 설정</a:t>
+            </a:r>
+            <a:endParaRPr lang="en-US" altLang="ko-KR" sz="1200" dirty="0" smtClean="0">
+              <a:sym typeface="Wingdings" panose="05000000000000000000" pitchFamily="2" charset="2"/>
+            </a:endParaRPr>
+          </a:p>
+          <a:p>
+            <a:r>
+              <a:rPr lang="en-US" altLang="ko-KR" sz="1200" dirty="0">
+                <a:sym typeface="Wingdings" panose="05000000000000000000" pitchFamily="2" charset="2"/>
+              </a:rPr>
+              <a:t> </a:t>
+            </a:r>
+            <a:r>
+              <a:rPr lang="en-US" altLang="ko-KR" sz="1200" dirty="0" smtClean="0">
+                <a:sym typeface="Wingdings" panose="05000000000000000000" pitchFamily="2" charset="2"/>
+              </a:rPr>
+              <a:t> </a:t>
+            </a:r>
+            <a:r>
+              <a:rPr lang="ko-KR" altLang="en-US" sz="1200" dirty="0" smtClean="0">
+                <a:sym typeface="Wingdings" panose="05000000000000000000" pitchFamily="2" charset="2"/>
+              </a:rPr>
+              <a:t>영역 이름 중 </a:t>
+            </a:r>
+            <a:r>
+              <a:rPr lang="en-US" altLang="ko-KR" sz="1200" dirty="0" smtClean="0">
+                <a:sym typeface="Wingdings" panose="05000000000000000000" pitchFamily="2" charset="2"/>
+              </a:rPr>
+              <a:t>“No Marking”</a:t>
+            </a:r>
+            <a:r>
+              <a:rPr lang="ko-KR" altLang="en-US" sz="1200" dirty="0" smtClean="0">
+                <a:sym typeface="Wingdings" panose="05000000000000000000" pitchFamily="2" charset="2"/>
+              </a:rPr>
+              <a:t>은 </a:t>
+            </a:r>
+            <a:r>
+              <a:rPr lang="en-US" altLang="ko-KR" sz="1200" dirty="0" smtClean="0">
+                <a:sym typeface="Wingdings" panose="05000000000000000000" pitchFamily="2" charset="2"/>
+              </a:rPr>
+              <a:t>“No mark big”</a:t>
+            </a:r>
+            <a:r>
+              <a:rPr lang="ko-KR" altLang="en-US" sz="1200" dirty="0" smtClean="0">
+                <a:sym typeface="Wingdings" panose="05000000000000000000" pitchFamily="2" charset="2"/>
+              </a:rPr>
+              <a:t>이 </a:t>
+            </a:r>
+            <a:r>
+              <a:rPr lang="en-US" altLang="ko-KR" sz="1200" dirty="0" smtClean="0">
+                <a:sym typeface="Wingdings" panose="05000000000000000000" pitchFamily="2" charset="2"/>
+              </a:rPr>
+              <a:t>“true”</a:t>
+            </a:r>
+            <a:r>
+              <a:rPr lang="ko-KR" altLang="en-US" sz="1200" dirty="0" smtClean="0">
+                <a:sym typeface="Wingdings" panose="05000000000000000000" pitchFamily="2" charset="2"/>
+              </a:rPr>
+              <a:t>로</a:t>
+            </a:r>
+            <a:r>
+              <a:rPr lang="en-US" altLang="ko-KR" sz="1200" dirty="0" smtClean="0">
+                <a:sym typeface="Wingdings" panose="05000000000000000000" pitchFamily="2" charset="2"/>
+              </a:rPr>
+              <a:t> </a:t>
+            </a:r>
+            <a:r>
+              <a:rPr lang="ko-KR" altLang="en-US" sz="1200" dirty="0" smtClean="0">
+                <a:sym typeface="Wingdings" panose="05000000000000000000" pitchFamily="2" charset="2"/>
+              </a:rPr>
+              <a:t>되어 있는 상태에서 이용되며 해당 영역에 </a:t>
+            </a:r>
+            <a:r>
+              <a:rPr lang="ko-KR" altLang="en-US" sz="1200" dirty="0">
+                <a:sym typeface="Wingdings" panose="05000000000000000000" pitchFamily="2" charset="2"/>
+              </a:rPr>
+              <a:t>일정 크기 </a:t>
+            </a:r>
+            <a:r>
+              <a:rPr lang="ko-KR" altLang="en-US" sz="1200" dirty="0" smtClean="0">
+                <a:sym typeface="Wingdings" panose="05000000000000000000" pitchFamily="2" charset="2"/>
+              </a:rPr>
+              <a:t>이상의 대상물체가 감지되면 화면의 감지된 대상물체에 원형 표시를 하지 않음</a:t>
+            </a:r>
+            <a:endParaRPr lang="en-US" altLang="ko-KR" sz="1200" dirty="0" smtClean="0">
+              <a:sym typeface="Wingdings" panose="05000000000000000000" pitchFamily="2" charset="2"/>
+            </a:endParaRPr>
+          </a:p>
+          <a:p>
+            <a:r>
+              <a:rPr lang="en-US" altLang="ko-KR" sz="1200" dirty="0">
+                <a:sym typeface="Wingdings" panose="05000000000000000000" pitchFamily="2" charset="2"/>
+              </a:rPr>
+              <a:t> </a:t>
+            </a:r>
+            <a:r>
+              <a:rPr lang="en-US" altLang="ko-KR" sz="1200" dirty="0" smtClean="0">
+                <a:sym typeface="Wingdings" panose="05000000000000000000" pitchFamily="2" charset="2"/>
+              </a:rPr>
+              <a:t> </a:t>
+            </a:r>
+            <a:r>
+              <a:rPr lang="ko-KR" altLang="en-US" sz="1200" dirty="0" smtClean="0">
+                <a:sym typeface="Wingdings" panose="05000000000000000000" pitchFamily="2" charset="2"/>
+              </a:rPr>
+              <a:t>이 대상물체의 크기는 </a:t>
+            </a:r>
+            <a:r>
+              <a:rPr lang="en-US" altLang="ko-KR" sz="1200" dirty="0" smtClean="0">
+                <a:sym typeface="Wingdings" panose="05000000000000000000" pitchFamily="2" charset="2"/>
+              </a:rPr>
+              <a:t>System </a:t>
+            </a:r>
+            <a:r>
+              <a:rPr lang="ko-KR" altLang="en-US" sz="1200" dirty="0" smtClean="0">
+                <a:sym typeface="Wingdings" panose="05000000000000000000" pitchFamily="2" charset="2"/>
+              </a:rPr>
+              <a:t>설정 화면의 </a:t>
+            </a:r>
+            <a:r>
+              <a:rPr lang="en-US" altLang="ko-KR" sz="1200" dirty="0" smtClean="0">
+                <a:sym typeface="Wingdings" panose="05000000000000000000" pitchFamily="2" charset="2"/>
+              </a:rPr>
+              <a:t>ROI_OBJECT_NO_MARK_BIG_DIAMETER_MIN </a:t>
+            </a:r>
+            <a:r>
+              <a:rPr lang="ko-KR" altLang="en-US" sz="1200" dirty="0" smtClean="0">
+                <a:sym typeface="Wingdings" panose="05000000000000000000" pitchFamily="2" charset="2"/>
+              </a:rPr>
+              <a:t>값을 이용함</a:t>
+            </a:r>
+            <a:r>
+              <a:rPr lang="en-US" altLang="ko-KR" sz="1200" dirty="0" smtClean="0">
+                <a:sym typeface="Wingdings" panose="05000000000000000000" pitchFamily="2" charset="2"/>
+              </a:rPr>
+              <a:t>(</a:t>
+            </a:r>
+            <a:r>
+              <a:rPr lang="ko-KR" altLang="en-US" sz="1200" dirty="0" smtClean="0">
+                <a:sym typeface="Wingdings" panose="05000000000000000000" pitchFamily="2" charset="2"/>
+              </a:rPr>
+              <a:t>기본값 </a:t>
+            </a:r>
+            <a:r>
+              <a:rPr lang="en-US" altLang="ko-KR" sz="1200" dirty="0" smtClean="0">
+                <a:sym typeface="Wingdings" panose="05000000000000000000" pitchFamily="2" charset="2"/>
+              </a:rPr>
+              <a:t>2meter)</a:t>
+            </a:r>
+            <a:endParaRPr lang="ko-KR" altLang="en-US" sz="1200" dirty="0"/>
+          </a:p>
+        </p:txBody>
+      </p:sp>
     </p:spTree>
-    <p:extLst>
-      <p:ext uri="{BB962C8B-B14F-4D97-AF65-F5344CB8AC3E}">
-        <p14:creationId xmlns:p14="http://schemas.microsoft.com/office/powerpoint/2010/main" val="1566085540"/>
-      </p:ext>
-    </p:extLst>
   </p:cSld>
   <p:clrMapOvr>
     <a:masterClrMapping/>

</xml_diff>

<commit_message>
Add 2D-AntiCollision Monitoring System rev. A06 document.
</commit_message>
<xml_diff>
--- a/2D-AntiCollision Monitoring System.pptx
+++ b/2D-AntiCollision Monitoring System.pptx
@@ -315,7 +315,7 @@
             <a:fld id="{F17B436D-341F-426B-A879-B4FA1B0657F1}" type="datetimeFigureOut">
               <a:rPr lang="ko-KR" altLang="en-US" smtClean="0"/>
               <a:pPr/>
-              <a:t>2018-08-24</a:t>
+              <a:t>2018-09-06</a:t>
             </a:fld>
             <a:endParaRPr lang="ko-KR" altLang="en-US"/>
           </a:p>
@@ -482,7 +482,7 @@
             <a:fld id="{F17B436D-341F-426B-A879-B4FA1B0657F1}" type="datetimeFigureOut">
               <a:rPr lang="ko-KR" altLang="en-US" smtClean="0"/>
               <a:pPr/>
-              <a:t>2018-08-24</a:t>
+              <a:t>2018-09-06</a:t>
             </a:fld>
             <a:endParaRPr lang="ko-KR" altLang="en-US"/>
           </a:p>
@@ -659,7 +659,7 @@
             <a:fld id="{F17B436D-341F-426B-A879-B4FA1B0657F1}" type="datetimeFigureOut">
               <a:rPr lang="ko-KR" altLang="en-US" smtClean="0"/>
               <a:pPr/>
-              <a:t>2018-08-24</a:t>
+              <a:t>2018-09-06</a:t>
             </a:fld>
             <a:endParaRPr lang="ko-KR" altLang="en-US"/>
           </a:p>
@@ -826,7 +826,7 @@
             <a:fld id="{F17B436D-341F-426B-A879-B4FA1B0657F1}" type="datetimeFigureOut">
               <a:rPr lang="ko-KR" altLang="en-US" smtClean="0"/>
               <a:pPr/>
-              <a:t>2018-08-24</a:t>
+              <a:t>2018-09-06</a:t>
             </a:fld>
             <a:endParaRPr lang="ko-KR" altLang="en-US"/>
           </a:p>
@@ -1069,7 +1069,7 @@
             <a:fld id="{F17B436D-341F-426B-A879-B4FA1B0657F1}" type="datetimeFigureOut">
               <a:rPr lang="ko-KR" altLang="en-US" smtClean="0"/>
               <a:pPr/>
-              <a:t>2018-08-24</a:t>
+              <a:t>2018-09-06</a:t>
             </a:fld>
             <a:endParaRPr lang="ko-KR" altLang="en-US"/>
           </a:p>
@@ -1354,7 +1354,7 @@
             <a:fld id="{F17B436D-341F-426B-A879-B4FA1B0657F1}" type="datetimeFigureOut">
               <a:rPr lang="ko-KR" altLang="en-US" smtClean="0"/>
               <a:pPr/>
-              <a:t>2018-08-24</a:t>
+              <a:t>2018-09-06</a:t>
             </a:fld>
             <a:endParaRPr lang="ko-KR" altLang="en-US"/>
           </a:p>
@@ -1773,7 +1773,7 @@
             <a:fld id="{F17B436D-341F-426B-A879-B4FA1B0657F1}" type="datetimeFigureOut">
               <a:rPr lang="ko-KR" altLang="en-US" smtClean="0"/>
               <a:pPr/>
-              <a:t>2018-08-24</a:t>
+              <a:t>2018-09-06</a:t>
             </a:fld>
             <a:endParaRPr lang="ko-KR" altLang="en-US"/>
           </a:p>
@@ -1888,7 +1888,7 @@
             <a:fld id="{F17B436D-341F-426B-A879-B4FA1B0657F1}" type="datetimeFigureOut">
               <a:rPr lang="ko-KR" altLang="en-US" smtClean="0"/>
               <a:pPr/>
-              <a:t>2018-08-24</a:t>
+              <a:t>2018-09-06</a:t>
             </a:fld>
             <a:endParaRPr lang="ko-KR" altLang="en-US"/>
           </a:p>
@@ -1980,7 +1980,7 @@
             <a:fld id="{F17B436D-341F-426B-A879-B4FA1B0657F1}" type="datetimeFigureOut">
               <a:rPr lang="ko-KR" altLang="en-US" smtClean="0"/>
               <a:pPr/>
-              <a:t>2018-08-24</a:t>
+              <a:t>2018-09-06</a:t>
             </a:fld>
             <a:endParaRPr lang="ko-KR" altLang="en-US"/>
           </a:p>
@@ -2254,7 +2254,7 @@
             <a:fld id="{F17B436D-341F-426B-A879-B4FA1B0657F1}" type="datetimeFigureOut">
               <a:rPr lang="ko-KR" altLang="en-US" smtClean="0"/>
               <a:pPr/>
-              <a:t>2018-08-24</a:t>
+              <a:t>2018-09-06</a:t>
             </a:fld>
             <a:endParaRPr lang="ko-KR" altLang="en-US"/>
           </a:p>
@@ -2504,7 +2504,7 @@
             <a:fld id="{F17B436D-341F-426B-A879-B4FA1B0657F1}" type="datetimeFigureOut">
               <a:rPr lang="ko-KR" altLang="en-US" smtClean="0"/>
               <a:pPr/>
-              <a:t>2018-08-24</a:t>
+              <a:t>2018-09-06</a:t>
             </a:fld>
             <a:endParaRPr lang="ko-KR" altLang="en-US"/>
           </a:p>
@@ -2714,7 +2714,7 @@
             <a:fld id="{F17B436D-341F-426B-A879-B4FA1B0657F1}" type="datetimeFigureOut">
               <a:rPr lang="ko-KR" altLang="en-US" smtClean="0"/>
               <a:pPr/>
-              <a:t>2018-08-24</a:t>
+              <a:t>2018-09-06</a:t>
             </a:fld>
             <a:endParaRPr lang="ko-KR" altLang="en-US"/>
           </a:p>
@@ -3124,7 +3124,7 @@
         <p:spPr>
           <a:xfrm>
             <a:off x="755576" y="1052736"/>
-            <a:ext cx="7848872" cy="1015663"/>
+            <a:ext cx="7848872" cy="1200329"/>
           </a:xfrm>
           <a:prstGeom prst="rect">
             <a:avLst/>
@@ -3191,11 +3191,34 @@
             </a:r>
             <a:r>
               <a:rPr lang="ko-KR" altLang="en-US" sz="1200" dirty="0" smtClean="0"/>
-              <a:t>설정 화면의 영역 설명 방식 변경사항 설명 </a:t>
+              <a:t>설정 화면의 영역 설명 방식 변경사항 설명 및 화면 </a:t>
             </a:r>
             <a:r>
               <a:rPr lang="ko-KR" altLang="en-US" sz="1200" dirty="0" smtClean="0"/>
-              <a:t>및 화면 추가</a:t>
+              <a:t>추가</a:t>
+            </a:r>
+            <a:endParaRPr lang="en-US" altLang="ko-KR" sz="1200" dirty="0" smtClean="0"/>
+          </a:p>
+          <a:p>
+            <a:r>
+              <a:rPr lang="en-US" altLang="ko-KR" sz="1200" dirty="0" smtClean="0"/>
+              <a:t>A06 2018-09-06 System </a:t>
+            </a:r>
+            <a:r>
+              <a:rPr lang="ko-KR" altLang="en-US" sz="1200" dirty="0"/>
+              <a:t>설정 화면의 </a:t>
+            </a:r>
+            <a:r>
+              <a:rPr lang="ko-KR" altLang="en-US" sz="1200" dirty="0" smtClean="0"/>
+              <a:t>머신 이름 설정 </a:t>
+            </a:r>
+            <a:r>
+              <a:rPr lang="ko-KR" altLang="en-US" sz="1200" dirty="0"/>
+              <a:t>및 화면 </a:t>
+            </a:r>
+            <a:r>
+              <a:rPr lang="ko-KR" altLang="en-US" sz="1200" dirty="0" smtClean="0"/>
+              <a:t>추가</a:t>
             </a:r>
             <a:endParaRPr lang="en-US" altLang="ko-KR" sz="1200" dirty="0"/>
           </a:p>
@@ -3650,7 +3673,7 @@
       </p:grpSpPr>
       <p:pic>
         <p:nvPicPr>
-          <p:cNvPr id="4" name="그림 3"/>
+          <p:cNvPr id="9" name="그림 8"/>
           <p:cNvPicPr>
             <a:picLocks noChangeAspect="1"/>
           </p:cNvPicPr>
@@ -3670,8 +3693,8 @@
         </p:blipFill>
         <p:spPr>
           <a:xfrm>
-            <a:off x="1860423" y="1750529"/>
-            <a:ext cx="5423154" cy="3356943"/>
+            <a:off x="1733148" y="2019459"/>
+            <a:ext cx="5677705" cy="3497773"/>
           </a:xfrm>
           <a:prstGeom prst="rect">
             <a:avLst/>
@@ -3720,13 +3743,13 @@
         </p:nvSpPr>
         <p:spPr>
           <a:xfrm>
-            <a:off x="4283968" y="1142979"/>
-            <a:ext cx="1368152" cy="504056"/>
+            <a:off x="3275856" y="1368478"/>
+            <a:ext cx="1296144" cy="504056"/>
           </a:xfrm>
           <a:prstGeom prst="wedgeRectCallout">
             <a:avLst>
-              <a:gd name="adj1" fmla="val -46997"/>
-              <a:gd name="adj2" fmla="val 130212"/>
+              <a:gd name="adj1" fmla="val 28777"/>
+              <a:gd name="adj2" fmla="val 126013"/>
             </a:avLst>
           </a:prstGeom>
           <a:noFill/>
@@ -3773,7 +3796,7 @@
                   <a:schemeClr val="tx1"/>
                 </a:solidFill>
               </a:rPr>
-              <a:t>이미지</a:t>
+              <a:t>아이콘</a:t>
             </a:r>
             <a:endParaRPr lang="en-US" altLang="ko-KR" sz="1200" dirty="0" smtClean="0">
               <a:solidFill>
@@ -3791,13 +3814,13 @@
         </p:nvSpPr>
         <p:spPr>
           <a:xfrm>
-            <a:off x="611560" y="2780928"/>
+            <a:off x="539552" y="4184920"/>
             <a:ext cx="1116124" cy="504056"/>
           </a:xfrm>
           <a:prstGeom prst="wedgeRectCallout">
             <a:avLst>
-              <a:gd name="adj1" fmla="val 144172"/>
-              <a:gd name="adj2" fmla="val -47425"/>
+              <a:gd name="adj1" fmla="val 153275"/>
+              <a:gd name="adj2" fmla="val 152250"/>
             </a:avLst>
           </a:prstGeom>
           <a:noFill/>
@@ -3889,13 +3912,13 @@
         </p:nvSpPr>
         <p:spPr>
           <a:xfrm>
-            <a:off x="611560" y="2204864"/>
+            <a:off x="539552" y="3264289"/>
             <a:ext cx="1116124" cy="504056"/>
           </a:xfrm>
           <a:prstGeom prst="wedgeRectCallout">
             <a:avLst>
-              <a:gd name="adj1" fmla="val 206889"/>
-              <a:gd name="adj2" fmla="val -22250"/>
+              <a:gd name="adj1" fmla="val 207742"/>
+              <a:gd name="adj2" fmla="val 22473"/>
             </a:avLst>
           </a:prstGeom>
           <a:noFill/>
@@ -3987,13 +4010,13 @@
         </p:nvSpPr>
         <p:spPr>
           <a:xfrm>
-            <a:off x="2663788" y="1142979"/>
+            <a:off x="1763688" y="1368478"/>
             <a:ext cx="1440160" cy="504056"/>
           </a:xfrm>
           <a:prstGeom prst="wedgeRectCallout">
             <a:avLst>
-              <a:gd name="adj1" fmla="val 29940"/>
-              <a:gd name="adj2" fmla="val 115496"/>
+              <a:gd name="adj1" fmla="val 64773"/>
+              <a:gd name="adj2" fmla="val 121795"/>
             </a:avLst>
           </a:prstGeom>
           <a:noFill/>
@@ -4042,13 +4065,13 @@
         </p:nvSpPr>
         <p:spPr>
           <a:xfrm>
-            <a:off x="2663788" y="1149091"/>
+            <a:off x="1763688" y="1368478"/>
             <a:ext cx="1440160" cy="504056"/>
           </a:xfrm>
           <a:prstGeom prst="wedgeRectCallout">
             <a:avLst>
-              <a:gd name="adj1" fmla="val -29585"/>
-              <a:gd name="adj2" fmla="val 111969"/>
+              <a:gd name="adj1" fmla="val 16393"/>
+              <a:gd name="adj2" fmla="val 116973"/>
             </a:avLst>
           </a:prstGeom>
           <a:noFill/>
@@ -4105,13 +4128,13 @@
         </p:nvSpPr>
         <p:spPr>
           <a:xfrm>
-            <a:off x="323528" y="3352428"/>
+            <a:off x="251520" y="2343658"/>
             <a:ext cx="1404156" cy="504056"/>
           </a:xfrm>
           <a:prstGeom prst="wedgeRectCallout">
             <a:avLst>
-              <a:gd name="adj1" fmla="val 180678"/>
-              <a:gd name="adj2" fmla="val -123347"/>
+              <a:gd name="adj1" fmla="val 191532"/>
+              <a:gd name="adj2" fmla="val 135538"/>
             </a:avLst>
           </a:prstGeom>
           <a:noFill/>
@@ -4192,6 +4215,69 @@
               </a:rPr>
               <a:t>)</a:t>
             </a:r>
+          </a:p>
+        </p:txBody>
+      </p:sp>
+      <p:sp>
+        <p:nvSpPr>
+          <p:cNvPr id="12" name="사각형 설명선 11"/>
+          <p:cNvSpPr/>
+          <p:nvPr/>
+        </p:nvSpPr>
+        <p:spPr>
+          <a:xfrm>
+            <a:off x="4644008" y="1368478"/>
+            <a:ext cx="1296144" cy="504056"/>
+          </a:xfrm>
+          <a:prstGeom prst="wedgeRectCallout">
+            <a:avLst>
+              <a:gd name="adj1" fmla="val -51732"/>
+              <a:gd name="adj2" fmla="val 113835"/>
+            </a:avLst>
+          </a:prstGeom>
+          <a:noFill/>
+          <a:ln>
+            <a:solidFill>
+              <a:schemeClr val="bg1">
+                <a:lumMod val="75000"/>
+              </a:schemeClr>
+            </a:solidFill>
+          </a:ln>
+        </p:spPr>
+        <p:style>
+          <a:lnRef idx="2">
+            <a:schemeClr val="accent1">
+              <a:shade val="50000"/>
+            </a:schemeClr>
+          </a:lnRef>
+          <a:fillRef idx="1">
+            <a:schemeClr val="accent1"/>
+          </a:fillRef>
+          <a:effectRef idx="0">
+            <a:schemeClr val="accent1"/>
+          </a:effectRef>
+          <a:fontRef idx="minor">
+            <a:schemeClr val="lt1"/>
+          </a:fontRef>
+        </p:style>
+        <p:txBody>
+          <a:bodyPr rtlCol="0" anchor="ctr"/>
+          <a:lstStyle/>
+          <a:p>
+            <a:pPr algn="ctr"/>
+            <a:r>
+              <a:rPr lang="ko-KR" altLang="en-US" sz="1200" dirty="0" smtClean="0">
+                <a:solidFill>
+                  <a:schemeClr val="tx1"/>
+                </a:solidFill>
+              </a:rPr>
+              <a:t>머신 이름</a:t>
+            </a:r>
+            <a:endParaRPr lang="en-US" altLang="ko-KR" sz="1200" dirty="0" smtClean="0">
+              <a:solidFill>
+                <a:schemeClr val="tx1"/>
+              </a:solidFill>
+            </a:endParaRPr>
           </a:p>
         </p:txBody>
       </p:sp>
@@ -4328,7 +4414,7 @@
       </p:sp>
       <p:pic>
         <p:nvPicPr>
-          <p:cNvPr id="2" name="그림 1"/>
+          <p:cNvPr id="4" name="그림 3"/>
           <p:cNvPicPr>
             <a:picLocks noChangeAspect="1"/>
           </p:cNvPicPr>
@@ -4348,8 +4434,8 @@
         </p:blipFill>
         <p:spPr>
           <a:xfrm>
-            <a:off x="1860423" y="1750529"/>
-            <a:ext cx="5423154" cy="3356943"/>
+            <a:off x="1734030" y="1986213"/>
+            <a:ext cx="5675940" cy="3513417"/>
           </a:xfrm>
           <a:prstGeom prst="rect">
             <a:avLst/>
@@ -4452,7 +4538,7 @@
       </p:sp>
       <p:pic>
         <p:nvPicPr>
-          <p:cNvPr id="4" name="그림 3"/>
+          <p:cNvPr id="2" name="그림 1"/>
           <p:cNvPicPr>
             <a:picLocks noChangeAspect="1"/>
           </p:cNvPicPr>
@@ -4472,8 +4558,8 @@
         </p:blipFill>
         <p:spPr>
           <a:xfrm>
-            <a:off x="1860423" y="1750529"/>
-            <a:ext cx="5423154" cy="3356943"/>
+            <a:off x="1734030" y="1968505"/>
+            <a:ext cx="5675940" cy="3513417"/>
           </a:xfrm>
           <a:prstGeom prst="rect">
             <a:avLst/>
@@ -4574,13 +4660,19 @@
             </a:r>
             <a:r>
               <a:rPr lang="ko-KR" altLang="en-US" sz="1200" dirty="0" smtClean="0"/>
-              <a:t>이미지를 </a:t>
+              <a:t>아이콘을 </a:t>
             </a:r>
             <a:r>
               <a:rPr lang="ko-KR" altLang="en-US" sz="1200" dirty="0" smtClean="0">
                 <a:sym typeface="Wingdings" panose="05000000000000000000" pitchFamily="2" charset="2"/>
               </a:rPr>
-              <a:t>마우스 왼쪽 버튼 클릭</a:t>
+              <a:t>마우스 </a:t>
+            </a:r>
+            <a:r>
+              <a:rPr lang="ko-KR" altLang="en-US" sz="1200" dirty="0" smtClean="0">
+                <a:sym typeface="Wingdings" panose="05000000000000000000" pitchFamily="2" charset="2"/>
+              </a:rPr>
+              <a:t>왼쪽 버튼 클릭</a:t>
             </a:r>
             <a:endParaRPr lang="ko-KR" altLang="en-US" sz="1200" dirty="0"/>
           </a:p>
@@ -4588,7 +4680,7 @@
       </p:sp>
       <p:pic>
         <p:nvPicPr>
-          <p:cNvPr id="5" name="그림 4"/>
+          <p:cNvPr id="2" name="그림 1"/>
           <p:cNvPicPr>
             <a:picLocks noChangeAspect="1"/>
           </p:cNvPicPr>
@@ -4608,8 +4700,8 @@
         </p:blipFill>
         <p:spPr>
           <a:xfrm>
-            <a:off x="467544" y="1340768"/>
-            <a:ext cx="5423154" cy="3356943"/>
+            <a:off x="179512" y="1196752"/>
+            <a:ext cx="5677705" cy="3514511"/>
           </a:xfrm>
           <a:prstGeom prst="rect">
             <a:avLst/>
@@ -4618,7 +4710,7 @@
       </p:pic>
       <p:pic>
         <p:nvPicPr>
-          <p:cNvPr id="6" name="그림 5"/>
+          <p:cNvPr id="4" name="그림 3"/>
           <p:cNvPicPr>
             <a:picLocks noChangeAspect="1"/>
           </p:cNvPicPr>
@@ -4638,8 +4730,8 @@
         </p:blipFill>
         <p:spPr>
           <a:xfrm>
-            <a:off x="3253302" y="3096393"/>
-            <a:ext cx="5423154" cy="3356943"/>
+            <a:off x="3275856" y="3140968"/>
+            <a:ext cx="5677705" cy="3514511"/>
           </a:xfrm>
           <a:prstGeom prst="rect">
             <a:avLst/>
@@ -4836,7 +4928,7 @@
       </p:grpSpPr>
       <p:pic>
         <p:nvPicPr>
-          <p:cNvPr id="14" name="그림 13"/>
+          <p:cNvPr id="8" name="그림 7"/>
           <p:cNvPicPr>
             <a:picLocks noChangeAspect="1"/>
           </p:cNvPicPr>
@@ -4856,8 +4948,8 @@
         </p:blipFill>
         <p:spPr>
           <a:xfrm>
-            <a:off x="1861200" y="1749600"/>
-            <a:ext cx="5399227" cy="3342132"/>
+            <a:off x="1860423" y="1750529"/>
+            <a:ext cx="5423154" cy="3356943"/>
           </a:xfrm>
           <a:prstGeom prst="rect">
             <a:avLst/>
@@ -4945,13 +5037,13 @@
         </p:nvSpPr>
         <p:spPr>
           <a:xfrm>
-            <a:off x="60896" y="1252368"/>
-            <a:ext cx="1846808" cy="392552"/>
+            <a:off x="251520" y="1704003"/>
+            <a:ext cx="1509511" cy="592456"/>
           </a:xfrm>
           <a:prstGeom prst="wedgeRectCallout">
             <a:avLst>
-              <a:gd name="adj1" fmla="val 54683"/>
-              <a:gd name="adj2" fmla="val 198064"/>
+              <a:gd name="adj1" fmla="val 67075"/>
+              <a:gd name="adj2" fmla="val 67661"/>
             </a:avLst>
           </a:prstGeom>
           <a:noFill/>
@@ -4983,22 +5075,44 @@
           <a:bodyPr rtlCol="0" anchor="ctr"/>
           <a:lstStyle/>
           <a:p>
-            <a:pPr algn="ctr"/>
             <a:r>
               <a:rPr lang="ko-KR" altLang="en-US" sz="1000" dirty="0" smtClean="0">
                 <a:solidFill>
                   <a:schemeClr val="tx1"/>
                 </a:solidFill>
               </a:rPr>
-              <a:t>각종 설정 화면 진입 시 입력해야 하는 </a:t>
-            </a:r>
+              <a:t>각종 설정 화면 </a:t>
+            </a:r>
+            <a:r>
+              <a:rPr lang="ko-KR" altLang="en-US" sz="1000" dirty="0" smtClean="0">
+                <a:solidFill>
+                  <a:schemeClr val="tx1"/>
+                </a:solidFill>
+              </a:rPr>
+              <a:t>진입 시 입력해야 하는</a:t>
+            </a:r>
+            <a:endParaRPr lang="en-US" altLang="ko-KR" sz="1000" dirty="0" smtClean="0">
+              <a:solidFill>
+                <a:schemeClr val="tx1"/>
+              </a:solidFill>
+            </a:endParaRPr>
+          </a:p>
+          <a:p>
             <a:r>
               <a:rPr lang="en-US" altLang="ko-KR" sz="1000" dirty="0" smtClean="0">
                 <a:solidFill>
                   <a:schemeClr val="tx1"/>
                 </a:solidFill>
               </a:rPr>
-              <a:t>System password</a:t>
+              <a:t>System </a:t>
+            </a:r>
+            <a:r>
+              <a:rPr lang="en-US" altLang="ko-KR" sz="1000" dirty="0" smtClean="0">
+                <a:solidFill>
+                  <a:schemeClr val="tx1"/>
+                </a:solidFill>
+              </a:rPr>
+              <a:t>password</a:t>
             </a:r>
           </a:p>
         </p:txBody>
@@ -5011,13 +5125,13 @@
         </p:nvSpPr>
         <p:spPr>
           <a:xfrm>
-            <a:off x="61610" y="2204864"/>
+            <a:off x="274977" y="2382507"/>
             <a:ext cx="1486054" cy="268939"/>
           </a:xfrm>
           <a:prstGeom prst="wedgeRectCallout">
             <a:avLst>
-              <a:gd name="adj1" fmla="val 80822"/>
-              <a:gd name="adj2" fmla="val 19707"/>
+              <a:gd name="adj1" fmla="val 67006"/>
+              <a:gd name="adj2" fmla="val 10262"/>
             </a:avLst>
           </a:prstGeom>
           <a:noFill/>
@@ -5089,13 +5203,13 @@
         </p:nvSpPr>
         <p:spPr>
           <a:xfrm>
-            <a:off x="61610" y="2564904"/>
+            <a:off x="274977" y="2734407"/>
             <a:ext cx="1486054" cy="359033"/>
           </a:xfrm>
           <a:prstGeom prst="wedgeRectCallout">
             <a:avLst>
-              <a:gd name="adj1" fmla="val 78967"/>
-              <a:gd name="adj2" fmla="val -17180"/>
+              <a:gd name="adj1" fmla="val 64438"/>
+              <a:gd name="adj2" fmla="val -23075"/>
             </a:avLst>
           </a:prstGeom>
           <a:noFill/>
@@ -5191,7 +5305,7 @@
         </p:nvSpPr>
         <p:spPr>
           <a:xfrm>
-            <a:off x="1979712" y="2507185"/>
+            <a:off x="1978998" y="2651446"/>
             <a:ext cx="45719" cy="353690"/>
           </a:xfrm>
           <a:prstGeom prst="leftBrace">
@@ -5229,13 +5343,13 @@
         </p:nvSpPr>
         <p:spPr>
           <a:xfrm>
-            <a:off x="60896" y="3016045"/>
+            <a:off x="274977" y="3175922"/>
             <a:ext cx="1486768" cy="268939"/>
           </a:xfrm>
           <a:prstGeom prst="wedgeRectCallout">
             <a:avLst>
-              <a:gd name="adj1" fmla="val 79381"/>
-              <a:gd name="adj2" fmla="val -65294"/>
+              <a:gd name="adj1" fmla="val 66853"/>
+              <a:gd name="adj2" fmla="val -61359"/>
             </a:avLst>
           </a:prstGeom>
           <a:noFill/>
@@ -5291,13 +5405,13 @@
         </p:nvSpPr>
         <p:spPr>
           <a:xfrm>
-            <a:off x="60896" y="4718729"/>
+            <a:off x="60896" y="4885869"/>
             <a:ext cx="1702792" cy="440844"/>
           </a:xfrm>
           <a:prstGeom prst="wedgeRectCallout">
             <a:avLst>
-              <a:gd name="adj1" fmla="val 62814"/>
-              <a:gd name="adj2" fmla="val -244678"/>
+              <a:gd name="adj1" fmla="val 64430"/>
+              <a:gd name="adj2" fmla="val -247559"/>
             </a:avLst>
           </a:prstGeom>
           <a:noFill/>
@@ -5355,13 +5469,113 @@
       </p:sp>
       <p:sp>
         <p:nvSpPr>
+          <p:cNvPr id="10" name="왼쪽 중괄호 9"/>
+          <p:cNvSpPr/>
+          <p:nvPr/>
+        </p:nvSpPr>
+        <p:spPr>
+          <a:xfrm>
+            <a:off x="1977769" y="3383786"/>
+            <a:ext cx="45719" cy="493023"/>
+          </a:xfrm>
+          <a:prstGeom prst="leftBrace">
+            <a:avLst/>
+          </a:prstGeom>
+        </p:spPr>
+        <p:style>
+          <a:lnRef idx="1">
+            <a:schemeClr val="accent1"/>
+          </a:lnRef>
+          <a:fillRef idx="0">
+            <a:schemeClr val="accent1"/>
+          </a:fillRef>
+          <a:effectRef idx="0">
+            <a:schemeClr val="accent1"/>
+          </a:effectRef>
+          <a:fontRef idx="minor">
+            <a:schemeClr val="tx1"/>
+          </a:fontRef>
+        </p:style>
+        <p:txBody>
+          <a:bodyPr rtlCol="0" anchor="ctr"/>
+          <a:lstStyle/>
+          <a:p>
+            <a:pPr algn="ctr"/>
+            <a:endParaRPr lang="ko-KR" altLang="en-US"/>
+          </a:p>
+        </p:txBody>
+      </p:sp>
+      <p:sp>
+        <p:nvSpPr>
+          <p:cNvPr id="15" name="사각형 설명선 14"/>
+          <p:cNvSpPr/>
+          <p:nvPr/>
+        </p:nvSpPr>
+        <p:spPr>
+          <a:xfrm>
+            <a:off x="1860423" y="1371879"/>
+            <a:ext cx="767361" cy="268939"/>
+          </a:xfrm>
+          <a:prstGeom prst="wedgeRectCallout">
+            <a:avLst>
+              <a:gd name="adj1" fmla="val -23542"/>
+              <a:gd name="adj2" fmla="val 256213"/>
+            </a:avLst>
+          </a:prstGeom>
+          <a:noFill/>
+          <a:ln>
+            <a:solidFill>
+              <a:schemeClr val="bg1">
+                <a:lumMod val="75000"/>
+              </a:schemeClr>
+            </a:solidFill>
+          </a:ln>
+        </p:spPr>
+        <p:style>
+          <a:lnRef idx="2">
+            <a:schemeClr val="accent1">
+              <a:shade val="50000"/>
+            </a:schemeClr>
+          </a:lnRef>
+          <a:fillRef idx="1">
+            <a:schemeClr val="accent1"/>
+          </a:fillRef>
+          <a:effectRef idx="0">
+            <a:schemeClr val="accent1"/>
+          </a:effectRef>
+          <a:fontRef idx="minor">
+            <a:schemeClr val="lt1"/>
+          </a:fontRef>
+        </p:style>
+        <p:txBody>
+          <a:bodyPr rtlCol="0" anchor="ctr"/>
+          <a:lstStyle/>
+          <a:p>
+            <a:r>
+              <a:rPr lang="ko-KR" altLang="en-US" sz="1000" smtClean="0">
+                <a:solidFill>
+                  <a:schemeClr val="tx1"/>
+                </a:solidFill>
+              </a:rPr>
+              <a:t>머신 이름</a:t>
+            </a:r>
+            <a:endParaRPr lang="en-US" altLang="ko-KR" sz="1000" dirty="0" smtClean="0">
+              <a:solidFill>
+                <a:schemeClr val="tx1"/>
+              </a:solidFill>
+            </a:endParaRPr>
+          </a:p>
+        </p:txBody>
+      </p:sp>
+      <p:sp>
+        <p:nvSpPr>
           <p:cNvPr id="11" name="사각형 설명선 10"/>
           <p:cNvSpPr/>
           <p:nvPr/>
         </p:nvSpPr>
         <p:spPr>
           <a:xfrm>
-            <a:off x="76002" y="3377092"/>
+            <a:off x="74059" y="3527343"/>
             <a:ext cx="1687686" cy="1276044"/>
           </a:xfrm>
           <a:prstGeom prst="wedgeRectCallout">
@@ -5519,44 +5733,6 @@
                 <a:schemeClr val="tx1"/>
               </a:solidFill>
             </a:endParaRPr>
-          </a:p>
-        </p:txBody>
-      </p:sp>
-      <p:sp>
-        <p:nvSpPr>
-          <p:cNvPr id="10" name="왼쪽 중괄호 9"/>
-          <p:cNvSpPr/>
-          <p:nvPr/>
-        </p:nvSpPr>
-        <p:spPr>
-          <a:xfrm>
-            <a:off x="1979712" y="3233535"/>
-            <a:ext cx="45719" cy="493023"/>
-          </a:xfrm>
-          <a:prstGeom prst="leftBrace">
-            <a:avLst/>
-          </a:prstGeom>
-        </p:spPr>
-        <p:style>
-          <a:lnRef idx="1">
-            <a:schemeClr val="accent1"/>
-          </a:lnRef>
-          <a:fillRef idx="0">
-            <a:schemeClr val="accent1"/>
-          </a:fillRef>
-          <a:effectRef idx="0">
-            <a:schemeClr val="accent1"/>
-          </a:effectRef>
-          <a:fontRef idx="minor">
-            <a:schemeClr val="tx1"/>
-          </a:fontRef>
-        </p:style>
-        <p:txBody>
-          <a:bodyPr rtlCol="0" anchor="ctr"/>
-          <a:lstStyle/>
-          <a:p>
-            <a:pPr algn="ctr"/>
-            <a:endParaRPr lang="ko-KR" altLang="en-US"/>
           </a:p>
         </p:txBody>
       </p:sp>

</xml_diff>